<commit_message>
Code snippets in VS presentation
</commit_message>
<xml_diff>
--- a/Presentation/tools-visual-studio.pptx
+++ b/Presentation/tools-visual-studio.pptx
@@ -6,7 +6,7 @@
     <p:sldMasterId id="2147483663" r:id="rId2"/>
   </p:sldMasterIdLst>
   <p:notesMasterIdLst>
-    <p:notesMasterId r:id="rId19"/>
+    <p:notesMasterId r:id="rId21"/>
   </p:notesMasterIdLst>
   <p:sldIdLst>
     <p:sldId id="257" r:id="rId3"/>
@@ -20,11 +20,13 @@
     <p:sldId id="271" r:id="rId11"/>
     <p:sldId id="266" r:id="rId12"/>
     <p:sldId id="269" r:id="rId13"/>
-    <p:sldId id="267" r:id="rId14"/>
-    <p:sldId id="268" r:id="rId15"/>
-    <p:sldId id="260" r:id="rId16"/>
-    <p:sldId id="261" r:id="rId17"/>
-    <p:sldId id="258" r:id="rId18"/>
+    <p:sldId id="273" r:id="rId14"/>
+    <p:sldId id="274" r:id="rId15"/>
+    <p:sldId id="267" r:id="rId16"/>
+    <p:sldId id="268" r:id="rId17"/>
+    <p:sldId id="260" r:id="rId18"/>
+    <p:sldId id="261" r:id="rId19"/>
+    <p:sldId id="258" r:id="rId20"/>
   </p:sldIdLst>
   <p:sldSz cx="9144000" cy="6858000" type="screen4x3"/>
   <p:notesSz cx="6858000" cy="9144000"/>
@@ -208,7 +210,7 @@
           <a:p>
             <a:fld id="{B24A7054-7FFB-49F4-A126-5DF6E687FF53}" type="datetimeFigureOut">
               <a:rPr lang="ru-RU" smtClean="0"/>
-              <a:t>26.09.2013</a:t>
+              <a:t>27.09.2013</a:t>
             </a:fld>
             <a:endParaRPr lang="ru-RU"/>
           </a:p>
@@ -1490,7 +1492,7 @@
           <a:p>
             <a:fld id="{8E6E6A2A-E9D3-4A0D-B04A-ABDD367A1E08}" type="datetimeFigureOut">
               <a:rPr lang="ru-RU" smtClean="0"/>
-              <a:t>26.09.2013</a:t>
+              <a:t>27.09.2013</a:t>
             </a:fld>
             <a:endParaRPr lang="ru-RU"/>
           </a:p>
@@ -4003,7 +4005,7 @@
                 </a:solidFill>
               </a:rPr>
               <a:pPr/>
-              <a:t>26.09.2013</a:t>
+              <a:t>27.09.2013</a:t>
             </a:fld>
             <a:endParaRPr lang="ru-RU">
               <a:solidFill>
@@ -5264,7 +5266,7 @@
           <a:p>
             <a:fld id="{AC3D3127-B7C4-45E3-9797-C527EC9FDD78}" type="datetimeFigureOut">
               <a:rPr lang="ru-RU" smtClean="0"/>
-              <a:t>26.09.2013</a:t>
+              <a:t>27.09.2013</a:t>
             </a:fld>
             <a:endParaRPr lang="ru-RU"/>
           </a:p>
@@ -5800,7 +5802,7 @@
                 </a:solidFill>
               </a:rPr>
               <a:pPr/>
-              <a:t>26.09.2013</a:t>
+              <a:t>27.09.2013</a:t>
             </a:fld>
             <a:endParaRPr lang="ru-RU">
               <a:solidFill>
@@ -6475,7 +6477,7 @@
               </a:buClr>
             </a:pPr>
             <a:r>
-              <a:rPr lang="en-US" smtClean="0">
+              <a:rPr lang="en-US" dirty="0" smtClean="0">
                 <a:solidFill>
                   <a:srgbClr val="F6AE1E"/>
                 </a:solidFill>
@@ -6483,7 +6485,7 @@
               <a:t>F12</a:t>
             </a:r>
             <a:r>
-              <a:rPr lang="en-US" smtClean="0">
+              <a:rPr lang="en-US" dirty="0" smtClean="0">
                 <a:solidFill>
                   <a:schemeClr val="bg1"/>
                 </a:solidFill>
@@ -6721,6 +6723,13 @@
   <p:clrMapOvr>
     <a:overrideClrMapping bg1="lt1" tx1="dk1" bg2="lt2" tx2="dk2" accent1="accent1" accent2="accent2" accent3="accent3" accent4="accent4" accent5="accent5" accent6="accent6" hlink="hlink" folHlink="folHlink"/>
   </p:clrMapOvr>
+  <p:timing>
+    <p:tnLst>
+      <p:par>
+        <p:cTn id="1" dur="indefinite" restart="never" nodeType="tmRoot"/>
+      </p:par>
+    </p:tnLst>
+  </p:timing>
 </p:sld>
 </file>
 
@@ -6947,20 +6956,6 @@
 <file path=ppt/slides/slide12.xml><?xml version="1.0" encoding="utf-8"?>
 <p:sld xmlns:a="http://schemas.openxmlformats.org/drawingml/2006/main" xmlns:r="http://schemas.openxmlformats.org/officeDocument/2006/relationships" xmlns:p="http://schemas.openxmlformats.org/presentationml/2006/main">
   <p:cSld>
-    <p:bg>
-      <p:bgPr>
-        <a:blipFill dpi="0" rotWithShape="1">
-          <a:blip r:embed="rId3">
-            <a:lum/>
-          </a:blip>
-          <a:srcRect/>
-          <a:stretch>
-            <a:fillRect/>
-          </a:stretch>
-        </a:blipFill>
-        <a:effectLst/>
-      </p:bgPr>
-    </p:bg>
     <p:spTree>
       <p:nvGrpSpPr>
         <p:cNvPr id="1" name=""/>
@@ -6992,11 +6987,15 @@
           <a:p>
             <a:r>
               <a:rPr lang="ru-RU" dirty="0" smtClean="0"/>
-              <a:t>Окна: </a:t>
+              <a:t>Редактор</a:t>
             </a:r>
             <a:r>
               <a:rPr lang="en-US" dirty="0" smtClean="0"/>
-              <a:t>Bookmarks</a:t>
+              <a:t>: </a:t>
+            </a:r>
+            <a:r>
+              <a:rPr lang="en-US" dirty="0" smtClean="0"/>
+              <a:t>Code Snippets</a:t>
             </a:r>
             <a:endParaRPr lang="en-US" dirty="0"/>
           </a:p>
@@ -7019,70 +7018,31 @@
           </a:bodyPr>
           <a:lstStyle/>
           <a:p>
-            <a:pPr>
+            <a:pPr marL="0" indent="0">
+              <a:spcAft>
+                <a:spcPts val="600"/>
+              </a:spcAft>
               <a:buClr>
                 <a:schemeClr val="bg1"/>
               </a:buClr>
+              <a:buNone/>
             </a:pPr>
             <a:r>
-              <a:rPr lang="ru-RU" dirty="0">
+              <a:rPr lang="en-US" dirty="0" smtClean="0">
                 <a:solidFill>
                   <a:schemeClr val="bg1"/>
                 </a:solidFill>
               </a:rPr>
-              <a:t>Закладки в текстовых файлах</a:t>
-            </a:r>
-            <a:endParaRPr lang="en-US" dirty="0" smtClean="0">
-              <a:solidFill>
-                <a:schemeClr val="bg1"/>
-              </a:solidFill>
-            </a:endParaRPr>
-          </a:p>
-          <a:p>
-            <a:pPr>
-              <a:buClr>
-                <a:schemeClr val="bg1"/>
-              </a:buClr>
-            </a:pPr>
+              <a:t>“Code Snippets” </a:t>
+            </a:r>
             <a:r>
               <a:rPr lang="ru-RU" dirty="0" smtClean="0">
                 <a:solidFill>
                   <a:schemeClr val="bg1"/>
                 </a:solidFill>
               </a:rPr>
-              <a:t>Команды меню </a:t>
-            </a:r>
-            <a:r>
-              <a:rPr lang="en-US" dirty="0" smtClean="0">
-                <a:solidFill>
-                  <a:schemeClr val="bg1"/>
-                </a:solidFill>
-              </a:rPr>
-              <a:t>View -&gt; Bookmark Window</a:t>
-            </a:r>
-            <a:r>
-              <a:rPr lang="ru-RU" dirty="0" smtClean="0">
-                <a:solidFill>
-                  <a:schemeClr val="bg1"/>
-                </a:solidFill>
-              </a:rPr>
-              <a:t> и </a:t>
-            </a:r>
-            <a:r>
-              <a:rPr lang="en-US" dirty="0" smtClean="0">
-                <a:solidFill>
-                  <a:schemeClr val="bg1"/>
-                </a:solidFill>
-              </a:rPr>
-              <a:t>Edit -&gt; Bookmarks.</a:t>
-            </a:r>
-          </a:p>
-          <a:p>
-            <a:pPr>
-              <a:buClr>
-                <a:schemeClr val="bg1"/>
-              </a:buClr>
-            </a:pPr>
+              <a:t>это короткие шаблоны кода на различных языках программирования.</a:t>
+            </a:r>
             <a:endParaRPr lang="ru-RU" dirty="0" smtClean="0">
               <a:solidFill>
                 <a:schemeClr val="bg1"/>
@@ -7090,11 +7050,103 @@
             </a:endParaRPr>
           </a:p>
           <a:p>
-            <a:pPr>
+            <a:pPr marL="0" indent="0">
+              <a:spcAft>
+                <a:spcPts val="600"/>
+              </a:spcAft>
               <a:buClr>
                 <a:schemeClr val="bg1"/>
               </a:buClr>
+              <a:buNone/>
             </a:pPr>
+            <a:r>
+              <a:rPr lang="ru-RU" dirty="0" smtClean="0">
+                <a:solidFill>
+                  <a:schemeClr val="bg1"/>
+                </a:solidFill>
+              </a:rPr>
+              <a:t>Шаблону может быть назначена короткая комбинация (</a:t>
+            </a:r>
+            <a:r>
+              <a:rPr lang="en-US" dirty="0" smtClean="0">
+                <a:solidFill>
+                  <a:schemeClr val="bg1"/>
+                </a:solidFill>
+              </a:rPr>
+              <a:t>shortcut</a:t>
+            </a:r>
+            <a:r>
+              <a:rPr lang="ru-RU" dirty="0" smtClean="0">
+                <a:solidFill>
+                  <a:schemeClr val="bg1"/>
+                </a:solidFill>
+              </a:rPr>
+              <a:t>) для быстрой вставки. Набрав</a:t>
+            </a:r>
+            <a:r>
+              <a:rPr lang="en-US" dirty="0">
+                <a:solidFill>
+                  <a:schemeClr val="bg1"/>
+                </a:solidFill>
+              </a:rPr>
+              <a:t> </a:t>
+            </a:r>
+            <a:r>
+              <a:rPr lang="en-US" dirty="0" smtClean="0">
+                <a:solidFill>
+                  <a:schemeClr val="bg1"/>
+                </a:solidFill>
+              </a:rPr>
+              <a:t>shortcut </a:t>
+            </a:r>
+            <a:r>
+              <a:rPr lang="ru-RU" dirty="0" smtClean="0">
+                <a:solidFill>
+                  <a:schemeClr val="bg1"/>
+                </a:solidFill>
+              </a:rPr>
+              <a:t>и нажав </a:t>
+            </a:r>
+            <a:r>
+              <a:rPr lang="en-US" dirty="0" smtClean="0">
+                <a:solidFill>
+                  <a:srgbClr val="F6AE1E"/>
+                </a:solidFill>
+              </a:rPr>
+              <a:t>Tab</a:t>
+            </a:r>
+            <a:r>
+              <a:rPr lang="en-US" dirty="0" smtClean="0">
+                <a:solidFill>
+                  <a:schemeClr val="bg1"/>
+                </a:solidFill>
+              </a:rPr>
+              <a:t> </a:t>
+            </a:r>
+            <a:r>
+              <a:rPr lang="ru-RU" dirty="0">
+                <a:solidFill>
+                  <a:schemeClr val="bg1"/>
+                </a:solidFill>
+              </a:rPr>
+              <a:t>мы </a:t>
+            </a:r>
+            <a:r>
+              <a:rPr lang="ru-RU" dirty="0" smtClean="0">
+                <a:solidFill>
+                  <a:schemeClr val="bg1"/>
+                </a:solidFill>
+              </a:rPr>
+              <a:t>получим текст шаблона в месте где был </a:t>
+            </a:r>
+            <a:r>
+              <a:rPr lang="en-US" dirty="0" smtClean="0">
+                <a:solidFill>
+                  <a:schemeClr val="bg1"/>
+                </a:solidFill>
+              </a:rPr>
+              <a:t>shortcut.</a:t>
+            </a:r>
             <a:endParaRPr lang="ru-RU" dirty="0" smtClean="0">
               <a:solidFill>
                 <a:schemeClr val="bg1"/>
@@ -7102,11 +7154,31 @@
             </a:endParaRPr>
           </a:p>
           <a:p>
-            <a:pPr>
+            <a:pPr marL="0" indent="0">
+              <a:spcAft>
+                <a:spcPts val="600"/>
+              </a:spcAft>
               <a:buClr>
                 <a:schemeClr val="bg1"/>
               </a:buClr>
+              <a:buNone/>
             </a:pPr>
+            <a:r>
+              <a:rPr lang="ru-RU" dirty="0" smtClean="0">
+                <a:solidFill>
+                  <a:schemeClr val="bg1"/>
+                </a:solidFill>
+              </a:rPr>
+              <a:t>Настройка производится через меню </a:t>
+            </a:r>
+            <a:r>
+              <a:rPr lang="en-US" dirty="0" smtClean="0">
+                <a:solidFill>
+                  <a:schemeClr val="bg1"/>
+                </a:solidFill>
+              </a:rPr>
+              <a:t>Tools -&gt; Code Snippets Manager.</a:t>
+            </a:r>
             <a:endParaRPr lang="ru-RU" dirty="0" smtClean="0">
               <a:solidFill>
                 <a:schemeClr val="bg1"/>
@@ -7131,17 +7203,1281 @@
     </p:spTree>
     <p:extLst>
       <p:ext uri="{BB962C8B-B14F-4D97-AF65-F5344CB8AC3E}">
-        <p14:creationId xmlns:p14="http://schemas.microsoft.com/office/powerpoint/2010/main" val="3985499755"/>
+        <p14:creationId xmlns:p14="http://schemas.microsoft.com/office/powerpoint/2010/main" val="3245183492"/>
       </p:ext>
     </p:extLst>
   </p:cSld>
   <p:clrMapOvr>
-    <a:overrideClrMapping bg1="lt1" tx1="dk1" bg2="lt2" tx2="dk2" accent1="accent1" accent2="accent2" accent3="accent3" accent4="accent4" accent5="accent5" accent6="accent6" hlink="hlink" folHlink="folHlink"/>
+    <a:masterClrMapping/>
   </p:clrMapOvr>
+  <p:timing>
+    <p:tnLst>
+      <p:par>
+        <p:cTn id="1" dur="indefinite" restart="never" nodeType="tmRoot"/>
+      </p:par>
+    </p:tnLst>
+  </p:timing>
 </p:sld>
 </file>
 
 <file path=ppt/slides/slide13.xml><?xml version="1.0" encoding="utf-8"?>
+<p:sld xmlns:a="http://schemas.openxmlformats.org/drawingml/2006/main" xmlns:r="http://schemas.openxmlformats.org/officeDocument/2006/relationships" xmlns:p="http://schemas.openxmlformats.org/presentationml/2006/main">
+  <p:cSld>
+    <p:spTree>
+      <p:nvGrpSpPr>
+        <p:cNvPr id="1" name=""/>
+        <p:cNvGrpSpPr/>
+        <p:nvPr/>
+      </p:nvGrpSpPr>
+      <p:grpSpPr>
+        <a:xfrm>
+          <a:off x="0" y="0"/>
+          <a:ext cx="0" cy="0"/>
+          <a:chOff x="0" y="0"/>
+          <a:chExt cx="0" cy="0"/>
+        </a:xfrm>
+      </p:grpSpPr>
+      <p:sp>
+        <p:nvSpPr>
+          <p:cNvPr id="2" name="Title 1"/>
+          <p:cNvSpPr>
+            <a:spLocks noGrp="1"/>
+          </p:cNvSpPr>
+          <p:nvPr>
+            <p:ph type="title"/>
+          </p:nvPr>
+        </p:nvSpPr>
+        <p:spPr/>
+        <p:txBody>
+          <a:bodyPr/>
+          <a:lstStyle/>
+          <a:p>
+            <a:r>
+              <a:rPr lang="en-US" dirty="0" smtClean="0"/>
+              <a:t>Code Snippets (C#)</a:t>
+            </a:r>
+            <a:endParaRPr lang="en-US" dirty="0"/>
+          </a:p>
+        </p:txBody>
+      </p:sp>
+      <p:graphicFrame>
+        <p:nvGraphicFramePr>
+          <p:cNvPr id="4" name="Content Placeholder 3"/>
+          <p:cNvGraphicFramePr>
+            <a:graphicFrameLocks noGrp="1"/>
+          </p:cNvGraphicFramePr>
+          <p:nvPr>
+            <p:ph idx="1"/>
+            <p:extLst>
+              <p:ext uri="{D42A27DB-BD31-4B8C-83A1-F6EECF244321}">
+                <p14:modId xmlns:p14="http://schemas.microsoft.com/office/powerpoint/2010/main" val="1417421607"/>
+              </p:ext>
+            </p:extLst>
+          </p:nvPr>
+        </p:nvGraphicFramePr>
+        <p:xfrm>
+          <a:off x="457200" y="1600200"/>
+          <a:ext cx="8229600" cy="2966720"/>
+        </p:xfrm>
+        <a:graphic>
+          <a:graphicData uri="http://schemas.openxmlformats.org/drawingml/2006/table">
+            <a:tbl>
+              <a:tblPr firstRow="1" bandRow="1">
+                <a:tableStyleId>{5C22544A-7EE6-4342-B048-85BDC9FD1C3A}</a:tableStyleId>
+              </a:tblPr>
+              <a:tblGrid>
+                <a:gridCol w="2098576"/>
+                <a:gridCol w="6131024"/>
+              </a:tblGrid>
+              <a:tr h="370840">
+                <a:tc>
+                  <a:txBody>
+                    <a:bodyPr/>
+                    <a:lstStyle/>
+                    <a:p>
+                      <a:r>
+                        <a:rPr lang="en-US" dirty="0" smtClean="0">
+                          <a:solidFill>
+                            <a:srgbClr val="0070C0"/>
+                          </a:solidFill>
+                        </a:rPr>
+                        <a:t>Shortcut</a:t>
+                      </a:r>
+                      <a:endParaRPr lang="en-US" dirty="0">
+                        <a:solidFill>
+                          <a:srgbClr val="0070C0"/>
+                        </a:solidFill>
+                      </a:endParaRPr>
+                    </a:p>
+                  </a:txBody>
+                  <a:tcPr>
+                    <a:lnL w="12700" cap="flat" cmpd="sng" algn="ctr">
+                      <a:solidFill>
+                        <a:schemeClr val="tx1"/>
+                      </a:solidFill>
+                      <a:prstDash val="solid"/>
+                      <a:round/>
+                      <a:headEnd type="none" w="med" len="med"/>
+                      <a:tailEnd type="none" w="med" len="med"/>
+                    </a:lnL>
+                    <a:lnR w="12700" cap="flat" cmpd="sng" algn="ctr">
+                      <a:solidFill>
+                        <a:srgbClr val="0070C0"/>
+                      </a:solidFill>
+                      <a:prstDash val="solid"/>
+                      <a:round/>
+                      <a:headEnd type="none" w="med" len="med"/>
+                      <a:tailEnd type="none" w="med" len="med"/>
+                    </a:lnR>
+                    <a:lnT w="12700" cap="flat" cmpd="sng" algn="ctr">
+                      <a:solidFill>
+                        <a:schemeClr val="tx1"/>
+                      </a:solidFill>
+                      <a:prstDash val="solid"/>
+                      <a:round/>
+                      <a:headEnd type="none" w="med" len="med"/>
+                      <a:tailEnd type="none" w="med" len="med"/>
+                    </a:lnT>
+                    <a:lnB w="12700" cap="flat" cmpd="sng" algn="ctr">
+                      <a:solidFill>
+                        <a:schemeClr val="tx1"/>
+                      </a:solidFill>
+                      <a:prstDash val="solid"/>
+                      <a:round/>
+                      <a:headEnd type="none" w="med" len="med"/>
+                      <a:tailEnd type="none" w="med" len="med"/>
+                    </a:lnB>
+                    <a:lnTlToBr w="12700" cmpd="sng">
+                      <a:noFill/>
+                      <a:prstDash val="solid"/>
+                    </a:lnTlToBr>
+                    <a:lnBlToTr w="12700" cmpd="sng">
+                      <a:noFill/>
+                      <a:prstDash val="solid"/>
+                    </a:lnBlToTr>
+                    <a:solidFill>
+                      <a:schemeClr val="bg1"/>
+                    </a:solidFill>
+                  </a:tcPr>
+                </a:tc>
+                <a:tc>
+                  <a:txBody>
+                    <a:bodyPr/>
+                    <a:lstStyle/>
+                    <a:p>
+                      <a:r>
+                        <a:rPr lang="ru-RU" dirty="0" smtClean="0">
+                          <a:solidFill>
+                            <a:srgbClr val="0070C0"/>
+                          </a:solidFill>
+                        </a:rPr>
+                        <a:t>Назначение</a:t>
+                      </a:r>
+                      <a:endParaRPr lang="en-US" dirty="0">
+                        <a:solidFill>
+                          <a:srgbClr val="0070C0"/>
+                        </a:solidFill>
+                      </a:endParaRPr>
+                    </a:p>
+                  </a:txBody>
+                  <a:tcPr>
+                    <a:lnL w="12700" cap="flat" cmpd="sng" algn="ctr">
+                      <a:solidFill>
+                        <a:srgbClr val="0070C0"/>
+                      </a:solidFill>
+                      <a:prstDash val="solid"/>
+                      <a:round/>
+                      <a:headEnd type="none" w="med" len="med"/>
+                      <a:tailEnd type="none" w="med" len="med"/>
+                    </a:lnL>
+                    <a:lnR w="12700" cap="flat" cmpd="sng" algn="ctr">
+                      <a:solidFill>
+                        <a:schemeClr val="tx1"/>
+                      </a:solidFill>
+                      <a:prstDash val="solid"/>
+                      <a:round/>
+                      <a:headEnd type="none" w="med" len="med"/>
+                      <a:tailEnd type="none" w="med" len="med"/>
+                    </a:lnR>
+                    <a:lnT w="12700" cap="flat" cmpd="sng" algn="ctr">
+                      <a:solidFill>
+                        <a:schemeClr val="tx1"/>
+                      </a:solidFill>
+                      <a:prstDash val="solid"/>
+                      <a:round/>
+                      <a:headEnd type="none" w="med" len="med"/>
+                      <a:tailEnd type="none" w="med" len="med"/>
+                    </a:lnT>
+                    <a:lnB w="12700" cap="flat" cmpd="sng" algn="ctr">
+                      <a:solidFill>
+                        <a:schemeClr val="tx1"/>
+                      </a:solidFill>
+                      <a:prstDash val="solid"/>
+                      <a:round/>
+                      <a:headEnd type="none" w="med" len="med"/>
+                      <a:tailEnd type="none" w="med" len="med"/>
+                    </a:lnB>
+                    <a:lnTlToBr w="12700" cmpd="sng">
+                      <a:noFill/>
+                      <a:prstDash val="solid"/>
+                    </a:lnTlToBr>
+                    <a:lnBlToTr w="12700" cmpd="sng">
+                      <a:noFill/>
+                      <a:prstDash val="solid"/>
+                    </a:lnBlToTr>
+                    <a:solidFill>
+                      <a:schemeClr val="bg1"/>
+                    </a:solidFill>
+                  </a:tcPr>
+                </a:tc>
+              </a:tr>
+              <a:tr h="370840">
+                <a:tc>
+                  <a:txBody>
+                    <a:bodyPr/>
+                    <a:lstStyle/>
+                    <a:p>
+                      <a:r>
+                        <a:rPr lang="en-US" dirty="0" smtClean="0">
+                          <a:solidFill>
+                            <a:schemeClr val="bg1"/>
+                          </a:solidFill>
+                        </a:rPr>
+                        <a:t>class</a:t>
+                      </a:r>
+                      <a:endParaRPr lang="en-US" dirty="0">
+                        <a:solidFill>
+                          <a:schemeClr val="bg1"/>
+                        </a:solidFill>
+                      </a:endParaRPr>
+                    </a:p>
+                  </a:txBody>
+                  <a:tcPr>
+                    <a:lnL w="12700" cap="flat" cmpd="sng" algn="ctr">
+                      <a:solidFill>
+                        <a:schemeClr val="tx1"/>
+                      </a:solidFill>
+                      <a:prstDash val="solid"/>
+                      <a:round/>
+                      <a:headEnd type="none" w="med" len="med"/>
+                      <a:tailEnd type="none" w="med" len="med"/>
+                    </a:lnL>
+                    <a:lnR w="12700" cap="flat" cmpd="sng" algn="ctr">
+                      <a:solidFill>
+                        <a:schemeClr val="tx1"/>
+                      </a:solidFill>
+                      <a:prstDash val="solid"/>
+                      <a:round/>
+                      <a:headEnd type="none" w="med" len="med"/>
+                      <a:tailEnd type="none" w="med" len="med"/>
+                    </a:lnR>
+                    <a:lnT w="12700" cap="flat" cmpd="sng" algn="ctr">
+                      <a:solidFill>
+                        <a:schemeClr val="tx1"/>
+                      </a:solidFill>
+                      <a:prstDash val="solid"/>
+                      <a:round/>
+                      <a:headEnd type="none" w="med" len="med"/>
+                      <a:tailEnd type="none" w="med" len="med"/>
+                    </a:lnT>
+                    <a:lnB w="12700" cap="flat" cmpd="sng" algn="ctr">
+                      <a:solidFill>
+                        <a:schemeClr val="tx1"/>
+                      </a:solidFill>
+                      <a:prstDash val="solid"/>
+                      <a:round/>
+                      <a:headEnd type="none" w="med" len="med"/>
+                      <a:tailEnd type="none" w="med" len="med"/>
+                    </a:lnB>
+                    <a:lnTlToBr w="12700" cmpd="sng">
+                      <a:noFill/>
+                      <a:prstDash val="solid"/>
+                    </a:lnTlToBr>
+                    <a:lnBlToTr w="12700" cmpd="sng">
+                      <a:noFill/>
+                      <a:prstDash val="solid"/>
+                    </a:lnBlToTr>
+                    <a:noFill/>
+                  </a:tcPr>
+                </a:tc>
+                <a:tc>
+                  <a:txBody>
+                    <a:bodyPr/>
+                    <a:lstStyle/>
+                    <a:p>
+                      <a:r>
+                        <a:rPr lang="ru-RU" dirty="0" smtClean="0">
+                          <a:solidFill>
+                            <a:schemeClr val="bg1"/>
+                          </a:solidFill>
+                        </a:rPr>
+                        <a:t>Новый класс</a:t>
+                      </a:r>
+                      <a:endParaRPr lang="en-US" dirty="0">
+                        <a:solidFill>
+                          <a:schemeClr val="bg1"/>
+                        </a:solidFill>
+                      </a:endParaRPr>
+                    </a:p>
+                  </a:txBody>
+                  <a:tcPr>
+                    <a:lnL w="12700" cap="flat" cmpd="sng" algn="ctr">
+                      <a:solidFill>
+                        <a:schemeClr val="tx1"/>
+                      </a:solidFill>
+                      <a:prstDash val="solid"/>
+                      <a:round/>
+                      <a:headEnd type="none" w="med" len="med"/>
+                      <a:tailEnd type="none" w="med" len="med"/>
+                    </a:lnL>
+                    <a:lnR w="12700" cap="flat" cmpd="sng" algn="ctr">
+                      <a:solidFill>
+                        <a:schemeClr val="tx1"/>
+                      </a:solidFill>
+                      <a:prstDash val="solid"/>
+                      <a:round/>
+                      <a:headEnd type="none" w="med" len="med"/>
+                      <a:tailEnd type="none" w="med" len="med"/>
+                    </a:lnR>
+                    <a:lnT w="12700" cap="flat" cmpd="sng" algn="ctr">
+                      <a:solidFill>
+                        <a:schemeClr val="tx1"/>
+                      </a:solidFill>
+                      <a:prstDash val="solid"/>
+                      <a:round/>
+                      <a:headEnd type="none" w="med" len="med"/>
+                      <a:tailEnd type="none" w="med" len="med"/>
+                    </a:lnT>
+                    <a:lnB w="12700" cap="flat" cmpd="sng" algn="ctr">
+                      <a:solidFill>
+                        <a:schemeClr val="tx1"/>
+                      </a:solidFill>
+                      <a:prstDash val="solid"/>
+                      <a:round/>
+                      <a:headEnd type="none" w="med" len="med"/>
+                      <a:tailEnd type="none" w="med" len="med"/>
+                    </a:lnB>
+                    <a:lnTlToBr w="12700" cmpd="sng">
+                      <a:noFill/>
+                      <a:prstDash val="solid"/>
+                    </a:lnTlToBr>
+                    <a:lnBlToTr w="12700" cmpd="sng">
+                      <a:noFill/>
+                      <a:prstDash val="solid"/>
+                    </a:lnBlToTr>
+                    <a:noFill/>
+                  </a:tcPr>
+                </a:tc>
+              </a:tr>
+              <a:tr h="370840">
+                <a:tc>
+                  <a:txBody>
+                    <a:bodyPr/>
+                    <a:lstStyle/>
+                    <a:p>
+                      <a:r>
+                        <a:rPr lang="en-US" dirty="0" err="1" smtClean="0">
+                          <a:solidFill>
+                            <a:schemeClr val="bg1"/>
+                          </a:solidFill>
+                        </a:rPr>
+                        <a:t>ctor</a:t>
+                      </a:r>
+                      <a:endParaRPr lang="en-US" dirty="0">
+                        <a:solidFill>
+                          <a:schemeClr val="bg1"/>
+                        </a:solidFill>
+                      </a:endParaRPr>
+                    </a:p>
+                  </a:txBody>
+                  <a:tcPr>
+                    <a:lnL w="12700" cap="flat" cmpd="sng" algn="ctr">
+                      <a:solidFill>
+                        <a:schemeClr val="tx1"/>
+                      </a:solidFill>
+                      <a:prstDash val="solid"/>
+                      <a:round/>
+                      <a:headEnd type="none" w="med" len="med"/>
+                      <a:tailEnd type="none" w="med" len="med"/>
+                    </a:lnL>
+                    <a:lnR w="12700" cap="flat" cmpd="sng" algn="ctr">
+                      <a:solidFill>
+                        <a:schemeClr val="tx1"/>
+                      </a:solidFill>
+                      <a:prstDash val="solid"/>
+                      <a:round/>
+                      <a:headEnd type="none" w="med" len="med"/>
+                      <a:tailEnd type="none" w="med" len="med"/>
+                    </a:lnR>
+                    <a:lnT w="12700" cap="flat" cmpd="sng" algn="ctr">
+                      <a:solidFill>
+                        <a:schemeClr val="tx1"/>
+                      </a:solidFill>
+                      <a:prstDash val="solid"/>
+                      <a:round/>
+                      <a:headEnd type="none" w="med" len="med"/>
+                      <a:tailEnd type="none" w="med" len="med"/>
+                    </a:lnT>
+                    <a:lnB w="12700" cap="flat" cmpd="sng" algn="ctr">
+                      <a:solidFill>
+                        <a:schemeClr val="tx1"/>
+                      </a:solidFill>
+                      <a:prstDash val="solid"/>
+                      <a:round/>
+                      <a:headEnd type="none" w="med" len="med"/>
+                      <a:tailEnd type="none" w="med" len="med"/>
+                    </a:lnB>
+                    <a:lnTlToBr w="12700" cmpd="sng">
+                      <a:noFill/>
+                      <a:prstDash val="solid"/>
+                    </a:lnTlToBr>
+                    <a:lnBlToTr w="12700" cmpd="sng">
+                      <a:noFill/>
+                      <a:prstDash val="solid"/>
+                    </a:lnBlToTr>
+                    <a:noFill/>
+                  </a:tcPr>
+                </a:tc>
+                <a:tc>
+                  <a:txBody>
+                    <a:bodyPr/>
+                    <a:lstStyle/>
+                    <a:p>
+                      <a:r>
+                        <a:rPr lang="ru-RU" dirty="0" smtClean="0">
+                          <a:solidFill>
+                            <a:schemeClr val="bg1"/>
+                          </a:solidFill>
+                        </a:rPr>
+                        <a:t>Конструктор</a:t>
+                      </a:r>
+                      <a:r>
+                        <a:rPr lang="ru-RU" baseline="0" dirty="0" smtClean="0">
+                          <a:solidFill>
+                            <a:schemeClr val="bg1"/>
+                          </a:solidFill>
+                        </a:rPr>
+                        <a:t> класса</a:t>
+                      </a:r>
+                      <a:endParaRPr lang="en-US" dirty="0">
+                        <a:solidFill>
+                          <a:schemeClr val="bg1"/>
+                        </a:solidFill>
+                      </a:endParaRPr>
+                    </a:p>
+                  </a:txBody>
+                  <a:tcPr>
+                    <a:lnL w="12700" cap="flat" cmpd="sng" algn="ctr">
+                      <a:solidFill>
+                        <a:schemeClr val="tx1"/>
+                      </a:solidFill>
+                      <a:prstDash val="solid"/>
+                      <a:round/>
+                      <a:headEnd type="none" w="med" len="med"/>
+                      <a:tailEnd type="none" w="med" len="med"/>
+                    </a:lnL>
+                    <a:lnR w="12700" cap="flat" cmpd="sng" algn="ctr">
+                      <a:solidFill>
+                        <a:schemeClr val="tx1"/>
+                      </a:solidFill>
+                      <a:prstDash val="solid"/>
+                      <a:round/>
+                      <a:headEnd type="none" w="med" len="med"/>
+                      <a:tailEnd type="none" w="med" len="med"/>
+                    </a:lnR>
+                    <a:lnT w="12700" cap="flat" cmpd="sng" algn="ctr">
+                      <a:solidFill>
+                        <a:schemeClr val="tx1"/>
+                      </a:solidFill>
+                      <a:prstDash val="solid"/>
+                      <a:round/>
+                      <a:headEnd type="none" w="med" len="med"/>
+                      <a:tailEnd type="none" w="med" len="med"/>
+                    </a:lnT>
+                    <a:lnB w="12700" cap="flat" cmpd="sng" algn="ctr">
+                      <a:solidFill>
+                        <a:schemeClr val="tx1"/>
+                      </a:solidFill>
+                      <a:prstDash val="solid"/>
+                      <a:round/>
+                      <a:headEnd type="none" w="med" len="med"/>
+                      <a:tailEnd type="none" w="med" len="med"/>
+                    </a:lnB>
+                    <a:lnTlToBr w="12700" cmpd="sng">
+                      <a:noFill/>
+                      <a:prstDash val="solid"/>
+                    </a:lnTlToBr>
+                    <a:lnBlToTr w="12700" cmpd="sng">
+                      <a:noFill/>
+                      <a:prstDash val="solid"/>
+                    </a:lnBlToTr>
+                    <a:noFill/>
+                  </a:tcPr>
+                </a:tc>
+              </a:tr>
+              <a:tr h="370840">
+                <a:tc>
+                  <a:txBody>
+                    <a:bodyPr/>
+                    <a:lstStyle/>
+                    <a:p>
+                      <a:r>
+                        <a:rPr lang="en-US" dirty="0" smtClean="0">
+                          <a:solidFill>
+                            <a:schemeClr val="bg1"/>
+                          </a:solidFill>
+                        </a:rPr>
+                        <a:t>~</a:t>
+                      </a:r>
+                      <a:endParaRPr lang="en-US" dirty="0">
+                        <a:solidFill>
+                          <a:schemeClr val="bg1"/>
+                        </a:solidFill>
+                      </a:endParaRPr>
+                    </a:p>
+                  </a:txBody>
+                  <a:tcPr>
+                    <a:lnL w="12700" cap="flat" cmpd="sng" algn="ctr">
+                      <a:solidFill>
+                        <a:schemeClr val="tx1"/>
+                      </a:solidFill>
+                      <a:prstDash val="solid"/>
+                      <a:round/>
+                      <a:headEnd type="none" w="med" len="med"/>
+                      <a:tailEnd type="none" w="med" len="med"/>
+                    </a:lnL>
+                    <a:lnR w="12700" cap="flat" cmpd="sng" algn="ctr">
+                      <a:solidFill>
+                        <a:schemeClr val="tx1"/>
+                      </a:solidFill>
+                      <a:prstDash val="solid"/>
+                      <a:round/>
+                      <a:headEnd type="none" w="med" len="med"/>
+                      <a:tailEnd type="none" w="med" len="med"/>
+                    </a:lnR>
+                    <a:lnT w="12700" cap="flat" cmpd="sng" algn="ctr">
+                      <a:solidFill>
+                        <a:schemeClr val="tx1"/>
+                      </a:solidFill>
+                      <a:prstDash val="solid"/>
+                      <a:round/>
+                      <a:headEnd type="none" w="med" len="med"/>
+                      <a:tailEnd type="none" w="med" len="med"/>
+                    </a:lnT>
+                    <a:lnB w="12700" cap="flat" cmpd="sng" algn="ctr">
+                      <a:solidFill>
+                        <a:schemeClr val="tx1"/>
+                      </a:solidFill>
+                      <a:prstDash val="solid"/>
+                      <a:round/>
+                      <a:headEnd type="none" w="med" len="med"/>
+                      <a:tailEnd type="none" w="med" len="med"/>
+                    </a:lnB>
+                    <a:lnTlToBr w="12700" cmpd="sng">
+                      <a:noFill/>
+                      <a:prstDash val="solid"/>
+                    </a:lnTlToBr>
+                    <a:lnBlToTr w="12700" cmpd="sng">
+                      <a:noFill/>
+                      <a:prstDash val="solid"/>
+                    </a:lnBlToTr>
+                    <a:noFill/>
+                  </a:tcPr>
+                </a:tc>
+                <a:tc>
+                  <a:txBody>
+                    <a:bodyPr/>
+                    <a:lstStyle/>
+                    <a:p>
+                      <a:r>
+                        <a:rPr lang="ru-RU" dirty="0" smtClean="0">
+                          <a:solidFill>
+                            <a:schemeClr val="bg1"/>
+                          </a:solidFill>
+                        </a:rPr>
+                        <a:t>Финализатор класса</a:t>
+                      </a:r>
+                      <a:endParaRPr lang="en-US" dirty="0">
+                        <a:solidFill>
+                          <a:schemeClr val="bg1"/>
+                        </a:solidFill>
+                      </a:endParaRPr>
+                    </a:p>
+                  </a:txBody>
+                  <a:tcPr>
+                    <a:lnL w="12700" cap="flat" cmpd="sng" algn="ctr">
+                      <a:solidFill>
+                        <a:schemeClr val="tx1"/>
+                      </a:solidFill>
+                      <a:prstDash val="solid"/>
+                      <a:round/>
+                      <a:headEnd type="none" w="med" len="med"/>
+                      <a:tailEnd type="none" w="med" len="med"/>
+                    </a:lnL>
+                    <a:lnR w="12700" cap="flat" cmpd="sng" algn="ctr">
+                      <a:solidFill>
+                        <a:schemeClr val="tx1"/>
+                      </a:solidFill>
+                      <a:prstDash val="solid"/>
+                      <a:round/>
+                      <a:headEnd type="none" w="med" len="med"/>
+                      <a:tailEnd type="none" w="med" len="med"/>
+                    </a:lnR>
+                    <a:lnT w="12700" cap="flat" cmpd="sng" algn="ctr">
+                      <a:solidFill>
+                        <a:schemeClr val="tx1"/>
+                      </a:solidFill>
+                      <a:prstDash val="solid"/>
+                      <a:round/>
+                      <a:headEnd type="none" w="med" len="med"/>
+                      <a:tailEnd type="none" w="med" len="med"/>
+                    </a:lnT>
+                    <a:lnB w="12700" cap="flat" cmpd="sng" algn="ctr">
+                      <a:solidFill>
+                        <a:schemeClr val="tx1"/>
+                      </a:solidFill>
+                      <a:prstDash val="solid"/>
+                      <a:round/>
+                      <a:headEnd type="none" w="med" len="med"/>
+                      <a:tailEnd type="none" w="med" len="med"/>
+                    </a:lnB>
+                    <a:lnTlToBr w="12700" cmpd="sng">
+                      <a:noFill/>
+                      <a:prstDash val="solid"/>
+                    </a:lnTlToBr>
+                    <a:lnBlToTr w="12700" cmpd="sng">
+                      <a:noFill/>
+                      <a:prstDash val="solid"/>
+                    </a:lnBlToTr>
+                    <a:noFill/>
+                  </a:tcPr>
+                </a:tc>
+              </a:tr>
+              <a:tr h="370840">
+                <a:tc>
+                  <a:txBody>
+                    <a:bodyPr/>
+                    <a:lstStyle/>
+                    <a:p>
+                      <a:r>
+                        <a:rPr lang="en-US" dirty="0" smtClean="0">
+                          <a:solidFill>
+                            <a:schemeClr val="bg1"/>
+                          </a:solidFill>
+                        </a:rPr>
+                        <a:t>prop</a:t>
+                      </a:r>
+                      <a:endParaRPr lang="en-US" dirty="0">
+                        <a:solidFill>
+                          <a:schemeClr val="bg1"/>
+                        </a:solidFill>
+                      </a:endParaRPr>
+                    </a:p>
+                  </a:txBody>
+                  <a:tcPr>
+                    <a:lnL w="12700" cap="flat" cmpd="sng" algn="ctr">
+                      <a:solidFill>
+                        <a:schemeClr val="tx1"/>
+                      </a:solidFill>
+                      <a:prstDash val="solid"/>
+                      <a:round/>
+                      <a:headEnd type="none" w="med" len="med"/>
+                      <a:tailEnd type="none" w="med" len="med"/>
+                    </a:lnL>
+                    <a:lnR w="12700" cap="flat" cmpd="sng" algn="ctr">
+                      <a:solidFill>
+                        <a:schemeClr val="tx1"/>
+                      </a:solidFill>
+                      <a:prstDash val="solid"/>
+                      <a:round/>
+                      <a:headEnd type="none" w="med" len="med"/>
+                      <a:tailEnd type="none" w="med" len="med"/>
+                    </a:lnR>
+                    <a:lnT w="12700" cap="flat" cmpd="sng" algn="ctr">
+                      <a:solidFill>
+                        <a:schemeClr val="tx1"/>
+                      </a:solidFill>
+                      <a:prstDash val="solid"/>
+                      <a:round/>
+                      <a:headEnd type="none" w="med" len="med"/>
+                      <a:tailEnd type="none" w="med" len="med"/>
+                    </a:lnT>
+                    <a:lnB w="12700" cap="flat" cmpd="sng" algn="ctr">
+                      <a:solidFill>
+                        <a:schemeClr val="tx1"/>
+                      </a:solidFill>
+                      <a:prstDash val="solid"/>
+                      <a:round/>
+                      <a:headEnd type="none" w="med" len="med"/>
+                      <a:tailEnd type="none" w="med" len="med"/>
+                    </a:lnB>
+                    <a:lnTlToBr w="12700" cmpd="sng">
+                      <a:noFill/>
+                      <a:prstDash val="solid"/>
+                    </a:lnTlToBr>
+                    <a:lnBlToTr w="12700" cmpd="sng">
+                      <a:noFill/>
+                      <a:prstDash val="solid"/>
+                    </a:lnBlToTr>
+                    <a:noFill/>
+                  </a:tcPr>
+                </a:tc>
+                <a:tc>
+                  <a:txBody>
+                    <a:bodyPr/>
+                    <a:lstStyle/>
+                    <a:p>
+                      <a:r>
+                        <a:rPr lang="en-US" dirty="0" smtClean="0">
+                          <a:solidFill>
+                            <a:schemeClr val="bg1"/>
+                          </a:solidFill>
+                        </a:rPr>
+                        <a:t>Auto-</a:t>
+                      </a:r>
+                      <a:r>
+                        <a:rPr lang="ru-RU" dirty="0" smtClean="0">
+                          <a:solidFill>
+                            <a:schemeClr val="bg1"/>
+                          </a:solidFill>
+                        </a:rPr>
+                        <a:t>свойство</a:t>
+                      </a:r>
+                      <a:endParaRPr lang="en-US" dirty="0">
+                        <a:solidFill>
+                          <a:schemeClr val="bg1"/>
+                        </a:solidFill>
+                      </a:endParaRPr>
+                    </a:p>
+                  </a:txBody>
+                  <a:tcPr>
+                    <a:lnL w="12700" cap="flat" cmpd="sng" algn="ctr">
+                      <a:solidFill>
+                        <a:schemeClr val="tx1"/>
+                      </a:solidFill>
+                      <a:prstDash val="solid"/>
+                      <a:round/>
+                      <a:headEnd type="none" w="med" len="med"/>
+                      <a:tailEnd type="none" w="med" len="med"/>
+                    </a:lnL>
+                    <a:lnR w="12700" cap="flat" cmpd="sng" algn="ctr">
+                      <a:solidFill>
+                        <a:schemeClr val="tx1"/>
+                      </a:solidFill>
+                      <a:prstDash val="solid"/>
+                      <a:round/>
+                      <a:headEnd type="none" w="med" len="med"/>
+                      <a:tailEnd type="none" w="med" len="med"/>
+                    </a:lnR>
+                    <a:lnT w="12700" cap="flat" cmpd="sng" algn="ctr">
+                      <a:solidFill>
+                        <a:schemeClr val="tx1"/>
+                      </a:solidFill>
+                      <a:prstDash val="solid"/>
+                      <a:round/>
+                      <a:headEnd type="none" w="med" len="med"/>
+                      <a:tailEnd type="none" w="med" len="med"/>
+                    </a:lnT>
+                    <a:lnB w="12700" cap="flat" cmpd="sng" algn="ctr">
+                      <a:solidFill>
+                        <a:schemeClr val="tx1"/>
+                      </a:solidFill>
+                      <a:prstDash val="solid"/>
+                      <a:round/>
+                      <a:headEnd type="none" w="med" len="med"/>
+                      <a:tailEnd type="none" w="med" len="med"/>
+                    </a:lnB>
+                    <a:lnTlToBr w="12700" cmpd="sng">
+                      <a:noFill/>
+                      <a:prstDash val="solid"/>
+                    </a:lnTlToBr>
+                    <a:lnBlToTr w="12700" cmpd="sng">
+                      <a:noFill/>
+                      <a:prstDash val="solid"/>
+                    </a:lnBlToTr>
+                    <a:noFill/>
+                  </a:tcPr>
+                </a:tc>
+              </a:tr>
+              <a:tr h="370840">
+                <a:tc>
+                  <a:txBody>
+                    <a:bodyPr/>
+                    <a:lstStyle/>
+                    <a:p>
+                      <a:r>
+                        <a:rPr lang="en-US" dirty="0" err="1" smtClean="0">
+                          <a:solidFill>
+                            <a:schemeClr val="bg1"/>
+                          </a:solidFill>
+                        </a:rPr>
+                        <a:t>propfull</a:t>
+                      </a:r>
+                      <a:endParaRPr lang="en-US" dirty="0">
+                        <a:solidFill>
+                          <a:schemeClr val="bg1"/>
+                        </a:solidFill>
+                      </a:endParaRPr>
+                    </a:p>
+                  </a:txBody>
+                  <a:tcPr>
+                    <a:lnL w="12700" cap="flat" cmpd="sng" algn="ctr">
+                      <a:solidFill>
+                        <a:schemeClr val="tx1"/>
+                      </a:solidFill>
+                      <a:prstDash val="solid"/>
+                      <a:round/>
+                      <a:headEnd type="none" w="med" len="med"/>
+                      <a:tailEnd type="none" w="med" len="med"/>
+                    </a:lnL>
+                    <a:lnR w="12700" cap="flat" cmpd="sng" algn="ctr">
+                      <a:solidFill>
+                        <a:schemeClr val="tx1"/>
+                      </a:solidFill>
+                      <a:prstDash val="solid"/>
+                      <a:round/>
+                      <a:headEnd type="none" w="med" len="med"/>
+                      <a:tailEnd type="none" w="med" len="med"/>
+                    </a:lnR>
+                    <a:lnT w="12700" cap="flat" cmpd="sng" algn="ctr">
+                      <a:solidFill>
+                        <a:schemeClr val="tx1"/>
+                      </a:solidFill>
+                      <a:prstDash val="solid"/>
+                      <a:round/>
+                      <a:headEnd type="none" w="med" len="med"/>
+                      <a:tailEnd type="none" w="med" len="med"/>
+                    </a:lnT>
+                    <a:lnB w="12700" cap="flat" cmpd="sng" algn="ctr">
+                      <a:solidFill>
+                        <a:schemeClr val="tx1"/>
+                      </a:solidFill>
+                      <a:prstDash val="solid"/>
+                      <a:round/>
+                      <a:headEnd type="none" w="med" len="med"/>
+                      <a:tailEnd type="none" w="med" len="med"/>
+                    </a:lnB>
+                    <a:lnTlToBr w="12700" cmpd="sng">
+                      <a:noFill/>
+                      <a:prstDash val="solid"/>
+                    </a:lnTlToBr>
+                    <a:lnBlToTr w="12700" cmpd="sng">
+                      <a:noFill/>
+                      <a:prstDash val="solid"/>
+                    </a:lnBlToTr>
+                    <a:noFill/>
+                  </a:tcPr>
+                </a:tc>
+                <a:tc>
+                  <a:txBody>
+                    <a:bodyPr/>
+                    <a:lstStyle/>
+                    <a:p>
+                      <a:r>
+                        <a:rPr lang="ru-RU" dirty="0" smtClean="0">
+                          <a:solidFill>
+                            <a:schemeClr val="bg1"/>
+                          </a:solidFill>
+                        </a:rPr>
+                        <a:t>Свойство</a:t>
+                      </a:r>
+                      <a:r>
+                        <a:rPr lang="ru-RU" baseline="0" dirty="0" smtClean="0">
+                          <a:solidFill>
+                            <a:schemeClr val="bg1"/>
+                          </a:solidFill>
+                        </a:rPr>
+                        <a:t> с  </a:t>
+                      </a:r>
+                      <a:r>
+                        <a:rPr lang="en-US" baseline="0" dirty="0" smtClean="0">
+                          <a:solidFill>
+                            <a:schemeClr val="bg1"/>
+                          </a:solidFill>
+                        </a:rPr>
+                        <a:t>get/set </a:t>
+                      </a:r>
+                      <a:r>
+                        <a:rPr lang="ru-RU" baseline="0" dirty="0" smtClean="0">
+                          <a:solidFill>
+                            <a:schemeClr val="bg1"/>
+                          </a:solidFill>
+                        </a:rPr>
+                        <a:t>и полем класса</a:t>
+                      </a:r>
+                      <a:endParaRPr lang="en-US" dirty="0">
+                        <a:solidFill>
+                          <a:schemeClr val="bg1"/>
+                        </a:solidFill>
+                      </a:endParaRPr>
+                    </a:p>
+                  </a:txBody>
+                  <a:tcPr>
+                    <a:lnL w="12700" cap="flat" cmpd="sng" algn="ctr">
+                      <a:solidFill>
+                        <a:schemeClr val="tx1"/>
+                      </a:solidFill>
+                      <a:prstDash val="solid"/>
+                      <a:round/>
+                      <a:headEnd type="none" w="med" len="med"/>
+                      <a:tailEnd type="none" w="med" len="med"/>
+                    </a:lnL>
+                    <a:lnR w="12700" cap="flat" cmpd="sng" algn="ctr">
+                      <a:solidFill>
+                        <a:schemeClr val="tx1"/>
+                      </a:solidFill>
+                      <a:prstDash val="solid"/>
+                      <a:round/>
+                      <a:headEnd type="none" w="med" len="med"/>
+                      <a:tailEnd type="none" w="med" len="med"/>
+                    </a:lnR>
+                    <a:lnT w="12700" cap="flat" cmpd="sng" algn="ctr">
+                      <a:solidFill>
+                        <a:schemeClr val="tx1"/>
+                      </a:solidFill>
+                      <a:prstDash val="solid"/>
+                      <a:round/>
+                      <a:headEnd type="none" w="med" len="med"/>
+                      <a:tailEnd type="none" w="med" len="med"/>
+                    </a:lnT>
+                    <a:lnB w="12700" cap="flat" cmpd="sng" algn="ctr">
+                      <a:solidFill>
+                        <a:schemeClr val="tx1"/>
+                      </a:solidFill>
+                      <a:prstDash val="solid"/>
+                      <a:round/>
+                      <a:headEnd type="none" w="med" len="med"/>
+                      <a:tailEnd type="none" w="med" len="med"/>
+                    </a:lnB>
+                    <a:lnTlToBr w="12700" cmpd="sng">
+                      <a:noFill/>
+                      <a:prstDash val="solid"/>
+                    </a:lnTlToBr>
+                    <a:lnBlToTr w="12700" cmpd="sng">
+                      <a:noFill/>
+                      <a:prstDash val="solid"/>
+                    </a:lnBlToTr>
+                    <a:noFill/>
+                  </a:tcPr>
+                </a:tc>
+              </a:tr>
+              <a:tr h="370840">
+                <a:tc>
+                  <a:txBody>
+                    <a:bodyPr/>
+                    <a:lstStyle/>
+                    <a:p>
+                      <a:r>
+                        <a:rPr lang="en-US" dirty="0" err="1" smtClean="0">
+                          <a:solidFill>
+                            <a:schemeClr val="bg1"/>
+                          </a:solidFill>
+                        </a:rPr>
+                        <a:t>propg</a:t>
+                      </a:r>
+                      <a:endParaRPr lang="en-US" dirty="0" smtClean="0">
+                        <a:solidFill>
+                          <a:schemeClr val="bg1"/>
+                        </a:solidFill>
+                      </a:endParaRPr>
+                    </a:p>
+                  </a:txBody>
+                  <a:tcPr>
+                    <a:lnL w="12700" cap="flat" cmpd="sng" algn="ctr">
+                      <a:solidFill>
+                        <a:schemeClr val="tx1"/>
+                      </a:solidFill>
+                      <a:prstDash val="solid"/>
+                      <a:round/>
+                      <a:headEnd type="none" w="med" len="med"/>
+                      <a:tailEnd type="none" w="med" len="med"/>
+                    </a:lnL>
+                    <a:lnR w="12700" cap="flat" cmpd="sng" algn="ctr">
+                      <a:solidFill>
+                        <a:schemeClr val="tx1"/>
+                      </a:solidFill>
+                      <a:prstDash val="solid"/>
+                      <a:round/>
+                      <a:headEnd type="none" w="med" len="med"/>
+                      <a:tailEnd type="none" w="med" len="med"/>
+                    </a:lnR>
+                    <a:lnT w="12700" cap="flat" cmpd="sng" algn="ctr">
+                      <a:solidFill>
+                        <a:schemeClr val="tx1"/>
+                      </a:solidFill>
+                      <a:prstDash val="solid"/>
+                      <a:round/>
+                      <a:headEnd type="none" w="med" len="med"/>
+                      <a:tailEnd type="none" w="med" len="med"/>
+                    </a:lnT>
+                    <a:lnB w="12700" cap="flat" cmpd="sng" algn="ctr">
+                      <a:solidFill>
+                        <a:schemeClr val="tx1"/>
+                      </a:solidFill>
+                      <a:prstDash val="solid"/>
+                      <a:round/>
+                      <a:headEnd type="none" w="med" len="med"/>
+                      <a:tailEnd type="none" w="med" len="med"/>
+                    </a:lnB>
+                    <a:lnTlToBr w="12700" cmpd="sng">
+                      <a:noFill/>
+                      <a:prstDash val="solid"/>
+                    </a:lnTlToBr>
+                    <a:lnBlToTr w="12700" cmpd="sng">
+                      <a:noFill/>
+                      <a:prstDash val="solid"/>
+                    </a:lnBlToTr>
+                    <a:noFill/>
+                  </a:tcPr>
+                </a:tc>
+                <a:tc>
+                  <a:txBody>
+                    <a:bodyPr/>
+                    <a:lstStyle/>
+                    <a:p>
+                      <a:r>
+                        <a:rPr lang="en-US" dirty="0" smtClean="0">
+                          <a:solidFill>
+                            <a:schemeClr val="bg1"/>
+                          </a:solidFill>
+                        </a:rPr>
+                        <a:t>Auto-c</a:t>
+                      </a:r>
+                      <a:r>
+                        <a:rPr lang="ru-RU" dirty="0" smtClean="0">
+                          <a:solidFill>
+                            <a:schemeClr val="bg1"/>
+                          </a:solidFill>
+                        </a:rPr>
+                        <a:t>войство с </a:t>
+                      </a:r>
+                      <a:r>
+                        <a:rPr lang="en-US" dirty="0" smtClean="0">
+                          <a:solidFill>
+                            <a:schemeClr val="bg1"/>
+                          </a:solidFill>
+                        </a:rPr>
+                        <a:t>public get </a:t>
+                      </a:r>
+                      <a:r>
+                        <a:rPr lang="ru-RU" dirty="0" smtClean="0">
+                          <a:solidFill>
+                            <a:schemeClr val="bg1"/>
+                          </a:solidFill>
+                        </a:rPr>
+                        <a:t>и </a:t>
+                      </a:r>
+                      <a:r>
+                        <a:rPr lang="en-US" dirty="0" smtClean="0">
+                          <a:solidFill>
+                            <a:schemeClr val="bg1"/>
+                          </a:solidFill>
+                        </a:rPr>
+                        <a:t>private set</a:t>
+                      </a:r>
+                      <a:endParaRPr lang="en-US" dirty="0">
+                        <a:solidFill>
+                          <a:schemeClr val="bg1"/>
+                        </a:solidFill>
+                      </a:endParaRPr>
+                    </a:p>
+                  </a:txBody>
+                  <a:tcPr>
+                    <a:lnL w="12700" cap="flat" cmpd="sng" algn="ctr">
+                      <a:solidFill>
+                        <a:schemeClr val="tx1"/>
+                      </a:solidFill>
+                      <a:prstDash val="solid"/>
+                      <a:round/>
+                      <a:headEnd type="none" w="med" len="med"/>
+                      <a:tailEnd type="none" w="med" len="med"/>
+                    </a:lnL>
+                    <a:lnR w="12700" cap="flat" cmpd="sng" algn="ctr">
+                      <a:solidFill>
+                        <a:schemeClr val="tx1"/>
+                      </a:solidFill>
+                      <a:prstDash val="solid"/>
+                      <a:round/>
+                      <a:headEnd type="none" w="med" len="med"/>
+                      <a:tailEnd type="none" w="med" len="med"/>
+                    </a:lnR>
+                    <a:lnT w="12700" cap="flat" cmpd="sng" algn="ctr">
+                      <a:solidFill>
+                        <a:schemeClr val="tx1"/>
+                      </a:solidFill>
+                      <a:prstDash val="solid"/>
+                      <a:round/>
+                      <a:headEnd type="none" w="med" len="med"/>
+                      <a:tailEnd type="none" w="med" len="med"/>
+                    </a:lnT>
+                    <a:lnB w="12700" cap="flat" cmpd="sng" algn="ctr">
+                      <a:solidFill>
+                        <a:schemeClr val="tx1"/>
+                      </a:solidFill>
+                      <a:prstDash val="solid"/>
+                      <a:round/>
+                      <a:headEnd type="none" w="med" len="med"/>
+                      <a:tailEnd type="none" w="med" len="med"/>
+                    </a:lnB>
+                    <a:lnTlToBr w="12700" cmpd="sng">
+                      <a:noFill/>
+                      <a:prstDash val="solid"/>
+                    </a:lnTlToBr>
+                    <a:lnBlToTr w="12700" cmpd="sng">
+                      <a:noFill/>
+                      <a:prstDash val="solid"/>
+                    </a:lnBlToTr>
+                    <a:noFill/>
+                  </a:tcPr>
+                </a:tc>
+              </a:tr>
+              <a:tr h="370840">
+                <a:tc>
+                  <a:txBody>
+                    <a:bodyPr/>
+                    <a:lstStyle/>
+                    <a:p>
+                      <a:endParaRPr lang="en-US" dirty="0">
+                        <a:solidFill>
+                          <a:schemeClr val="bg1"/>
+                        </a:solidFill>
+                      </a:endParaRPr>
+                    </a:p>
+                  </a:txBody>
+                  <a:tcPr>
+                    <a:lnL w="12700" cap="flat" cmpd="sng" algn="ctr">
+                      <a:solidFill>
+                        <a:schemeClr val="tx1"/>
+                      </a:solidFill>
+                      <a:prstDash val="solid"/>
+                      <a:round/>
+                      <a:headEnd type="none" w="med" len="med"/>
+                      <a:tailEnd type="none" w="med" len="med"/>
+                    </a:lnL>
+                    <a:lnR w="12700" cap="flat" cmpd="sng" algn="ctr">
+                      <a:solidFill>
+                        <a:schemeClr val="tx1"/>
+                      </a:solidFill>
+                      <a:prstDash val="solid"/>
+                      <a:round/>
+                      <a:headEnd type="none" w="med" len="med"/>
+                      <a:tailEnd type="none" w="med" len="med"/>
+                    </a:lnR>
+                    <a:lnT w="12700" cap="flat" cmpd="sng" algn="ctr">
+                      <a:solidFill>
+                        <a:schemeClr val="tx1"/>
+                      </a:solidFill>
+                      <a:prstDash val="solid"/>
+                      <a:round/>
+                      <a:headEnd type="none" w="med" len="med"/>
+                      <a:tailEnd type="none" w="med" len="med"/>
+                    </a:lnT>
+                    <a:lnB w="12700" cap="flat" cmpd="sng" algn="ctr">
+                      <a:solidFill>
+                        <a:schemeClr val="tx1"/>
+                      </a:solidFill>
+                      <a:prstDash val="solid"/>
+                      <a:round/>
+                      <a:headEnd type="none" w="med" len="med"/>
+                      <a:tailEnd type="none" w="med" len="med"/>
+                    </a:lnB>
+                    <a:lnTlToBr w="12700" cmpd="sng">
+                      <a:noFill/>
+                      <a:prstDash val="solid"/>
+                    </a:lnTlToBr>
+                    <a:lnBlToTr w="12700" cmpd="sng">
+                      <a:noFill/>
+                      <a:prstDash val="solid"/>
+                    </a:lnBlToTr>
+                    <a:noFill/>
+                  </a:tcPr>
+                </a:tc>
+                <a:tc>
+                  <a:txBody>
+                    <a:bodyPr/>
+                    <a:lstStyle/>
+                    <a:p>
+                      <a:endParaRPr lang="en-US" dirty="0">
+                        <a:solidFill>
+                          <a:schemeClr val="bg1"/>
+                        </a:solidFill>
+                      </a:endParaRPr>
+                    </a:p>
+                  </a:txBody>
+                  <a:tcPr>
+                    <a:lnL w="12700" cap="flat" cmpd="sng" algn="ctr">
+                      <a:solidFill>
+                        <a:schemeClr val="tx1"/>
+                      </a:solidFill>
+                      <a:prstDash val="solid"/>
+                      <a:round/>
+                      <a:headEnd type="none" w="med" len="med"/>
+                      <a:tailEnd type="none" w="med" len="med"/>
+                    </a:lnL>
+                    <a:lnR w="12700" cap="flat" cmpd="sng" algn="ctr">
+                      <a:solidFill>
+                        <a:schemeClr val="tx1"/>
+                      </a:solidFill>
+                      <a:prstDash val="solid"/>
+                      <a:round/>
+                      <a:headEnd type="none" w="med" len="med"/>
+                      <a:tailEnd type="none" w="med" len="med"/>
+                    </a:lnR>
+                    <a:lnT w="12700" cap="flat" cmpd="sng" algn="ctr">
+                      <a:solidFill>
+                        <a:schemeClr val="tx1"/>
+                      </a:solidFill>
+                      <a:prstDash val="solid"/>
+                      <a:round/>
+                      <a:headEnd type="none" w="med" len="med"/>
+                      <a:tailEnd type="none" w="med" len="med"/>
+                    </a:lnT>
+                    <a:lnB w="12700" cap="flat" cmpd="sng" algn="ctr">
+                      <a:solidFill>
+                        <a:schemeClr val="tx1"/>
+                      </a:solidFill>
+                      <a:prstDash val="solid"/>
+                      <a:round/>
+                      <a:headEnd type="none" w="med" len="med"/>
+                      <a:tailEnd type="none" w="med" len="med"/>
+                    </a:lnB>
+                    <a:lnTlToBr w="12700" cmpd="sng">
+                      <a:noFill/>
+                      <a:prstDash val="solid"/>
+                    </a:lnTlToBr>
+                    <a:lnBlToTr w="12700" cmpd="sng">
+                      <a:noFill/>
+                      <a:prstDash val="solid"/>
+                    </a:lnBlToTr>
+                    <a:noFill/>
+                  </a:tcPr>
+                </a:tc>
+              </a:tr>
+            </a:tbl>
+          </a:graphicData>
+        </a:graphic>
+      </p:graphicFrame>
+    </p:spTree>
+    <p:extLst>
+      <p:ext uri="{BB962C8B-B14F-4D97-AF65-F5344CB8AC3E}">
+        <p14:creationId xmlns:p14="http://schemas.microsoft.com/office/powerpoint/2010/main" val="1906430335"/>
+      </p:ext>
+    </p:extLst>
+  </p:cSld>
+  <p:clrMapOvr>
+    <a:masterClrMapping/>
+  </p:clrMapOvr>
+  <p:timing>
+    <p:tnLst>
+      <p:par>
+        <p:cTn id="1" dur="indefinite" restart="never" nodeType="tmRoot"/>
+      </p:par>
+    </p:tnLst>
+  </p:timing>
+</p:sld>
+</file>
+
+<file path=ppt/slides/slide14.xml><?xml version="1.0" encoding="utf-8"?>
 <p:sld xmlns:a="http://schemas.openxmlformats.org/drawingml/2006/main" xmlns:r="http://schemas.openxmlformats.org/officeDocument/2006/relationships" xmlns:p="http://schemas.openxmlformats.org/presentationml/2006/main">
   <p:cSld>
     <p:bg>
@@ -7193,7 +8529,7 @@
             </a:r>
             <a:r>
               <a:rPr lang="en-US" dirty="0" smtClean="0"/>
-              <a:t>Task List</a:t>
+              <a:t>Bookmarks</a:t>
             </a:r>
             <a:endParaRPr lang="en-US" dirty="0"/>
           </a:p>
@@ -7227,6 +8563,203 @@
                   <a:schemeClr val="bg1"/>
                 </a:solidFill>
               </a:rPr>
+              <a:t>Закладки в текстовых файлах</a:t>
+            </a:r>
+            <a:endParaRPr lang="en-US" dirty="0" smtClean="0">
+              <a:solidFill>
+                <a:schemeClr val="bg1"/>
+              </a:solidFill>
+            </a:endParaRPr>
+          </a:p>
+          <a:p>
+            <a:pPr>
+              <a:buClr>
+                <a:schemeClr val="bg1"/>
+              </a:buClr>
+            </a:pPr>
+            <a:r>
+              <a:rPr lang="ru-RU" dirty="0" smtClean="0">
+                <a:solidFill>
+                  <a:schemeClr val="bg1"/>
+                </a:solidFill>
+              </a:rPr>
+              <a:t>Команды меню </a:t>
+            </a:r>
+            <a:r>
+              <a:rPr lang="en-US" dirty="0" smtClean="0">
+                <a:solidFill>
+                  <a:schemeClr val="bg1"/>
+                </a:solidFill>
+              </a:rPr>
+              <a:t>View -&gt; Bookmark Window</a:t>
+            </a:r>
+            <a:r>
+              <a:rPr lang="ru-RU" dirty="0" smtClean="0">
+                <a:solidFill>
+                  <a:schemeClr val="bg1"/>
+                </a:solidFill>
+              </a:rPr>
+              <a:t> и </a:t>
+            </a:r>
+            <a:r>
+              <a:rPr lang="en-US" dirty="0" smtClean="0">
+                <a:solidFill>
+                  <a:schemeClr val="bg1"/>
+                </a:solidFill>
+              </a:rPr>
+              <a:t>Edit -&gt; Bookmarks.</a:t>
+            </a:r>
+          </a:p>
+          <a:p>
+            <a:pPr>
+              <a:buClr>
+                <a:schemeClr val="bg1"/>
+              </a:buClr>
+            </a:pPr>
+            <a:endParaRPr lang="ru-RU" dirty="0" smtClean="0">
+              <a:solidFill>
+                <a:schemeClr val="bg1"/>
+              </a:solidFill>
+            </a:endParaRPr>
+          </a:p>
+          <a:p>
+            <a:pPr>
+              <a:buClr>
+                <a:schemeClr val="bg1"/>
+              </a:buClr>
+            </a:pPr>
+            <a:endParaRPr lang="ru-RU" dirty="0" smtClean="0">
+              <a:solidFill>
+                <a:schemeClr val="bg1"/>
+              </a:solidFill>
+            </a:endParaRPr>
+          </a:p>
+          <a:p>
+            <a:pPr>
+              <a:buClr>
+                <a:schemeClr val="bg1"/>
+              </a:buClr>
+            </a:pPr>
+            <a:endParaRPr lang="ru-RU" dirty="0" smtClean="0">
+              <a:solidFill>
+                <a:schemeClr val="bg1"/>
+              </a:solidFill>
+            </a:endParaRPr>
+          </a:p>
+          <a:p>
+            <a:pPr marL="0" indent="0">
+              <a:buClr>
+                <a:schemeClr val="bg1"/>
+              </a:buClr>
+              <a:buNone/>
+            </a:pPr>
+            <a:endParaRPr lang="en-US" dirty="0">
+              <a:solidFill>
+                <a:schemeClr val="bg1"/>
+              </a:solidFill>
+            </a:endParaRPr>
+          </a:p>
+        </p:txBody>
+      </p:sp>
+    </p:spTree>
+    <p:extLst>
+      <p:ext uri="{BB962C8B-B14F-4D97-AF65-F5344CB8AC3E}">
+        <p14:creationId xmlns:p14="http://schemas.microsoft.com/office/powerpoint/2010/main" val="3985499755"/>
+      </p:ext>
+    </p:extLst>
+  </p:cSld>
+  <p:clrMapOvr>
+    <a:overrideClrMapping bg1="lt1" tx1="dk1" bg2="lt2" tx2="dk2" accent1="accent1" accent2="accent2" accent3="accent3" accent4="accent4" accent5="accent5" accent6="accent6" hlink="hlink" folHlink="folHlink"/>
+  </p:clrMapOvr>
+</p:sld>
+</file>
+
+<file path=ppt/slides/slide15.xml><?xml version="1.0" encoding="utf-8"?>
+<p:sld xmlns:a="http://schemas.openxmlformats.org/drawingml/2006/main" xmlns:r="http://schemas.openxmlformats.org/officeDocument/2006/relationships" xmlns:p="http://schemas.openxmlformats.org/presentationml/2006/main">
+  <p:cSld>
+    <p:bg>
+      <p:bgPr>
+        <a:blipFill dpi="0" rotWithShape="1">
+          <a:blip r:embed="rId3">
+            <a:lum/>
+          </a:blip>
+          <a:srcRect/>
+          <a:stretch>
+            <a:fillRect/>
+          </a:stretch>
+        </a:blipFill>
+        <a:effectLst/>
+      </p:bgPr>
+    </p:bg>
+    <p:spTree>
+      <p:nvGrpSpPr>
+        <p:cNvPr id="1" name=""/>
+        <p:cNvGrpSpPr/>
+        <p:nvPr/>
+      </p:nvGrpSpPr>
+      <p:grpSpPr>
+        <a:xfrm>
+          <a:off x="0" y="0"/>
+          <a:ext cx="0" cy="0"/>
+          <a:chOff x="0" y="0"/>
+          <a:chExt cx="0" cy="0"/>
+        </a:xfrm>
+      </p:grpSpPr>
+      <p:sp>
+        <p:nvSpPr>
+          <p:cNvPr id="2" name="Title 1"/>
+          <p:cNvSpPr>
+            <a:spLocks noGrp="1"/>
+          </p:cNvSpPr>
+          <p:nvPr>
+            <p:ph type="title"/>
+          </p:nvPr>
+        </p:nvSpPr>
+        <p:spPr/>
+        <p:txBody>
+          <a:bodyPr/>
+          <a:lstStyle/>
+          <a:p>
+            <a:r>
+              <a:rPr lang="ru-RU" dirty="0" smtClean="0"/>
+              <a:t>Окна: </a:t>
+            </a:r>
+            <a:r>
+              <a:rPr lang="en-US" dirty="0" smtClean="0"/>
+              <a:t>Task List</a:t>
+            </a:r>
+            <a:endParaRPr lang="en-US" dirty="0"/>
+          </a:p>
+        </p:txBody>
+      </p:sp>
+      <p:sp>
+        <p:nvSpPr>
+          <p:cNvPr id="3" name="Content Placeholder 2"/>
+          <p:cNvSpPr>
+            <a:spLocks noGrp="1"/>
+          </p:cNvSpPr>
+          <p:nvPr>
+            <p:ph idx="1"/>
+          </p:nvPr>
+        </p:nvSpPr>
+        <p:spPr/>
+        <p:txBody>
+          <a:bodyPr>
+            <a:normAutofit/>
+          </a:bodyPr>
+          <a:lstStyle/>
+          <a:p>
+            <a:pPr>
+              <a:buClr>
+                <a:schemeClr val="bg1"/>
+              </a:buClr>
+            </a:pPr>
+            <a:r>
+              <a:rPr lang="ru-RU" dirty="0">
+                <a:solidFill>
+                  <a:schemeClr val="bg1"/>
+                </a:solidFill>
+              </a:rPr>
               <a:t>Список можно использовать для хранения заметок по проекту</a:t>
             </a:r>
             <a:endParaRPr lang="en-US" dirty="0" smtClean="0">
@@ -7349,7 +8882,7 @@
 </p:sld>
 </file>
 
-<file path=ppt/slides/slide14.xml><?xml version="1.0" encoding="utf-8"?>
+<file path=ppt/slides/slide16.xml><?xml version="1.0" encoding="utf-8"?>
 <p:sld xmlns:a="http://schemas.openxmlformats.org/drawingml/2006/main" xmlns:r="http://schemas.openxmlformats.org/officeDocument/2006/relationships" xmlns:p="http://schemas.openxmlformats.org/presentationml/2006/main">
   <p:cSld>
     <p:spTree>
@@ -7421,7 +8954,7 @@
 </p:sld>
 </file>
 
-<file path=ppt/slides/slide15.xml><?xml version="1.0" encoding="utf-8"?>
+<file path=ppt/slides/slide17.xml><?xml version="1.0" encoding="utf-8"?>
 <p:sld xmlns:a="http://schemas.openxmlformats.org/drawingml/2006/main" xmlns:r="http://schemas.openxmlformats.org/officeDocument/2006/relationships" xmlns:p="http://schemas.openxmlformats.org/presentationml/2006/main">
   <p:cSld>
     <p:spTree>
@@ -7620,7 +9153,7 @@
 </p:sld>
 </file>
 
-<file path=ppt/slides/slide16.xml><?xml version="1.0" encoding="utf-8"?>
+<file path=ppt/slides/slide18.xml><?xml version="1.0" encoding="utf-8"?>
 <p:sld xmlns:a="http://schemas.openxmlformats.org/drawingml/2006/main" xmlns:r="http://schemas.openxmlformats.org/officeDocument/2006/relationships" xmlns:p="http://schemas.openxmlformats.org/presentationml/2006/main">
   <p:cSld>
     <p:spTree>

</xml_diff>

<commit_message>
Updated VS 2010 presentation
</commit_message>
<xml_diff>
--- a/Presentation/tools-visual-studio.pptx
+++ b/Presentation/tools-visual-studio.pptx
@@ -6,7 +6,7 @@
     <p:sldMasterId id="2147483663" r:id="rId2"/>
   </p:sldMasterIdLst>
   <p:notesMasterIdLst>
-    <p:notesMasterId r:id="rId23"/>
+    <p:notesMasterId r:id="rId24"/>
   </p:notesMasterIdLst>
   <p:sldIdLst>
     <p:sldId id="257" r:id="rId3"/>
@@ -21,14 +21,15 @@
     <p:sldId id="277" r:id="rId12"/>
     <p:sldId id="271" r:id="rId13"/>
     <p:sldId id="266" r:id="rId14"/>
-    <p:sldId id="269" r:id="rId15"/>
-    <p:sldId id="273" r:id="rId16"/>
-    <p:sldId id="274" r:id="rId17"/>
-    <p:sldId id="267" r:id="rId18"/>
-    <p:sldId id="268" r:id="rId19"/>
-    <p:sldId id="260" r:id="rId20"/>
-    <p:sldId id="261" r:id="rId21"/>
-    <p:sldId id="276" r:id="rId22"/>
+    <p:sldId id="279" r:id="rId15"/>
+    <p:sldId id="269" r:id="rId16"/>
+    <p:sldId id="273" r:id="rId17"/>
+    <p:sldId id="274" r:id="rId18"/>
+    <p:sldId id="267" r:id="rId19"/>
+    <p:sldId id="268" r:id="rId20"/>
+    <p:sldId id="260" r:id="rId21"/>
+    <p:sldId id="261" r:id="rId22"/>
+    <p:sldId id="276" r:id="rId23"/>
   </p:sldIdLst>
   <p:sldSz cx="9144000" cy="6858000" type="screen4x3"/>
   <p:notesSz cx="6858000" cy="9144000"/>
@@ -127,6 +128,22 @@
       </a:defRPr>
     </a:lvl9pPr>
   </p:defaultTextStyle>
+  <p:extLst>
+    <p:ext uri="{EFAFB233-063F-42B5-8137-9DF3F51BA10A}">
+      <p15:sldGuideLst xmlns:p15="http://schemas.microsoft.com/office/powerpoint/2012/main">
+        <p15:guide id="1" orient="horz" pos="2160">
+          <p15:clr>
+            <a:srgbClr val="A4A3A4"/>
+          </p15:clr>
+        </p15:guide>
+        <p15:guide id="2" pos="2880">
+          <p15:clr>
+            <a:srgbClr val="A4A3A4"/>
+          </p15:clr>
+        </p15:guide>
+      </p15:sldGuideLst>
+    </p:ext>
+  </p:extLst>
 </p:presentation>
 </file>
 
@@ -212,7 +229,7 @@
           <a:p>
             <a:fld id="{B24A7054-7FFB-49F4-A126-5DF6E687FF53}" type="datetimeFigureOut">
               <a:rPr lang="ru-RU" smtClean="0"/>
-              <a:t>27.10.2013</a:t>
+              <a:t>28.11.2013</a:t>
             </a:fld>
             <a:endParaRPr lang="ru-RU"/>
           </a:p>
@@ -1494,7 +1511,7 @@
           <a:p>
             <a:fld id="{8E6E6A2A-E9D3-4A0D-B04A-ABDD367A1E08}" type="datetimeFigureOut">
               <a:rPr lang="ru-RU" smtClean="0"/>
-              <a:t>27.10.2013</a:t>
+              <a:t>28.11.2013</a:t>
             </a:fld>
             <a:endParaRPr lang="ru-RU"/>
           </a:p>
@@ -4007,7 +4024,7 @@
                 </a:solidFill>
               </a:rPr>
               <a:pPr/>
-              <a:t>27.10.2013</a:t>
+              <a:t>28.11.2013</a:t>
             </a:fld>
             <a:endParaRPr lang="ru-RU">
               <a:solidFill>
@@ -5268,7 +5285,7 @@
           <a:p>
             <a:fld id="{AC3D3127-B7C4-45E3-9797-C527EC9FDD78}" type="datetimeFigureOut">
               <a:rPr lang="ru-RU" smtClean="0"/>
-              <a:t>27.10.2013</a:t>
+              <a:t>28.11.2013</a:t>
             </a:fld>
             <a:endParaRPr lang="ru-RU"/>
           </a:p>
@@ -5804,7 +5821,7 @@
                 </a:solidFill>
               </a:rPr>
               <a:pPr/>
-              <a:t>27.10.2013</a:t>
+              <a:t>28.11.2013</a:t>
             </a:fld>
             <a:endParaRPr lang="ru-RU">
               <a:solidFill>
@@ -7128,6 +7145,110 @@
 <file path=ppt/slides/slide13.xml><?xml version="1.0" encoding="utf-8"?>
 <p:sld xmlns:a="http://schemas.openxmlformats.org/drawingml/2006/main" xmlns:r="http://schemas.openxmlformats.org/officeDocument/2006/relationships" xmlns:p="http://schemas.openxmlformats.org/presentationml/2006/main">
   <p:cSld>
+    <p:spTree>
+      <p:nvGrpSpPr>
+        <p:cNvPr id="1" name=""/>
+        <p:cNvGrpSpPr/>
+        <p:nvPr/>
+      </p:nvGrpSpPr>
+      <p:grpSpPr>
+        <a:xfrm>
+          <a:off x="0" y="0"/>
+          <a:ext cx="0" cy="0"/>
+          <a:chOff x="0" y="0"/>
+          <a:chExt cx="0" cy="0"/>
+        </a:xfrm>
+      </p:grpSpPr>
+      <p:sp>
+        <p:nvSpPr>
+          <p:cNvPr id="2" name="Title 1"/>
+          <p:cNvSpPr>
+            <a:spLocks noGrp="1"/>
+          </p:cNvSpPr>
+          <p:nvPr>
+            <p:ph type="title"/>
+          </p:nvPr>
+        </p:nvSpPr>
+        <p:spPr/>
+        <p:txBody>
+          <a:bodyPr/>
+          <a:lstStyle/>
+          <a:p>
+            <a:r>
+              <a:rPr lang="ru-RU" dirty="0" smtClean="0"/>
+              <a:t>Редактор: Смарт-тег</a:t>
+            </a:r>
+            <a:endParaRPr lang="ru-RU" dirty="0"/>
+          </a:p>
+        </p:txBody>
+      </p:sp>
+      <p:sp>
+        <p:nvSpPr>
+          <p:cNvPr id="3" name="Content Placeholder 2"/>
+          <p:cNvSpPr>
+            <a:spLocks noGrp="1"/>
+          </p:cNvSpPr>
+          <p:nvPr>
+            <p:ph idx="1"/>
+          </p:nvPr>
+        </p:nvSpPr>
+        <p:spPr/>
+        <p:txBody>
+          <a:bodyPr/>
+          <a:lstStyle/>
+          <a:p>
+            <a:r>
+              <a:rPr lang="en-US" dirty="0" smtClean="0">
+                <a:solidFill>
+                  <a:srgbClr val="F6AE1E"/>
+                </a:solidFill>
+              </a:rPr>
+              <a:t>Alt + Shift + F10</a:t>
+            </a:r>
+            <a:r>
+              <a:rPr lang="en-US" dirty="0" smtClean="0"/>
+              <a:t> </a:t>
+            </a:r>
+            <a:r>
+              <a:rPr lang="ru-RU" dirty="0" smtClean="0"/>
+              <a:t>или </a:t>
+            </a:r>
+            <a:r>
+              <a:rPr lang="en-US" dirty="0" smtClean="0">
+                <a:solidFill>
+                  <a:srgbClr val="F6AE1E"/>
+                </a:solidFill>
+              </a:rPr>
+              <a:t>Ctrl + .</a:t>
+            </a:r>
+            <a:r>
+              <a:rPr lang="en-US" dirty="0" smtClean="0"/>
+              <a:t> – </a:t>
+            </a:r>
+            <a:r>
+              <a:rPr lang="ru-RU" dirty="0" smtClean="0"/>
+              <a:t>открыть меню смарт-тега</a:t>
+            </a:r>
+            <a:endParaRPr lang="ru-RU" dirty="0"/>
+          </a:p>
+        </p:txBody>
+      </p:sp>
+    </p:spTree>
+    <p:extLst>
+      <p:ext uri="{BB962C8B-B14F-4D97-AF65-F5344CB8AC3E}">
+        <p14:creationId xmlns:p14="http://schemas.microsoft.com/office/powerpoint/2010/main" val="3059698048"/>
+      </p:ext>
+    </p:extLst>
+  </p:cSld>
+  <p:clrMapOvr>
+    <a:masterClrMapping/>
+  </p:clrMapOvr>
+</p:sld>
+</file>
+
+<file path=ppt/slides/slide14.xml><?xml version="1.0" encoding="utf-8"?>
+<p:sld xmlns:a="http://schemas.openxmlformats.org/drawingml/2006/main" xmlns:r="http://schemas.openxmlformats.org/officeDocument/2006/relationships" xmlns:p="http://schemas.openxmlformats.org/presentationml/2006/main">
+  <p:cSld>
     <p:bg>
       <p:bgPr>
         <a:blipFill dpi="0" rotWithShape="1">
@@ -7345,7 +7466,7 @@
 </p:sld>
 </file>
 
-<file path=ppt/slides/slide14.xml><?xml version="1.0" encoding="utf-8"?>
+<file path=ppt/slides/slide15.xml><?xml version="1.0" encoding="utf-8"?>
 <p:sld xmlns:a="http://schemas.openxmlformats.org/drawingml/2006/main" xmlns:r="http://schemas.openxmlformats.org/officeDocument/2006/relationships" xmlns:p="http://schemas.openxmlformats.org/presentationml/2006/main">
   <p:cSld>
     <p:spTree>
@@ -7603,7 +7724,7 @@
 </p:sld>
 </file>
 
-<file path=ppt/slides/slide15.xml><?xml version="1.0" encoding="utf-8"?>
+<file path=ppt/slides/slide16.xml><?xml version="1.0" encoding="utf-8"?>
 <p:sld xmlns:a="http://schemas.openxmlformats.org/drawingml/2006/main" xmlns:r="http://schemas.openxmlformats.org/officeDocument/2006/relationships" xmlns:p="http://schemas.openxmlformats.org/presentationml/2006/main">
   <p:cSld>
     <p:spTree>
@@ -8860,203 +8981,6 @@
 </p:sld>
 </file>
 
-<file path=ppt/slides/slide16.xml><?xml version="1.0" encoding="utf-8"?>
-<p:sld xmlns:a="http://schemas.openxmlformats.org/drawingml/2006/main" xmlns:r="http://schemas.openxmlformats.org/officeDocument/2006/relationships" xmlns:p="http://schemas.openxmlformats.org/presentationml/2006/main">
-  <p:cSld>
-    <p:bg>
-      <p:bgPr>
-        <a:blipFill dpi="0" rotWithShape="1">
-          <a:blip r:embed="rId3">
-            <a:lum/>
-          </a:blip>
-          <a:srcRect/>
-          <a:stretch>
-            <a:fillRect/>
-          </a:stretch>
-        </a:blipFill>
-        <a:effectLst/>
-      </p:bgPr>
-    </p:bg>
-    <p:spTree>
-      <p:nvGrpSpPr>
-        <p:cNvPr id="1" name=""/>
-        <p:cNvGrpSpPr/>
-        <p:nvPr/>
-      </p:nvGrpSpPr>
-      <p:grpSpPr>
-        <a:xfrm>
-          <a:off x="0" y="0"/>
-          <a:ext cx="0" cy="0"/>
-          <a:chOff x="0" y="0"/>
-          <a:chExt cx="0" cy="0"/>
-        </a:xfrm>
-      </p:grpSpPr>
-      <p:sp>
-        <p:nvSpPr>
-          <p:cNvPr id="2" name="Title 1"/>
-          <p:cNvSpPr>
-            <a:spLocks noGrp="1"/>
-          </p:cNvSpPr>
-          <p:nvPr>
-            <p:ph type="title"/>
-          </p:nvPr>
-        </p:nvSpPr>
-        <p:spPr/>
-        <p:txBody>
-          <a:bodyPr/>
-          <a:lstStyle/>
-          <a:p>
-            <a:r>
-              <a:rPr lang="ru-RU" dirty="0" smtClean="0"/>
-              <a:t>Окна: </a:t>
-            </a:r>
-            <a:r>
-              <a:rPr lang="en-US" dirty="0" smtClean="0"/>
-              <a:t>Bookmarks</a:t>
-            </a:r>
-            <a:endParaRPr lang="en-US" dirty="0"/>
-          </a:p>
-        </p:txBody>
-      </p:sp>
-      <p:sp>
-        <p:nvSpPr>
-          <p:cNvPr id="3" name="Content Placeholder 2"/>
-          <p:cNvSpPr>
-            <a:spLocks noGrp="1"/>
-          </p:cNvSpPr>
-          <p:nvPr>
-            <p:ph idx="1"/>
-          </p:nvPr>
-        </p:nvSpPr>
-        <p:spPr/>
-        <p:txBody>
-          <a:bodyPr>
-            <a:normAutofit/>
-          </a:bodyPr>
-          <a:lstStyle/>
-          <a:p>
-            <a:pPr>
-              <a:buClr>
-                <a:schemeClr val="bg1"/>
-              </a:buClr>
-            </a:pPr>
-            <a:r>
-              <a:rPr lang="ru-RU" dirty="0">
-                <a:solidFill>
-                  <a:schemeClr val="bg1"/>
-                </a:solidFill>
-              </a:rPr>
-              <a:t>Закладки в текстовых файлах</a:t>
-            </a:r>
-            <a:endParaRPr lang="en-US" dirty="0" smtClean="0">
-              <a:solidFill>
-                <a:schemeClr val="bg1"/>
-              </a:solidFill>
-            </a:endParaRPr>
-          </a:p>
-          <a:p>
-            <a:pPr>
-              <a:buClr>
-                <a:schemeClr val="bg1"/>
-              </a:buClr>
-            </a:pPr>
-            <a:r>
-              <a:rPr lang="ru-RU" dirty="0" smtClean="0">
-                <a:solidFill>
-                  <a:schemeClr val="bg1"/>
-                </a:solidFill>
-              </a:rPr>
-              <a:t>Команды меню </a:t>
-            </a:r>
-            <a:r>
-              <a:rPr lang="en-US" dirty="0" smtClean="0">
-                <a:solidFill>
-                  <a:schemeClr val="bg1"/>
-                </a:solidFill>
-              </a:rPr>
-              <a:t>View -&gt; Bookmark Window</a:t>
-            </a:r>
-            <a:r>
-              <a:rPr lang="ru-RU" dirty="0" smtClean="0">
-                <a:solidFill>
-                  <a:schemeClr val="bg1"/>
-                </a:solidFill>
-              </a:rPr>
-              <a:t> и </a:t>
-            </a:r>
-            <a:r>
-              <a:rPr lang="en-US" dirty="0" smtClean="0">
-                <a:solidFill>
-                  <a:schemeClr val="bg1"/>
-                </a:solidFill>
-              </a:rPr>
-              <a:t>Edit -&gt; Bookmarks.</a:t>
-            </a:r>
-          </a:p>
-          <a:p>
-            <a:pPr>
-              <a:buClr>
-                <a:schemeClr val="bg1"/>
-              </a:buClr>
-            </a:pPr>
-            <a:endParaRPr lang="ru-RU" dirty="0" smtClean="0">
-              <a:solidFill>
-                <a:schemeClr val="bg1"/>
-              </a:solidFill>
-            </a:endParaRPr>
-          </a:p>
-          <a:p>
-            <a:pPr>
-              <a:buClr>
-                <a:schemeClr val="bg1"/>
-              </a:buClr>
-            </a:pPr>
-            <a:endParaRPr lang="ru-RU" dirty="0" smtClean="0">
-              <a:solidFill>
-                <a:schemeClr val="bg1"/>
-              </a:solidFill>
-            </a:endParaRPr>
-          </a:p>
-          <a:p>
-            <a:pPr>
-              <a:buClr>
-                <a:schemeClr val="bg1"/>
-              </a:buClr>
-            </a:pPr>
-            <a:endParaRPr lang="ru-RU" dirty="0" smtClean="0">
-              <a:solidFill>
-                <a:schemeClr val="bg1"/>
-              </a:solidFill>
-            </a:endParaRPr>
-          </a:p>
-          <a:p>
-            <a:pPr marL="0" indent="0">
-              <a:buClr>
-                <a:schemeClr val="bg1"/>
-              </a:buClr>
-              <a:buNone/>
-            </a:pPr>
-            <a:endParaRPr lang="en-US" dirty="0">
-              <a:solidFill>
-                <a:schemeClr val="bg1"/>
-              </a:solidFill>
-            </a:endParaRPr>
-          </a:p>
-        </p:txBody>
-      </p:sp>
-    </p:spTree>
-    <p:extLst>
-      <p:ext uri="{BB962C8B-B14F-4D97-AF65-F5344CB8AC3E}">
-        <p14:creationId xmlns:p14="http://schemas.microsoft.com/office/powerpoint/2010/main" val="3985499755"/>
-      </p:ext>
-    </p:extLst>
-  </p:cSld>
-  <p:clrMapOvr>
-    <a:overrideClrMapping bg1="lt1" tx1="dk1" bg2="lt2" tx2="dk2" accent1="accent1" accent2="accent2" accent3="accent3" accent4="accent4" accent5="accent5" accent6="accent6" hlink="hlink" folHlink="folHlink"/>
-  </p:clrMapOvr>
-</p:sld>
-</file>
-
 <file path=ppt/slides/slide17.xml><?xml version="1.0" encoding="utf-8"?>
 <p:sld xmlns:a="http://schemas.openxmlformats.org/drawingml/2006/main" xmlns:r="http://schemas.openxmlformats.org/officeDocument/2006/relationships" xmlns:p="http://schemas.openxmlformats.org/presentationml/2006/main">
   <p:cSld>
@@ -9109,7 +9033,7 @@
             </a:r>
             <a:r>
               <a:rPr lang="en-US" dirty="0" smtClean="0"/>
-              <a:t>Task List</a:t>
+              <a:t>Bookmarks</a:t>
             </a:r>
             <a:endParaRPr lang="en-US" dirty="0"/>
           </a:p>
@@ -9143,7 +9067,7 @@
                   <a:schemeClr val="bg1"/>
                 </a:solidFill>
               </a:rPr>
-              <a:t>Список можно использовать для хранения заметок по проекту</a:t>
+              <a:t>Закладки в текстовых файлах</a:t>
             </a:r>
             <a:endParaRPr lang="en-US" dirty="0" smtClean="0">
               <a:solidFill>
@@ -9163,7 +9087,7 @@
                   <a:schemeClr val="bg1"/>
                 </a:solidFill>
               </a:rPr>
-              <a:t>Команда меню </a:t>
+              <a:t>Команды меню </a:t>
             </a:r>
             <a:r>
               <a:rPr lang="en-US" dirty="0" smtClean="0">
@@ -9171,15 +9095,15 @@
                   <a:schemeClr val="bg1"/>
                 </a:solidFill>
               </a:rPr>
-              <a:t>View -&gt; </a:t>
-            </a:r>
-            <a:r>
-              <a:rPr lang="en-US" dirty="0">
+              <a:t>View -&gt; Bookmark Window</a:t>
+            </a:r>
+            <a:r>
+              <a:rPr lang="ru-RU" dirty="0" smtClean="0">
                 <a:solidFill>
                   <a:schemeClr val="bg1"/>
                 </a:solidFill>
               </a:rPr>
-              <a:t>Task </a:t>
+              <a:t> и </a:t>
             </a:r>
             <a:r>
               <a:rPr lang="en-US" dirty="0" smtClean="0">
@@ -9187,7 +9111,7 @@
                   <a:schemeClr val="bg1"/>
                 </a:solidFill>
               </a:rPr>
-              <a:t>List.</a:t>
+              <a:t>Edit -&gt; Bookmarks.</a:t>
             </a:r>
           </a:p>
           <a:p>
@@ -9196,46 +9120,35 @@
                 <a:schemeClr val="bg1"/>
               </a:buClr>
             </a:pPr>
-            <a:r>
-              <a:rPr lang="ru-RU" dirty="0" smtClean="0">
-                <a:solidFill>
-                  <a:schemeClr val="bg1"/>
-                </a:solidFill>
-              </a:rPr>
-              <a:t>Текст комментария написанный после </a:t>
-            </a:r>
-            <a:r>
-              <a:rPr lang="en-US" dirty="0" smtClean="0">
-                <a:solidFill>
-                  <a:schemeClr val="bg1"/>
-                </a:solidFill>
-              </a:rPr>
-              <a:t>TODO </a:t>
-            </a:r>
-            <a:r>
-              <a:rPr lang="ru-RU" dirty="0" smtClean="0">
-                <a:solidFill>
-                  <a:schemeClr val="bg1"/>
-                </a:solidFill>
-              </a:rPr>
-              <a:t>попадает в</a:t>
-            </a:r>
-            <a:r>
-              <a:rPr lang="en-US" dirty="0" smtClean="0">
-                <a:solidFill>
-                  <a:schemeClr val="bg1"/>
-                </a:solidFill>
-              </a:rPr>
-              <a:t> </a:t>
-            </a:r>
-            <a:r>
-              <a:rPr lang="ru-RU" dirty="0" smtClean="0">
-                <a:solidFill>
-                  <a:schemeClr val="bg1"/>
-                </a:solidFill>
-              </a:rPr>
-              <a:t>него автоматически</a:t>
-            </a:r>
+            <a:endParaRPr lang="ru-RU" dirty="0" smtClean="0">
+              <a:solidFill>
+                <a:schemeClr val="bg1"/>
+              </a:solidFill>
+            </a:endParaRPr>
+          </a:p>
+          <a:p>
+            <a:pPr>
+              <a:buClr>
+                <a:schemeClr val="bg1"/>
+              </a:buClr>
+            </a:pPr>
+            <a:endParaRPr lang="ru-RU" dirty="0" smtClean="0">
+              <a:solidFill>
+                <a:schemeClr val="bg1"/>
+              </a:solidFill>
+            </a:endParaRPr>
+          </a:p>
+          <a:p>
+            <a:pPr>
+              <a:buClr>
+                <a:schemeClr val="bg1"/>
+              </a:buClr>
+            </a:pPr>
+            <a:endParaRPr lang="ru-RU" dirty="0" smtClean="0">
+              <a:solidFill>
+                <a:schemeClr val="bg1"/>
+              </a:solidFill>
+            </a:endParaRPr>
           </a:p>
           <a:p>
             <a:pPr marL="0" indent="0">
@@ -9255,7 +9168,7 @@
     </p:spTree>
     <p:extLst>
       <p:ext uri="{BB962C8B-B14F-4D97-AF65-F5344CB8AC3E}">
-        <p14:creationId xmlns:p14="http://schemas.microsoft.com/office/powerpoint/2010/main" val="1384232909"/>
+        <p14:creationId xmlns:p14="http://schemas.microsoft.com/office/powerpoint/2010/main" val="3985499755"/>
       </p:ext>
     </p:extLst>
   </p:cSld>
@@ -9268,6 +9181,20 @@
 <file path=ppt/slides/slide18.xml><?xml version="1.0" encoding="utf-8"?>
 <p:sld xmlns:a="http://schemas.openxmlformats.org/drawingml/2006/main" xmlns:r="http://schemas.openxmlformats.org/officeDocument/2006/relationships" xmlns:p="http://schemas.openxmlformats.org/presentationml/2006/main">
   <p:cSld>
+    <p:bg>
+      <p:bgPr>
+        <a:blipFill dpi="0" rotWithShape="1">
+          <a:blip r:embed="rId3">
+            <a:lum/>
+          </a:blip>
+          <a:srcRect/>
+          <a:stretch>
+            <a:fillRect/>
+          </a:stretch>
+        </a:blipFill>
+        <a:effectLst/>
+      </p:bgPr>
+    </p:bg>
     <p:spTree>
       <p:nvGrpSpPr>
         <p:cNvPr id="1" name=""/>
@@ -9299,7 +9226,11 @@
           <a:p>
             <a:r>
               <a:rPr lang="ru-RU" dirty="0" smtClean="0"/>
-              <a:t>Отладчик</a:t>
+              <a:t>Окна: </a:t>
+            </a:r>
+            <a:r>
+              <a:rPr lang="en-US" dirty="0" smtClean="0"/>
+              <a:t>Task List</a:t>
             </a:r>
             <a:endParaRPr lang="en-US" dirty="0"/>
           </a:p>
@@ -9317,22 +9248,140 @@
         </p:nvSpPr>
         <p:spPr/>
         <p:txBody>
-          <a:bodyPr/>
+          <a:bodyPr>
+            <a:normAutofit/>
+          </a:bodyPr>
           <a:lstStyle/>
           <a:p>
-            <a:endParaRPr lang="en-US" dirty="0"/>
+            <a:pPr>
+              <a:buClr>
+                <a:schemeClr val="bg1"/>
+              </a:buClr>
+            </a:pPr>
+            <a:r>
+              <a:rPr lang="ru-RU" dirty="0">
+                <a:solidFill>
+                  <a:schemeClr val="bg1"/>
+                </a:solidFill>
+              </a:rPr>
+              <a:t>Список можно использовать для хранения заметок по проекту</a:t>
+            </a:r>
+            <a:endParaRPr lang="en-US" dirty="0" smtClean="0">
+              <a:solidFill>
+                <a:schemeClr val="bg1"/>
+              </a:solidFill>
+            </a:endParaRPr>
+          </a:p>
+          <a:p>
+            <a:pPr>
+              <a:buClr>
+                <a:schemeClr val="bg1"/>
+              </a:buClr>
+            </a:pPr>
+            <a:r>
+              <a:rPr lang="ru-RU" dirty="0" smtClean="0">
+                <a:solidFill>
+                  <a:schemeClr val="bg1"/>
+                </a:solidFill>
+              </a:rPr>
+              <a:t>Команда меню </a:t>
+            </a:r>
+            <a:r>
+              <a:rPr lang="en-US" dirty="0" smtClean="0">
+                <a:solidFill>
+                  <a:schemeClr val="bg1"/>
+                </a:solidFill>
+              </a:rPr>
+              <a:t>View -&gt; </a:t>
+            </a:r>
+            <a:r>
+              <a:rPr lang="en-US" dirty="0">
+                <a:solidFill>
+                  <a:schemeClr val="bg1"/>
+                </a:solidFill>
+              </a:rPr>
+              <a:t>Task </a:t>
+            </a:r>
+            <a:r>
+              <a:rPr lang="en-US" dirty="0" smtClean="0">
+                <a:solidFill>
+                  <a:schemeClr val="bg1"/>
+                </a:solidFill>
+              </a:rPr>
+              <a:t>List.</a:t>
+            </a:r>
+          </a:p>
+          <a:p>
+            <a:pPr>
+              <a:buClr>
+                <a:schemeClr val="bg1"/>
+              </a:buClr>
+            </a:pPr>
+            <a:r>
+              <a:rPr lang="ru-RU" dirty="0" smtClean="0">
+                <a:solidFill>
+                  <a:schemeClr val="bg1"/>
+                </a:solidFill>
+              </a:rPr>
+              <a:t>Текст комментария написанный после </a:t>
+            </a:r>
+            <a:r>
+              <a:rPr lang="en-US" dirty="0" smtClean="0">
+                <a:solidFill>
+                  <a:schemeClr val="bg1"/>
+                </a:solidFill>
+              </a:rPr>
+              <a:t>TODO </a:t>
+            </a:r>
+            <a:r>
+              <a:rPr lang="ru-RU" dirty="0" smtClean="0">
+                <a:solidFill>
+                  <a:schemeClr val="bg1"/>
+                </a:solidFill>
+              </a:rPr>
+              <a:t>попадает в</a:t>
+            </a:r>
+            <a:r>
+              <a:rPr lang="en-US" dirty="0" smtClean="0">
+                <a:solidFill>
+                  <a:schemeClr val="bg1"/>
+                </a:solidFill>
+              </a:rPr>
+              <a:t> </a:t>
+            </a:r>
+            <a:r>
+              <a:rPr lang="ru-RU" dirty="0" smtClean="0">
+                <a:solidFill>
+                  <a:schemeClr val="bg1"/>
+                </a:solidFill>
+              </a:rPr>
+              <a:t>него автоматически</a:t>
+            </a:r>
+          </a:p>
+          <a:p>
+            <a:pPr marL="0" indent="0">
+              <a:buClr>
+                <a:schemeClr val="bg1"/>
+              </a:buClr>
+              <a:buNone/>
+            </a:pPr>
+            <a:endParaRPr lang="en-US" dirty="0">
+              <a:solidFill>
+                <a:schemeClr val="bg1"/>
+              </a:solidFill>
+            </a:endParaRPr>
           </a:p>
         </p:txBody>
       </p:sp>
     </p:spTree>
     <p:extLst>
       <p:ext uri="{BB962C8B-B14F-4D97-AF65-F5344CB8AC3E}">
-        <p14:creationId xmlns:p14="http://schemas.microsoft.com/office/powerpoint/2010/main" val="1495295926"/>
+        <p14:creationId xmlns:p14="http://schemas.microsoft.com/office/powerpoint/2010/main" val="1384232909"/>
       </p:ext>
     </p:extLst>
   </p:cSld>
   <p:clrMapOvr>
-    <a:masterClrMapping/>
+    <a:overrideClrMapping bg1="lt1" tx1="dk1" bg2="lt2" tx2="dk2" accent1="accent1" accent2="accent2" accent3="accent3" accent4="accent4" accent5="accent5" accent6="accent6" hlink="hlink" folHlink="folHlink"/>
   </p:clrMapOvr>
 </p:sld>
 </file>
@@ -9371,11 +9420,7 @@
           <a:p>
             <a:r>
               <a:rPr lang="ru-RU" dirty="0" smtClean="0"/>
-              <a:t>Бесплатные расширения для </a:t>
-            </a:r>
-            <a:r>
-              <a:rPr lang="en-US" dirty="0" smtClean="0"/>
-              <a:t>VS</a:t>
+              <a:t>Отладчик</a:t>
             </a:r>
             <a:endParaRPr lang="en-US" dirty="0"/>
           </a:p>
@@ -9393,173 +9438,8 @@
         </p:nvSpPr>
         <p:spPr/>
         <p:txBody>
-          <a:bodyPr>
-            <a:normAutofit fontScale="70000" lnSpcReduction="20000"/>
-          </a:bodyPr>
+          <a:bodyPr/>
           <a:lstStyle/>
-          <a:p>
-            <a:r>
-              <a:rPr lang="en-US" dirty="0" smtClean="0"/>
-              <a:t>Productivity </a:t>
-            </a:r>
-            <a:r>
-              <a:rPr lang="en-US" dirty="0"/>
-              <a:t>Power </a:t>
-            </a:r>
-            <a:r>
-              <a:rPr lang="en-US" dirty="0" smtClean="0"/>
-              <a:t>Tools</a:t>
-            </a:r>
-          </a:p>
-          <a:p>
-            <a:pPr lvl="1"/>
-            <a:r>
-              <a:rPr lang="en-US" dirty="0" smtClean="0"/>
-              <a:t>VS 2010: </a:t>
-            </a:r>
-            <a:r>
-              <a:rPr lang="en-US" dirty="0" smtClean="0">
-                <a:hlinkClick r:id="rId2"/>
-              </a:rPr>
-              <a:t>http</a:t>
-            </a:r>
-            <a:r>
-              <a:rPr lang="en-US" dirty="0">
-                <a:hlinkClick r:id="rId2"/>
-              </a:rPr>
-              <a:t>://</a:t>
-            </a:r>
-            <a:r>
-              <a:rPr lang="en-US" dirty="0" smtClean="0">
-                <a:hlinkClick r:id="rId2"/>
-              </a:rPr>
-              <a:t>visualstudiogallery.msdn.microsoft.com/d0d33361-18e2-46c0-8ff2-4adea1e34fef</a:t>
-            </a:r>
-            <a:endParaRPr lang="en-US" dirty="0" smtClean="0"/>
-          </a:p>
-          <a:p>
-            <a:pPr lvl="1"/>
-            <a:r>
-              <a:rPr lang="en-US" dirty="0"/>
-              <a:t>VS 2012: </a:t>
-            </a:r>
-            <a:r>
-              <a:rPr lang="en-US" dirty="0">
-                <a:hlinkClick r:id="rId3"/>
-              </a:rPr>
-              <a:t>http://</a:t>
-            </a:r>
-            <a:r>
-              <a:rPr lang="en-US" dirty="0" smtClean="0">
-                <a:hlinkClick r:id="rId3"/>
-              </a:rPr>
-              <a:t>visualstudiogallery.msdn.microsoft.com/3a96a4dc-ba9c-4589-92c5-640e07332afd</a:t>
-            </a:r>
-            <a:endParaRPr lang="en-US" dirty="0" smtClean="0"/>
-          </a:p>
-          <a:p>
-            <a:r>
-              <a:rPr lang="en-US" dirty="0" smtClean="0"/>
-              <a:t>Entity </a:t>
-            </a:r>
-            <a:r>
-              <a:rPr lang="en-US" dirty="0"/>
-              <a:t>Framework Power Tools Beta </a:t>
-            </a:r>
-            <a:r>
-              <a:rPr lang="en-US" dirty="0" smtClean="0"/>
-              <a:t>4</a:t>
-            </a:r>
-          </a:p>
-          <a:p>
-            <a:pPr lvl="1"/>
-            <a:r>
-              <a:rPr lang="en-US" dirty="0" smtClean="0">
-                <a:hlinkClick r:id="rId4"/>
-              </a:rPr>
-              <a:t>http</a:t>
-            </a:r>
-            <a:r>
-              <a:rPr lang="en-US" dirty="0">
-                <a:hlinkClick r:id="rId4"/>
-              </a:rPr>
-              <a:t>://</a:t>
-            </a:r>
-            <a:r>
-              <a:rPr lang="en-US" dirty="0" smtClean="0">
-                <a:hlinkClick r:id="rId4"/>
-              </a:rPr>
-              <a:t>visualstudiogallery.msdn.microsoft.com/72a60b14-1581-4b9b-89f2-846072eff19d</a:t>
-            </a:r>
-            <a:endParaRPr lang="en-US" dirty="0" smtClean="0"/>
-          </a:p>
-          <a:p>
-            <a:r>
-              <a:rPr lang="ru-RU" dirty="0" smtClean="0"/>
-              <a:t>Подсветка синтаксиса для </a:t>
-            </a:r>
-            <a:r>
-              <a:rPr lang="en-US" dirty="0" smtClean="0"/>
-              <a:t>T4</a:t>
-            </a:r>
-          </a:p>
-          <a:p>
-            <a:pPr lvl="1"/>
-            <a:r>
-              <a:rPr lang="en-US" dirty="0"/>
-              <a:t>tangible T4 </a:t>
-            </a:r>
-            <a:r>
-              <a:rPr lang="en-US" dirty="0" smtClean="0"/>
-              <a:t>Editor</a:t>
-            </a:r>
-          </a:p>
-          <a:p>
-            <a:pPr lvl="2"/>
-            <a:r>
-              <a:rPr lang="en-US" dirty="0">
-                <a:hlinkClick r:id="rId5"/>
-              </a:rPr>
-              <a:t>http://</a:t>
-            </a:r>
-            <a:r>
-              <a:rPr lang="en-US" dirty="0" smtClean="0">
-                <a:hlinkClick r:id="rId5"/>
-              </a:rPr>
-              <a:t>visualstudiogallery.msdn.microsoft.com/60297607-5fd4-4da4-97e1-3715e90c1a23</a:t>
-            </a:r>
-            <a:endParaRPr lang="en-US" dirty="0" smtClean="0"/>
-          </a:p>
-          <a:p>
-            <a:pPr lvl="1"/>
-            <a:r>
-              <a:rPr lang="en-US" dirty="0" smtClean="0"/>
-              <a:t>Visual T4 (</a:t>
-            </a:r>
-            <a:r>
-              <a:rPr lang="en-US" dirty="0" err="1" smtClean="0"/>
-              <a:t>Clarius</a:t>
-            </a:r>
-            <a:r>
-              <a:rPr lang="en-US" dirty="0" smtClean="0"/>
-              <a:t>)</a:t>
-            </a:r>
-          </a:p>
-          <a:p>
-            <a:pPr lvl="2"/>
-            <a:r>
-              <a:rPr lang="en-US" dirty="0"/>
-              <a:t>http://visualstudiogallery.msdn.microsoft.com/40a887aa-f3be-40ec-a85d-37044b239591</a:t>
-            </a:r>
-            <a:endParaRPr lang="ru-RU" dirty="0" smtClean="0"/>
-          </a:p>
-          <a:p>
-            <a:endParaRPr lang="en-US" dirty="0" smtClean="0"/>
-          </a:p>
-          <a:p>
-            <a:pPr lvl="1"/>
-            <a:endParaRPr lang="en-US" dirty="0" smtClean="0"/>
-          </a:p>
           <a:p>
             <a:endParaRPr lang="en-US" dirty="0"/>
           </a:p>
@@ -9568,7 +9448,7 @@
     </p:spTree>
     <p:extLst>
       <p:ext uri="{BB962C8B-B14F-4D97-AF65-F5344CB8AC3E}">
-        <p14:creationId xmlns:p14="http://schemas.microsoft.com/office/powerpoint/2010/main" val="1235442158"/>
+        <p14:creationId xmlns:p14="http://schemas.microsoft.com/office/powerpoint/2010/main" val="1495295926"/>
       </p:ext>
     </p:extLst>
   </p:cSld>
@@ -9663,6 +9543,247 @@
 </file>
 
 <file path=ppt/slides/slide20.xml><?xml version="1.0" encoding="utf-8"?>
+<p:sld xmlns:a="http://schemas.openxmlformats.org/drawingml/2006/main" xmlns:r="http://schemas.openxmlformats.org/officeDocument/2006/relationships" xmlns:p="http://schemas.openxmlformats.org/presentationml/2006/main">
+  <p:cSld>
+    <p:spTree>
+      <p:nvGrpSpPr>
+        <p:cNvPr id="1" name=""/>
+        <p:cNvGrpSpPr/>
+        <p:nvPr/>
+      </p:nvGrpSpPr>
+      <p:grpSpPr>
+        <a:xfrm>
+          <a:off x="0" y="0"/>
+          <a:ext cx="0" cy="0"/>
+          <a:chOff x="0" y="0"/>
+          <a:chExt cx="0" cy="0"/>
+        </a:xfrm>
+      </p:grpSpPr>
+      <p:sp>
+        <p:nvSpPr>
+          <p:cNvPr id="2" name="Title 1"/>
+          <p:cNvSpPr>
+            <a:spLocks noGrp="1"/>
+          </p:cNvSpPr>
+          <p:nvPr>
+            <p:ph type="title"/>
+          </p:nvPr>
+        </p:nvSpPr>
+        <p:spPr/>
+        <p:txBody>
+          <a:bodyPr/>
+          <a:lstStyle/>
+          <a:p>
+            <a:r>
+              <a:rPr lang="ru-RU" dirty="0" smtClean="0"/>
+              <a:t>Бесплатные расширения для </a:t>
+            </a:r>
+            <a:r>
+              <a:rPr lang="en-US" dirty="0" smtClean="0"/>
+              <a:t>VS</a:t>
+            </a:r>
+            <a:endParaRPr lang="en-US" dirty="0"/>
+          </a:p>
+        </p:txBody>
+      </p:sp>
+      <p:sp>
+        <p:nvSpPr>
+          <p:cNvPr id="3" name="Content Placeholder 2"/>
+          <p:cNvSpPr>
+            <a:spLocks noGrp="1"/>
+          </p:cNvSpPr>
+          <p:nvPr>
+            <p:ph idx="1"/>
+          </p:nvPr>
+        </p:nvSpPr>
+        <p:spPr/>
+        <p:txBody>
+          <a:bodyPr>
+            <a:normAutofit fontScale="70000" lnSpcReduction="20000"/>
+          </a:bodyPr>
+          <a:lstStyle/>
+          <a:p>
+            <a:r>
+              <a:rPr lang="en-US" dirty="0" smtClean="0"/>
+              <a:t>Productivity </a:t>
+            </a:r>
+            <a:r>
+              <a:rPr lang="en-US" dirty="0"/>
+              <a:t>Power </a:t>
+            </a:r>
+            <a:r>
+              <a:rPr lang="en-US" dirty="0" smtClean="0"/>
+              <a:t>Tools</a:t>
+            </a:r>
+          </a:p>
+          <a:p>
+            <a:pPr lvl="1"/>
+            <a:r>
+              <a:rPr lang="en-US" dirty="0" smtClean="0"/>
+              <a:t>VS 2010: </a:t>
+            </a:r>
+            <a:r>
+              <a:rPr lang="en-US" dirty="0" smtClean="0">
+                <a:hlinkClick r:id="rId2"/>
+              </a:rPr>
+              <a:t>http</a:t>
+            </a:r>
+            <a:r>
+              <a:rPr lang="en-US" dirty="0">
+                <a:hlinkClick r:id="rId2"/>
+              </a:rPr>
+              <a:t>://</a:t>
+            </a:r>
+            <a:r>
+              <a:rPr lang="en-US" dirty="0" smtClean="0">
+                <a:hlinkClick r:id="rId2"/>
+              </a:rPr>
+              <a:t>visualstudiogallery.msdn.microsoft.com/d0d33361-18e2-46c0-8ff2-4adea1e34fef</a:t>
+            </a:r>
+            <a:endParaRPr lang="en-US" dirty="0" smtClean="0"/>
+          </a:p>
+          <a:p>
+            <a:pPr lvl="1"/>
+            <a:r>
+              <a:rPr lang="en-US" dirty="0"/>
+              <a:t>VS 2012: </a:t>
+            </a:r>
+            <a:r>
+              <a:rPr lang="en-US" dirty="0">
+                <a:hlinkClick r:id="rId3"/>
+              </a:rPr>
+              <a:t>http://</a:t>
+            </a:r>
+            <a:r>
+              <a:rPr lang="en-US" dirty="0" smtClean="0">
+                <a:hlinkClick r:id="rId3"/>
+              </a:rPr>
+              <a:t>visualstudiogallery.msdn.microsoft.com/3a96a4dc-ba9c-4589-92c5-640e07332afd</a:t>
+            </a:r>
+            <a:endParaRPr lang="en-US" dirty="0" smtClean="0"/>
+          </a:p>
+          <a:p>
+            <a:r>
+              <a:rPr lang="en-US" dirty="0" smtClean="0"/>
+              <a:t>Entity </a:t>
+            </a:r>
+            <a:r>
+              <a:rPr lang="en-US" dirty="0"/>
+              <a:t>Framework Power Tools Beta </a:t>
+            </a:r>
+            <a:r>
+              <a:rPr lang="en-US" dirty="0" smtClean="0"/>
+              <a:t>4</a:t>
+            </a:r>
+          </a:p>
+          <a:p>
+            <a:pPr lvl="1"/>
+            <a:r>
+              <a:rPr lang="en-US" dirty="0" smtClean="0">
+                <a:hlinkClick r:id="rId4"/>
+              </a:rPr>
+              <a:t>http</a:t>
+            </a:r>
+            <a:r>
+              <a:rPr lang="en-US" dirty="0">
+                <a:hlinkClick r:id="rId4"/>
+              </a:rPr>
+              <a:t>://</a:t>
+            </a:r>
+            <a:r>
+              <a:rPr lang="en-US" dirty="0" smtClean="0">
+                <a:hlinkClick r:id="rId4"/>
+              </a:rPr>
+              <a:t>visualstudiogallery.msdn.microsoft.com/72a60b14-1581-4b9b-89f2-846072eff19d</a:t>
+            </a:r>
+            <a:endParaRPr lang="en-US" dirty="0" smtClean="0"/>
+          </a:p>
+          <a:p>
+            <a:r>
+              <a:rPr lang="ru-RU" dirty="0" smtClean="0"/>
+              <a:t>Подсветка синтаксиса для </a:t>
+            </a:r>
+            <a:r>
+              <a:rPr lang="en-US" dirty="0" smtClean="0"/>
+              <a:t>T4</a:t>
+            </a:r>
+          </a:p>
+          <a:p>
+            <a:pPr lvl="1"/>
+            <a:r>
+              <a:rPr lang="en-US" dirty="0"/>
+              <a:t>tangible T4 </a:t>
+            </a:r>
+            <a:r>
+              <a:rPr lang="en-US" dirty="0" smtClean="0"/>
+              <a:t>Editor</a:t>
+            </a:r>
+          </a:p>
+          <a:p>
+            <a:pPr lvl="2"/>
+            <a:r>
+              <a:rPr lang="en-US" dirty="0">
+                <a:hlinkClick r:id="rId5"/>
+              </a:rPr>
+              <a:t>http://</a:t>
+            </a:r>
+            <a:r>
+              <a:rPr lang="en-US" dirty="0" smtClean="0">
+                <a:hlinkClick r:id="rId5"/>
+              </a:rPr>
+              <a:t>visualstudiogallery.msdn.microsoft.com/60297607-5fd4-4da4-97e1-3715e90c1a23</a:t>
+            </a:r>
+            <a:endParaRPr lang="en-US" dirty="0" smtClean="0"/>
+          </a:p>
+          <a:p>
+            <a:pPr lvl="1"/>
+            <a:r>
+              <a:rPr lang="en-US" dirty="0" smtClean="0"/>
+              <a:t>Visual T4 (</a:t>
+            </a:r>
+            <a:r>
+              <a:rPr lang="en-US" dirty="0" err="1" smtClean="0"/>
+              <a:t>Clarius</a:t>
+            </a:r>
+            <a:r>
+              <a:rPr lang="en-US" dirty="0" smtClean="0"/>
+              <a:t>)</a:t>
+            </a:r>
+          </a:p>
+          <a:p>
+            <a:pPr lvl="2"/>
+            <a:r>
+              <a:rPr lang="en-US" dirty="0"/>
+              <a:t>http://visualstudiogallery.msdn.microsoft.com/40a887aa-f3be-40ec-a85d-37044b239591</a:t>
+            </a:r>
+            <a:endParaRPr lang="ru-RU" dirty="0" smtClean="0"/>
+          </a:p>
+          <a:p>
+            <a:endParaRPr lang="en-US" dirty="0" smtClean="0"/>
+          </a:p>
+          <a:p>
+            <a:pPr lvl="1"/>
+            <a:endParaRPr lang="en-US" dirty="0" smtClean="0"/>
+          </a:p>
+          <a:p>
+            <a:endParaRPr lang="en-US" dirty="0"/>
+          </a:p>
+        </p:txBody>
+      </p:sp>
+    </p:spTree>
+    <p:extLst>
+      <p:ext uri="{BB962C8B-B14F-4D97-AF65-F5344CB8AC3E}">
+        <p14:creationId xmlns:p14="http://schemas.microsoft.com/office/powerpoint/2010/main" val="1235442158"/>
+      </p:ext>
+    </p:extLst>
+  </p:cSld>
+  <p:clrMapOvr>
+    <a:masterClrMapping/>
+  </p:clrMapOvr>
+</p:sld>
+</file>
+
+<file path=ppt/slides/slide21.xml><?xml version="1.0" encoding="utf-8"?>
 <p:sld xmlns:a="http://schemas.openxmlformats.org/drawingml/2006/main" xmlns:r="http://schemas.openxmlformats.org/officeDocument/2006/relationships" xmlns:p="http://schemas.openxmlformats.org/presentationml/2006/main">
   <p:cSld>
     <p:spTree>

</xml_diff>

<commit_message>
Info about rootsuffix option
</commit_message>
<xml_diff>
--- a/Presentation/tools-visual-studio.pptx
+++ b/Presentation/tools-visual-studio.pptx
@@ -131,7 +131,7 @@
   </p:defaultTextStyle>
   <p:extLst>
     <p:ext uri="{EFAFB233-063F-42B5-8137-9DF3F51BA10A}">
-      <p15:sldGuideLst xmlns="" xmlns:p15="http://schemas.microsoft.com/office/powerpoint/2012/main">
+      <p15:sldGuideLst xmlns:p15="http://schemas.microsoft.com/office/powerpoint/2012/main" xmlns="">
         <p15:guide id="1" orient="horz" pos="2160">
           <p15:clr>
             <a:srgbClr val="A4A3A4"/>
@@ -230,7 +230,7 @@
           <a:p>
             <a:fld id="{B24A7054-7FFB-49F4-A126-5DF6E687FF53}" type="datetimeFigureOut">
               <a:rPr lang="ru-RU" smtClean="0"/>
-              <a:t>04.06.2014</a:t>
+              <a:t>12.08.2014</a:t>
             </a:fld>
             <a:endParaRPr lang="ru-RU"/>
           </a:p>
@@ -1512,7 +1512,7 @@
           <a:p>
             <a:fld id="{8E6E6A2A-E9D3-4A0D-B04A-ABDD367A1E08}" type="datetimeFigureOut">
               <a:rPr lang="ru-RU" smtClean="0"/>
-              <a:t>04.06.2014</a:t>
+              <a:t>12.08.2014</a:t>
             </a:fld>
             <a:endParaRPr lang="ru-RU"/>
           </a:p>
@@ -4025,7 +4025,7 @@
                 </a:solidFill>
               </a:rPr>
               <a:pPr/>
-              <a:t>04.06.2014</a:t>
+              <a:t>12.08.2014</a:t>
             </a:fld>
             <a:endParaRPr lang="ru-RU">
               <a:solidFill>
@@ -5286,7 +5286,7 @@
           <a:p>
             <a:fld id="{AC3D3127-B7C4-45E3-9797-C527EC9FDD78}" type="datetimeFigureOut">
               <a:rPr lang="ru-RU" smtClean="0"/>
-              <a:t>04.06.2014</a:t>
+              <a:t>12.08.2014</a:t>
             </a:fld>
             <a:endParaRPr lang="ru-RU"/>
           </a:p>
@@ -5822,7 +5822,7 @@
                 </a:solidFill>
               </a:rPr>
               <a:pPr/>
-              <a:t>04.06.2014</a:t>
+              <a:t>12.08.2014</a:t>
             </a:fld>
             <a:endParaRPr lang="ru-RU">
               <a:solidFill>
@@ -6454,11 +6454,7 @@
             </a:r>
             <a:r>
               <a:rPr lang="ru-RU" dirty="0" smtClean="0"/>
-              <a:t>Выделение </a:t>
-            </a:r>
-            <a:r>
-              <a:rPr lang="ru-RU" dirty="0" smtClean="0"/>
-              <a:t>текста</a:t>
+              <a:t>Выделение текста</a:t>
             </a:r>
             <a:endParaRPr lang="en-US" dirty="0"/>
           </a:p>
@@ -11020,30 +11016,89 @@
               <a:rPr lang="en-US" dirty="0" err="1" smtClean="0"/>
               <a:t>SafeMode</a:t>
             </a:r>
-            <a:endParaRPr lang="en-US" dirty="0" smtClean="0"/>
-          </a:p>
-          <a:p>
-            <a:pPr lvl="1"/>
+            <a:r>
+              <a:rPr lang="en-US" dirty="0" smtClean="0"/>
+              <a:t/>
+            </a:r>
+            <a:br>
+              <a:rPr lang="en-US" dirty="0" smtClean="0"/>
+            </a:br>
+            <a:r>
+              <a:rPr lang="ru-RU" sz="2800" dirty="0" smtClean="0"/>
+              <a:t>Безопасный </a:t>
+            </a:r>
+            <a:r>
+              <a:rPr lang="ru-RU" sz="2800" dirty="0"/>
+              <a:t>режим</a:t>
+            </a:r>
+            <a:r>
+              <a:rPr lang="en-US" sz="2800" dirty="0"/>
+              <a:t> (</a:t>
+            </a:r>
+            <a:r>
+              <a:rPr lang="ru-RU" sz="2800" dirty="0"/>
+              <a:t>отключает все расширения</a:t>
+            </a:r>
+            <a:r>
+              <a:rPr lang="en-US" sz="2800" dirty="0" smtClean="0"/>
+              <a:t>)</a:t>
+            </a:r>
+          </a:p>
+          <a:p>
+            <a:r>
+              <a:rPr lang="en-US" dirty="0"/>
+              <a:t>/</a:t>
+            </a:r>
+            <a:r>
+              <a:rPr lang="en-US" dirty="0" err="1" smtClean="0"/>
+              <a:t>rootsuffix</a:t>
+            </a:r>
+            <a:r>
+              <a:rPr lang="en-US" dirty="0" smtClean="0"/>
+              <a:t> &lt;</a:t>
+            </a:r>
             <a:r>
               <a:rPr lang="ru-RU" dirty="0" smtClean="0"/>
-              <a:t>Безопасный </a:t>
-            </a:r>
-            <a:r>
-              <a:rPr lang="ru-RU" dirty="0"/>
-              <a:t>режим</a:t>
-            </a:r>
-            <a:r>
-              <a:rPr lang="en-US" dirty="0"/>
-              <a:t> (</a:t>
-            </a:r>
-            <a:r>
-              <a:rPr lang="ru-RU" dirty="0"/>
-              <a:t>отключает все расширения</a:t>
-            </a:r>
-            <a:r>
-              <a:rPr lang="en-US" dirty="0"/>
-              <a:t>)</a:t>
-            </a:r>
+              <a:t>и</a:t>
+            </a:r>
+            <a:r>
+              <a:rPr lang="ru-RU" smtClean="0"/>
+              <a:t>мя</a:t>
+            </a:r>
+            <a:r>
+              <a:rPr lang="en-US" dirty="0" smtClean="0"/>
+              <a:t>&gt;</a:t>
+            </a:r>
+            <a:r>
+              <a:rPr lang="ru-RU" dirty="0" smtClean="0"/>
+              <a:t/>
+            </a:r>
+            <a:br>
+              <a:rPr lang="ru-RU" dirty="0" smtClean="0"/>
+            </a:br>
+            <a:r>
+              <a:rPr lang="ru-RU" sz="2800" dirty="0" smtClean="0"/>
+              <a:t>Запуск </a:t>
+            </a:r>
+            <a:r>
+              <a:rPr lang="en-US" sz="2800" dirty="0" smtClean="0"/>
+              <a:t>VS </a:t>
+            </a:r>
+            <a:r>
+              <a:rPr lang="ru-RU" sz="2800" dirty="0" smtClean="0"/>
+              <a:t>с указанным профилем. Для выборочной установки расширений в разные профили используйте утилиту </a:t>
+            </a:r>
+            <a:r>
+              <a:rPr lang="en-US" sz="2800" dirty="0" smtClean="0"/>
+              <a:t>Root-VSIX</a:t>
+            </a:r>
+            <a:r>
+              <a:rPr lang="en-US" dirty="0" smtClean="0"/>
+              <a:t/>
+            </a:r>
+            <a:br>
+              <a:rPr lang="en-US" dirty="0" smtClean="0"/>
+            </a:br>
             <a:endParaRPr lang="ru-RU" dirty="0"/>
           </a:p>
           <a:p>
@@ -11517,15 +11572,7 @@
                   <a:schemeClr val="bg1"/>
                 </a:solidFill>
               </a:rPr>
-              <a:t> </a:t>
-            </a:r>
-            <a:r>
-              <a:rPr lang="ru-RU" dirty="0" smtClean="0">
-                <a:solidFill>
-                  <a:schemeClr val="bg1"/>
-                </a:solidFill>
-              </a:rPr>
-              <a:t>поиск</a:t>
+              <a:t> поиск</a:t>
             </a:r>
           </a:p>
           <a:p>

</xml_diff>

<commit_message>
Updated list of VS addons
</commit_message>
<xml_diff>
--- a/Presentation/tools-visual-studio.pptx
+++ b/Presentation/tools-visual-studio.pptx
@@ -131,7 +131,7 @@
   </p:defaultTextStyle>
   <p:extLst>
     <p:ext uri="{EFAFB233-063F-42B5-8137-9DF3F51BA10A}">
-      <p15:sldGuideLst xmlns:p15="http://schemas.microsoft.com/office/powerpoint/2012/main" xmlns="">
+      <p15:sldGuideLst xmlns="" xmlns:p15="http://schemas.microsoft.com/office/powerpoint/2012/main">
         <p15:guide id="1" orient="horz" pos="2160">
           <p15:clr>
             <a:srgbClr val="A4A3A4"/>
@@ -230,7 +230,7 @@
           <a:p>
             <a:fld id="{B24A7054-7FFB-49F4-A126-5DF6E687FF53}" type="datetimeFigureOut">
               <a:rPr lang="ru-RU" smtClean="0"/>
-              <a:t>12.08.2014</a:t>
+              <a:t>18.08.2014</a:t>
             </a:fld>
             <a:endParaRPr lang="ru-RU"/>
           </a:p>
@@ -1512,7 +1512,7 @@
           <a:p>
             <a:fld id="{8E6E6A2A-E9D3-4A0D-B04A-ABDD367A1E08}" type="datetimeFigureOut">
               <a:rPr lang="ru-RU" smtClean="0"/>
-              <a:t>12.08.2014</a:t>
+              <a:t>18.08.2014</a:t>
             </a:fld>
             <a:endParaRPr lang="ru-RU"/>
           </a:p>
@@ -4025,7 +4025,7 @@
                 </a:solidFill>
               </a:rPr>
               <a:pPr/>
-              <a:t>12.08.2014</a:t>
+              <a:t>18.08.2014</a:t>
             </a:fld>
             <a:endParaRPr lang="ru-RU">
               <a:solidFill>
@@ -5286,7 +5286,7 @@
           <a:p>
             <a:fld id="{AC3D3127-B7C4-45E3-9797-C527EC9FDD78}" type="datetimeFigureOut">
               <a:rPr lang="ru-RU" smtClean="0"/>
-              <a:t>12.08.2014</a:t>
+              <a:t>18.08.2014</a:t>
             </a:fld>
             <a:endParaRPr lang="ru-RU"/>
           </a:p>
@@ -5822,7 +5822,7 @@
                 </a:solidFill>
               </a:rPr>
               <a:pPr/>
-              <a:t>12.08.2014</a:t>
+              <a:t>18.08.2014</a:t>
             </a:fld>
             <a:endParaRPr lang="ru-RU">
               <a:solidFill>
@@ -9796,7 +9796,7 @@
         <p:spPr/>
         <p:txBody>
           <a:bodyPr>
-            <a:normAutofit fontScale="70000" lnSpcReduction="20000"/>
+            <a:normAutofit fontScale="55000" lnSpcReduction="20000"/>
           </a:bodyPr>
           <a:lstStyle/>
           <a:p>
@@ -9892,6 +9892,32 @@
                 <a:hlinkClick r:id="rId4"/>
               </a:rPr>
               <a:t>visualstudiogallery.msdn.microsoft.com/72a60b14-1581-4b9b-89f2-846072eff19d</a:t>
+            </a:r>
+            <a:endParaRPr lang="ru-RU" dirty="0" smtClean="0"/>
+          </a:p>
+          <a:p>
+            <a:r>
+              <a:rPr lang="en-US" dirty="0" err="1" smtClean="0"/>
+              <a:t>VSColorOutput</a:t>
+            </a:r>
+            <a:r>
+              <a:rPr lang="en-US" dirty="0" smtClean="0"/>
+              <a:t> (</a:t>
+            </a:r>
+            <a:r>
+              <a:rPr lang="ru-RU" dirty="0" smtClean="0"/>
+              <a:t>раскраска строк в окне </a:t>
+            </a:r>
+            <a:r>
+              <a:rPr lang="en-US" dirty="0" smtClean="0"/>
+              <a:t>Output)</a:t>
+            </a:r>
+          </a:p>
+          <a:p>
+            <a:pPr lvl="1"/>
+            <a:r>
+              <a:rPr lang="en-US" dirty="0"/>
+              <a:t>http://visualstudiogallery.msdn.microsoft.com/f4d9c2b5-d6d7-4543-a7a5-2d7ebabc2496</a:t>
             </a:r>
             <a:endParaRPr lang="en-US" dirty="0" smtClean="0"/>
           </a:p>
@@ -10021,6 +10047,10 @@
           </a:bodyPr>
           <a:lstStyle/>
           <a:p>
+            <a:r>
+              <a:rPr lang="ru-RU" dirty="0" smtClean="0"/>
+              <a:t>Платные расширения</a:t>
+            </a:r>
             <a:endParaRPr lang="ru-RU" dirty="0"/>
           </a:p>
         </p:txBody>

</xml_diff>

<commit_message>
How to reset VS settings
</commit_message>
<xml_diff>
--- a/Presentation/tools-visual-studio.pptx
+++ b/Presentation/tools-visual-studio.pptx
@@ -6,7 +6,7 @@
     <p:sldMasterId id="2147483663" r:id="rId2"/>
   </p:sldMasterIdLst>
   <p:notesMasterIdLst>
-    <p:notesMasterId r:id="rId25"/>
+    <p:notesMasterId r:id="rId26"/>
   </p:notesMasterIdLst>
   <p:sldIdLst>
     <p:sldId id="257" r:id="rId3"/>
@@ -14,23 +14,24 @@
     <p:sldId id="278" r:id="rId5"/>
     <p:sldId id="264" r:id="rId6"/>
     <p:sldId id="270" r:id="rId7"/>
-    <p:sldId id="272" r:id="rId8"/>
-    <p:sldId id="275" r:id="rId9"/>
-    <p:sldId id="262" r:id="rId10"/>
-    <p:sldId id="265" r:id="rId11"/>
-    <p:sldId id="280" r:id="rId12"/>
-    <p:sldId id="277" r:id="rId13"/>
-    <p:sldId id="271" r:id="rId14"/>
-    <p:sldId id="266" r:id="rId15"/>
-    <p:sldId id="279" r:id="rId16"/>
-    <p:sldId id="269" r:id="rId17"/>
-    <p:sldId id="273" r:id="rId18"/>
-    <p:sldId id="274" r:id="rId19"/>
-    <p:sldId id="267" r:id="rId20"/>
-    <p:sldId id="268" r:id="rId21"/>
-    <p:sldId id="260" r:id="rId22"/>
-    <p:sldId id="261" r:id="rId23"/>
-    <p:sldId id="276" r:id="rId24"/>
+    <p:sldId id="281" r:id="rId8"/>
+    <p:sldId id="272" r:id="rId9"/>
+    <p:sldId id="275" r:id="rId10"/>
+    <p:sldId id="262" r:id="rId11"/>
+    <p:sldId id="265" r:id="rId12"/>
+    <p:sldId id="280" r:id="rId13"/>
+    <p:sldId id="277" r:id="rId14"/>
+    <p:sldId id="271" r:id="rId15"/>
+    <p:sldId id="266" r:id="rId16"/>
+    <p:sldId id="279" r:id="rId17"/>
+    <p:sldId id="269" r:id="rId18"/>
+    <p:sldId id="273" r:id="rId19"/>
+    <p:sldId id="274" r:id="rId20"/>
+    <p:sldId id="267" r:id="rId21"/>
+    <p:sldId id="268" r:id="rId22"/>
+    <p:sldId id="260" r:id="rId23"/>
+    <p:sldId id="261" r:id="rId24"/>
+    <p:sldId id="276" r:id="rId25"/>
   </p:sldIdLst>
   <p:sldSz cx="9144000" cy="6858000" type="screen4x3"/>
   <p:notesSz cx="6858000" cy="9144000"/>
@@ -131,7 +132,7 @@
   </p:defaultTextStyle>
   <p:extLst>
     <p:ext uri="{EFAFB233-063F-42B5-8137-9DF3F51BA10A}">
-      <p15:sldGuideLst xmlns="" xmlns:p15="http://schemas.microsoft.com/office/powerpoint/2012/main">
+      <p15:sldGuideLst xmlns:p15="http://schemas.microsoft.com/office/powerpoint/2012/main" xmlns="">
         <p15:guide id="1" orient="horz" pos="2160">
           <p15:clr>
             <a:srgbClr val="A4A3A4"/>
@@ -230,7 +231,7 @@
           <a:p>
             <a:fld id="{B24A7054-7FFB-49F4-A126-5DF6E687FF53}" type="datetimeFigureOut">
               <a:rPr lang="ru-RU" smtClean="0"/>
-              <a:t>18.08.2014</a:t>
+              <a:t>24.08.2014</a:t>
             </a:fld>
             <a:endParaRPr lang="ru-RU"/>
           </a:p>
@@ -1512,7 +1513,7 @@
           <a:p>
             <a:fld id="{8E6E6A2A-E9D3-4A0D-B04A-ABDD367A1E08}" type="datetimeFigureOut">
               <a:rPr lang="ru-RU" smtClean="0"/>
-              <a:t>18.08.2014</a:t>
+              <a:t>24.08.2014</a:t>
             </a:fld>
             <a:endParaRPr lang="ru-RU"/>
           </a:p>
@@ -4025,7 +4026,7 @@
                 </a:solidFill>
               </a:rPr>
               <a:pPr/>
-              <a:t>18.08.2014</a:t>
+              <a:t>24.08.2014</a:t>
             </a:fld>
             <a:endParaRPr lang="ru-RU">
               <a:solidFill>
@@ -5286,7 +5287,7 @@
           <a:p>
             <a:fld id="{AC3D3127-B7C4-45E3-9797-C527EC9FDD78}" type="datetimeFigureOut">
               <a:rPr lang="ru-RU" smtClean="0"/>
-              <a:t>18.08.2014</a:t>
+              <a:t>24.08.2014</a:t>
             </a:fld>
             <a:endParaRPr lang="ru-RU"/>
           </a:p>
@@ -5822,7 +5823,7 @@
                 </a:solidFill>
               </a:rPr>
               <a:pPr/>
-              <a:t>18.08.2014</a:t>
+              <a:t>24.08.2014</a:t>
             </a:fld>
             <a:endParaRPr lang="ru-RU">
               <a:solidFill>
@@ -6454,7 +6455,7 @@
             </a:r>
             <a:r>
               <a:rPr lang="ru-RU" dirty="0" smtClean="0"/>
-              <a:t>Выделение текста</a:t>
+              <a:t>Поиск текста</a:t>
             </a:r>
             <a:endParaRPr lang="en-US" dirty="0"/>
           </a:p>
@@ -6473,7 +6474,7 @@
         <p:spPr/>
         <p:txBody>
           <a:bodyPr>
-            <a:normAutofit/>
+            <a:normAutofit fontScale="85000" lnSpcReduction="10000"/>
           </a:bodyPr>
           <a:lstStyle/>
           <a:p>
@@ -6488,15 +6489,69 @@
                   <a:srgbClr val="F6AE1E"/>
                 </a:solidFill>
               </a:rPr>
-              <a:t>Ctrl+Shift</a:t>
+              <a:t>Ctrl+I</a:t>
+            </a:r>
+            <a:r>
+              <a:rPr lang="ru-RU" dirty="0" smtClean="0">
+                <a:solidFill>
+                  <a:schemeClr val="bg1"/>
+                </a:solidFill>
+              </a:rPr>
+              <a:t> поиск</a:t>
+            </a:r>
+          </a:p>
+          <a:p>
+            <a:pPr>
+              <a:buClr>
+                <a:schemeClr val="bg1"/>
+              </a:buClr>
+            </a:pPr>
+            <a:r>
+              <a:rPr lang="en-US" dirty="0">
+                <a:solidFill>
+                  <a:srgbClr val="F6AE1E"/>
+                </a:solidFill>
+              </a:rPr>
+              <a:t>F3/Shift+F3</a:t>
             </a:r>
             <a:r>
               <a:rPr lang="en-US" dirty="0" smtClean="0">
                 <a:solidFill>
+                  <a:schemeClr val="bg1"/>
+                </a:solidFill>
+              </a:rPr>
+              <a:t> </a:t>
+            </a:r>
+            <a:r>
+              <a:rPr lang="ru-RU" dirty="0" smtClean="0">
+                <a:solidFill>
+                  <a:schemeClr val="bg1"/>
+                </a:solidFill>
+              </a:rPr>
+              <a:t>найти следующее/предыдущее вхождение строки</a:t>
+            </a:r>
+          </a:p>
+          <a:p>
+            <a:pPr>
+              <a:buClr>
+                <a:schemeClr val="bg1"/>
+              </a:buClr>
+            </a:pPr>
+            <a:r>
+              <a:rPr lang="en-US" dirty="0">
+                <a:solidFill>
                   <a:srgbClr val="F6AE1E"/>
                 </a:solidFill>
               </a:rPr>
-              <a:t>+]</a:t>
+              <a:t>Ctrl+F3</a:t>
+            </a:r>
+            <a:r>
+              <a:rPr lang="en-US" dirty="0" smtClean="0">
+                <a:solidFill>
+                  <a:schemeClr val="bg1"/>
+                </a:solidFill>
+              </a:rPr>
+              <a:t> </a:t>
             </a:r>
             <a:r>
               <a:rPr lang="ru-RU" dirty="0" smtClean="0">
@@ -6504,7 +6559,22 @@
                   <a:schemeClr val="bg1"/>
                 </a:solidFill>
               </a:rPr>
-              <a:t> выделение блока внутри</a:t>
+              <a:t>найти следующее вхождение выделенного текста</a:t>
+            </a:r>
+          </a:p>
+          <a:p>
+            <a:pPr>
+              <a:buClr>
+                <a:schemeClr val="bg1"/>
+              </a:buClr>
+            </a:pPr>
+            <a:r>
+              <a:rPr lang="en-US" dirty="0" err="1">
+                <a:solidFill>
+                  <a:srgbClr val="F6AE1E"/>
+                </a:solidFill>
+              </a:rPr>
+              <a:t>Ctrl+Shift+F</a:t>
             </a:r>
             <a:r>
               <a:rPr lang="en-US" dirty="0" smtClean="0">
@@ -6512,7 +6582,7 @@
                   <a:schemeClr val="bg1"/>
                 </a:solidFill>
               </a:rPr>
-              <a:t> { }. </a:t>
+              <a:t> </a:t>
             </a:r>
             <a:r>
               <a:rPr lang="ru-RU" dirty="0" smtClean="0">
@@ -6520,7 +6590,7 @@
                   <a:schemeClr val="bg1"/>
                 </a:solidFill>
               </a:rPr>
-              <a:t>Курсор должен стоять на </a:t>
+              <a:t>найти в </a:t>
             </a:r>
             <a:r>
               <a:rPr lang="en-US" dirty="0" smtClean="0">
@@ -6528,23 +6598,58 @@
                   <a:schemeClr val="bg1"/>
                 </a:solidFill>
               </a:rPr>
-              <a:t>{ </a:t>
-            </a:r>
-            <a:r>
-              <a:rPr lang="ru-RU" dirty="0" smtClean="0">
+              <a:t>solution</a:t>
+            </a:r>
+          </a:p>
+          <a:p>
+            <a:pPr marL="0" indent="0">
+              <a:buClr>
+                <a:schemeClr val="bg1"/>
+              </a:buClr>
+              <a:buNone/>
+            </a:pPr>
+            <a:endParaRPr lang="ru-RU" dirty="0" smtClean="0">
+              <a:solidFill>
+                <a:schemeClr val="bg1"/>
+              </a:solidFill>
+            </a:endParaRPr>
+          </a:p>
+          <a:p>
+            <a:pPr>
+              <a:buClr>
+                <a:schemeClr val="bg1"/>
+              </a:buClr>
+            </a:pPr>
+            <a:endParaRPr lang="ru-RU" dirty="0">
+              <a:solidFill>
+                <a:schemeClr val="bg1"/>
+              </a:solidFill>
+            </a:endParaRPr>
+          </a:p>
+          <a:p>
+            <a:pPr marL="0" indent="0">
+              <a:buClr>
+                <a:schemeClr val="bg1"/>
+              </a:buClr>
+              <a:buNone/>
+            </a:pPr>
+            <a:r>
+              <a:rPr lang="en-US" dirty="0">
                 <a:solidFill>
                   <a:schemeClr val="bg1"/>
                 </a:solidFill>
-              </a:rPr>
-              <a:t>или </a:t>
+                <a:hlinkClick r:id="rId2"/>
+              </a:rPr>
+              <a:t>http://</a:t>
             </a:r>
             <a:r>
               <a:rPr lang="en-US" dirty="0" smtClean="0">
                 <a:solidFill>
                   <a:schemeClr val="bg1"/>
                 </a:solidFill>
-              </a:rPr>
-              <a:t>}</a:t>
+                <a:hlinkClick r:id="rId2"/>
+              </a:rPr>
+              <a:t>weblogs.asp.net/scottgu/archive/2010/08/24/search-and-navigation-tips-tricks-with-visual-studio.aspx</a:t>
             </a:r>
             <a:endParaRPr lang="ru-RU" dirty="0" smtClean="0">
               <a:solidFill>
@@ -6570,7 +6675,7 @@
     </p:spTree>
     <p:extLst>
       <p:ext uri="{BB962C8B-B14F-4D97-AF65-F5344CB8AC3E}">
-        <p14:creationId xmlns:p14="http://schemas.microsoft.com/office/powerpoint/2010/main" val="4175683496"/>
+        <p14:creationId xmlns:p14="http://schemas.microsoft.com/office/powerpoint/2010/main" val="1967395690"/>
       </p:ext>
     </p:extLst>
   </p:cSld>
@@ -6621,9 +6726,17 @@
           <a:p>
             <a:r>
               <a:rPr lang="ru-RU" dirty="0" smtClean="0"/>
-              <a:t>Редактор: комментарии</a:t>
-            </a:r>
-            <a:endParaRPr lang="ru-RU" dirty="0"/>
+              <a:t>Редактор</a:t>
+            </a:r>
+            <a:r>
+              <a:rPr lang="en-US" dirty="0" smtClean="0"/>
+              <a:t>: </a:t>
+            </a:r>
+            <a:r>
+              <a:rPr lang="ru-RU" dirty="0" smtClean="0"/>
+              <a:t>Выделение текста</a:t>
+            </a:r>
+            <a:endParaRPr lang="en-US" dirty="0"/>
           </a:p>
         </p:txBody>
       </p:sp>
@@ -6644,95 +6757,100 @@
           </a:bodyPr>
           <a:lstStyle/>
           <a:p>
-            <a:r>
-              <a:rPr lang="en-US" sz="2800" dirty="0" err="1">
+            <a:pPr>
+              <a:buClr>
+                <a:schemeClr val="bg1"/>
+              </a:buClr>
+            </a:pPr>
+            <a:r>
+              <a:rPr lang="en-US" dirty="0" err="1" smtClean="0">
                 <a:solidFill>
                   <a:srgbClr val="F6AE1E"/>
                 </a:solidFill>
               </a:rPr>
-              <a:t>Ctrl+K</a:t>
-            </a:r>
-            <a:r>
-              <a:rPr lang="en-US" sz="2800" dirty="0">
+              <a:t>Ctrl+Shift</a:t>
+            </a:r>
+            <a:r>
+              <a:rPr lang="en-US" dirty="0" smtClean="0">
                 <a:solidFill>
                   <a:srgbClr val="F6AE1E"/>
                 </a:solidFill>
               </a:rPr>
-              <a:t>, </a:t>
-            </a:r>
-            <a:r>
-              <a:rPr lang="en-US" sz="2800" dirty="0" err="1">
-                <a:solidFill>
-                  <a:srgbClr val="F6AE1E"/>
-                </a:solidFill>
-              </a:rPr>
-              <a:t>Ctrl+C</a:t>
-            </a:r>
-            <a:r>
-              <a:rPr lang="en-US" sz="2800" dirty="0">
+              <a:t>+]</a:t>
+            </a:r>
+            <a:r>
+              <a:rPr lang="ru-RU" dirty="0" smtClean="0">
                 <a:solidFill>
                   <a:schemeClr val="bg1"/>
                 </a:solidFill>
               </a:rPr>
-              <a:t> </a:t>
-            </a:r>
-            <a:r>
-              <a:rPr lang="ru-RU" sz="2800" dirty="0">
+              <a:t> выделение блока внутри</a:t>
+            </a:r>
+            <a:r>
+              <a:rPr lang="en-US" dirty="0" smtClean="0">
                 <a:solidFill>
                   <a:schemeClr val="bg1"/>
                 </a:solidFill>
               </a:rPr>
-              <a:t>закоментировать выбранные </a:t>
-            </a:r>
-            <a:r>
-              <a:rPr lang="ru-RU" sz="2800" dirty="0" smtClean="0">
+              <a:t> { }. </a:t>
+            </a:r>
+            <a:r>
+              <a:rPr lang="ru-RU" dirty="0" smtClean="0">
                 <a:solidFill>
                   <a:schemeClr val="bg1"/>
                 </a:solidFill>
               </a:rPr>
-              <a:t>строки</a:t>
-            </a:r>
-          </a:p>
-          <a:p>
-            <a:r>
-              <a:rPr lang="en-US" sz="2800" dirty="0" err="1">
-                <a:solidFill>
-                  <a:srgbClr val="F6AE1E"/>
-                </a:solidFill>
-              </a:rPr>
-              <a:t>Ctrl+K</a:t>
-            </a:r>
-            <a:r>
-              <a:rPr lang="en-US" sz="2800" dirty="0">
-                <a:solidFill>
-                  <a:srgbClr val="F6AE1E"/>
-                </a:solidFill>
-              </a:rPr>
-              <a:t>, </a:t>
-            </a:r>
-            <a:r>
-              <a:rPr lang="en-US" sz="2800" dirty="0" err="1">
-                <a:solidFill>
-                  <a:srgbClr val="F6AE1E"/>
-                </a:solidFill>
-              </a:rPr>
-              <a:t>Ctrl+U</a:t>
-            </a:r>
-            <a:r>
-              <a:rPr lang="en-US" sz="2800" dirty="0"/>
-              <a:t> </a:t>
-            </a:r>
-            <a:r>
-              <a:rPr lang="ru-RU" sz="2800" dirty="0"/>
-              <a:t>снять коментарий с выбранных строк</a:t>
-            </a:r>
+              <a:t>Курсор должен стоять на </a:t>
+            </a:r>
+            <a:r>
+              <a:rPr lang="en-US" dirty="0" smtClean="0">
+                <a:solidFill>
+                  <a:schemeClr val="bg1"/>
+                </a:solidFill>
+              </a:rPr>
+              <a:t>{ </a:t>
+            </a:r>
+            <a:r>
+              <a:rPr lang="ru-RU" dirty="0" smtClean="0">
+                <a:solidFill>
+                  <a:schemeClr val="bg1"/>
+                </a:solidFill>
+              </a:rPr>
+              <a:t>или </a:t>
+            </a:r>
+            <a:r>
+              <a:rPr lang="en-US" dirty="0" smtClean="0">
+                <a:solidFill>
+                  <a:schemeClr val="bg1"/>
+                </a:solidFill>
+              </a:rPr>
+              <a:t>}</a:t>
+            </a:r>
+            <a:endParaRPr lang="ru-RU" dirty="0" smtClean="0">
+              <a:solidFill>
+                <a:schemeClr val="bg1"/>
+              </a:solidFill>
+            </a:endParaRPr>
+          </a:p>
+          <a:p>
+            <a:pPr marL="0" indent="0">
+              <a:buClr>
+                <a:schemeClr val="bg1"/>
+              </a:buClr>
+              <a:buNone/>
+            </a:pPr>
+            <a:endParaRPr lang="en-US" dirty="0">
+              <a:solidFill>
+                <a:schemeClr val="bg1"/>
+              </a:solidFill>
+            </a:endParaRPr>
           </a:p>
         </p:txBody>
       </p:sp>
     </p:spTree>
     <p:extLst>
       <p:ext uri="{BB962C8B-B14F-4D97-AF65-F5344CB8AC3E}">
-        <p14:creationId xmlns:p14="http://schemas.microsoft.com/office/powerpoint/2010/main" val="4274730761"/>
+        <p14:creationId xmlns:p14="http://schemas.microsoft.com/office/powerpoint/2010/main" val="4175683496"/>
       </p:ext>
     </p:extLst>
   </p:cSld>
@@ -6783,6 +6901,168 @@
           <a:p>
             <a:r>
               <a:rPr lang="ru-RU" dirty="0" smtClean="0"/>
+              <a:t>Редактор: комментарии</a:t>
+            </a:r>
+            <a:endParaRPr lang="ru-RU" dirty="0"/>
+          </a:p>
+        </p:txBody>
+      </p:sp>
+      <p:sp>
+        <p:nvSpPr>
+          <p:cNvPr id="3" name="Content Placeholder 2"/>
+          <p:cNvSpPr>
+            <a:spLocks noGrp="1"/>
+          </p:cNvSpPr>
+          <p:nvPr>
+            <p:ph idx="1"/>
+          </p:nvPr>
+        </p:nvSpPr>
+        <p:spPr/>
+        <p:txBody>
+          <a:bodyPr>
+            <a:normAutofit/>
+          </a:bodyPr>
+          <a:lstStyle/>
+          <a:p>
+            <a:r>
+              <a:rPr lang="en-US" sz="2800" dirty="0" err="1">
+                <a:solidFill>
+                  <a:srgbClr val="F6AE1E"/>
+                </a:solidFill>
+              </a:rPr>
+              <a:t>Ctrl+K</a:t>
+            </a:r>
+            <a:r>
+              <a:rPr lang="en-US" sz="2800" dirty="0">
+                <a:solidFill>
+                  <a:srgbClr val="F6AE1E"/>
+                </a:solidFill>
+              </a:rPr>
+              <a:t>, </a:t>
+            </a:r>
+            <a:r>
+              <a:rPr lang="en-US" sz="2800" dirty="0" err="1">
+                <a:solidFill>
+                  <a:srgbClr val="F6AE1E"/>
+                </a:solidFill>
+              </a:rPr>
+              <a:t>Ctrl+C</a:t>
+            </a:r>
+            <a:r>
+              <a:rPr lang="en-US" sz="2800" dirty="0">
+                <a:solidFill>
+                  <a:schemeClr val="bg1"/>
+                </a:solidFill>
+              </a:rPr>
+              <a:t> </a:t>
+            </a:r>
+            <a:r>
+              <a:rPr lang="ru-RU" sz="2800" dirty="0">
+                <a:solidFill>
+                  <a:schemeClr val="bg1"/>
+                </a:solidFill>
+              </a:rPr>
+              <a:t>закоментировать выбранные </a:t>
+            </a:r>
+            <a:r>
+              <a:rPr lang="ru-RU" sz="2800" dirty="0" smtClean="0">
+                <a:solidFill>
+                  <a:schemeClr val="bg1"/>
+                </a:solidFill>
+              </a:rPr>
+              <a:t>строки</a:t>
+            </a:r>
+          </a:p>
+          <a:p>
+            <a:r>
+              <a:rPr lang="en-US" sz="2800" dirty="0" err="1">
+                <a:solidFill>
+                  <a:srgbClr val="F6AE1E"/>
+                </a:solidFill>
+              </a:rPr>
+              <a:t>Ctrl+K</a:t>
+            </a:r>
+            <a:r>
+              <a:rPr lang="en-US" sz="2800" dirty="0">
+                <a:solidFill>
+                  <a:srgbClr val="F6AE1E"/>
+                </a:solidFill>
+              </a:rPr>
+              <a:t>, </a:t>
+            </a:r>
+            <a:r>
+              <a:rPr lang="en-US" sz="2800" dirty="0" err="1">
+                <a:solidFill>
+                  <a:srgbClr val="F6AE1E"/>
+                </a:solidFill>
+              </a:rPr>
+              <a:t>Ctrl+U</a:t>
+            </a:r>
+            <a:r>
+              <a:rPr lang="en-US" sz="2800" dirty="0"/>
+              <a:t> </a:t>
+            </a:r>
+            <a:r>
+              <a:rPr lang="ru-RU" sz="2800" dirty="0"/>
+              <a:t>снять коментарий с выбранных строк</a:t>
+            </a:r>
+          </a:p>
+        </p:txBody>
+      </p:sp>
+    </p:spTree>
+    <p:extLst>
+      <p:ext uri="{BB962C8B-B14F-4D97-AF65-F5344CB8AC3E}">
+        <p14:creationId xmlns:p14="http://schemas.microsoft.com/office/powerpoint/2010/main" val="4274730761"/>
+      </p:ext>
+    </p:extLst>
+  </p:cSld>
+  <p:clrMapOvr>
+    <a:masterClrMapping/>
+  </p:clrMapOvr>
+  <p:timing>
+    <p:tnLst>
+      <p:par>
+        <p:cTn id="1" dur="indefinite" restart="never" nodeType="tmRoot"/>
+      </p:par>
+    </p:tnLst>
+  </p:timing>
+</p:sld>
+</file>
+
+<file path=ppt/slides/slide13.xml><?xml version="1.0" encoding="utf-8"?>
+<p:sld xmlns:a="http://schemas.openxmlformats.org/drawingml/2006/main" xmlns:r="http://schemas.openxmlformats.org/officeDocument/2006/relationships" xmlns:p="http://schemas.openxmlformats.org/presentationml/2006/main">
+  <p:cSld>
+    <p:spTree>
+      <p:nvGrpSpPr>
+        <p:cNvPr id="1" name=""/>
+        <p:cNvGrpSpPr/>
+        <p:nvPr/>
+      </p:nvGrpSpPr>
+      <p:grpSpPr>
+        <a:xfrm>
+          <a:off x="0" y="0"/>
+          <a:ext cx="0" cy="0"/>
+          <a:chOff x="0" y="0"/>
+          <a:chExt cx="0" cy="0"/>
+        </a:xfrm>
+      </p:grpSpPr>
+      <p:sp>
+        <p:nvSpPr>
+          <p:cNvPr id="2" name="Title 1"/>
+          <p:cNvSpPr>
+            <a:spLocks noGrp="1"/>
+          </p:cNvSpPr>
+          <p:nvPr>
+            <p:ph type="title"/>
+          </p:nvPr>
+        </p:nvSpPr>
+        <p:spPr/>
+        <p:txBody>
+          <a:bodyPr/>
+          <a:lstStyle/>
+          <a:p>
+            <a:r>
+              <a:rPr lang="ru-RU" dirty="0" smtClean="0"/>
               <a:t>Редактор</a:t>
             </a:r>
             <a:r>
@@ -6955,7 +7235,7 @@
 </p:sld>
 </file>
 
-<file path=ppt/slides/slide13.xml><?xml version="1.0" encoding="utf-8"?>
+<file path=ppt/slides/slide14.xml><?xml version="1.0" encoding="utf-8"?>
 <p:sld xmlns:a="http://schemas.openxmlformats.org/drawingml/2006/main" xmlns:r="http://schemas.openxmlformats.org/officeDocument/2006/relationships" xmlns:p="http://schemas.openxmlformats.org/presentationml/2006/main">
   <p:cSld>
     <p:bg>
@@ -7332,7 +7612,7 @@
 </p:sld>
 </file>
 
-<file path=ppt/slides/slide14.xml><?xml version="1.0" encoding="utf-8"?>
+<file path=ppt/slides/slide15.xml><?xml version="1.0" encoding="utf-8"?>
 <p:sld xmlns:a="http://schemas.openxmlformats.org/drawingml/2006/main" xmlns:r="http://schemas.openxmlformats.org/officeDocument/2006/relationships" xmlns:p="http://schemas.openxmlformats.org/presentationml/2006/main">
   <p:cSld>
     <p:spTree>
@@ -7436,7 +7716,7 @@
 </p:sld>
 </file>
 
-<file path=ppt/slides/slide15.xml><?xml version="1.0" encoding="utf-8"?>
+<file path=ppt/slides/slide16.xml><?xml version="1.0" encoding="utf-8"?>
 <p:sld xmlns:a="http://schemas.openxmlformats.org/drawingml/2006/main" xmlns:r="http://schemas.openxmlformats.org/officeDocument/2006/relationships" xmlns:p="http://schemas.openxmlformats.org/presentationml/2006/main">
   <p:cSld>
     <p:bg>
@@ -7656,7 +7936,7 @@
 </p:sld>
 </file>
 
-<file path=ppt/slides/slide16.xml><?xml version="1.0" encoding="utf-8"?>
+<file path=ppt/slides/slide17.xml><?xml version="1.0" encoding="utf-8"?>
 <p:sld xmlns:a="http://schemas.openxmlformats.org/drawingml/2006/main" xmlns:r="http://schemas.openxmlformats.org/officeDocument/2006/relationships" xmlns:p="http://schemas.openxmlformats.org/presentationml/2006/main">
   <p:cSld>
     <p:spTree>
@@ -7914,7 +8194,7 @@
 </p:sld>
 </file>
 
-<file path=ppt/slides/slide17.xml><?xml version="1.0" encoding="utf-8"?>
+<file path=ppt/slides/slide18.xml><?xml version="1.0" encoding="utf-8"?>
 <p:sld xmlns:a="http://schemas.openxmlformats.org/drawingml/2006/main" xmlns:r="http://schemas.openxmlformats.org/officeDocument/2006/relationships" xmlns:p="http://schemas.openxmlformats.org/presentationml/2006/main">
   <p:cSld>
     <p:spTree>
@@ -9171,203 +9451,6 @@
 </p:sld>
 </file>
 
-<file path=ppt/slides/slide18.xml><?xml version="1.0" encoding="utf-8"?>
-<p:sld xmlns:a="http://schemas.openxmlformats.org/drawingml/2006/main" xmlns:r="http://schemas.openxmlformats.org/officeDocument/2006/relationships" xmlns:p="http://schemas.openxmlformats.org/presentationml/2006/main">
-  <p:cSld>
-    <p:bg>
-      <p:bgPr>
-        <a:blipFill dpi="0" rotWithShape="1">
-          <a:blip r:embed="rId3">
-            <a:lum/>
-          </a:blip>
-          <a:srcRect/>
-          <a:stretch>
-            <a:fillRect/>
-          </a:stretch>
-        </a:blipFill>
-        <a:effectLst/>
-      </p:bgPr>
-    </p:bg>
-    <p:spTree>
-      <p:nvGrpSpPr>
-        <p:cNvPr id="1" name=""/>
-        <p:cNvGrpSpPr/>
-        <p:nvPr/>
-      </p:nvGrpSpPr>
-      <p:grpSpPr>
-        <a:xfrm>
-          <a:off x="0" y="0"/>
-          <a:ext cx="0" cy="0"/>
-          <a:chOff x="0" y="0"/>
-          <a:chExt cx="0" cy="0"/>
-        </a:xfrm>
-      </p:grpSpPr>
-      <p:sp>
-        <p:nvSpPr>
-          <p:cNvPr id="2" name="Title 1"/>
-          <p:cNvSpPr>
-            <a:spLocks noGrp="1"/>
-          </p:cNvSpPr>
-          <p:nvPr>
-            <p:ph type="title"/>
-          </p:nvPr>
-        </p:nvSpPr>
-        <p:spPr/>
-        <p:txBody>
-          <a:bodyPr/>
-          <a:lstStyle/>
-          <a:p>
-            <a:r>
-              <a:rPr lang="ru-RU" dirty="0" smtClean="0"/>
-              <a:t>Окна: </a:t>
-            </a:r>
-            <a:r>
-              <a:rPr lang="en-US" dirty="0" smtClean="0"/>
-              <a:t>Bookmarks</a:t>
-            </a:r>
-            <a:endParaRPr lang="en-US" dirty="0"/>
-          </a:p>
-        </p:txBody>
-      </p:sp>
-      <p:sp>
-        <p:nvSpPr>
-          <p:cNvPr id="3" name="Content Placeholder 2"/>
-          <p:cNvSpPr>
-            <a:spLocks noGrp="1"/>
-          </p:cNvSpPr>
-          <p:nvPr>
-            <p:ph idx="1"/>
-          </p:nvPr>
-        </p:nvSpPr>
-        <p:spPr/>
-        <p:txBody>
-          <a:bodyPr>
-            <a:normAutofit/>
-          </a:bodyPr>
-          <a:lstStyle/>
-          <a:p>
-            <a:pPr>
-              <a:buClr>
-                <a:schemeClr val="bg1"/>
-              </a:buClr>
-            </a:pPr>
-            <a:r>
-              <a:rPr lang="ru-RU" dirty="0">
-                <a:solidFill>
-                  <a:schemeClr val="bg1"/>
-                </a:solidFill>
-              </a:rPr>
-              <a:t>Закладки в текстовых файлах</a:t>
-            </a:r>
-            <a:endParaRPr lang="en-US" dirty="0" smtClean="0">
-              <a:solidFill>
-                <a:schemeClr val="bg1"/>
-              </a:solidFill>
-            </a:endParaRPr>
-          </a:p>
-          <a:p>
-            <a:pPr>
-              <a:buClr>
-                <a:schemeClr val="bg1"/>
-              </a:buClr>
-            </a:pPr>
-            <a:r>
-              <a:rPr lang="ru-RU" dirty="0" smtClean="0">
-                <a:solidFill>
-                  <a:schemeClr val="bg1"/>
-                </a:solidFill>
-              </a:rPr>
-              <a:t>Команды меню </a:t>
-            </a:r>
-            <a:r>
-              <a:rPr lang="en-US" dirty="0" smtClean="0">
-                <a:solidFill>
-                  <a:schemeClr val="bg1"/>
-                </a:solidFill>
-              </a:rPr>
-              <a:t>View -&gt; Bookmark Window</a:t>
-            </a:r>
-            <a:r>
-              <a:rPr lang="ru-RU" dirty="0" smtClean="0">
-                <a:solidFill>
-                  <a:schemeClr val="bg1"/>
-                </a:solidFill>
-              </a:rPr>
-              <a:t> и </a:t>
-            </a:r>
-            <a:r>
-              <a:rPr lang="en-US" dirty="0" smtClean="0">
-                <a:solidFill>
-                  <a:schemeClr val="bg1"/>
-                </a:solidFill>
-              </a:rPr>
-              <a:t>Edit -&gt; Bookmarks.</a:t>
-            </a:r>
-          </a:p>
-          <a:p>
-            <a:pPr>
-              <a:buClr>
-                <a:schemeClr val="bg1"/>
-              </a:buClr>
-            </a:pPr>
-            <a:endParaRPr lang="ru-RU" dirty="0" smtClean="0">
-              <a:solidFill>
-                <a:schemeClr val="bg1"/>
-              </a:solidFill>
-            </a:endParaRPr>
-          </a:p>
-          <a:p>
-            <a:pPr>
-              <a:buClr>
-                <a:schemeClr val="bg1"/>
-              </a:buClr>
-            </a:pPr>
-            <a:endParaRPr lang="ru-RU" dirty="0" smtClean="0">
-              <a:solidFill>
-                <a:schemeClr val="bg1"/>
-              </a:solidFill>
-            </a:endParaRPr>
-          </a:p>
-          <a:p>
-            <a:pPr>
-              <a:buClr>
-                <a:schemeClr val="bg1"/>
-              </a:buClr>
-            </a:pPr>
-            <a:endParaRPr lang="ru-RU" dirty="0" smtClean="0">
-              <a:solidFill>
-                <a:schemeClr val="bg1"/>
-              </a:solidFill>
-            </a:endParaRPr>
-          </a:p>
-          <a:p>
-            <a:pPr marL="0" indent="0">
-              <a:buClr>
-                <a:schemeClr val="bg1"/>
-              </a:buClr>
-              <a:buNone/>
-            </a:pPr>
-            <a:endParaRPr lang="en-US" dirty="0">
-              <a:solidFill>
-                <a:schemeClr val="bg1"/>
-              </a:solidFill>
-            </a:endParaRPr>
-          </a:p>
-        </p:txBody>
-      </p:sp>
-    </p:spTree>
-    <p:extLst>
-      <p:ext uri="{BB962C8B-B14F-4D97-AF65-F5344CB8AC3E}">
-        <p14:creationId xmlns:p14="http://schemas.microsoft.com/office/powerpoint/2010/main" val="3985499755"/>
-      </p:ext>
-    </p:extLst>
-  </p:cSld>
-  <p:clrMapOvr>
-    <a:overrideClrMapping bg1="lt1" tx1="dk1" bg2="lt2" tx2="dk2" accent1="accent1" accent2="accent2" accent3="accent3" accent4="accent4" accent5="accent5" accent6="accent6" hlink="hlink" folHlink="folHlink"/>
-  </p:clrMapOvr>
-</p:sld>
-</file>
-
 <file path=ppt/slides/slide19.xml><?xml version="1.0" encoding="utf-8"?>
 <p:sld xmlns:a="http://schemas.openxmlformats.org/drawingml/2006/main" xmlns:r="http://schemas.openxmlformats.org/officeDocument/2006/relationships" xmlns:p="http://schemas.openxmlformats.org/presentationml/2006/main">
   <p:cSld>
@@ -9420,7 +9503,7 @@
             </a:r>
             <a:r>
               <a:rPr lang="en-US" dirty="0" smtClean="0"/>
-              <a:t>Task List</a:t>
+              <a:t>Bookmarks</a:t>
             </a:r>
             <a:endParaRPr lang="en-US" dirty="0"/>
           </a:p>
@@ -9454,7 +9537,7 @@
                   <a:schemeClr val="bg1"/>
                 </a:solidFill>
               </a:rPr>
-              <a:t>Список можно использовать для хранения заметок по проекту</a:t>
+              <a:t>Закладки в текстовых файлах</a:t>
             </a:r>
             <a:endParaRPr lang="en-US" dirty="0" smtClean="0">
               <a:solidFill>
@@ -9474,7 +9557,7 @@
                   <a:schemeClr val="bg1"/>
                 </a:solidFill>
               </a:rPr>
-              <a:t>Команда меню </a:t>
+              <a:t>Команды меню </a:t>
             </a:r>
             <a:r>
               <a:rPr lang="en-US" dirty="0" smtClean="0">
@@ -9482,15 +9565,15 @@
                   <a:schemeClr val="bg1"/>
                 </a:solidFill>
               </a:rPr>
-              <a:t>View -&gt; </a:t>
-            </a:r>
-            <a:r>
-              <a:rPr lang="en-US" dirty="0">
+              <a:t>View -&gt; Bookmark Window</a:t>
+            </a:r>
+            <a:r>
+              <a:rPr lang="ru-RU" dirty="0" smtClean="0">
                 <a:solidFill>
                   <a:schemeClr val="bg1"/>
                 </a:solidFill>
               </a:rPr>
-              <a:t>Task </a:t>
+              <a:t> и </a:t>
             </a:r>
             <a:r>
               <a:rPr lang="en-US" dirty="0" smtClean="0">
@@ -9498,7 +9581,7 @@
                   <a:schemeClr val="bg1"/>
                 </a:solidFill>
               </a:rPr>
-              <a:t>List.</a:t>
+              <a:t>Edit -&gt; Bookmarks.</a:t>
             </a:r>
           </a:p>
           <a:p>
@@ -9507,46 +9590,35 @@
                 <a:schemeClr val="bg1"/>
               </a:buClr>
             </a:pPr>
-            <a:r>
-              <a:rPr lang="ru-RU" dirty="0" smtClean="0">
-                <a:solidFill>
-                  <a:schemeClr val="bg1"/>
-                </a:solidFill>
-              </a:rPr>
-              <a:t>Текст комментария написанный после </a:t>
-            </a:r>
-            <a:r>
-              <a:rPr lang="en-US" dirty="0" smtClean="0">
-                <a:solidFill>
-                  <a:schemeClr val="bg1"/>
-                </a:solidFill>
-              </a:rPr>
-              <a:t>TODO </a:t>
-            </a:r>
-            <a:r>
-              <a:rPr lang="ru-RU" dirty="0" smtClean="0">
-                <a:solidFill>
-                  <a:schemeClr val="bg1"/>
-                </a:solidFill>
-              </a:rPr>
-              <a:t>попадает в</a:t>
-            </a:r>
-            <a:r>
-              <a:rPr lang="en-US" dirty="0" smtClean="0">
-                <a:solidFill>
-                  <a:schemeClr val="bg1"/>
-                </a:solidFill>
-              </a:rPr>
-              <a:t> </a:t>
-            </a:r>
-            <a:r>
-              <a:rPr lang="ru-RU" dirty="0" smtClean="0">
-                <a:solidFill>
-                  <a:schemeClr val="bg1"/>
-                </a:solidFill>
-              </a:rPr>
-              <a:t>него автоматически</a:t>
-            </a:r>
+            <a:endParaRPr lang="ru-RU" dirty="0" smtClean="0">
+              <a:solidFill>
+                <a:schemeClr val="bg1"/>
+              </a:solidFill>
+            </a:endParaRPr>
+          </a:p>
+          <a:p>
+            <a:pPr>
+              <a:buClr>
+                <a:schemeClr val="bg1"/>
+              </a:buClr>
+            </a:pPr>
+            <a:endParaRPr lang="ru-RU" dirty="0" smtClean="0">
+              <a:solidFill>
+                <a:schemeClr val="bg1"/>
+              </a:solidFill>
+            </a:endParaRPr>
+          </a:p>
+          <a:p>
+            <a:pPr>
+              <a:buClr>
+                <a:schemeClr val="bg1"/>
+              </a:buClr>
+            </a:pPr>
+            <a:endParaRPr lang="ru-RU" dirty="0" smtClean="0">
+              <a:solidFill>
+                <a:schemeClr val="bg1"/>
+              </a:solidFill>
+            </a:endParaRPr>
           </a:p>
           <a:p>
             <a:pPr marL="0" indent="0">
@@ -9566,7 +9638,7 @@
     </p:spTree>
     <p:extLst>
       <p:ext uri="{BB962C8B-B14F-4D97-AF65-F5344CB8AC3E}">
-        <p14:creationId xmlns:p14="http://schemas.microsoft.com/office/powerpoint/2010/main" val="1384232909"/>
+        <p14:creationId xmlns:p14="http://schemas.microsoft.com/office/powerpoint/2010/main" val="3985499755"/>
       </p:ext>
     </p:extLst>
   </p:cSld>
@@ -9670,6 +9742,20 @@
 <file path=ppt/slides/slide20.xml><?xml version="1.0" encoding="utf-8"?>
 <p:sld xmlns:a="http://schemas.openxmlformats.org/drawingml/2006/main" xmlns:r="http://schemas.openxmlformats.org/officeDocument/2006/relationships" xmlns:p="http://schemas.openxmlformats.org/presentationml/2006/main">
   <p:cSld>
+    <p:bg>
+      <p:bgPr>
+        <a:blipFill dpi="0" rotWithShape="1">
+          <a:blip r:embed="rId3">
+            <a:lum/>
+          </a:blip>
+          <a:srcRect/>
+          <a:stretch>
+            <a:fillRect/>
+          </a:stretch>
+        </a:blipFill>
+        <a:effectLst/>
+      </p:bgPr>
+    </p:bg>
     <p:spTree>
       <p:nvGrpSpPr>
         <p:cNvPr id="1" name=""/>
@@ -9701,7 +9787,11 @@
           <a:p>
             <a:r>
               <a:rPr lang="ru-RU" dirty="0" smtClean="0"/>
-              <a:t>Отладчик</a:t>
+              <a:t>Окна: </a:t>
+            </a:r>
+            <a:r>
+              <a:rPr lang="en-US" dirty="0" smtClean="0"/>
+              <a:t>Task List</a:t>
             </a:r>
             <a:endParaRPr lang="en-US" dirty="0"/>
           </a:p>
@@ -9719,22 +9809,140 @@
         </p:nvSpPr>
         <p:spPr/>
         <p:txBody>
-          <a:bodyPr/>
+          <a:bodyPr>
+            <a:normAutofit/>
+          </a:bodyPr>
           <a:lstStyle/>
           <a:p>
-            <a:endParaRPr lang="en-US" dirty="0"/>
+            <a:pPr>
+              <a:buClr>
+                <a:schemeClr val="bg1"/>
+              </a:buClr>
+            </a:pPr>
+            <a:r>
+              <a:rPr lang="ru-RU" dirty="0">
+                <a:solidFill>
+                  <a:schemeClr val="bg1"/>
+                </a:solidFill>
+              </a:rPr>
+              <a:t>Список можно использовать для хранения заметок по проекту</a:t>
+            </a:r>
+            <a:endParaRPr lang="en-US" dirty="0" smtClean="0">
+              <a:solidFill>
+                <a:schemeClr val="bg1"/>
+              </a:solidFill>
+            </a:endParaRPr>
+          </a:p>
+          <a:p>
+            <a:pPr>
+              <a:buClr>
+                <a:schemeClr val="bg1"/>
+              </a:buClr>
+            </a:pPr>
+            <a:r>
+              <a:rPr lang="ru-RU" dirty="0" smtClean="0">
+                <a:solidFill>
+                  <a:schemeClr val="bg1"/>
+                </a:solidFill>
+              </a:rPr>
+              <a:t>Команда меню </a:t>
+            </a:r>
+            <a:r>
+              <a:rPr lang="en-US" dirty="0" smtClean="0">
+                <a:solidFill>
+                  <a:schemeClr val="bg1"/>
+                </a:solidFill>
+              </a:rPr>
+              <a:t>View -&gt; </a:t>
+            </a:r>
+            <a:r>
+              <a:rPr lang="en-US" dirty="0">
+                <a:solidFill>
+                  <a:schemeClr val="bg1"/>
+                </a:solidFill>
+              </a:rPr>
+              <a:t>Task </a:t>
+            </a:r>
+            <a:r>
+              <a:rPr lang="en-US" dirty="0" smtClean="0">
+                <a:solidFill>
+                  <a:schemeClr val="bg1"/>
+                </a:solidFill>
+              </a:rPr>
+              <a:t>List.</a:t>
+            </a:r>
+          </a:p>
+          <a:p>
+            <a:pPr>
+              <a:buClr>
+                <a:schemeClr val="bg1"/>
+              </a:buClr>
+            </a:pPr>
+            <a:r>
+              <a:rPr lang="ru-RU" dirty="0" smtClean="0">
+                <a:solidFill>
+                  <a:schemeClr val="bg1"/>
+                </a:solidFill>
+              </a:rPr>
+              <a:t>Текст комментария написанный после </a:t>
+            </a:r>
+            <a:r>
+              <a:rPr lang="en-US" dirty="0" smtClean="0">
+                <a:solidFill>
+                  <a:schemeClr val="bg1"/>
+                </a:solidFill>
+              </a:rPr>
+              <a:t>TODO </a:t>
+            </a:r>
+            <a:r>
+              <a:rPr lang="ru-RU" dirty="0" smtClean="0">
+                <a:solidFill>
+                  <a:schemeClr val="bg1"/>
+                </a:solidFill>
+              </a:rPr>
+              <a:t>попадает в</a:t>
+            </a:r>
+            <a:r>
+              <a:rPr lang="en-US" dirty="0" smtClean="0">
+                <a:solidFill>
+                  <a:schemeClr val="bg1"/>
+                </a:solidFill>
+              </a:rPr>
+              <a:t> </a:t>
+            </a:r>
+            <a:r>
+              <a:rPr lang="ru-RU" dirty="0" smtClean="0">
+                <a:solidFill>
+                  <a:schemeClr val="bg1"/>
+                </a:solidFill>
+              </a:rPr>
+              <a:t>него автоматически</a:t>
+            </a:r>
+          </a:p>
+          <a:p>
+            <a:pPr marL="0" indent="0">
+              <a:buClr>
+                <a:schemeClr val="bg1"/>
+              </a:buClr>
+              <a:buNone/>
+            </a:pPr>
+            <a:endParaRPr lang="en-US" dirty="0">
+              <a:solidFill>
+                <a:schemeClr val="bg1"/>
+              </a:solidFill>
+            </a:endParaRPr>
           </a:p>
         </p:txBody>
       </p:sp>
     </p:spTree>
     <p:extLst>
       <p:ext uri="{BB962C8B-B14F-4D97-AF65-F5344CB8AC3E}">
-        <p14:creationId xmlns:p14="http://schemas.microsoft.com/office/powerpoint/2010/main" val="1495295926"/>
+        <p14:creationId xmlns:p14="http://schemas.microsoft.com/office/powerpoint/2010/main" val="1384232909"/>
       </p:ext>
     </p:extLst>
   </p:cSld>
   <p:clrMapOvr>
-    <a:masterClrMapping/>
+    <a:overrideClrMapping bg1="lt1" tx1="dk1" bg2="lt2" tx2="dk2" accent1="accent1" accent2="accent2" accent3="accent3" accent4="accent4" accent5="accent5" accent6="accent6" hlink="hlink" folHlink="folHlink"/>
   </p:clrMapOvr>
 </p:sld>
 </file>
@@ -9773,6 +9981,78 @@
           <a:p>
             <a:r>
               <a:rPr lang="ru-RU" dirty="0" smtClean="0"/>
+              <a:t>Отладчик</a:t>
+            </a:r>
+            <a:endParaRPr lang="en-US" dirty="0"/>
+          </a:p>
+        </p:txBody>
+      </p:sp>
+      <p:sp>
+        <p:nvSpPr>
+          <p:cNvPr id="3" name="Content Placeholder 2"/>
+          <p:cNvSpPr>
+            <a:spLocks noGrp="1"/>
+          </p:cNvSpPr>
+          <p:nvPr>
+            <p:ph idx="1"/>
+          </p:nvPr>
+        </p:nvSpPr>
+        <p:spPr/>
+        <p:txBody>
+          <a:bodyPr/>
+          <a:lstStyle/>
+          <a:p>
+            <a:endParaRPr lang="en-US" dirty="0"/>
+          </a:p>
+        </p:txBody>
+      </p:sp>
+    </p:spTree>
+    <p:extLst>
+      <p:ext uri="{BB962C8B-B14F-4D97-AF65-F5344CB8AC3E}">
+        <p14:creationId xmlns:p14="http://schemas.microsoft.com/office/powerpoint/2010/main" val="1495295926"/>
+      </p:ext>
+    </p:extLst>
+  </p:cSld>
+  <p:clrMapOvr>
+    <a:masterClrMapping/>
+  </p:clrMapOvr>
+</p:sld>
+</file>
+
+<file path=ppt/slides/slide22.xml><?xml version="1.0" encoding="utf-8"?>
+<p:sld xmlns:a="http://schemas.openxmlformats.org/drawingml/2006/main" xmlns:r="http://schemas.openxmlformats.org/officeDocument/2006/relationships" xmlns:p="http://schemas.openxmlformats.org/presentationml/2006/main">
+  <p:cSld>
+    <p:spTree>
+      <p:nvGrpSpPr>
+        <p:cNvPr id="1" name=""/>
+        <p:cNvGrpSpPr/>
+        <p:nvPr/>
+      </p:nvGrpSpPr>
+      <p:grpSpPr>
+        <a:xfrm>
+          <a:off x="0" y="0"/>
+          <a:ext cx="0" cy="0"/>
+          <a:chOff x="0" y="0"/>
+          <a:chExt cx="0" cy="0"/>
+        </a:xfrm>
+      </p:grpSpPr>
+      <p:sp>
+        <p:nvSpPr>
+          <p:cNvPr id="2" name="Title 1"/>
+          <p:cNvSpPr>
+            <a:spLocks noGrp="1"/>
+          </p:cNvSpPr>
+          <p:nvPr>
+            <p:ph type="title"/>
+          </p:nvPr>
+        </p:nvSpPr>
+        <p:spPr/>
+        <p:txBody>
+          <a:bodyPr/>
+          <a:lstStyle/>
+          <a:p>
+            <a:r>
+              <a:rPr lang="ru-RU" dirty="0" smtClean="0"/>
               <a:t>Бесплатные расширения для </a:t>
             </a:r>
             <a:r>
@@ -10013,7 +10293,7 @@
 </p:sld>
 </file>
 
-<file path=ppt/slides/slide22.xml><?xml version="1.0" encoding="utf-8"?>
+<file path=ppt/slides/slide23.xml><?xml version="1.0" encoding="utf-8"?>
 <p:sld xmlns:a="http://schemas.openxmlformats.org/drawingml/2006/main" xmlns:r="http://schemas.openxmlformats.org/officeDocument/2006/relationships" xmlns:p="http://schemas.openxmlformats.org/presentationml/2006/main">
   <p:cSld>
     <p:spTree>
@@ -10731,35 +11011,6 @@
       </p:grpSpPr>
       <p:sp>
         <p:nvSpPr>
-          <p:cNvPr id="2" name="Title 1"/>
-          <p:cNvSpPr>
-            <a:spLocks noGrp="1"/>
-          </p:cNvSpPr>
-          <p:nvPr>
-            <p:ph type="title"/>
-          </p:nvPr>
-        </p:nvSpPr>
-        <p:spPr/>
-        <p:txBody>
-          <a:bodyPr>
-            <a:normAutofit fontScale="90000"/>
-          </a:bodyPr>
-          <a:lstStyle/>
-          <a:p>
-            <a:r>
-              <a:rPr lang="en-US" dirty="0" smtClean="0"/>
-              <a:t>Visual Studio </a:t>
-            </a:r>
-            <a:r>
-              <a:rPr lang="ru-RU" dirty="0" smtClean="0"/>
-              <a:t>и права администратора</a:t>
-            </a:r>
-            <a:endParaRPr lang="en-US" dirty="0"/>
-          </a:p>
-        </p:txBody>
-      </p:sp>
-      <p:sp>
-        <p:nvSpPr>
           <p:cNvPr id="3" name="Content Placeholder 2"/>
           <p:cNvSpPr>
             <a:spLocks noGrp="1"/>
@@ -10768,10 +11019,15 @@
             <p:ph idx="1"/>
           </p:nvPr>
         </p:nvSpPr>
-        <p:spPr/>
+        <p:spPr>
+          <a:xfrm>
+            <a:off x="457200" y="620688"/>
+            <a:ext cx="8229600" cy="5505475"/>
+          </a:xfrm>
+        </p:spPr>
         <p:txBody>
           <a:bodyPr>
-            <a:normAutofit fontScale="70000" lnSpcReduction="20000"/>
+            <a:normAutofit fontScale="92500" lnSpcReduction="10000"/>
           </a:bodyPr>
           <a:lstStyle/>
           <a:p>
@@ -10780,35 +11036,15 @@
             </a:pPr>
             <a:r>
               <a:rPr lang="ru-RU" dirty="0" smtClean="0"/>
-              <a:t>Если у вас установлена </a:t>
-            </a:r>
-            <a:r>
-              <a:rPr lang="en-US" dirty="0"/>
-              <a:t>Windows </a:t>
+              <a:t>Комбинации клавиш приведенные в презентации соотвествуют настройкам по умолчанию для </a:t>
             </a:r>
             <a:r>
               <a:rPr lang="en-US" dirty="0" smtClean="0"/>
-              <a:t>Vista, Windows 7 </a:t>
+              <a:t>Visual C#. </a:t>
             </a:r>
             <a:r>
               <a:rPr lang="ru-RU" dirty="0" smtClean="0"/>
-              <a:t>или </a:t>
-            </a:r>
-            <a:r>
-              <a:rPr lang="en-US" dirty="0" smtClean="0"/>
-              <a:t>Windows 8 </a:t>
-            </a:r>
-            <a:r>
-              <a:rPr lang="ru-RU" dirty="0" smtClean="0"/>
-              <a:t>с включенным </a:t>
-            </a:r>
-            <a:r>
-              <a:rPr lang="en-US" dirty="0" smtClean="0"/>
-              <a:t>UAC</a:t>
-            </a:r>
-            <a:r>
-              <a:rPr lang="ru-RU" dirty="0" smtClean="0"/>
-              <a:t>, то для корректной работы отладчика рекомендуется всегда запускать </a:t>
+              <a:t>При первом запуске </a:t>
             </a:r>
             <a:r>
               <a:rPr lang="en-US" dirty="0" smtClean="0"/>
@@ -10816,164 +11052,77 @@
             </a:r>
             <a:r>
               <a:rPr lang="ru-RU" dirty="0" smtClean="0"/>
-              <a:t>с правами администратора. Для этого откройте свойства следующих файлов, перейдите на закладку </a:t>
+              <a:t>предлагает выбрать предпочитаемые настройки. Если вы выбрали не </a:t>
             </a:r>
             <a:r>
               <a:rPr lang="en-US" dirty="0" smtClean="0"/>
-              <a:t>Compatibility</a:t>
+              <a:t>Visual C#</a:t>
             </a:r>
             <a:r>
               <a:rPr lang="ru-RU" dirty="0" smtClean="0"/>
-              <a:t> и </a:t>
-            </a:r>
-            <a:r>
-              <a:rPr lang="ru-RU" smtClean="0"/>
-              <a:t>включите опцию </a:t>
+              <a:t> и хотите это сделать после первого запуска, то выберите команду </a:t>
+            </a:r>
+            <a:r>
+              <a:rPr lang="en-US" dirty="0" smtClean="0"/>
+              <a:t>“Tools -&gt; Import and Export Settings …” </a:t>
             </a:r>
             <a:r>
               <a:rPr lang="ru-RU" dirty="0" smtClean="0"/>
-              <a:t>«</a:t>
+              <a:t>и затем </a:t>
             </a:r>
             <a:r>
               <a:rPr lang="en-US" dirty="0" smtClean="0"/>
-              <a:t>Run this program as administrator</a:t>
-            </a:r>
+              <a:t>“Reset all settings”.</a:t>
+            </a:r>
+          </a:p>
+          <a:p>
+            <a:pPr marL="0" indent="0">
+              <a:buNone/>
+            </a:pPr>
+            <a:endParaRPr lang="en-US" dirty="0"/>
+          </a:p>
+          <a:p>
+            <a:pPr marL="0" indent="0">
+              <a:buNone/>
+            </a:pPr>
             <a:r>
               <a:rPr lang="ru-RU" dirty="0" smtClean="0"/>
-              <a:t>»</a:t>
+              <a:t>Также не забывайте, то </a:t>
             </a:r>
             <a:r>
               <a:rPr lang="en-US" dirty="0" smtClean="0"/>
-              <a:t>:</a:t>
-            </a:r>
-          </a:p>
-          <a:p>
+              <a:t>VS </a:t>
+            </a:r>
+            <a:r>
+              <a:rPr lang="ru-RU" dirty="0" smtClean="0"/>
+              <a:t>дает возможность поменять горячие клавиши или назначить новые в меню </a:t>
+            </a:r>
             <a:r>
               <a:rPr lang="en-US" dirty="0" smtClean="0"/>
-              <a:t>Devenv.exe</a:t>
-            </a:r>
-          </a:p>
-          <a:p>
-            <a:pPr lvl="1"/>
-            <a:r>
-              <a:rPr lang="en-US" dirty="0"/>
-              <a:t>(win 64) "C:\Program Files (x86)\Microsoft Visual Studio </a:t>
+              <a:t>Tools -&gt; Customize, </a:t>
+            </a:r>
+            <a:r>
+              <a:rPr lang="ru-RU" dirty="0" smtClean="0"/>
+              <a:t>кнопка</a:t>
             </a:r>
             <a:r>
               <a:rPr lang="en-US" dirty="0" smtClean="0"/>
-              <a:t>XX.Y\Common7\IDE\“</a:t>
-            </a:r>
-          </a:p>
-          <a:p>
-            <a:pPr lvl="1"/>
-            <a:r>
-              <a:rPr lang="en-US" dirty="0"/>
-              <a:t>(win </a:t>
-            </a:r>
-            <a:r>
-              <a:rPr lang="en-US" dirty="0" smtClean="0"/>
-              <a:t>32) </a:t>
-            </a:r>
-            <a:r>
-              <a:rPr lang="en-US" dirty="0"/>
-              <a:t>"C:\Program </a:t>
-            </a:r>
-            <a:r>
-              <a:rPr lang="en-US" dirty="0" smtClean="0"/>
-              <a:t>Files\Microsoft </a:t>
-            </a:r>
-            <a:r>
-              <a:rPr lang="en-US" dirty="0"/>
-              <a:t>Visual Studio XX.Y\Common7\IDE</a:t>
-            </a:r>
-            <a:r>
-              <a:rPr lang="en-US" dirty="0" smtClean="0"/>
-              <a:t>\“</a:t>
-            </a:r>
-          </a:p>
-          <a:p>
-            <a:r>
-              <a:rPr lang="en-US" dirty="0" smtClean="0"/>
-              <a:t>VSLauncher.exe</a:t>
-            </a:r>
-          </a:p>
-          <a:p>
-            <a:pPr lvl="1"/>
-            <a:r>
-              <a:rPr lang="en-US" dirty="0" smtClean="0"/>
-              <a:t>(win 64) "C</a:t>
-            </a:r>
-            <a:r>
-              <a:rPr lang="en-US" dirty="0"/>
-              <a:t>:\Program Files (x86)\Common Files\</a:t>
-            </a:r>
-            <a:r>
-              <a:rPr lang="en-US" dirty="0" err="1"/>
-              <a:t>microsoft</a:t>
-            </a:r>
-            <a:r>
-              <a:rPr lang="en-US" dirty="0"/>
-              <a:t> shared\</a:t>
-            </a:r>
-            <a:r>
-              <a:rPr lang="en-US" dirty="0" err="1"/>
-              <a:t>MSEnv</a:t>
-            </a:r>
-            <a:r>
-              <a:rPr lang="en-US" dirty="0" smtClean="0"/>
-              <a:t>\“</a:t>
-            </a:r>
-          </a:p>
-          <a:p>
-            <a:pPr lvl="1"/>
-            <a:r>
-              <a:rPr lang="en-US" dirty="0"/>
-              <a:t>(win 32) "C:\Program </a:t>
-            </a:r>
-            <a:r>
-              <a:rPr lang="en-US" dirty="0" smtClean="0"/>
-              <a:t>Files\Common </a:t>
-            </a:r>
-            <a:r>
-              <a:rPr lang="en-US" dirty="0"/>
-              <a:t>Files\</a:t>
-            </a:r>
-            <a:r>
-              <a:rPr lang="en-US" dirty="0" err="1"/>
-              <a:t>microsoft</a:t>
-            </a:r>
-            <a:r>
-              <a:rPr lang="en-US" dirty="0"/>
-              <a:t> shared\</a:t>
-            </a:r>
-            <a:r>
-              <a:rPr lang="en-US" dirty="0" err="1"/>
-              <a:t>MSEnv</a:t>
-            </a:r>
-            <a:r>
-              <a:rPr lang="en-US" dirty="0"/>
-              <a:t>\"</a:t>
-            </a:r>
+              <a:t> Keyboard.</a:t>
+            </a:r>
+            <a:endParaRPr lang="ru-RU" dirty="0"/>
           </a:p>
         </p:txBody>
       </p:sp>
     </p:spTree>
     <p:extLst>
       <p:ext uri="{BB962C8B-B14F-4D97-AF65-F5344CB8AC3E}">
-        <p14:creationId xmlns:p14="http://schemas.microsoft.com/office/powerpoint/2010/main" val="536631026"/>
+        <p14:creationId xmlns:p14="http://schemas.microsoft.com/office/powerpoint/2010/main" val="734817978"/>
       </p:ext>
     </p:extLst>
   </p:cSld>
   <p:clrMapOvr>
     <a:masterClrMapping/>
   </p:clrMapOvr>
-  <p:timing>
-    <p:tnLst>
-      <p:par>
-        <p:cTn id="1" dur="indefinite" restart="never" nodeType="tmRoot"/>
-      </p:par>
-    </p:tnLst>
-  </p:timing>
 </p:sld>
 </file>
 
@@ -11012,14 +11161,14 @@
           <a:lstStyle/>
           <a:p>
             <a:r>
+              <a:rPr lang="en-US" dirty="0" smtClean="0"/>
+              <a:t>Visual Studio </a:t>
+            </a:r>
+            <a:r>
               <a:rPr lang="ru-RU" dirty="0" smtClean="0"/>
-              <a:t>Аргументы командной строки для </a:t>
-            </a:r>
-            <a:r>
-              <a:rPr lang="en-US" dirty="0"/>
-              <a:t>Visual Studio (Devenv.exe)</a:t>
-            </a:r>
-            <a:endParaRPr lang="ru-RU" dirty="0"/>
+              <a:t>и права администратора</a:t>
+            </a:r>
+            <a:endParaRPr lang="en-US" dirty="0"/>
           </a:p>
         </p:txBody>
       </p:sp>
@@ -11035,112 +11184,197 @@
         </p:nvSpPr>
         <p:spPr/>
         <p:txBody>
-          <a:bodyPr/>
+          <a:bodyPr>
+            <a:normAutofit fontScale="70000" lnSpcReduction="20000"/>
+          </a:bodyPr>
           <a:lstStyle/>
           <a:p>
+            <a:pPr marL="0" indent="0">
+              <a:buNone/>
+            </a:pPr>
+            <a:r>
+              <a:rPr lang="ru-RU" dirty="0" smtClean="0"/>
+              <a:t>Если у вас установлена </a:t>
+            </a:r>
             <a:r>
               <a:rPr lang="en-US" dirty="0"/>
-              <a:t>/</a:t>
-            </a:r>
-            <a:r>
-              <a:rPr lang="en-US" dirty="0" err="1" smtClean="0"/>
-              <a:t>SafeMode</a:t>
+              <a:t>Windows </a:t>
             </a:r>
             <a:r>
               <a:rPr lang="en-US" dirty="0" smtClean="0"/>
-              <a:t/>
-            </a:r>
-            <a:br>
+              <a:t>Vista, Windows 7 </a:t>
+            </a:r>
+            <a:r>
+              <a:rPr lang="ru-RU" dirty="0" smtClean="0"/>
+              <a:t>или </a:t>
+            </a:r>
+            <a:r>
               <a:rPr lang="en-US" dirty="0" smtClean="0"/>
-            </a:br>
-            <a:r>
-              <a:rPr lang="ru-RU" sz="2800" dirty="0" smtClean="0"/>
-              <a:t>Безопасный </a:t>
-            </a:r>
-            <a:r>
-              <a:rPr lang="ru-RU" sz="2800" dirty="0"/>
-              <a:t>режим</a:t>
-            </a:r>
-            <a:r>
-              <a:rPr lang="en-US" sz="2800" dirty="0"/>
-              <a:t> (</a:t>
-            </a:r>
-            <a:r>
-              <a:rPr lang="ru-RU" sz="2800" dirty="0"/>
-              <a:t>отключает все расширения</a:t>
-            </a:r>
-            <a:r>
-              <a:rPr lang="en-US" sz="2800" dirty="0" smtClean="0"/>
-              <a:t>)</a:t>
-            </a:r>
-          </a:p>
-          <a:p>
+              <a:t>Windows 8 </a:t>
+            </a:r>
+            <a:r>
+              <a:rPr lang="ru-RU" dirty="0" smtClean="0"/>
+              <a:t>с включенным </a:t>
+            </a:r>
+            <a:r>
+              <a:rPr lang="en-US" dirty="0" smtClean="0"/>
+              <a:t>UAC</a:t>
+            </a:r>
+            <a:r>
+              <a:rPr lang="ru-RU" dirty="0" smtClean="0"/>
+              <a:t>, то для корректной работы отладчика рекомендуется всегда запускать </a:t>
+            </a:r>
+            <a:r>
+              <a:rPr lang="en-US" dirty="0" smtClean="0"/>
+              <a:t>VS </a:t>
+            </a:r>
+            <a:r>
+              <a:rPr lang="ru-RU" dirty="0" smtClean="0"/>
+              <a:t>с правами администратора. Для этого откройте свойства следующих файлов, перейдите на закладку </a:t>
+            </a:r>
+            <a:r>
+              <a:rPr lang="en-US" dirty="0" smtClean="0"/>
+              <a:t>Compatibility</a:t>
+            </a:r>
+            <a:r>
+              <a:rPr lang="ru-RU" dirty="0" smtClean="0"/>
+              <a:t> и </a:t>
+            </a:r>
+            <a:r>
+              <a:rPr lang="ru-RU" smtClean="0"/>
+              <a:t>включите опцию </a:t>
+            </a:r>
+            <a:r>
+              <a:rPr lang="ru-RU" dirty="0" smtClean="0"/>
+              <a:t>«</a:t>
+            </a:r>
+            <a:r>
+              <a:rPr lang="en-US" dirty="0" smtClean="0"/>
+              <a:t>Run this program as administrator</a:t>
+            </a:r>
+            <a:r>
+              <a:rPr lang="ru-RU" dirty="0" smtClean="0"/>
+              <a:t>»</a:t>
+            </a:r>
+            <a:r>
+              <a:rPr lang="en-US" dirty="0" smtClean="0"/>
+              <a:t>:</a:t>
+            </a:r>
+          </a:p>
+          <a:p>
+            <a:r>
+              <a:rPr lang="en-US" dirty="0" smtClean="0"/>
+              <a:t>Devenv.exe</a:t>
+            </a:r>
+          </a:p>
+          <a:p>
+            <a:pPr lvl="1"/>
             <a:r>
               <a:rPr lang="en-US" dirty="0"/>
-              <a:t>/</a:t>
-            </a:r>
-            <a:r>
-              <a:rPr lang="en-US" dirty="0" err="1" smtClean="0"/>
-              <a:t>rootsuffix</a:t>
+              <a:t>(win 64) "C:\Program Files (x86)\Microsoft Visual Studio </a:t>
             </a:r>
             <a:r>
               <a:rPr lang="en-US" dirty="0" smtClean="0"/>
-              <a:t> &lt;</a:t>
-            </a:r>
-            <a:r>
-              <a:rPr lang="ru-RU" dirty="0" smtClean="0"/>
-              <a:t>и</a:t>
-            </a:r>
-            <a:r>
-              <a:rPr lang="ru-RU" smtClean="0"/>
-              <a:t>мя</a:t>
+              <a:t>XX.Y\Common7\IDE\“</a:t>
+            </a:r>
+          </a:p>
+          <a:p>
+            <a:pPr lvl="1"/>
+            <a:r>
+              <a:rPr lang="en-US" dirty="0"/>
+              <a:t>(win </a:t>
             </a:r>
             <a:r>
               <a:rPr lang="en-US" dirty="0" smtClean="0"/>
-              <a:t>&gt;</a:t>
-            </a:r>
-            <a:r>
-              <a:rPr lang="ru-RU" dirty="0" smtClean="0"/>
-              <a:t/>
-            </a:r>
-            <a:br>
-              <a:rPr lang="ru-RU" dirty="0" smtClean="0"/>
-            </a:br>
-            <a:r>
-              <a:rPr lang="ru-RU" sz="2800" dirty="0" smtClean="0"/>
-              <a:t>Запуск </a:t>
-            </a:r>
-            <a:r>
-              <a:rPr lang="en-US" sz="2800" dirty="0" smtClean="0"/>
-              <a:t>VS </a:t>
-            </a:r>
-            <a:r>
-              <a:rPr lang="ru-RU" sz="2800" dirty="0" smtClean="0"/>
-              <a:t>с указанным профилем. Для выборочной установки расширений в разные профили используйте утилиту </a:t>
-            </a:r>
-            <a:r>
-              <a:rPr lang="en-US" sz="2800" dirty="0" smtClean="0"/>
-              <a:t>Root-VSIX</a:t>
+              <a:t>32) </a:t>
+            </a:r>
+            <a:r>
+              <a:rPr lang="en-US" dirty="0"/>
+              <a:t>"C:\Program </a:t>
             </a:r>
             <a:r>
               <a:rPr lang="en-US" dirty="0" smtClean="0"/>
-              <a:t/>
-            </a:r>
-            <a:br>
+              <a:t>Files\Microsoft </a:t>
+            </a:r>
+            <a:r>
+              <a:rPr lang="en-US" dirty="0"/>
+              <a:t>Visual Studio XX.Y\Common7\IDE</a:t>
+            </a:r>
+            <a:r>
               <a:rPr lang="en-US" dirty="0" smtClean="0"/>
-            </a:br>
-            <a:endParaRPr lang="ru-RU" dirty="0"/>
+              <a:t>\“</a:t>
+            </a:r>
+          </a:p>
+          <a:p>
+            <a:r>
+              <a:rPr lang="en-US" dirty="0" smtClean="0"/>
+              <a:t>VSLauncher.exe</a:t>
+            </a:r>
           </a:p>
           <a:p>
             <a:pPr lvl="1"/>
-            <a:endParaRPr lang="ru-RU" dirty="0"/>
+            <a:r>
+              <a:rPr lang="en-US" dirty="0" smtClean="0"/>
+              <a:t>(win 64) "C</a:t>
+            </a:r>
+            <a:r>
+              <a:rPr lang="en-US" dirty="0"/>
+              <a:t>:\Program Files (x86)\Common Files\</a:t>
+            </a:r>
+            <a:r>
+              <a:rPr lang="en-US" dirty="0" err="1"/>
+              <a:t>microsoft</a:t>
+            </a:r>
+            <a:r>
+              <a:rPr lang="en-US" dirty="0"/>
+              <a:t> shared\</a:t>
+            </a:r>
+            <a:r>
+              <a:rPr lang="en-US" dirty="0" err="1"/>
+              <a:t>MSEnv</a:t>
+            </a:r>
+            <a:r>
+              <a:rPr lang="en-US" dirty="0" smtClean="0"/>
+              <a:t>\“</a:t>
+            </a:r>
+          </a:p>
+          <a:p>
+            <a:pPr lvl="1"/>
+            <a:r>
+              <a:rPr lang="en-US" dirty="0"/>
+              <a:t>(win 32) "C:\Program </a:t>
+            </a:r>
+            <a:r>
+              <a:rPr lang="en-US" dirty="0" smtClean="0"/>
+              <a:t>Files\Common </a:t>
+            </a:r>
+            <a:r>
+              <a:rPr lang="en-US" dirty="0"/>
+              <a:t>Files\</a:t>
+            </a:r>
+            <a:r>
+              <a:rPr lang="en-US" dirty="0" err="1"/>
+              <a:t>microsoft</a:t>
+            </a:r>
+            <a:r>
+              <a:rPr lang="en-US" dirty="0"/>
+              <a:t> shared\</a:t>
+            </a:r>
+            <a:r>
+              <a:rPr lang="en-US" dirty="0" err="1"/>
+              <a:t>MSEnv</a:t>
+            </a:r>
+            <a:r>
+              <a:rPr lang="en-US" dirty="0"/>
+              <a:t>\"</a:t>
+            </a:r>
           </a:p>
         </p:txBody>
       </p:sp>
     </p:spTree>
     <p:extLst>
       <p:ext uri="{BB962C8B-B14F-4D97-AF65-F5344CB8AC3E}">
-        <p14:creationId xmlns:p14="http://schemas.microsoft.com/office/powerpoint/2010/main" val="3059897896"/>
+        <p14:creationId xmlns:p14="http://schemas.microsoft.com/office/powerpoint/2010/main" val="536631026"/>
       </p:ext>
     </p:extLst>
   </p:cSld>
@@ -11186,14 +11420,20 @@
         </p:nvSpPr>
         <p:spPr/>
         <p:txBody>
-          <a:bodyPr/>
+          <a:bodyPr>
+            <a:normAutofit fontScale="90000"/>
+          </a:bodyPr>
           <a:lstStyle/>
           <a:p>
             <a:r>
               <a:rPr lang="ru-RU" dirty="0" smtClean="0"/>
-              <a:t>Редактор</a:t>
-            </a:r>
-            <a:endParaRPr lang="en-US" dirty="0"/>
+              <a:t>Аргументы командной строки для </a:t>
+            </a:r>
+            <a:r>
+              <a:rPr lang="en-US" dirty="0"/>
+              <a:t>Visual Studio (Devenv.exe)</a:t>
+            </a:r>
+            <a:endParaRPr lang="ru-RU" dirty="0"/>
           </a:p>
         </p:txBody>
       </p:sp>
@@ -11209,299 +11449,112 @@
         </p:nvSpPr>
         <p:spPr/>
         <p:txBody>
-          <a:bodyPr>
-            <a:normAutofit lnSpcReduction="10000"/>
-          </a:bodyPr>
+          <a:bodyPr/>
           <a:lstStyle/>
           <a:p>
-            <a:pPr>
-              <a:buClr>
-                <a:schemeClr val="bg1"/>
-              </a:buClr>
-            </a:pPr>
-            <a:r>
-              <a:rPr lang="en-US" dirty="0" smtClean="0">
-                <a:solidFill>
-                  <a:srgbClr val="92D050"/>
-                </a:solidFill>
-              </a:rPr>
-              <a:t>[10]</a:t>
+            <a:r>
+              <a:rPr lang="en-US" dirty="0"/>
+              <a:t>/</a:t>
+            </a:r>
+            <a:r>
+              <a:rPr lang="en-US" dirty="0" err="1" smtClean="0"/>
+              <a:t>SafeMode</a:t>
             </a:r>
             <a:r>
               <a:rPr lang="en-US" dirty="0" smtClean="0"/>
-              <a:t> </a:t>
+              <a:t/>
+            </a:r>
+            <a:br>
+              <a:rPr lang="en-US" dirty="0" smtClean="0"/>
+            </a:br>
+            <a:r>
+              <a:rPr lang="ru-RU" sz="2800" dirty="0" smtClean="0"/>
+              <a:t>Безопасный </a:t>
+            </a:r>
+            <a:r>
+              <a:rPr lang="ru-RU" sz="2800" dirty="0"/>
+              <a:t>режим</a:t>
+            </a:r>
+            <a:r>
+              <a:rPr lang="en-US" sz="2800" dirty="0"/>
+              <a:t> (</a:t>
+            </a:r>
+            <a:r>
+              <a:rPr lang="ru-RU" sz="2800" dirty="0"/>
+              <a:t>отключает все расширения</a:t>
+            </a:r>
+            <a:r>
+              <a:rPr lang="en-US" sz="2800" dirty="0" smtClean="0"/>
+              <a:t>)</a:t>
+            </a:r>
+          </a:p>
+          <a:p>
+            <a:r>
+              <a:rPr lang="en-US" dirty="0"/>
+              <a:t>/</a:t>
+            </a:r>
+            <a:r>
+              <a:rPr lang="en-US" dirty="0" err="1" smtClean="0"/>
+              <a:t>rootsuffix</a:t>
+            </a:r>
+            <a:r>
+              <a:rPr lang="en-US" dirty="0" smtClean="0"/>
+              <a:t> &lt;</a:t>
             </a:r>
             <a:r>
               <a:rPr lang="ru-RU" dirty="0" smtClean="0"/>
-              <a:t>Изменение размера шрифта </a:t>
-            </a:r>
-            <a:r>
-              <a:rPr lang="en-US" dirty="0">
-                <a:solidFill>
-                  <a:srgbClr val="F6AE1E"/>
-                </a:solidFill>
-              </a:rPr>
-              <a:t>(</a:t>
-            </a:r>
-            <a:r>
-              <a:rPr lang="en-US" dirty="0" err="1">
-                <a:solidFill>
-                  <a:srgbClr val="F6AE1E"/>
-                </a:solidFill>
-              </a:rPr>
-              <a:t>Ctrl+Shift</a:t>
-            </a:r>
-            <a:r>
-              <a:rPr lang="en-US" dirty="0">
-                <a:solidFill>
-                  <a:srgbClr val="F6AE1E"/>
-                </a:solidFill>
-              </a:rPr>
-              <a:t> + &lt;/&gt; </a:t>
-            </a:r>
-            <a:r>
-              <a:rPr lang="ru-RU" dirty="0" smtClean="0">
-                <a:solidFill>
-                  <a:schemeClr val="bg1"/>
-                </a:solidFill>
-              </a:rPr>
-              <a:t>или</a:t>
-            </a:r>
-            <a:r>
-              <a:rPr lang="en-US" dirty="0" smtClean="0">
-                <a:solidFill>
-                  <a:srgbClr val="F6AE1E"/>
-                </a:solidFill>
-              </a:rPr>
-              <a:t> </a:t>
-            </a:r>
-            <a:r>
-              <a:rPr lang="en-US" dirty="0">
-                <a:solidFill>
-                  <a:srgbClr val="F6AE1E"/>
-                </a:solidFill>
-              </a:rPr>
-              <a:t>Ctrl + Mouse Scroll</a:t>
-            </a:r>
-            <a:r>
-              <a:rPr lang="en-US" dirty="0" smtClean="0">
-                <a:solidFill>
-                  <a:srgbClr val="F6AE1E"/>
-                </a:solidFill>
-              </a:rPr>
-              <a:t>)</a:t>
-            </a:r>
-            <a:endParaRPr lang="ru-RU" dirty="0" smtClean="0">
-              <a:solidFill>
-                <a:srgbClr val="F6AE1E"/>
-              </a:solidFill>
-            </a:endParaRPr>
-          </a:p>
-          <a:p>
-            <a:pPr>
-              <a:buClr>
-                <a:schemeClr val="bg1"/>
-              </a:buClr>
-            </a:pPr>
-            <a:r>
-              <a:rPr lang="en-US" dirty="0">
-                <a:solidFill>
-                  <a:srgbClr val="92D050"/>
-                </a:solidFill>
-              </a:rPr>
-              <a:t>[10]</a:t>
+              <a:t>и</a:t>
+            </a:r>
+            <a:r>
+              <a:rPr lang="ru-RU" smtClean="0"/>
+              <a:t>мя</a:t>
             </a:r>
             <a:r>
               <a:rPr lang="en-US" dirty="0" smtClean="0"/>
-              <a:t> </a:t>
+              <a:t>&gt;</a:t>
             </a:r>
             <a:r>
               <a:rPr lang="ru-RU" dirty="0" smtClean="0"/>
-              <a:t>Многострочное редактирование</a:t>
+              <a:t/>
+            </a:r>
+            <a:br>
+              <a:rPr lang="ru-RU" dirty="0" smtClean="0"/>
+            </a:br>
+            <a:r>
+              <a:rPr lang="ru-RU" sz="2800" dirty="0" smtClean="0"/>
+              <a:t>Запуск </a:t>
+            </a:r>
+            <a:r>
+              <a:rPr lang="en-US" sz="2800" dirty="0" smtClean="0"/>
+              <a:t>VS </a:t>
+            </a:r>
+            <a:r>
+              <a:rPr lang="ru-RU" sz="2800" dirty="0" smtClean="0"/>
+              <a:t>с указанным профилем. Для выборочной установки расширений в разные профили используйте утилиту </a:t>
+            </a:r>
+            <a:r>
+              <a:rPr lang="en-US" sz="2800" dirty="0" smtClean="0"/>
+              <a:t>Root-VSIX</a:t>
             </a:r>
             <a:r>
               <a:rPr lang="en-US" dirty="0" smtClean="0"/>
-              <a:t> </a:t>
-            </a:r>
-            <a:r>
-              <a:rPr lang="en-US" dirty="0" smtClean="0">
-                <a:solidFill>
-                  <a:srgbClr val="F6AE1E"/>
-                </a:solidFill>
-              </a:rPr>
-              <a:t>(</a:t>
-            </a:r>
-            <a:r>
-              <a:rPr lang="en-US" dirty="0" err="1">
-                <a:solidFill>
-                  <a:srgbClr val="F6AE1E"/>
-                </a:solidFill>
-              </a:rPr>
-              <a:t>Alt+Shift</a:t>
-            </a:r>
-            <a:r>
-              <a:rPr lang="en-US" dirty="0">
-                <a:solidFill>
-                  <a:srgbClr val="F6AE1E"/>
-                </a:solidFill>
-              </a:rPr>
-              <a:t> + Up/Down</a:t>
-            </a:r>
-            <a:r>
-              <a:rPr lang="en-US" dirty="0"/>
-              <a:t> </a:t>
-            </a:r>
-            <a:r>
-              <a:rPr lang="ru-RU" dirty="0" smtClean="0"/>
-              <a:t>или</a:t>
-            </a:r>
-            <a:r>
+              <a:t/>
+            </a:r>
+            <a:br>
               <a:rPr lang="en-US" dirty="0" smtClean="0"/>
-              <a:t> </a:t>
-            </a:r>
-            <a:r>
-              <a:rPr lang="en-US" dirty="0">
-                <a:solidFill>
-                  <a:srgbClr val="F6AE1E"/>
-                </a:solidFill>
-              </a:rPr>
-              <a:t>Alt + Mouse Up/Down</a:t>
-            </a:r>
-            <a:r>
-              <a:rPr lang="en-US" dirty="0" smtClean="0">
-                <a:solidFill>
-                  <a:srgbClr val="F6AE1E"/>
-                </a:solidFill>
-              </a:rPr>
-              <a:t>)</a:t>
-            </a:r>
-            <a:endParaRPr lang="ru-RU" dirty="0" smtClean="0">
-              <a:solidFill>
-                <a:srgbClr val="F6AE1E"/>
-              </a:solidFill>
-            </a:endParaRPr>
-          </a:p>
-          <a:p>
-            <a:pPr>
-              <a:buClr>
-                <a:schemeClr val="bg1"/>
-              </a:buClr>
-            </a:pPr>
-            <a:r>
-              <a:rPr lang="en-US" dirty="0" smtClean="0">
-                <a:solidFill>
-                  <a:srgbClr val="92D050"/>
-                </a:solidFill>
-              </a:rPr>
-              <a:t>[0</a:t>
-            </a:r>
-            <a:r>
-              <a:rPr lang="ru-RU" dirty="0" smtClean="0">
-                <a:solidFill>
-                  <a:srgbClr val="92D050"/>
-                </a:solidFill>
-              </a:rPr>
-              <a:t>5</a:t>
-            </a:r>
-            <a:r>
-              <a:rPr lang="en-US" dirty="0" smtClean="0">
-                <a:solidFill>
-                  <a:srgbClr val="92D050"/>
-                </a:solidFill>
-              </a:rPr>
-              <a:t>]</a:t>
-            </a:r>
-            <a:r>
-              <a:rPr lang="en-US" dirty="0" smtClean="0"/>
-              <a:t> </a:t>
-            </a:r>
-            <a:r>
-              <a:rPr lang="ru-RU" dirty="0" smtClean="0"/>
-              <a:t>Вставка текста из ц</a:t>
-            </a:r>
-            <a:r>
-              <a:rPr lang="ru-RU" dirty="0" smtClean="0">
-                <a:solidFill>
-                  <a:schemeClr val="bg1"/>
-                </a:solidFill>
-              </a:rPr>
-              <a:t>иклического буфера обмена </a:t>
-            </a:r>
-            <a:r>
-              <a:rPr lang="en-US" dirty="0">
-                <a:solidFill>
-                  <a:srgbClr val="F6AE1E"/>
-                </a:solidFill>
-              </a:rPr>
-              <a:t>(</a:t>
-            </a:r>
-            <a:r>
-              <a:rPr lang="en-US" dirty="0" err="1">
-                <a:solidFill>
-                  <a:srgbClr val="F6AE1E"/>
-                </a:solidFill>
-              </a:rPr>
-              <a:t>Ctrl+Shift</a:t>
-            </a:r>
-            <a:r>
-              <a:rPr lang="en-US" dirty="0">
-                <a:solidFill>
-                  <a:srgbClr val="F6AE1E"/>
-                </a:solidFill>
-              </a:rPr>
-              <a:t> + V</a:t>
-            </a:r>
-            <a:r>
-              <a:rPr lang="en-US" dirty="0" smtClean="0">
-                <a:solidFill>
-                  <a:srgbClr val="F6AE1E"/>
-                </a:solidFill>
-              </a:rPr>
-              <a:t>)</a:t>
-            </a:r>
-            <a:endParaRPr lang="ru-RU" dirty="0" smtClean="0">
-              <a:solidFill>
-                <a:srgbClr val="F6AE1E"/>
-              </a:solidFill>
-            </a:endParaRPr>
-          </a:p>
-          <a:p>
-            <a:pPr>
-              <a:buClr>
-                <a:schemeClr val="bg1"/>
-              </a:buClr>
-            </a:pPr>
-            <a:r>
-              <a:rPr lang="ru-RU" smtClean="0">
-                <a:solidFill>
-                  <a:schemeClr val="bg1"/>
-                </a:solidFill>
-              </a:rPr>
-              <a:t>Прокрутка текста без изменения положения курсора</a:t>
-            </a:r>
-            <a:r>
-              <a:rPr lang="en-US" dirty="0" smtClean="0">
-                <a:solidFill>
-                  <a:schemeClr val="bg1"/>
-                </a:solidFill>
-              </a:rPr>
-              <a:t> </a:t>
-            </a:r>
-            <a:r>
-              <a:rPr lang="en-US" dirty="0">
-                <a:solidFill>
-                  <a:srgbClr val="F6AE1E"/>
-                </a:solidFill>
-              </a:rPr>
-              <a:t>(Ctrl + Up/Down Arrow)</a:t>
-            </a:r>
+            </a:br>
+            <a:endParaRPr lang="ru-RU" dirty="0"/>
+          </a:p>
+          <a:p>
+            <a:pPr lvl="1"/>
+            <a:endParaRPr lang="ru-RU" dirty="0"/>
           </a:p>
         </p:txBody>
       </p:sp>
     </p:spTree>
     <p:extLst>
       <p:ext uri="{BB962C8B-B14F-4D97-AF65-F5344CB8AC3E}">
-        <p14:creationId xmlns:p14="http://schemas.microsoft.com/office/powerpoint/2010/main" val="468185828"/>
+        <p14:creationId xmlns:p14="http://schemas.microsoft.com/office/powerpoint/2010/main" val="3059897896"/>
       </p:ext>
     </p:extLst>
   </p:cSld>
@@ -11554,14 +11607,6 @@
               <a:rPr lang="ru-RU" dirty="0" smtClean="0"/>
               <a:t>Редактор</a:t>
             </a:r>
-            <a:r>
-              <a:rPr lang="en-US" dirty="0" smtClean="0"/>
-              <a:t>: </a:t>
-            </a:r>
-            <a:r>
-              <a:rPr lang="ru-RU" dirty="0" smtClean="0"/>
-              <a:t>Поиск текста</a:t>
-            </a:r>
             <a:endParaRPr lang="en-US" dirty="0"/>
           </a:p>
         </p:txBody>
@@ -11579,7 +11624,7 @@
         <p:spPr/>
         <p:txBody>
           <a:bodyPr>
-            <a:normAutofit fontScale="85000" lnSpcReduction="10000"/>
+            <a:normAutofit lnSpcReduction="10000"/>
           </a:bodyPr>
           <a:lstStyle/>
           <a:p>
@@ -11589,12 +11634,44 @@
               </a:buClr>
             </a:pPr>
             <a:r>
-              <a:rPr lang="en-US" dirty="0" err="1" smtClean="0">
+              <a:rPr lang="en-US" dirty="0" smtClean="0">
+                <a:solidFill>
+                  <a:srgbClr val="92D050"/>
+                </a:solidFill>
+              </a:rPr>
+              <a:t>[10]</a:t>
+            </a:r>
+            <a:r>
+              <a:rPr lang="en-US" dirty="0" smtClean="0"/>
+              <a:t> </a:t>
+            </a:r>
+            <a:r>
+              <a:rPr lang="ru-RU" dirty="0" smtClean="0"/>
+              <a:t>Изменение размера шрифта </a:t>
+            </a:r>
+            <a:r>
+              <a:rPr lang="en-US" dirty="0">
                 <a:solidFill>
                   <a:srgbClr val="F6AE1E"/>
                 </a:solidFill>
               </a:rPr>
-              <a:t>Ctrl+I</a:t>
+              <a:t>(</a:t>
+            </a:r>
+            <a:r>
+              <a:rPr lang="en-US" dirty="0" err="1">
+                <a:solidFill>
+                  <a:srgbClr val="F6AE1E"/>
+                </a:solidFill>
+              </a:rPr>
+              <a:t>Ctrl+Shift</a:t>
+            </a:r>
+            <a:r>
+              <a:rPr lang="en-US" dirty="0">
+                <a:solidFill>
+                  <a:srgbClr val="F6AE1E"/>
+                </a:solidFill>
+              </a:rPr>
+              <a:t> + &lt;/&gt; </a:t>
             </a:r>
             <a:r>
               <a:rPr lang="ru-RU" dirty="0" smtClean="0">
@@ -11602,8 +11679,37 @@
                   <a:schemeClr val="bg1"/>
                 </a:solidFill>
               </a:rPr>
-              <a:t> поиск</a:t>
-            </a:r>
+              <a:t>или</a:t>
+            </a:r>
+            <a:r>
+              <a:rPr lang="en-US" dirty="0" smtClean="0">
+                <a:solidFill>
+                  <a:srgbClr val="F6AE1E"/>
+                </a:solidFill>
+              </a:rPr>
+              <a:t> </a:t>
+            </a:r>
+            <a:r>
+              <a:rPr lang="en-US" dirty="0">
+                <a:solidFill>
+                  <a:srgbClr val="F6AE1E"/>
+                </a:solidFill>
+              </a:rPr>
+              <a:t>Ctrl + Mouse Scroll</a:t>
+            </a:r>
+            <a:r>
+              <a:rPr lang="en-US" dirty="0" smtClean="0">
+                <a:solidFill>
+                  <a:srgbClr val="F6AE1E"/>
+                </a:solidFill>
+              </a:rPr>
+              <a:t>)</a:t>
+            </a:r>
+            <a:endParaRPr lang="ru-RU" dirty="0" smtClean="0">
+              <a:solidFill>
+                <a:srgbClr val="F6AE1E"/>
+              </a:solidFill>
+            </a:endParaRPr>
           </a:p>
           <a:p>
             <a:pPr>
@@ -11614,27 +11720,80 @@
             <a:r>
               <a:rPr lang="en-US" dirty="0">
                 <a:solidFill>
+                  <a:srgbClr val="92D050"/>
+                </a:solidFill>
+              </a:rPr>
+              <a:t>[10]</a:t>
+            </a:r>
+            <a:r>
+              <a:rPr lang="en-US" dirty="0" smtClean="0"/>
+              <a:t> </a:t>
+            </a:r>
+            <a:r>
+              <a:rPr lang="ru-RU" dirty="0" smtClean="0"/>
+              <a:t>Многострочное редактирование</a:t>
+            </a:r>
+            <a:r>
+              <a:rPr lang="en-US" dirty="0" smtClean="0"/>
+              <a:t> </a:t>
+            </a:r>
+            <a:r>
+              <a:rPr lang="en-US" dirty="0" smtClean="0">
+                <a:solidFill>
                   <a:srgbClr val="F6AE1E"/>
                 </a:solidFill>
               </a:rPr>
-              <a:t>F3/Shift+F3</a:t>
+              <a:t>(</a:t>
+            </a:r>
+            <a:r>
+              <a:rPr lang="en-US" dirty="0" err="1">
+                <a:solidFill>
+                  <a:srgbClr val="F6AE1E"/>
+                </a:solidFill>
+              </a:rPr>
+              <a:t>Alt+Shift</a:t>
+            </a:r>
+            <a:r>
+              <a:rPr lang="en-US" dirty="0">
+                <a:solidFill>
+                  <a:srgbClr val="F6AE1E"/>
+                </a:solidFill>
+              </a:rPr>
+              <a:t> + Up/Down</a:t>
+            </a:r>
+            <a:r>
+              <a:rPr lang="en-US" dirty="0"/>
+              <a:t> </a:t>
+            </a:r>
+            <a:r>
+              <a:rPr lang="ru-RU" dirty="0" smtClean="0"/>
+              <a:t>или</a:t>
+            </a:r>
+            <a:r>
+              <a:rPr lang="en-US" dirty="0" smtClean="0"/>
+              <a:t> </a:t>
+            </a:r>
+            <a:r>
+              <a:rPr lang="en-US" dirty="0">
+                <a:solidFill>
+                  <a:srgbClr val="F6AE1E"/>
+                </a:solidFill>
+              </a:rPr>
+              <a:t>Alt + Mouse Up/Down</a:t>
             </a:r>
             <a:r>
               <a:rPr lang="en-US" dirty="0" smtClean="0">
                 <a:solidFill>
-                  <a:schemeClr val="bg1"/>
-                </a:solidFill>
-              </a:rPr>
-              <a:t> </a:t>
-            </a:r>
-            <a:r>
-              <a:rPr lang="ru-RU" dirty="0" smtClean="0">
-                <a:solidFill>
-                  <a:schemeClr val="bg1"/>
-                </a:solidFill>
-              </a:rPr>
-              <a:t>найти следующее/предыдущее вхождение строки</a:t>
-            </a:r>
+                  <a:srgbClr val="F6AE1E"/>
+                </a:solidFill>
+              </a:rPr>
+              <a:t>)</a:t>
+            </a:r>
+            <a:endParaRPr lang="ru-RU" dirty="0" smtClean="0">
+              <a:solidFill>
+                <a:srgbClr val="F6AE1E"/>
+              </a:solidFill>
+            </a:endParaRPr>
           </a:p>
           <a:p>
             <a:pPr>
@@ -11643,29 +11802,82 @@
               </a:buClr>
             </a:pPr>
             <a:r>
+              <a:rPr lang="en-US" dirty="0" smtClean="0">
+                <a:solidFill>
+                  <a:srgbClr val="92D050"/>
+                </a:solidFill>
+              </a:rPr>
+              <a:t>[0</a:t>
+            </a:r>
+            <a:r>
+              <a:rPr lang="ru-RU" dirty="0" smtClean="0">
+                <a:solidFill>
+                  <a:srgbClr val="92D050"/>
+                </a:solidFill>
+              </a:rPr>
+              <a:t>5</a:t>
+            </a:r>
+            <a:r>
+              <a:rPr lang="en-US" dirty="0" smtClean="0">
+                <a:solidFill>
+                  <a:srgbClr val="92D050"/>
+                </a:solidFill>
+              </a:rPr>
+              <a:t>]</a:t>
+            </a:r>
+            <a:r>
+              <a:rPr lang="en-US" dirty="0" smtClean="0"/>
+              <a:t> </a:t>
+            </a:r>
+            <a:r>
+              <a:rPr lang="ru-RU" dirty="0" smtClean="0"/>
+              <a:t>Вставка текста из ц</a:t>
+            </a:r>
+            <a:r>
+              <a:rPr lang="ru-RU" dirty="0" smtClean="0">
+                <a:solidFill>
+                  <a:schemeClr val="bg1"/>
+                </a:solidFill>
+              </a:rPr>
+              <a:t>иклического буфера обмена </a:t>
+            </a:r>
+            <a:r>
               <a:rPr lang="en-US" dirty="0">
                 <a:solidFill>
                   <a:srgbClr val="F6AE1E"/>
                 </a:solidFill>
               </a:rPr>
-              <a:t>Ctrl+F3</a:t>
+              <a:t>(</a:t>
+            </a:r>
+            <a:r>
+              <a:rPr lang="en-US" dirty="0" err="1">
+                <a:solidFill>
+                  <a:srgbClr val="F6AE1E"/>
+                </a:solidFill>
+              </a:rPr>
+              <a:t>Ctrl+Shift</a:t>
+            </a:r>
+            <a:r>
+              <a:rPr lang="en-US" dirty="0">
+                <a:solidFill>
+                  <a:srgbClr val="F6AE1E"/>
+                </a:solidFill>
+              </a:rPr>
+              <a:t> + V</a:t>
             </a:r>
             <a:r>
               <a:rPr lang="en-US" dirty="0" smtClean="0">
                 <a:solidFill>
-                  <a:schemeClr val="bg1"/>
-                </a:solidFill>
-              </a:rPr>
-              <a:t> </a:t>
-            </a:r>
-            <a:r>
-              <a:rPr lang="ru-RU" dirty="0" smtClean="0">
-                <a:solidFill>
-                  <a:schemeClr val="bg1"/>
-                </a:solidFill>
-              </a:rPr>
-              <a:t>найти следующее вхождение выделенного текста</a:t>
-            </a:r>
+                  <a:srgbClr val="F6AE1E"/>
+                </a:solidFill>
+              </a:rPr>
+              <a:t>)</a:t>
+            </a:r>
+            <a:endParaRPr lang="ru-RU" dirty="0" smtClean="0">
+              <a:solidFill>
+                <a:srgbClr val="F6AE1E"/>
+              </a:solidFill>
+            </a:endParaRPr>
           </a:p>
           <a:p>
             <a:pPr>
@@ -11674,113 +11886,36 @@
               </a:buClr>
             </a:pPr>
             <a:r>
-              <a:rPr lang="en-US" dirty="0" err="1">
+              <a:rPr lang="ru-RU" smtClean="0">
+                <a:solidFill>
+                  <a:schemeClr val="bg1"/>
+                </a:solidFill>
+              </a:rPr>
+              <a:t>Прокрутка текста без изменения положения курсора</a:t>
+            </a:r>
+            <a:r>
+              <a:rPr lang="en-US" dirty="0" smtClean="0">
+                <a:solidFill>
+                  <a:schemeClr val="bg1"/>
+                </a:solidFill>
+              </a:rPr>
+              <a:t> </a:t>
+            </a:r>
+            <a:r>
+              <a:rPr lang="en-US" dirty="0">
                 <a:solidFill>
                   <a:srgbClr val="F6AE1E"/>
                 </a:solidFill>
               </a:rPr>
-              <a:t>Ctrl+Shift+F</a:t>
-            </a:r>
-            <a:r>
-              <a:rPr lang="en-US" dirty="0" smtClean="0">
-                <a:solidFill>
-                  <a:schemeClr val="bg1"/>
-                </a:solidFill>
-              </a:rPr>
-              <a:t> </a:t>
-            </a:r>
-            <a:r>
-              <a:rPr lang="ru-RU" dirty="0" smtClean="0">
-                <a:solidFill>
-                  <a:schemeClr val="bg1"/>
-                </a:solidFill>
-              </a:rPr>
-              <a:t>найти в </a:t>
-            </a:r>
-            <a:r>
-              <a:rPr lang="en-US" dirty="0" smtClean="0">
-                <a:solidFill>
-                  <a:schemeClr val="bg1"/>
-                </a:solidFill>
-              </a:rPr>
-              <a:t>solution</a:t>
-            </a:r>
-          </a:p>
-          <a:p>
-            <a:pPr marL="0" indent="0">
-              <a:buClr>
-                <a:schemeClr val="bg1"/>
-              </a:buClr>
-              <a:buNone/>
-            </a:pPr>
-            <a:endParaRPr lang="ru-RU" dirty="0" smtClean="0">
-              <a:solidFill>
-                <a:schemeClr val="bg1"/>
-              </a:solidFill>
-            </a:endParaRPr>
-          </a:p>
-          <a:p>
-            <a:pPr>
-              <a:buClr>
-                <a:schemeClr val="bg1"/>
-              </a:buClr>
-            </a:pPr>
-            <a:endParaRPr lang="ru-RU" dirty="0">
-              <a:solidFill>
-                <a:schemeClr val="bg1"/>
-              </a:solidFill>
-            </a:endParaRPr>
-          </a:p>
-          <a:p>
-            <a:pPr marL="0" indent="0">
-              <a:buClr>
-                <a:schemeClr val="bg1"/>
-              </a:buClr>
-              <a:buNone/>
-            </a:pPr>
-            <a:r>
-              <a:rPr lang="en-US" dirty="0">
-                <a:solidFill>
-                  <a:schemeClr val="bg1"/>
-                </a:solidFill>
-                <a:hlinkClick r:id="rId2"/>
-              </a:rPr>
-              <a:t>http://</a:t>
-            </a:r>
-            <a:r>
-              <a:rPr lang="en-US" dirty="0" smtClean="0">
-                <a:solidFill>
-                  <a:schemeClr val="bg1"/>
-                </a:solidFill>
-                <a:hlinkClick r:id="rId2"/>
-              </a:rPr>
-              <a:t>weblogs.asp.net/scottgu/archive/2010/08/24/search-and-navigation-tips-tricks-with-visual-studio.aspx</a:t>
-            </a:r>
-            <a:endParaRPr lang="ru-RU" dirty="0" smtClean="0">
-              <a:solidFill>
-                <a:schemeClr val="bg1"/>
-              </a:solidFill>
-            </a:endParaRPr>
-          </a:p>
-          <a:p>
-            <a:pPr marL="0" indent="0">
-              <a:buClr>
-                <a:schemeClr val="bg1"/>
-              </a:buClr>
-              <a:buNone/>
-            </a:pPr>
-            <a:endParaRPr lang="en-US" dirty="0">
-              <a:solidFill>
-                <a:schemeClr val="bg1"/>
-              </a:solidFill>
-            </a:endParaRPr>
+              <a:t>(Ctrl + Up/Down Arrow)</a:t>
+            </a:r>
           </a:p>
         </p:txBody>
       </p:sp>
     </p:spTree>
     <p:extLst>
       <p:ext uri="{BB962C8B-B14F-4D97-AF65-F5344CB8AC3E}">
-        <p14:creationId xmlns:p14="http://schemas.microsoft.com/office/powerpoint/2010/main" val="1967395690"/>
+        <p14:creationId xmlns:p14="http://schemas.microsoft.com/office/powerpoint/2010/main" val="468185828"/>
       </p:ext>
     </p:extLst>
   </p:cSld>

</xml_diff>

<commit_message>
Match the parentheses hot key
</commit_message>
<xml_diff>
--- a/Presentation/tools-visual-studio.pptx
+++ b/Presentation/tools-visual-studio.pptx
@@ -132,7 +132,7 @@
   </p:defaultTextStyle>
   <p:extLst>
     <p:ext uri="{EFAFB233-063F-42B5-8137-9DF3F51BA10A}">
-      <p15:sldGuideLst xmlns:p15="http://schemas.microsoft.com/office/powerpoint/2012/main" xmlns="">
+      <p15:sldGuideLst xmlns="" xmlns:p15="http://schemas.microsoft.com/office/powerpoint/2012/main">
         <p15:guide id="1" orient="horz" pos="2160">
           <p15:clr>
             <a:srgbClr val="A4A3A4"/>
@@ -231,7 +231,7 @@
           <a:p>
             <a:fld id="{B24A7054-7FFB-49F4-A126-5DF6E687FF53}" type="datetimeFigureOut">
               <a:rPr lang="ru-RU" smtClean="0"/>
-              <a:t>24.08.2014</a:t>
+              <a:t>31.08.2014</a:t>
             </a:fld>
             <a:endParaRPr lang="ru-RU"/>
           </a:p>
@@ -1513,7 +1513,7 @@
           <a:p>
             <a:fld id="{8E6E6A2A-E9D3-4A0D-B04A-ABDD367A1E08}" type="datetimeFigureOut">
               <a:rPr lang="ru-RU" smtClean="0"/>
-              <a:t>24.08.2014</a:t>
+              <a:t>31.08.2014</a:t>
             </a:fld>
             <a:endParaRPr lang="ru-RU"/>
           </a:p>
@@ -4026,7 +4026,7 @@
                 </a:solidFill>
               </a:rPr>
               <a:pPr/>
-              <a:t>24.08.2014</a:t>
+              <a:t>31.08.2014</a:t>
             </a:fld>
             <a:endParaRPr lang="ru-RU">
               <a:solidFill>
@@ -5287,7 +5287,7 @@
           <a:p>
             <a:fld id="{AC3D3127-B7C4-45E3-9797-C527EC9FDD78}" type="datetimeFigureOut">
               <a:rPr lang="ru-RU" smtClean="0"/>
-              <a:t>24.08.2014</a:t>
+              <a:t>31.08.2014</a:t>
             </a:fld>
             <a:endParaRPr lang="ru-RU"/>
           </a:p>
@@ -5823,7 +5823,7 @@
                 </a:solidFill>
               </a:rPr>
               <a:pPr/>
-              <a:t>24.08.2014</a:t>
+              <a:t>31.08.2014</a:t>
             </a:fld>
             <a:endParaRPr lang="ru-RU">
               <a:solidFill>
@@ -7310,7 +7310,7 @@
         <p:spPr/>
         <p:txBody>
           <a:bodyPr>
-            <a:normAutofit fontScale="85000" lnSpcReduction="10000"/>
+            <a:normAutofit fontScale="77500" lnSpcReduction="20000"/>
           </a:bodyPr>
           <a:lstStyle/>
           <a:p>
@@ -7526,7 +7526,38 @@
                   <a:schemeClr val="bg1"/>
                 </a:solidFill>
               </a:rPr>
-              <a:t>перейти на строку №</a:t>
+              <a:t>перейти на строку </a:t>
+            </a:r>
+            <a:r>
+              <a:rPr lang="ru-RU" dirty="0" smtClean="0">
+                <a:solidFill>
+                  <a:schemeClr val="bg1"/>
+                </a:solidFill>
+              </a:rPr>
+              <a:t>№</a:t>
+            </a:r>
+          </a:p>
+          <a:p>
+            <a:pPr>
+              <a:buClr>
+                <a:schemeClr val="bg1"/>
+              </a:buClr>
+            </a:pPr>
+            <a:r>
+              <a:rPr lang="en-US" dirty="0">
+                <a:solidFill>
+                  <a:srgbClr val="F6AE1E"/>
+                </a:solidFill>
+              </a:rPr>
+              <a:t>Ctrl+] </a:t>
+            </a:r>
+            <a:r>
+              <a:rPr lang="ru-RU" dirty="0" smtClean="0">
+                <a:solidFill>
+                  <a:schemeClr val="bg1"/>
+                </a:solidFill>
+              </a:rPr>
+              <a:t>перейти к парной скобке открывающей или закрывающей скобке</a:t>
             </a:r>
             <a:endParaRPr lang="en-US" dirty="0" smtClean="0">
               <a:solidFill>
@@ -7713,6 +7744,13 @@
   <p:clrMapOvr>
     <a:masterClrMapping/>
   </p:clrMapOvr>
+  <p:timing>
+    <p:tnLst>
+      <p:par>
+        <p:cTn id="1" dur="indefinite" restart="never" nodeType="tmRoot"/>
+      </p:par>
+    </p:tnLst>
+  </p:timing>
 </p:sld>
 </file>
 
@@ -7933,6 +7971,13 @@
   <p:clrMapOvr>
     <a:overrideClrMapping bg1="lt1" tx1="dk1" bg2="lt2" tx2="dk2" accent1="accent1" accent2="accent2" accent3="accent3" accent4="accent4" accent5="accent5" accent6="accent6" hlink="hlink" folHlink="folHlink"/>
   </p:clrMapOvr>
+  <p:timing>
+    <p:tnLst>
+      <p:par>
+        <p:cTn id="1" dur="indefinite" restart="never" nodeType="tmRoot"/>
+      </p:par>
+    </p:tnLst>
+  </p:timing>
 </p:sld>
 </file>
 
@@ -11087,7 +11132,11 @@
             </a:pPr>
             <a:r>
               <a:rPr lang="ru-RU" dirty="0" smtClean="0"/>
-              <a:t>Также не забывайте, то </a:t>
+              <a:t>Также не забывайте, </a:t>
+            </a:r>
+            <a:r>
+              <a:rPr lang="ru-RU" dirty="0" smtClean="0"/>
+              <a:t>что </a:t>
             </a:r>
             <a:r>
               <a:rPr lang="en-US" dirty="0" smtClean="0"/>
@@ -11123,6 +11172,13 @@
   <p:clrMapOvr>
     <a:masterClrMapping/>
   </p:clrMapOvr>
+  <p:timing>
+    <p:tnLst>
+      <p:par>
+        <p:cTn id="1" dur="indefinite" restart="never" nodeType="tmRoot"/>
+      </p:par>
+    </p:tnLst>
+  </p:timing>
 </p:sld>
 </file>
 

</xml_diff>

<commit_message>
Added "Hide Selection" command
</commit_message>
<xml_diff>
--- a/Presentation/tools-visual-studio.pptx
+++ b/Presentation/tools-visual-studio.pptx
@@ -6,7 +6,7 @@
     <p:sldMasterId id="2147483663" r:id="rId2"/>
   </p:sldMasterIdLst>
   <p:notesMasterIdLst>
-    <p:notesMasterId r:id="rId26"/>
+    <p:notesMasterId r:id="rId30"/>
   </p:notesMasterIdLst>
   <p:sldIdLst>
     <p:sldId id="257" r:id="rId3"/>
@@ -17,21 +17,25 @@
     <p:sldId id="281" r:id="rId8"/>
     <p:sldId id="272" r:id="rId9"/>
     <p:sldId id="275" r:id="rId10"/>
-    <p:sldId id="262" r:id="rId11"/>
-    <p:sldId id="265" r:id="rId12"/>
-    <p:sldId id="280" r:id="rId13"/>
-    <p:sldId id="277" r:id="rId14"/>
-    <p:sldId id="271" r:id="rId15"/>
-    <p:sldId id="266" r:id="rId16"/>
-    <p:sldId id="279" r:id="rId17"/>
-    <p:sldId id="269" r:id="rId18"/>
-    <p:sldId id="273" r:id="rId19"/>
-    <p:sldId id="274" r:id="rId20"/>
-    <p:sldId id="267" r:id="rId21"/>
-    <p:sldId id="268" r:id="rId22"/>
-    <p:sldId id="260" r:id="rId23"/>
-    <p:sldId id="261" r:id="rId24"/>
-    <p:sldId id="276" r:id="rId25"/>
+    <p:sldId id="284" r:id="rId11"/>
+    <p:sldId id="282" r:id="rId12"/>
+    <p:sldId id="262" r:id="rId13"/>
+    <p:sldId id="283" r:id="rId14"/>
+    <p:sldId id="285" r:id="rId15"/>
+    <p:sldId id="265" r:id="rId16"/>
+    <p:sldId id="280" r:id="rId17"/>
+    <p:sldId id="277" r:id="rId18"/>
+    <p:sldId id="271" r:id="rId19"/>
+    <p:sldId id="266" r:id="rId20"/>
+    <p:sldId id="279" r:id="rId21"/>
+    <p:sldId id="269" r:id="rId22"/>
+    <p:sldId id="273" r:id="rId23"/>
+    <p:sldId id="274" r:id="rId24"/>
+    <p:sldId id="267" r:id="rId25"/>
+    <p:sldId id="268" r:id="rId26"/>
+    <p:sldId id="260" r:id="rId27"/>
+    <p:sldId id="261" r:id="rId28"/>
+    <p:sldId id="276" r:id="rId29"/>
   </p:sldIdLst>
   <p:sldSz cx="9144000" cy="6858000" type="screen4x3"/>
   <p:notesSz cx="6858000" cy="9144000"/>
@@ -231,7 +235,7 @@
           <a:p>
             <a:fld id="{B24A7054-7FFB-49F4-A126-5DF6E687FF53}" type="datetimeFigureOut">
               <a:rPr lang="ru-RU" smtClean="0"/>
-              <a:t>31.08.2014</a:t>
+              <a:t>12.09.2014</a:t>
             </a:fld>
             <a:endParaRPr lang="ru-RU"/>
           </a:p>
@@ -1513,7 +1517,7 @@
           <a:p>
             <a:fld id="{8E6E6A2A-E9D3-4A0D-B04A-ABDD367A1E08}" type="datetimeFigureOut">
               <a:rPr lang="ru-RU" smtClean="0"/>
-              <a:t>31.08.2014</a:t>
+              <a:t>12.09.2014</a:t>
             </a:fld>
             <a:endParaRPr lang="ru-RU"/>
           </a:p>
@@ -4026,7 +4030,7 @@
                 </a:solidFill>
               </a:rPr>
               <a:pPr/>
-              <a:t>31.08.2014</a:t>
+              <a:t>12.09.2014</a:t>
             </a:fld>
             <a:endParaRPr lang="ru-RU">
               <a:solidFill>
@@ -5287,7 +5291,7 @@
           <a:p>
             <a:fld id="{AC3D3127-B7C4-45E3-9797-C527EC9FDD78}" type="datetimeFigureOut">
               <a:rPr lang="ru-RU" smtClean="0"/>
-              <a:t>31.08.2014</a:t>
+              <a:t>12.09.2014</a:t>
             </a:fld>
             <a:endParaRPr lang="ru-RU"/>
           </a:p>
@@ -5823,7 +5827,7 @@
                 </a:solidFill>
               </a:rPr>
               <a:pPr/>
-              <a:t>31.08.2014</a:t>
+              <a:t>12.09.2014</a:t>
             </a:fld>
             <a:endParaRPr lang="ru-RU">
               <a:solidFill>
@@ -6447,17 +6451,9 @@
           <a:p>
             <a:r>
               <a:rPr lang="ru-RU" dirty="0" smtClean="0"/>
-              <a:t>Редактор</a:t>
-            </a:r>
-            <a:r>
-              <a:rPr lang="en-US" dirty="0" smtClean="0"/>
-              <a:t>: </a:t>
-            </a:r>
-            <a:r>
-              <a:rPr lang="ru-RU" dirty="0" smtClean="0"/>
-              <a:t>Поиск текста</a:t>
-            </a:r>
-            <a:endParaRPr lang="en-US" dirty="0"/>
+              <a:t>Редактор: Настройки</a:t>
+            </a:r>
+            <a:endParaRPr lang="ru-RU" dirty="0"/>
           </a:p>
         </p:txBody>
       </p:sp>
@@ -6473,222 +6469,59 @@
         </p:nvSpPr>
         <p:spPr/>
         <p:txBody>
-          <a:bodyPr>
-            <a:normAutofit fontScale="85000" lnSpcReduction="10000"/>
-          </a:bodyPr>
+          <a:bodyPr/>
           <a:lstStyle/>
           <a:p>
-            <a:pPr>
-              <a:buClr>
-                <a:schemeClr val="bg1"/>
-              </a:buClr>
+            <a:pPr marL="0" indent="0">
+              <a:buNone/>
             </a:pPr>
             <a:r>
-              <a:rPr lang="en-US" dirty="0" err="1" smtClean="0">
-                <a:solidFill>
-                  <a:srgbClr val="F6AE1E"/>
-                </a:solidFill>
-              </a:rPr>
-              <a:t>Ctrl+I</a:t>
-            </a:r>
-            <a:r>
-              <a:rPr lang="ru-RU" dirty="0" smtClean="0">
-                <a:solidFill>
-                  <a:schemeClr val="bg1"/>
-                </a:solidFill>
-              </a:rPr>
-              <a:t> поиск</a:t>
-            </a:r>
-          </a:p>
-          <a:p>
-            <a:pPr>
-              <a:buClr>
-                <a:schemeClr val="bg1"/>
-              </a:buClr>
+              <a:rPr lang="ru-RU" dirty="0" smtClean="0"/>
+              <a:t>Редактор </a:t>
+            </a:r>
+            <a:r>
+              <a:rPr lang="en-US" dirty="0" smtClean="0"/>
+              <a:t>VS </a:t>
+            </a:r>
+            <a:r>
+              <a:rPr lang="ru-RU" dirty="0" smtClean="0"/>
+              <a:t>поддерживает множество языков. Настройки можно менять для всех языков сразу или по отдельности в диалоге «</a:t>
+            </a:r>
+            <a:r>
+              <a:rPr lang="en-US" dirty="0" smtClean="0"/>
+              <a:t>Tools -&gt; Options ...</a:t>
+            </a:r>
+            <a:r>
+              <a:rPr lang="ru-RU" dirty="0" smtClean="0"/>
+              <a:t>»</a:t>
+            </a:r>
+            <a:r>
+              <a:rPr lang="en-US" dirty="0" smtClean="0"/>
+              <a:t>.</a:t>
+            </a:r>
+            <a:endParaRPr lang="ru-RU" dirty="0" smtClean="0"/>
+          </a:p>
+          <a:p>
+            <a:pPr marL="0" indent="0">
+              <a:buNone/>
             </a:pPr>
-            <a:r>
-              <a:rPr lang="en-US" dirty="0">
-                <a:solidFill>
-                  <a:srgbClr val="F6AE1E"/>
-                </a:solidFill>
-              </a:rPr>
-              <a:t>F3/Shift+F3</a:t>
-            </a:r>
-            <a:r>
-              <a:rPr lang="en-US" dirty="0" smtClean="0">
-                <a:solidFill>
-                  <a:schemeClr val="bg1"/>
-                </a:solidFill>
-              </a:rPr>
-              <a:t> </a:t>
-            </a:r>
-            <a:r>
-              <a:rPr lang="ru-RU" dirty="0" smtClean="0">
-                <a:solidFill>
-                  <a:schemeClr val="bg1"/>
-                </a:solidFill>
-              </a:rPr>
-              <a:t>найти следующее/предыдущее вхождение строки</a:t>
-            </a:r>
-          </a:p>
-          <a:p>
-            <a:pPr>
-              <a:buClr>
-                <a:schemeClr val="bg1"/>
-              </a:buClr>
-            </a:pPr>
-            <a:r>
-              <a:rPr lang="en-US" dirty="0">
-                <a:solidFill>
-                  <a:srgbClr val="F6AE1E"/>
-                </a:solidFill>
-              </a:rPr>
-              <a:t>Ctrl+F3</a:t>
-            </a:r>
-            <a:r>
-              <a:rPr lang="en-US" dirty="0" smtClean="0">
-                <a:solidFill>
-                  <a:schemeClr val="bg1"/>
-                </a:solidFill>
-              </a:rPr>
-              <a:t> </a:t>
-            </a:r>
-            <a:r>
-              <a:rPr lang="ru-RU" dirty="0" smtClean="0">
-                <a:solidFill>
-                  <a:schemeClr val="bg1"/>
-                </a:solidFill>
-              </a:rPr>
-              <a:t>найти следующее вхождение выделенного текста</a:t>
-            </a:r>
-          </a:p>
-          <a:p>
-            <a:pPr>
-              <a:buClr>
-                <a:schemeClr val="bg1"/>
-              </a:buClr>
-            </a:pPr>
-            <a:r>
-              <a:rPr lang="en-US" dirty="0" err="1">
-                <a:solidFill>
-                  <a:srgbClr val="F6AE1E"/>
-                </a:solidFill>
-              </a:rPr>
-              <a:t>Ctrl+Shift+F</a:t>
-            </a:r>
-            <a:r>
-              <a:rPr lang="en-US" dirty="0" smtClean="0">
-                <a:solidFill>
-                  <a:schemeClr val="bg1"/>
-                </a:solidFill>
-              </a:rPr>
-              <a:t> </a:t>
-            </a:r>
-            <a:r>
-              <a:rPr lang="ru-RU" dirty="0" smtClean="0">
-                <a:solidFill>
-                  <a:schemeClr val="bg1"/>
-                </a:solidFill>
-              </a:rPr>
-              <a:t>найти в </a:t>
-            </a:r>
-            <a:r>
-              <a:rPr lang="en-US" dirty="0" smtClean="0">
-                <a:solidFill>
-                  <a:schemeClr val="bg1"/>
-                </a:solidFill>
-              </a:rPr>
-              <a:t>solution</a:t>
-            </a:r>
-          </a:p>
-          <a:p>
-            <a:pPr marL="0" indent="0">
-              <a:buClr>
-                <a:schemeClr val="bg1"/>
-              </a:buClr>
-              <a:buNone/>
-            </a:pPr>
-            <a:endParaRPr lang="ru-RU" dirty="0" smtClean="0">
-              <a:solidFill>
-                <a:schemeClr val="bg1"/>
-              </a:solidFill>
-            </a:endParaRPr>
-          </a:p>
-          <a:p>
-            <a:pPr>
-              <a:buClr>
-                <a:schemeClr val="bg1"/>
-              </a:buClr>
-            </a:pPr>
-            <a:endParaRPr lang="ru-RU" dirty="0">
-              <a:solidFill>
-                <a:schemeClr val="bg1"/>
-              </a:solidFill>
-            </a:endParaRPr>
-          </a:p>
-          <a:p>
-            <a:pPr marL="0" indent="0">
-              <a:buClr>
-                <a:schemeClr val="bg1"/>
-              </a:buClr>
-              <a:buNone/>
-            </a:pPr>
-            <a:r>
-              <a:rPr lang="en-US" dirty="0">
-                <a:solidFill>
-                  <a:schemeClr val="bg1"/>
-                </a:solidFill>
-                <a:hlinkClick r:id="rId2"/>
-              </a:rPr>
-              <a:t>http://</a:t>
-            </a:r>
-            <a:r>
-              <a:rPr lang="en-US" dirty="0" smtClean="0">
-                <a:solidFill>
-                  <a:schemeClr val="bg1"/>
-                </a:solidFill>
-                <a:hlinkClick r:id="rId2"/>
-              </a:rPr>
-              <a:t>weblogs.asp.net/scottgu/archive/2010/08/24/search-and-navigation-tips-tricks-with-visual-studio.aspx</a:t>
-            </a:r>
-            <a:endParaRPr lang="ru-RU" dirty="0" smtClean="0">
-              <a:solidFill>
-                <a:schemeClr val="bg1"/>
-              </a:solidFill>
-            </a:endParaRPr>
-          </a:p>
-          <a:p>
-            <a:pPr marL="0" indent="0">
-              <a:buClr>
-                <a:schemeClr val="bg1"/>
-              </a:buClr>
-              <a:buNone/>
-            </a:pPr>
-            <a:endParaRPr lang="en-US" dirty="0">
-              <a:solidFill>
-                <a:schemeClr val="bg1"/>
-              </a:solidFill>
-            </a:endParaRPr>
+            <a:endParaRPr lang="ru-RU" dirty="0" smtClean="0"/>
+          </a:p>
+          <a:p>
+            <a:endParaRPr lang="ru-RU" dirty="0"/>
           </a:p>
         </p:txBody>
       </p:sp>
     </p:spTree>
     <p:extLst>
       <p:ext uri="{BB962C8B-B14F-4D97-AF65-F5344CB8AC3E}">
-        <p14:creationId xmlns:p14="http://schemas.microsoft.com/office/powerpoint/2010/main" val="1967395690"/>
+        <p14:creationId xmlns:p14="http://schemas.microsoft.com/office/powerpoint/2010/main" val="2394860654"/>
       </p:ext>
     </p:extLst>
   </p:cSld>
   <p:clrMapOvr>
     <a:masterClrMapping/>
   </p:clrMapOvr>
-  <p:timing>
-    <p:tnLst>
-      <p:par>
-        <p:cTn id="1" dur="indefinite" restart="never" nodeType="tmRoot"/>
-      </p:par>
-    </p:tnLst>
-  </p:timing>
 </p:sld>
 </file>
 
@@ -6728,14 +6561,6 @@
               <a:rPr lang="ru-RU" dirty="0" smtClean="0"/>
               <a:t>Редактор</a:t>
             </a:r>
-            <a:r>
-              <a:rPr lang="en-US" dirty="0" smtClean="0"/>
-              <a:t>: </a:t>
-            </a:r>
-            <a:r>
-              <a:rPr lang="ru-RU" dirty="0" smtClean="0"/>
-              <a:t>Выделение текста</a:t>
-            </a:r>
             <a:endParaRPr lang="en-US" dirty="0"/>
           </a:p>
         </p:txBody>
@@ -6753,7 +6578,7 @@
         <p:spPr/>
         <p:txBody>
           <a:bodyPr>
-            <a:normAutofit/>
+            <a:normAutofit lnSpcReduction="10000"/>
           </a:bodyPr>
           <a:lstStyle/>
           <a:p>
@@ -6763,94 +6588,288 @@
               </a:buClr>
             </a:pPr>
             <a:r>
-              <a:rPr lang="en-US" dirty="0" err="1" smtClean="0">
+              <a:rPr lang="en-US" dirty="0" smtClean="0">
+                <a:solidFill>
+                  <a:srgbClr val="92D050"/>
+                </a:solidFill>
+              </a:rPr>
+              <a:t>[10]</a:t>
+            </a:r>
+            <a:r>
+              <a:rPr lang="en-US" dirty="0" smtClean="0"/>
+              <a:t> </a:t>
+            </a:r>
+            <a:r>
+              <a:rPr lang="ru-RU" dirty="0" smtClean="0"/>
+              <a:t>Изменение размера шрифта </a:t>
+            </a:r>
+            <a:r>
+              <a:rPr lang="en-US" dirty="0">
                 <a:solidFill>
                   <a:srgbClr val="F6AE1E"/>
                 </a:solidFill>
               </a:rPr>
+              <a:t>(</a:t>
+            </a:r>
+            <a:r>
+              <a:rPr lang="en-US" dirty="0" err="1">
+                <a:solidFill>
+                  <a:srgbClr val="F6AE1E"/>
+                </a:solidFill>
+              </a:rPr>
               <a:t>Ctrl+Shift</a:t>
             </a:r>
             <a:r>
+              <a:rPr lang="en-US" dirty="0">
+                <a:solidFill>
+                  <a:srgbClr val="F6AE1E"/>
+                </a:solidFill>
+              </a:rPr>
+              <a:t> + &lt;/&gt; </a:t>
+            </a:r>
+            <a:r>
+              <a:rPr lang="ru-RU" dirty="0" smtClean="0">
+                <a:solidFill>
+                  <a:schemeClr val="bg1"/>
+                </a:solidFill>
+              </a:rPr>
+              <a:t>или</a:t>
+            </a:r>
+            <a:r>
               <a:rPr lang="en-US" dirty="0" smtClean="0">
                 <a:solidFill>
                   <a:srgbClr val="F6AE1E"/>
                 </a:solidFill>
               </a:rPr>
-              <a:t>+]</a:t>
-            </a:r>
-            <a:r>
-              <a:rPr lang="ru-RU" dirty="0" smtClean="0">
-                <a:solidFill>
-                  <a:schemeClr val="bg1"/>
-                </a:solidFill>
-              </a:rPr>
-              <a:t> выделение блока внутри</a:t>
+              <a:t> </a:t>
+            </a:r>
+            <a:r>
+              <a:rPr lang="en-US" dirty="0">
+                <a:solidFill>
+                  <a:srgbClr val="F6AE1E"/>
+                </a:solidFill>
+              </a:rPr>
+              <a:t>Ctrl + Mouse Scroll</a:t>
             </a:r>
             <a:r>
               <a:rPr lang="en-US" dirty="0" smtClean="0">
                 <a:solidFill>
-                  <a:schemeClr val="bg1"/>
-                </a:solidFill>
-              </a:rPr>
-              <a:t> { }. </a:t>
-            </a:r>
-            <a:r>
-              <a:rPr lang="ru-RU" dirty="0" smtClean="0">
-                <a:solidFill>
-                  <a:schemeClr val="bg1"/>
-                </a:solidFill>
-              </a:rPr>
-              <a:t>Курсор должен стоять на </a:t>
-            </a:r>
-            <a:r>
-              <a:rPr lang="en-US" dirty="0" smtClean="0">
-                <a:solidFill>
-                  <a:schemeClr val="bg1"/>
-                </a:solidFill>
-              </a:rPr>
-              <a:t>{ </a:t>
-            </a:r>
-            <a:r>
-              <a:rPr lang="ru-RU" dirty="0" smtClean="0">
-                <a:solidFill>
-                  <a:schemeClr val="bg1"/>
-                </a:solidFill>
-              </a:rPr>
-              <a:t>или </a:t>
-            </a:r>
-            <a:r>
-              <a:rPr lang="en-US" dirty="0" smtClean="0">
-                <a:solidFill>
-                  <a:schemeClr val="bg1"/>
-                </a:solidFill>
-              </a:rPr>
-              <a:t>}</a:t>
+                  <a:srgbClr val="F6AE1E"/>
+                </a:solidFill>
+              </a:rPr>
+              <a:t>)</a:t>
             </a:r>
             <a:endParaRPr lang="ru-RU" dirty="0" smtClean="0">
               <a:solidFill>
-                <a:schemeClr val="bg1"/>
+                <a:srgbClr val="F6AE1E"/>
               </a:solidFill>
             </a:endParaRPr>
           </a:p>
           <a:p>
-            <a:pPr marL="0" indent="0">
+            <a:pPr>
               <a:buClr>
                 <a:schemeClr val="bg1"/>
               </a:buClr>
-              <a:buNone/>
             </a:pPr>
-            <a:endParaRPr lang="en-US" dirty="0">
+            <a:r>
+              <a:rPr lang="en-US" dirty="0">
+                <a:solidFill>
+                  <a:srgbClr val="92D050"/>
+                </a:solidFill>
+              </a:rPr>
+              <a:t>[10]</a:t>
+            </a:r>
+            <a:r>
+              <a:rPr lang="en-US" dirty="0" smtClean="0"/>
+              <a:t> </a:t>
+            </a:r>
+            <a:r>
+              <a:rPr lang="ru-RU" dirty="0" smtClean="0"/>
+              <a:t>Многострочное редактирование</a:t>
+            </a:r>
+            <a:r>
+              <a:rPr lang="en-US" dirty="0" smtClean="0"/>
+              <a:t> </a:t>
+            </a:r>
+            <a:r>
+              <a:rPr lang="en-US" dirty="0" smtClean="0">
+                <a:solidFill>
+                  <a:srgbClr val="F6AE1E"/>
+                </a:solidFill>
+              </a:rPr>
+              <a:t>(</a:t>
+            </a:r>
+            <a:r>
+              <a:rPr lang="en-US" dirty="0" err="1">
+                <a:solidFill>
+                  <a:srgbClr val="F6AE1E"/>
+                </a:solidFill>
+              </a:rPr>
+              <a:t>Alt+Shift</a:t>
+            </a:r>
+            <a:r>
+              <a:rPr lang="en-US" dirty="0">
+                <a:solidFill>
+                  <a:srgbClr val="F6AE1E"/>
+                </a:solidFill>
+              </a:rPr>
+              <a:t> + Up/Down</a:t>
+            </a:r>
+            <a:r>
+              <a:rPr lang="en-US" dirty="0"/>
+              <a:t> </a:t>
+            </a:r>
+            <a:r>
+              <a:rPr lang="ru-RU" dirty="0" smtClean="0"/>
+              <a:t>или</a:t>
+            </a:r>
+            <a:r>
+              <a:rPr lang="en-US" dirty="0" smtClean="0"/>
+              <a:t> </a:t>
+            </a:r>
+            <a:r>
+              <a:rPr lang="en-US" dirty="0">
+                <a:solidFill>
+                  <a:srgbClr val="F6AE1E"/>
+                </a:solidFill>
+              </a:rPr>
+              <a:t>Alt + Mouse Up/Down</a:t>
+            </a:r>
+            <a:r>
+              <a:rPr lang="en-US" dirty="0" smtClean="0">
+                <a:solidFill>
+                  <a:srgbClr val="F6AE1E"/>
+                </a:solidFill>
+              </a:rPr>
+              <a:t>)</a:t>
+            </a:r>
+            <a:endParaRPr lang="ru-RU" dirty="0" smtClean="0">
               <a:solidFill>
-                <a:schemeClr val="bg1"/>
+                <a:srgbClr val="F6AE1E"/>
               </a:solidFill>
             </a:endParaRPr>
+          </a:p>
+          <a:p>
+            <a:pPr>
+              <a:buClr>
+                <a:schemeClr val="bg1"/>
+              </a:buClr>
+            </a:pPr>
+            <a:r>
+              <a:rPr lang="en-US" dirty="0" smtClean="0">
+                <a:solidFill>
+                  <a:srgbClr val="92D050"/>
+                </a:solidFill>
+              </a:rPr>
+              <a:t>[0</a:t>
+            </a:r>
+            <a:r>
+              <a:rPr lang="ru-RU" dirty="0" smtClean="0">
+                <a:solidFill>
+                  <a:srgbClr val="92D050"/>
+                </a:solidFill>
+              </a:rPr>
+              <a:t>5</a:t>
+            </a:r>
+            <a:r>
+              <a:rPr lang="en-US" dirty="0" smtClean="0">
+                <a:solidFill>
+                  <a:srgbClr val="92D050"/>
+                </a:solidFill>
+              </a:rPr>
+              <a:t>]</a:t>
+            </a:r>
+            <a:r>
+              <a:rPr lang="en-US" dirty="0" smtClean="0"/>
+              <a:t> </a:t>
+            </a:r>
+            <a:r>
+              <a:rPr lang="ru-RU" dirty="0" smtClean="0"/>
+              <a:t>Вставка текста из ц</a:t>
+            </a:r>
+            <a:r>
+              <a:rPr lang="ru-RU" dirty="0" smtClean="0">
+                <a:solidFill>
+                  <a:schemeClr val="bg1"/>
+                </a:solidFill>
+              </a:rPr>
+              <a:t>иклического буфера обмена </a:t>
+            </a:r>
+            <a:r>
+              <a:rPr lang="en-US" dirty="0">
+                <a:solidFill>
+                  <a:srgbClr val="F6AE1E"/>
+                </a:solidFill>
+              </a:rPr>
+              <a:t>(</a:t>
+            </a:r>
+            <a:r>
+              <a:rPr lang="en-US" dirty="0" err="1">
+                <a:solidFill>
+                  <a:srgbClr val="F6AE1E"/>
+                </a:solidFill>
+              </a:rPr>
+              <a:t>Ctrl+Shift</a:t>
+            </a:r>
+            <a:r>
+              <a:rPr lang="en-US" dirty="0">
+                <a:solidFill>
+                  <a:srgbClr val="F6AE1E"/>
+                </a:solidFill>
+              </a:rPr>
+              <a:t> + V</a:t>
+            </a:r>
+            <a:r>
+              <a:rPr lang="en-US" dirty="0" smtClean="0">
+                <a:solidFill>
+                  <a:srgbClr val="F6AE1E"/>
+                </a:solidFill>
+              </a:rPr>
+              <a:t>)</a:t>
+            </a:r>
+            <a:endParaRPr lang="ru-RU" dirty="0" smtClean="0">
+              <a:solidFill>
+                <a:srgbClr val="F6AE1E"/>
+              </a:solidFill>
+            </a:endParaRPr>
+          </a:p>
+          <a:p>
+            <a:pPr>
+              <a:buClr>
+                <a:schemeClr val="bg1"/>
+              </a:buClr>
+            </a:pPr>
+            <a:r>
+              <a:rPr lang="ru-RU" dirty="0" smtClean="0">
+                <a:solidFill>
+                  <a:schemeClr val="bg1"/>
+                </a:solidFill>
+              </a:rPr>
+              <a:t>Прокрутка текста без изменения положения курсора</a:t>
+            </a:r>
+            <a:r>
+              <a:rPr lang="en-US" dirty="0" smtClean="0">
+                <a:solidFill>
+                  <a:schemeClr val="bg1"/>
+                </a:solidFill>
+              </a:rPr>
+              <a:t> </a:t>
+            </a:r>
+            <a:r>
+              <a:rPr lang="en-US" dirty="0">
+                <a:solidFill>
+                  <a:srgbClr val="F6AE1E"/>
+                </a:solidFill>
+              </a:rPr>
+              <a:t>(Ctrl + Up/Down Arrow)</a:t>
+            </a:r>
           </a:p>
         </p:txBody>
       </p:sp>
     </p:spTree>
     <p:extLst>
       <p:ext uri="{BB962C8B-B14F-4D97-AF65-F5344CB8AC3E}">
-        <p14:creationId xmlns:p14="http://schemas.microsoft.com/office/powerpoint/2010/main" val="4175683496"/>
+        <p14:creationId xmlns:p14="http://schemas.microsoft.com/office/powerpoint/2010/main" val="468185828"/>
       </p:ext>
     </p:extLst>
   </p:cSld>
@@ -6901,7 +6920,11 @@
           <a:p>
             <a:r>
               <a:rPr lang="ru-RU" dirty="0" smtClean="0"/>
-              <a:t>Редактор: комментарии</a:t>
+              <a:t>Редактор</a:t>
+            </a:r>
+            <a:r>
+              <a:rPr lang="en-US" dirty="0" smtClean="0"/>
+              <a:t>: Virtual Space</a:t>
             </a:r>
             <a:endParaRPr lang="ru-RU" dirty="0"/>
           </a:p>
@@ -6919,113 +6942,58 @@
         </p:nvSpPr>
         <p:spPr/>
         <p:txBody>
-          <a:bodyPr>
-            <a:normAutofit/>
-          </a:bodyPr>
+          <a:bodyPr/>
           <a:lstStyle/>
           <a:p>
-            <a:r>
-              <a:rPr lang="en-US" sz="2800" dirty="0" err="1">
-                <a:solidFill>
-                  <a:srgbClr val="F6AE1E"/>
-                </a:solidFill>
-              </a:rPr>
-              <a:t>Ctrl+K</a:t>
-            </a:r>
-            <a:r>
-              <a:rPr lang="en-US" sz="2800" dirty="0">
-                <a:solidFill>
-                  <a:srgbClr val="F6AE1E"/>
-                </a:solidFill>
-              </a:rPr>
+            <a:pPr marL="0" indent="0">
+              <a:buNone/>
+            </a:pPr>
+            <a:r>
+              <a:rPr lang="ru-RU" dirty="0" smtClean="0"/>
+              <a:t>Если </a:t>
+            </a:r>
+            <a:r>
+              <a:rPr lang="ru-RU" dirty="0"/>
+              <a:t>включить </a:t>
+            </a:r>
+            <a:r>
+              <a:rPr lang="ru-RU" dirty="0" smtClean="0"/>
+              <a:t>переключатель «</a:t>
+            </a:r>
+            <a:r>
+              <a:rPr lang="en-US" dirty="0" smtClean="0"/>
+              <a:t>Enable virtual space</a:t>
+            </a:r>
+            <a:r>
+              <a:rPr lang="ru-RU" dirty="0" smtClean="0"/>
+              <a:t>»</a:t>
+            </a:r>
+            <a:r>
+              <a:rPr lang="en-US" dirty="0" smtClean="0"/>
               <a:t>, </a:t>
             </a:r>
             <a:r>
-              <a:rPr lang="en-US" sz="2800" dirty="0" err="1">
-                <a:solidFill>
-                  <a:srgbClr val="F6AE1E"/>
-                </a:solidFill>
-              </a:rPr>
-              <a:t>Ctrl+C</a:t>
-            </a:r>
-            <a:r>
-              <a:rPr lang="en-US" sz="2800" dirty="0">
-                <a:solidFill>
-                  <a:schemeClr val="bg1"/>
-                </a:solidFill>
-              </a:rPr>
-              <a:t> </a:t>
-            </a:r>
-            <a:r>
-              <a:rPr lang="ru-RU" sz="2800" dirty="0">
-                <a:solidFill>
-                  <a:schemeClr val="bg1"/>
-                </a:solidFill>
-              </a:rPr>
-              <a:t>закоментировать выбранные </a:t>
-            </a:r>
-            <a:r>
-              <a:rPr lang="ru-RU" sz="2800" dirty="0" smtClean="0">
-                <a:solidFill>
-                  <a:schemeClr val="bg1"/>
-                </a:solidFill>
-              </a:rPr>
-              <a:t>строки</a:t>
-            </a:r>
-          </a:p>
-          <a:p>
-            <a:r>
-              <a:rPr lang="en-US" sz="2800" dirty="0" err="1">
-                <a:solidFill>
-                  <a:srgbClr val="F6AE1E"/>
-                </a:solidFill>
-              </a:rPr>
-              <a:t>Ctrl+K</a:t>
-            </a:r>
-            <a:r>
-              <a:rPr lang="en-US" sz="2800" dirty="0">
-                <a:solidFill>
-                  <a:srgbClr val="F6AE1E"/>
-                </a:solidFill>
-              </a:rPr>
-              <a:t>, </a:t>
-            </a:r>
-            <a:r>
-              <a:rPr lang="en-US" sz="2800" dirty="0" err="1">
-                <a:solidFill>
-                  <a:srgbClr val="F6AE1E"/>
-                </a:solidFill>
-              </a:rPr>
-              <a:t>Ctrl+U</a:t>
-            </a:r>
-            <a:r>
-              <a:rPr lang="en-US" sz="2800" dirty="0"/>
-              <a:t> </a:t>
-            </a:r>
-            <a:r>
-              <a:rPr lang="ru-RU" sz="2800" dirty="0"/>
-              <a:t>снять коментарий с выбранных строк</a:t>
-            </a:r>
+              <a:rPr lang="ru-RU" dirty="0" smtClean="0"/>
+              <a:t>то курсор можно будет ставить в любой место в документе, а не только туда где введен </a:t>
+            </a:r>
+            <a:r>
+              <a:rPr lang="ru-RU" smtClean="0"/>
+              <a:t>текст. </a:t>
+            </a:r>
+            <a:endParaRPr lang="ru-RU" dirty="0"/>
           </a:p>
         </p:txBody>
       </p:sp>
     </p:spTree>
     <p:extLst>
       <p:ext uri="{BB962C8B-B14F-4D97-AF65-F5344CB8AC3E}">
-        <p14:creationId xmlns:p14="http://schemas.microsoft.com/office/powerpoint/2010/main" val="4274730761"/>
+        <p14:creationId xmlns:p14="http://schemas.microsoft.com/office/powerpoint/2010/main" val="2950142326"/>
       </p:ext>
     </p:extLst>
   </p:cSld>
   <p:clrMapOvr>
     <a:masterClrMapping/>
   </p:clrMapOvr>
-  <p:timing>
-    <p:tnLst>
-      <p:par>
-        <p:cTn id="1" dur="indefinite" restart="never" nodeType="tmRoot"/>
-      </p:par>
-    </p:tnLst>
-  </p:timing>
 </p:sld>
 </file>
 
@@ -7058,6 +7026,758 @@
         </p:nvSpPr>
         <p:spPr/>
         <p:txBody>
+          <a:bodyPr>
+            <a:normAutofit fontScale="90000"/>
+          </a:bodyPr>
+          <a:lstStyle/>
+          <a:p>
+            <a:r>
+              <a:rPr lang="ru-RU" dirty="0" smtClean="0"/>
+              <a:t>Редактор</a:t>
+            </a:r>
+            <a:r>
+              <a:rPr lang="en-US" dirty="0" smtClean="0"/>
+              <a:t>: </a:t>
+            </a:r>
+            <a:r>
+              <a:rPr lang="en-US" dirty="0" smtClean="0"/>
+              <a:t>Outlining</a:t>
+            </a:r>
+            <a:br>
+              <a:rPr lang="en-US" dirty="0" smtClean="0"/>
+            </a:br>
+            <a:r>
+              <a:rPr lang="ru-RU" dirty="0" smtClean="0"/>
+              <a:t>Свернуть выделенный блок текста</a:t>
+            </a:r>
+            <a:endParaRPr lang="ru-RU" dirty="0"/>
+          </a:p>
+        </p:txBody>
+      </p:sp>
+      <p:sp>
+        <p:nvSpPr>
+          <p:cNvPr id="3" name="Content Placeholder 2"/>
+          <p:cNvSpPr>
+            <a:spLocks noGrp="1"/>
+          </p:cNvSpPr>
+          <p:nvPr>
+            <p:ph idx="1"/>
+          </p:nvPr>
+        </p:nvSpPr>
+        <p:spPr/>
+        <p:txBody>
+          <a:bodyPr/>
+          <a:lstStyle/>
+          <a:p>
+            <a:pPr marL="0" indent="0">
+              <a:buNone/>
+            </a:pPr>
+            <a:r>
+              <a:rPr lang="ru-RU" dirty="0" smtClean="0"/>
+              <a:t>Выделяем текст, нажимаем </a:t>
+            </a:r>
+            <a:r>
+              <a:rPr lang="en-US" dirty="0" smtClean="0">
+                <a:solidFill>
+                  <a:srgbClr val="FFC000"/>
+                </a:solidFill>
+              </a:rPr>
+              <a:t>Ctrl + M, H</a:t>
+            </a:r>
+            <a:r>
+              <a:rPr lang="ru-RU" dirty="0" smtClean="0"/>
+              <a:t> и выделенный блок текста «свернется».</a:t>
+            </a:r>
+            <a:r>
+              <a:rPr lang="en-US" dirty="0" smtClean="0"/>
+              <a:t> </a:t>
+            </a:r>
+            <a:r>
+              <a:rPr lang="ru-RU" dirty="0" smtClean="0"/>
+              <a:t>Та же команда доступна в меню </a:t>
+            </a:r>
+            <a:r>
+              <a:rPr lang="en-US" dirty="0" smtClean="0"/>
+              <a:t>Edit -&gt;</a:t>
+            </a:r>
+            <a:r>
+              <a:rPr lang="ru-RU" dirty="0" smtClean="0"/>
+              <a:t> </a:t>
+            </a:r>
+            <a:r>
+              <a:rPr lang="en-US" dirty="0" smtClean="0"/>
+              <a:t>Outlining</a:t>
+            </a:r>
+            <a:r>
+              <a:rPr lang="ru-RU" dirty="0" smtClean="0"/>
+              <a:t> -</a:t>
+            </a:r>
+            <a:r>
+              <a:rPr lang="en-US" dirty="0" smtClean="0"/>
+              <a:t>&gt; Hide Selection.</a:t>
+            </a:r>
+            <a:endParaRPr lang="ru-RU" dirty="0"/>
+          </a:p>
+        </p:txBody>
+      </p:sp>
+    </p:spTree>
+    <p:extLst>
+      <p:ext uri="{BB962C8B-B14F-4D97-AF65-F5344CB8AC3E}">
+        <p14:creationId xmlns:p14="http://schemas.microsoft.com/office/powerpoint/2010/main" val="2080747852"/>
+      </p:ext>
+    </p:extLst>
+  </p:cSld>
+  <p:clrMapOvr>
+    <a:masterClrMapping/>
+  </p:clrMapOvr>
+</p:sld>
+</file>
+
+<file path=ppt/slides/slide14.xml><?xml version="1.0" encoding="utf-8"?>
+<p:sld xmlns:a="http://schemas.openxmlformats.org/drawingml/2006/main" xmlns:r="http://schemas.openxmlformats.org/officeDocument/2006/relationships" xmlns:p="http://schemas.openxmlformats.org/presentationml/2006/main">
+  <p:cSld>
+    <p:spTree>
+      <p:nvGrpSpPr>
+        <p:cNvPr id="1" name=""/>
+        <p:cNvGrpSpPr/>
+        <p:nvPr/>
+      </p:nvGrpSpPr>
+      <p:grpSpPr>
+        <a:xfrm>
+          <a:off x="0" y="0"/>
+          <a:ext cx="0" cy="0"/>
+          <a:chOff x="0" y="0"/>
+          <a:chExt cx="0" cy="0"/>
+        </a:xfrm>
+      </p:grpSpPr>
+      <p:sp>
+        <p:nvSpPr>
+          <p:cNvPr id="2" name="Title 1"/>
+          <p:cNvSpPr>
+            <a:spLocks noGrp="1"/>
+          </p:cNvSpPr>
+          <p:nvPr>
+            <p:ph type="title"/>
+          </p:nvPr>
+        </p:nvSpPr>
+        <p:spPr/>
+        <p:txBody>
+          <a:bodyPr/>
+          <a:lstStyle/>
+          <a:p>
+            <a:r>
+              <a:rPr lang="ru-RU" dirty="0" smtClean="0"/>
+              <a:t>Редактор</a:t>
+            </a:r>
+            <a:r>
+              <a:rPr lang="en-US" dirty="0" smtClean="0"/>
+              <a:t>: </a:t>
+            </a:r>
+            <a:r>
+              <a:rPr lang="ru-RU" dirty="0" smtClean="0"/>
+              <a:t>Поиск текста</a:t>
+            </a:r>
+            <a:endParaRPr lang="en-US" dirty="0"/>
+          </a:p>
+        </p:txBody>
+      </p:sp>
+      <p:sp>
+        <p:nvSpPr>
+          <p:cNvPr id="3" name="Content Placeholder 2"/>
+          <p:cNvSpPr>
+            <a:spLocks noGrp="1"/>
+          </p:cNvSpPr>
+          <p:nvPr>
+            <p:ph idx="1"/>
+          </p:nvPr>
+        </p:nvSpPr>
+        <p:spPr/>
+        <p:txBody>
+          <a:bodyPr>
+            <a:normAutofit fontScale="85000" lnSpcReduction="10000"/>
+          </a:bodyPr>
+          <a:lstStyle/>
+          <a:p>
+            <a:pPr>
+              <a:buClr>
+                <a:schemeClr val="bg1"/>
+              </a:buClr>
+            </a:pPr>
+            <a:r>
+              <a:rPr lang="en-US" dirty="0" err="1" smtClean="0">
+                <a:solidFill>
+                  <a:srgbClr val="F6AE1E"/>
+                </a:solidFill>
+              </a:rPr>
+              <a:t>Ctrl+I</a:t>
+            </a:r>
+            <a:r>
+              <a:rPr lang="ru-RU" dirty="0" smtClean="0">
+                <a:solidFill>
+                  <a:schemeClr val="bg1"/>
+                </a:solidFill>
+              </a:rPr>
+              <a:t> поиск</a:t>
+            </a:r>
+          </a:p>
+          <a:p>
+            <a:pPr>
+              <a:buClr>
+                <a:schemeClr val="bg1"/>
+              </a:buClr>
+            </a:pPr>
+            <a:r>
+              <a:rPr lang="en-US" dirty="0">
+                <a:solidFill>
+                  <a:srgbClr val="F6AE1E"/>
+                </a:solidFill>
+              </a:rPr>
+              <a:t>F3/Shift+F3</a:t>
+            </a:r>
+            <a:r>
+              <a:rPr lang="en-US" dirty="0" smtClean="0">
+                <a:solidFill>
+                  <a:schemeClr val="bg1"/>
+                </a:solidFill>
+              </a:rPr>
+              <a:t> </a:t>
+            </a:r>
+            <a:r>
+              <a:rPr lang="ru-RU" dirty="0" smtClean="0">
+                <a:solidFill>
+                  <a:schemeClr val="bg1"/>
+                </a:solidFill>
+              </a:rPr>
+              <a:t>найти следующее/предыдущее вхождение строки</a:t>
+            </a:r>
+          </a:p>
+          <a:p>
+            <a:pPr>
+              <a:buClr>
+                <a:schemeClr val="bg1"/>
+              </a:buClr>
+            </a:pPr>
+            <a:r>
+              <a:rPr lang="en-US" dirty="0">
+                <a:solidFill>
+                  <a:srgbClr val="F6AE1E"/>
+                </a:solidFill>
+              </a:rPr>
+              <a:t>Ctrl+F3</a:t>
+            </a:r>
+            <a:r>
+              <a:rPr lang="en-US" dirty="0" smtClean="0">
+                <a:solidFill>
+                  <a:schemeClr val="bg1"/>
+                </a:solidFill>
+              </a:rPr>
+              <a:t> </a:t>
+            </a:r>
+            <a:r>
+              <a:rPr lang="ru-RU" dirty="0" smtClean="0">
+                <a:solidFill>
+                  <a:schemeClr val="bg1"/>
+                </a:solidFill>
+              </a:rPr>
+              <a:t>найти следующее вхождение выделенного текста</a:t>
+            </a:r>
+          </a:p>
+          <a:p>
+            <a:pPr>
+              <a:buClr>
+                <a:schemeClr val="bg1"/>
+              </a:buClr>
+            </a:pPr>
+            <a:r>
+              <a:rPr lang="en-US" dirty="0" err="1">
+                <a:solidFill>
+                  <a:srgbClr val="F6AE1E"/>
+                </a:solidFill>
+              </a:rPr>
+              <a:t>Ctrl+Shift+F</a:t>
+            </a:r>
+            <a:r>
+              <a:rPr lang="en-US" dirty="0" smtClean="0">
+                <a:solidFill>
+                  <a:schemeClr val="bg1"/>
+                </a:solidFill>
+              </a:rPr>
+              <a:t> </a:t>
+            </a:r>
+            <a:r>
+              <a:rPr lang="ru-RU" dirty="0" smtClean="0">
+                <a:solidFill>
+                  <a:schemeClr val="bg1"/>
+                </a:solidFill>
+              </a:rPr>
+              <a:t>найти в </a:t>
+            </a:r>
+            <a:r>
+              <a:rPr lang="en-US" dirty="0" smtClean="0">
+                <a:solidFill>
+                  <a:schemeClr val="bg1"/>
+                </a:solidFill>
+              </a:rPr>
+              <a:t>solution</a:t>
+            </a:r>
+          </a:p>
+          <a:p>
+            <a:pPr marL="0" indent="0">
+              <a:buClr>
+                <a:schemeClr val="bg1"/>
+              </a:buClr>
+              <a:buNone/>
+            </a:pPr>
+            <a:endParaRPr lang="ru-RU" dirty="0" smtClean="0">
+              <a:solidFill>
+                <a:schemeClr val="bg1"/>
+              </a:solidFill>
+            </a:endParaRPr>
+          </a:p>
+          <a:p>
+            <a:pPr>
+              <a:buClr>
+                <a:schemeClr val="bg1"/>
+              </a:buClr>
+            </a:pPr>
+            <a:endParaRPr lang="ru-RU" dirty="0">
+              <a:solidFill>
+                <a:schemeClr val="bg1"/>
+              </a:solidFill>
+            </a:endParaRPr>
+          </a:p>
+          <a:p>
+            <a:pPr marL="0" indent="0">
+              <a:buClr>
+                <a:schemeClr val="bg1"/>
+              </a:buClr>
+              <a:buNone/>
+            </a:pPr>
+            <a:r>
+              <a:rPr lang="en-US" dirty="0">
+                <a:solidFill>
+                  <a:schemeClr val="bg1"/>
+                </a:solidFill>
+                <a:hlinkClick r:id="rId2"/>
+              </a:rPr>
+              <a:t>http://</a:t>
+            </a:r>
+            <a:r>
+              <a:rPr lang="en-US" dirty="0" smtClean="0">
+                <a:solidFill>
+                  <a:schemeClr val="bg1"/>
+                </a:solidFill>
+                <a:hlinkClick r:id="rId2"/>
+              </a:rPr>
+              <a:t>weblogs.asp.net/scottgu/archive/2010/08/24/search-and-navigation-tips-tricks-with-visual-studio.aspx</a:t>
+            </a:r>
+            <a:endParaRPr lang="ru-RU" dirty="0" smtClean="0">
+              <a:solidFill>
+                <a:schemeClr val="bg1"/>
+              </a:solidFill>
+            </a:endParaRPr>
+          </a:p>
+          <a:p>
+            <a:pPr marL="0" indent="0">
+              <a:buClr>
+                <a:schemeClr val="bg1"/>
+              </a:buClr>
+              <a:buNone/>
+            </a:pPr>
+            <a:endParaRPr lang="en-US" dirty="0">
+              <a:solidFill>
+                <a:schemeClr val="bg1"/>
+              </a:solidFill>
+            </a:endParaRPr>
+          </a:p>
+        </p:txBody>
+      </p:sp>
+    </p:spTree>
+    <p:extLst>
+      <p:ext uri="{BB962C8B-B14F-4D97-AF65-F5344CB8AC3E}">
+        <p14:creationId xmlns:p14="http://schemas.microsoft.com/office/powerpoint/2010/main" val="1967395690"/>
+      </p:ext>
+    </p:extLst>
+  </p:cSld>
+  <p:clrMapOvr>
+    <a:masterClrMapping/>
+  </p:clrMapOvr>
+  <p:timing>
+    <p:tnLst>
+      <p:par>
+        <p:cTn id="1" dur="indefinite" restart="never" nodeType="tmRoot"/>
+      </p:par>
+    </p:tnLst>
+  </p:timing>
+</p:sld>
+</file>
+
+<file path=ppt/slides/slide15.xml><?xml version="1.0" encoding="utf-8"?>
+<p:sld xmlns:a="http://schemas.openxmlformats.org/drawingml/2006/main" xmlns:r="http://schemas.openxmlformats.org/officeDocument/2006/relationships" xmlns:p="http://schemas.openxmlformats.org/presentationml/2006/main">
+  <p:cSld>
+    <p:spTree>
+      <p:nvGrpSpPr>
+        <p:cNvPr id="1" name=""/>
+        <p:cNvGrpSpPr/>
+        <p:nvPr/>
+      </p:nvGrpSpPr>
+      <p:grpSpPr>
+        <a:xfrm>
+          <a:off x="0" y="0"/>
+          <a:ext cx="0" cy="0"/>
+          <a:chOff x="0" y="0"/>
+          <a:chExt cx="0" cy="0"/>
+        </a:xfrm>
+      </p:grpSpPr>
+      <p:sp>
+        <p:nvSpPr>
+          <p:cNvPr id="2" name="Title 1"/>
+          <p:cNvSpPr>
+            <a:spLocks noGrp="1"/>
+          </p:cNvSpPr>
+          <p:nvPr>
+            <p:ph type="title"/>
+          </p:nvPr>
+        </p:nvSpPr>
+        <p:spPr/>
+        <p:txBody>
+          <a:bodyPr/>
+          <a:lstStyle/>
+          <a:p>
+            <a:r>
+              <a:rPr lang="ru-RU" dirty="0" smtClean="0"/>
+              <a:t>Редактор</a:t>
+            </a:r>
+            <a:r>
+              <a:rPr lang="en-US" dirty="0" smtClean="0"/>
+              <a:t>: </a:t>
+            </a:r>
+            <a:r>
+              <a:rPr lang="ru-RU" dirty="0" smtClean="0"/>
+              <a:t>Выделение текста</a:t>
+            </a:r>
+            <a:endParaRPr lang="en-US" dirty="0"/>
+          </a:p>
+        </p:txBody>
+      </p:sp>
+      <p:sp>
+        <p:nvSpPr>
+          <p:cNvPr id="3" name="Content Placeholder 2"/>
+          <p:cNvSpPr>
+            <a:spLocks noGrp="1"/>
+          </p:cNvSpPr>
+          <p:nvPr>
+            <p:ph idx="1"/>
+          </p:nvPr>
+        </p:nvSpPr>
+        <p:spPr/>
+        <p:txBody>
+          <a:bodyPr>
+            <a:normAutofit/>
+          </a:bodyPr>
+          <a:lstStyle/>
+          <a:p>
+            <a:pPr>
+              <a:buClr>
+                <a:schemeClr val="bg1"/>
+              </a:buClr>
+            </a:pPr>
+            <a:r>
+              <a:rPr lang="en-US" dirty="0" err="1" smtClean="0">
+                <a:solidFill>
+                  <a:srgbClr val="F6AE1E"/>
+                </a:solidFill>
+              </a:rPr>
+              <a:t>Ctrl+Shift</a:t>
+            </a:r>
+            <a:r>
+              <a:rPr lang="en-US" dirty="0" smtClean="0">
+                <a:solidFill>
+                  <a:srgbClr val="F6AE1E"/>
+                </a:solidFill>
+              </a:rPr>
+              <a:t>+]</a:t>
+            </a:r>
+            <a:r>
+              <a:rPr lang="ru-RU" dirty="0" smtClean="0">
+                <a:solidFill>
+                  <a:schemeClr val="bg1"/>
+                </a:solidFill>
+              </a:rPr>
+              <a:t> выделение блока внутри</a:t>
+            </a:r>
+            <a:r>
+              <a:rPr lang="en-US" dirty="0" smtClean="0">
+                <a:solidFill>
+                  <a:schemeClr val="bg1"/>
+                </a:solidFill>
+              </a:rPr>
+              <a:t> { }. </a:t>
+            </a:r>
+            <a:r>
+              <a:rPr lang="ru-RU" dirty="0" smtClean="0">
+                <a:solidFill>
+                  <a:schemeClr val="bg1"/>
+                </a:solidFill>
+              </a:rPr>
+              <a:t>Курсор должен стоять на </a:t>
+            </a:r>
+            <a:r>
+              <a:rPr lang="en-US" dirty="0" smtClean="0">
+                <a:solidFill>
+                  <a:schemeClr val="bg1"/>
+                </a:solidFill>
+              </a:rPr>
+              <a:t>{ </a:t>
+            </a:r>
+            <a:r>
+              <a:rPr lang="ru-RU" dirty="0" smtClean="0">
+                <a:solidFill>
+                  <a:schemeClr val="bg1"/>
+                </a:solidFill>
+              </a:rPr>
+              <a:t>или </a:t>
+            </a:r>
+            <a:r>
+              <a:rPr lang="en-US" dirty="0" smtClean="0">
+                <a:solidFill>
+                  <a:schemeClr val="bg1"/>
+                </a:solidFill>
+              </a:rPr>
+              <a:t>}</a:t>
+            </a:r>
+            <a:endParaRPr lang="ru-RU" dirty="0" smtClean="0">
+              <a:solidFill>
+                <a:schemeClr val="bg1"/>
+              </a:solidFill>
+            </a:endParaRPr>
+          </a:p>
+          <a:p>
+            <a:pPr marL="0" indent="0">
+              <a:buClr>
+                <a:schemeClr val="bg1"/>
+              </a:buClr>
+              <a:buNone/>
+            </a:pPr>
+            <a:endParaRPr lang="en-US" dirty="0">
+              <a:solidFill>
+                <a:schemeClr val="bg1"/>
+              </a:solidFill>
+            </a:endParaRPr>
+          </a:p>
+        </p:txBody>
+      </p:sp>
+    </p:spTree>
+    <p:extLst>
+      <p:ext uri="{BB962C8B-B14F-4D97-AF65-F5344CB8AC3E}">
+        <p14:creationId xmlns:p14="http://schemas.microsoft.com/office/powerpoint/2010/main" val="4175683496"/>
+      </p:ext>
+    </p:extLst>
+  </p:cSld>
+  <p:clrMapOvr>
+    <a:masterClrMapping/>
+  </p:clrMapOvr>
+  <p:timing>
+    <p:tnLst>
+      <p:par>
+        <p:cTn id="1" dur="indefinite" restart="never" nodeType="tmRoot"/>
+      </p:par>
+    </p:tnLst>
+  </p:timing>
+</p:sld>
+</file>
+
+<file path=ppt/slides/slide16.xml><?xml version="1.0" encoding="utf-8"?>
+<p:sld xmlns:a="http://schemas.openxmlformats.org/drawingml/2006/main" xmlns:r="http://schemas.openxmlformats.org/officeDocument/2006/relationships" xmlns:p="http://schemas.openxmlformats.org/presentationml/2006/main">
+  <p:cSld>
+    <p:spTree>
+      <p:nvGrpSpPr>
+        <p:cNvPr id="1" name=""/>
+        <p:cNvGrpSpPr/>
+        <p:nvPr/>
+      </p:nvGrpSpPr>
+      <p:grpSpPr>
+        <a:xfrm>
+          <a:off x="0" y="0"/>
+          <a:ext cx="0" cy="0"/>
+          <a:chOff x="0" y="0"/>
+          <a:chExt cx="0" cy="0"/>
+        </a:xfrm>
+      </p:grpSpPr>
+      <p:sp>
+        <p:nvSpPr>
+          <p:cNvPr id="2" name="Title 1"/>
+          <p:cNvSpPr>
+            <a:spLocks noGrp="1"/>
+          </p:cNvSpPr>
+          <p:nvPr>
+            <p:ph type="title"/>
+          </p:nvPr>
+        </p:nvSpPr>
+        <p:spPr/>
+        <p:txBody>
+          <a:bodyPr/>
+          <a:lstStyle/>
+          <a:p>
+            <a:r>
+              <a:rPr lang="ru-RU" dirty="0" smtClean="0"/>
+              <a:t>Редактор: комментарии</a:t>
+            </a:r>
+            <a:endParaRPr lang="ru-RU" dirty="0"/>
+          </a:p>
+        </p:txBody>
+      </p:sp>
+      <p:sp>
+        <p:nvSpPr>
+          <p:cNvPr id="3" name="Content Placeholder 2"/>
+          <p:cNvSpPr>
+            <a:spLocks noGrp="1"/>
+          </p:cNvSpPr>
+          <p:nvPr>
+            <p:ph idx="1"/>
+          </p:nvPr>
+        </p:nvSpPr>
+        <p:spPr/>
+        <p:txBody>
+          <a:bodyPr>
+            <a:normAutofit/>
+          </a:bodyPr>
+          <a:lstStyle/>
+          <a:p>
+            <a:r>
+              <a:rPr lang="en-US" sz="2800" dirty="0" err="1">
+                <a:solidFill>
+                  <a:srgbClr val="F6AE1E"/>
+                </a:solidFill>
+              </a:rPr>
+              <a:t>Ctrl+K</a:t>
+            </a:r>
+            <a:r>
+              <a:rPr lang="en-US" sz="2800" dirty="0">
+                <a:solidFill>
+                  <a:srgbClr val="F6AE1E"/>
+                </a:solidFill>
+              </a:rPr>
+              <a:t>, </a:t>
+            </a:r>
+            <a:r>
+              <a:rPr lang="en-US" sz="2800" dirty="0" err="1">
+                <a:solidFill>
+                  <a:srgbClr val="F6AE1E"/>
+                </a:solidFill>
+              </a:rPr>
+              <a:t>Ctrl+C</a:t>
+            </a:r>
+            <a:r>
+              <a:rPr lang="en-US" sz="2800" dirty="0">
+                <a:solidFill>
+                  <a:schemeClr val="bg1"/>
+                </a:solidFill>
+              </a:rPr>
+              <a:t> </a:t>
+            </a:r>
+            <a:r>
+              <a:rPr lang="ru-RU" sz="2800" dirty="0">
+                <a:solidFill>
+                  <a:schemeClr val="bg1"/>
+                </a:solidFill>
+              </a:rPr>
+              <a:t>закоментировать выбранные </a:t>
+            </a:r>
+            <a:r>
+              <a:rPr lang="ru-RU" sz="2800" dirty="0" smtClean="0">
+                <a:solidFill>
+                  <a:schemeClr val="bg1"/>
+                </a:solidFill>
+              </a:rPr>
+              <a:t>строки</a:t>
+            </a:r>
+          </a:p>
+          <a:p>
+            <a:r>
+              <a:rPr lang="en-US" sz="2800" dirty="0" err="1">
+                <a:solidFill>
+                  <a:srgbClr val="F6AE1E"/>
+                </a:solidFill>
+              </a:rPr>
+              <a:t>Ctrl+K</a:t>
+            </a:r>
+            <a:r>
+              <a:rPr lang="en-US" sz="2800" dirty="0">
+                <a:solidFill>
+                  <a:srgbClr val="F6AE1E"/>
+                </a:solidFill>
+              </a:rPr>
+              <a:t>, </a:t>
+            </a:r>
+            <a:r>
+              <a:rPr lang="en-US" sz="2800" dirty="0" err="1">
+                <a:solidFill>
+                  <a:srgbClr val="F6AE1E"/>
+                </a:solidFill>
+              </a:rPr>
+              <a:t>Ctrl+U</a:t>
+            </a:r>
+            <a:r>
+              <a:rPr lang="en-US" sz="2800" dirty="0"/>
+              <a:t> </a:t>
+            </a:r>
+            <a:r>
+              <a:rPr lang="ru-RU" sz="2800" dirty="0"/>
+              <a:t>снять коментарий с выбранных строк</a:t>
+            </a:r>
+          </a:p>
+        </p:txBody>
+      </p:sp>
+    </p:spTree>
+    <p:extLst>
+      <p:ext uri="{BB962C8B-B14F-4D97-AF65-F5344CB8AC3E}">
+        <p14:creationId xmlns:p14="http://schemas.microsoft.com/office/powerpoint/2010/main" val="4274730761"/>
+      </p:ext>
+    </p:extLst>
+  </p:cSld>
+  <p:clrMapOvr>
+    <a:masterClrMapping/>
+  </p:clrMapOvr>
+  <p:timing>
+    <p:tnLst>
+      <p:par>
+        <p:cTn id="1" dur="indefinite" restart="never" nodeType="tmRoot"/>
+      </p:par>
+    </p:tnLst>
+  </p:timing>
+</p:sld>
+</file>
+
+<file path=ppt/slides/slide17.xml><?xml version="1.0" encoding="utf-8"?>
+<p:sld xmlns:a="http://schemas.openxmlformats.org/drawingml/2006/main" xmlns:r="http://schemas.openxmlformats.org/officeDocument/2006/relationships" xmlns:p="http://schemas.openxmlformats.org/presentationml/2006/main">
+  <p:cSld>
+    <p:spTree>
+      <p:nvGrpSpPr>
+        <p:cNvPr id="1" name=""/>
+        <p:cNvGrpSpPr/>
+        <p:nvPr/>
+      </p:nvGrpSpPr>
+      <p:grpSpPr>
+        <a:xfrm>
+          <a:off x="0" y="0"/>
+          <a:ext cx="0" cy="0"/>
+          <a:chOff x="0" y="0"/>
+          <a:chExt cx="0" cy="0"/>
+        </a:xfrm>
+      </p:grpSpPr>
+      <p:sp>
+        <p:nvSpPr>
+          <p:cNvPr id="2" name="Title 1"/>
+          <p:cNvSpPr>
+            <a:spLocks noGrp="1"/>
+          </p:cNvSpPr>
+          <p:nvPr>
+            <p:ph type="title"/>
+          </p:nvPr>
+        </p:nvSpPr>
+        <p:spPr/>
+        <p:txBody>
           <a:bodyPr/>
           <a:lstStyle/>
           <a:p>
@@ -7235,7 +7955,7 @@
 </p:sld>
 </file>
 
-<file path=ppt/slides/slide14.xml><?xml version="1.0" encoding="utf-8"?>
+<file path=ppt/slides/slide18.xml><?xml version="1.0" encoding="utf-8"?>
 <p:sld xmlns:a="http://schemas.openxmlformats.org/drawingml/2006/main" xmlns:r="http://schemas.openxmlformats.org/officeDocument/2006/relationships" xmlns:p="http://schemas.openxmlformats.org/presentationml/2006/main">
   <p:cSld>
     <p:bg>
@@ -7643,7 +8363,7 @@
 </p:sld>
 </file>
 
-<file path=ppt/slides/slide15.xml><?xml version="1.0" encoding="utf-8"?>
+<file path=ppt/slides/slide19.xml><?xml version="1.0" encoding="utf-8"?>
 <p:sld xmlns:a="http://schemas.openxmlformats.org/drawingml/2006/main" xmlns:r="http://schemas.openxmlformats.org/officeDocument/2006/relationships" xmlns:p="http://schemas.openxmlformats.org/presentationml/2006/main">
   <p:cSld>
     <p:spTree>
@@ -7754,7 +8474,98 @@
 </p:sld>
 </file>
 
-<file path=ppt/slides/slide16.xml><?xml version="1.0" encoding="utf-8"?>
+<file path=ppt/slides/slide2.xml><?xml version="1.0" encoding="utf-8"?>
+<p:sld xmlns:a="http://schemas.openxmlformats.org/drawingml/2006/main" xmlns:r="http://schemas.openxmlformats.org/officeDocument/2006/relationships" xmlns:p="http://schemas.openxmlformats.org/presentationml/2006/main" show="0">
+  <p:cSld>
+    <p:spTree>
+      <p:nvGrpSpPr>
+        <p:cNvPr id="1" name=""/>
+        <p:cNvGrpSpPr/>
+        <p:nvPr/>
+      </p:nvGrpSpPr>
+      <p:grpSpPr>
+        <a:xfrm>
+          <a:off x="0" y="0"/>
+          <a:ext cx="0" cy="0"/>
+          <a:chOff x="0" y="0"/>
+          <a:chExt cx="0" cy="0"/>
+        </a:xfrm>
+      </p:grpSpPr>
+      <p:sp>
+        <p:nvSpPr>
+          <p:cNvPr id="2" name="Title 1"/>
+          <p:cNvSpPr>
+            <a:spLocks noGrp="1"/>
+          </p:cNvSpPr>
+          <p:nvPr>
+            <p:ph type="title"/>
+          </p:nvPr>
+        </p:nvSpPr>
+        <p:spPr/>
+        <p:txBody>
+          <a:bodyPr/>
+          <a:lstStyle/>
+          <a:p>
+            <a:r>
+              <a:rPr lang="ru-RU" dirty="0" smtClean="0"/>
+              <a:t>Литература</a:t>
+            </a:r>
+            <a:endParaRPr lang="en-US" dirty="0"/>
+          </a:p>
+        </p:txBody>
+      </p:sp>
+      <p:sp>
+        <p:nvSpPr>
+          <p:cNvPr id="3" name="Content Placeholder 2"/>
+          <p:cNvSpPr>
+            <a:spLocks noGrp="1"/>
+          </p:cNvSpPr>
+          <p:nvPr>
+            <p:ph idx="1"/>
+          </p:nvPr>
+        </p:nvSpPr>
+        <p:spPr/>
+        <p:txBody>
+          <a:bodyPr/>
+          <a:lstStyle/>
+          <a:p>
+            <a:r>
+              <a:rPr lang="en-US" dirty="0" smtClean="0"/>
+              <a:t>TODO!</a:t>
+            </a:r>
+            <a:endParaRPr lang="en-US" dirty="0"/>
+          </a:p>
+        </p:txBody>
+      </p:sp>
+    </p:spTree>
+    <p:extLst>
+      <p:ext uri="{BB962C8B-B14F-4D97-AF65-F5344CB8AC3E}">
+        <p14:creationId xmlns:p14="http://schemas.microsoft.com/office/powerpoint/2010/main" val="1333002201"/>
+      </p:ext>
+    </p:extLst>
+  </p:cSld>
+  <p:clrMapOvr>
+    <a:masterClrMapping/>
+  </p:clrMapOvr>
+  <mc:AlternateContent xmlns:mc="http://schemas.openxmlformats.org/markup-compatibility/2006" xmlns:p14="http://schemas.microsoft.com/office/powerpoint/2010/main">
+    <mc:Choice Requires="p14">
+      <p:transition spd="slow" p14:dur="2000"/>
+    </mc:Choice>
+    <mc:Fallback xmlns="">
+      <p:transition spd="slow"/>
+    </mc:Fallback>
+  </mc:AlternateContent>
+  <p:timing>
+    <p:tnLst>
+      <p:par>
+        <p:cTn id="1" dur="indefinite" restart="never" nodeType="tmRoot"/>
+      </p:par>
+    </p:tnLst>
+  </p:timing>
+</p:sld>
+</file>
+
+<file path=ppt/slides/slide20.xml><?xml version="1.0" encoding="utf-8"?>
 <p:sld xmlns:a="http://schemas.openxmlformats.org/drawingml/2006/main" xmlns:r="http://schemas.openxmlformats.org/officeDocument/2006/relationships" xmlns:p="http://schemas.openxmlformats.org/presentationml/2006/main">
   <p:cSld>
     <p:bg>
@@ -7981,7 +8792,7 @@
 </p:sld>
 </file>
 
-<file path=ppt/slides/slide17.xml><?xml version="1.0" encoding="utf-8"?>
+<file path=ppt/slides/slide21.xml><?xml version="1.0" encoding="utf-8"?>
 <p:sld xmlns:a="http://schemas.openxmlformats.org/drawingml/2006/main" xmlns:r="http://schemas.openxmlformats.org/officeDocument/2006/relationships" xmlns:p="http://schemas.openxmlformats.org/presentationml/2006/main">
   <p:cSld>
     <p:spTree>
@@ -8239,7 +9050,7 @@
 </p:sld>
 </file>
 
-<file path=ppt/slides/slide18.xml><?xml version="1.0" encoding="utf-8"?>
+<file path=ppt/slides/slide22.xml><?xml version="1.0" encoding="utf-8"?>
 <p:sld xmlns:a="http://schemas.openxmlformats.org/drawingml/2006/main" xmlns:r="http://schemas.openxmlformats.org/officeDocument/2006/relationships" xmlns:p="http://schemas.openxmlformats.org/presentationml/2006/main">
   <p:cSld>
     <p:spTree>
@@ -9496,7 +10307,7 @@
 </p:sld>
 </file>
 
-<file path=ppt/slides/slide19.xml><?xml version="1.0" encoding="utf-8"?>
+<file path=ppt/slides/slide23.xml><?xml version="1.0" encoding="utf-8"?>
 <p:sld xmlns:a="http://schemas.openxmlformats.org/drawingml/2006/main" xmlns:r="http://schemas.openxmlformats.org/officeDocument/2006/relationships" xmlns:p="http://schemas.openxmlformats.org/presentationml/2006/main">
   <p:cSld>
     <p:bg>
@@ -9693,98 +10504,7 @@
 </p:sld>
 </file>
 
-<file path=ppt/slides/slide2.xml><?xml version="1.0" encoding="utf-8"?>
-<p:sld xmlns:a="http://schemas.openxmlformats.org/drawingml/2006/main" xmlns:r="http://schemas.openxmlformats.org/officeDocument/2006/relationships" xmlns:p="http://schemas.openxmlformats.org/presentationml/2006/main" show="0">
-  <p:cSld>
-    <p:spTree>
-      <p:nvGrpSpPr>
-        <p:cNvPr id="1" name=""/>
-        <p:cNvGrpSpPr/>
-        <p:nvPr/>
-      </p:nvGrpSpPr>
-      <p:grpSpPr>
-        <a:xfrm>
-          <a:off x="0" y="0"/>
-          <a:ext cx="0" cy="0"/>
-          <a:chOff x="0" y="0"/>
-          <a:chExt cx="0" cy="0"/>
-        </a:xfrm>
-      </p:grpSpPr>
-      <p:sp>
-        <p:nvSpPr>
-          <p:cNvPr id="2" name="Title 1"/>
-          <p:cNvSpPr>
-            <a:spLocks noGrp="1"/>
-          </p:cNvSpPr>
-          <p:nvPr>
-            <p:ph type="title"/>
-          </p:nvPr>
-        </p:nvSpPr>
-        <p:spPr/>
-        <p:txBody>
-          <a:bodyPr/>
-          <a:lstStyle/>
-          <a:p>
-            <a:r>
-              <a:rPr lang="ru-RU" dirty="0" smtClean="0"/>
-              <a:t>Литература</a:t>
-            </a:r>
-            <a:endParaRPr lang="en-US" dirty="0"/>
-          </a:p>
-        </p:txBody>
-      </p:sp>
-      <p:sp>
-        <p:nvSpPr>
-          <p:cNvPr id="3" name="Content Placeholder 2"/>
-          <p:cNvSpPr>
-            <a:spLocks noGrp="1"/>
-          </p:cNvSpPr>
-          <p:nvPr>
-            <p:ph idx="1"/>
-          </p:nvPr>
-        </p:nvSpPr>
-        <p:spPr/>
-        <p:txBody>
-          <a:bodyPr/>
-          <a:lstStyle/>
-          <a:p>
-            <a:r>
-              <a:rPr lang="en-US" dirty="0" smtClean="0"/>
-              <a:t>TODO!</a:t>
-            </a:r>
-            <a:endParaRPr lang="en-US" dirty="0"/>
-          </a:p>
-        </p:txBody>
-      </p:sp>
-    </p:spTree>
-    <p:extLst>
-      <p:ext uri="{BB962C8B-B14F-4D97-AF65-F5344CB8AC3E}">
-        <p14:creationId xmlns:p14="http://schemas.microsoft.com/office/powerpoint/2010/main" val="1333002201"/>
-      </p:ext>
-    </p:extLst>
-  </p:cSld>
-  <p:clrMapOvr>
-    <a:masterClrMapping/>
-  </p:clrMapOvr>
-  <mc:AlternateContent xmlns:mc="http://schemas.openxmlformats.org/markup-compatibility/2006" xmlns:p14="http://schemas.microsoft.com/office/powerpoint/2010/main">
-    <mc:Choice Requires="p14">
-      <p:transition spd="slow" p14:dur="2000"/>
-    </mc:Choice>
-    <mc:Fallback xmlns="">
-      <p:transition spd="slow"/>
-    </mc:Fallback>
-  </mc:AlternateContent>
-  <p:timing>
-    <p:tnLst>
-      <p:par>
-        <p:cTn id="1" dur="indefinite" restart="never" nodeType="tmRoot"/>
-      </p:par>
-    </p:tnLst>
-  </p:timing>
-</p:sld>
-</file>
-
-<file path=ppt/slides/slide20.xml><?xml version="1.0" encoding="utf-8"?>
+<file path=ppt/slides/slide24.xml><?xml version="1.0" encoding="utf-8"?>
 <p:sld xmlns:a="http://schemas.openxmlformats.org/drawingml/2006/main" xmlns:r="http://schemas.openxmlformats.org/officeDocument/2006/relationships" xmlns:p="http://schemas.openxmlformats.org/presentationml/2006/main">
   <p:cSld>
     <p:bg>
@@ -9992,7 +10712,7 @@
 </p:sld>
 </file>
 
-<file path=ppt/slides/slide21.xml><?xml version="1.0" encoding="utf-8"?>
+<file path=ppt/slides/slide25.xml><?xml version="1.0" encoding="utf-8"?>
 <p:sld xmlns:a="http://schemas.openxmlformats.org/drawingml/2006/main" xmlns:r="http://schemas.openxmlformats.org/officeDocument/2006/relationships" xmlns:p="http://schemas.openxmlformats.org/presentationml/2006/main">
   <p:cSld>
     <p:spTree>
@@ -10064,7 +10784,7 @@
 </p:sld>
 </file>
 
-<file path=ppt/slides/slide22.xml><?xml version="1.0" encoding="utf-8"?>
+<file path=ppt/slides/slide26.xml><?xml version="1.0" encoding="utf-8"?>
 <p:sld xmlns:a="http://schemas.openxmlformats.org/drawingml/2006/main" xmlns:r="http://schemas.openxmlformats.org/officeDocument/2006/relationships" xmlns:p="http://schemas.openxmlformats.org/presentationml/2006/main">
   <p:cSld>
     <p:spTree>
@@ -10338,7 +11058,7 @@
 </p:sld>
 </file>
 
-<file path=ppt/slides/slide23.xml><?xml version="1.0" encoding="utf-8"?>
+<file path=ppt/slides/slide27.xml><?xml version="1.0" encoding="utf-8"?>
 <p:sld xmlns:a="http://schemas.openxmlformats.org/drawingml/2006/main" xmlns:r="http://schemas.openxmlformats.org/officeDocument/2006/relationships" xmlns:p="http://schemas.openxmlformats.org/presentationml/2006/main">
   <p:cSld>
     <p:spTree>
@@ -11132,11 +11852,7 @@
             </a:pPr>
             <a:r>
               <a:rPr lang="ru-RU" dirty="0" smtClean="0"/>
-              <a:t>Также не забывайте, </a:t>
-            </a:r>
-            <a:r>
-              <a:rPr lang="ru-RU" dirty="0" smtClean="0"/>
-              <a:t>что </a:t>
+              <a:t>Также не забывайте, что </a:t>
             </a:r>
             <a:r>
               <a:rPr lang="en-US" dirty="0" smtClean="0"/>
@@ -11663,328 +12379,39 @@
               <a:rPr lang="ru-RU" dirty="0" smtClean="0"/>
               <a:t>Редактор</a:t>
             </a:r>
-            <a:endParaRPr lang="en-US" dirty="0"/>
+            <a:endParaRPr lang="ru-RU" dirty="0"/>
           </a:p>
         </p:txBody>
       </p:sp>
       <p:sp>
         <p:nvSpPr>
-          <p:cNvPr id="3" name="Content Placeholder 2"/>
+          <p:cNvPr id="3" name="Text Placeholder 2"/>
           <p:cNvSpPr>
             <a:spLocks noGrp="1"/>
           </p:cNvSpPr>
           <p:nvPr>
-            <p:ph idx="1"/>
+            <p:ph type="body" idx="1"/>
           </p:nvPr>
         </p:nvSpPr>
         <p:spPr/>
         <p:txBody>
-          <a:bodyPr>
-            <a:normAutofit lnSpcReduction="10000"/>
-          </a:bodyPr>
+          <a:bodyPr/>
           <a:lstStyle/>
           <a:p>
-            <a:pPr>
-              <a:buClr>
-                <a:schemeClr val="bg1"/>
-              </a:buClr>
-            </a:pPr>
-            <a:r>
-              <a:rPr lang="en-US" dirty="0" smtClean="0">
-                <a:solidFill>
-                  <a:srgbClr val="92D050"/>
-                </a:solidFill>
-              </a:rPr>
-              <a:t>[10]</a:t>
-            </a:r>
-            <a:r>
-              <a:rPr lang="en-US" dirty="0" smtClean="0"/>
-              <a:t> </a:t>
-            </a:r>
-            <a:r>
-              <a:rPr lang="ru-RU" dirty="0" smtClean="0"/>
-              <a:t>Изменение размера шрифта </a:t>
-            </a:r>
-            <a:r>
-              <a:rPr lang="en-US" dirty="0">
-                <a:solidFill>
-                  <a:srgbClr val="F6AE1E"/>
-                </a:solidFill>
-              </a:rPr>
-              <a:t>(</a:t>
-            </a:r>
-            <a:r>
-              <a:rPr lang="en-US" dirty="0" err="1">
-                <a:solidFill>
-                  <a:srgbClr val="F6AE1E"/>
-                </a:solidFill>
-              </a:rPr>
-              <a:t>Ctrl+Shift</a:t>
-            </a:r>
-            <a:r>
-              <a:rPr lang="en-US" dirty="0">
-                <a:solidFill>
-                  <a:srgbClr val="F6AE1E"/>
-                </a:solidFill>
-              </a:rPr>
-              <a:t> + &lt;/&gt; </a:t>
-            </a:r>
-            <a:r>
-              <a:rPr lang="ru-RU" dirty="0" smtClean="0">
-                <a:solidFill>
-                  <a:schemeClr val="bg1"/>
-                </a:solidFill>
-              </a:rPr>
-              <a:t>или</a:t>
-            </a:r>
-            <a:r>
-              <a:rPr lang="en-US" dirty="0" smtClean="0">
-                <a:solidFill>
-                  <a:srgbClr val="F6AE1E"/>
-                </a:solidFill>
-              </a:rPr>
-              <a:t> </a:t>
-            </a:r>
-            <a:r>
-              <a:rPr lang="en-US" dirty="0">
-                <a:solidFill>
-                  <a:srgbClr val="F6AE1E"/>
-                </a:solidFill>
-              </a:rPr>
-              <a:t>Ctrl + Mouse Scroll</a:t>
-            </a:r>
-            <a:r>
-              <a:rPr lang="en-US" dirty="0" smtClean="0">
-                <a:solidFill>
-                  <a:srgbClr val="F6AE1E"/>
-                </a:solidFill>
-              </a:rPr>
-              <a:t>)</a:t>
-            </a:r>
-            <a:endParaRPr lang="ru-RU" dirty="0" smtClean="0">
-              <a:solidFill>
-                <a:srgbClr val="F6AE1E"/>
-              </a:solidFill>
-            </a:endParaRPr>
-          </a:p>
-          <a:p>
-            <a:pPr>
-              <a:buClr>
-                <a:schemeClr val="bg1"/>
-              </a:buClr>
-            </a:pPr>
-            <a:r>
-              <a:rPr lang="en-US" dirty="0">
-                <a:solidFill>
-                  <a:srgbClr val="92D050"/>
-                </a:solidFill>
-              </a:rPr>
-              <a:t>[10]</a:t>
-            </a:r>
-            <a:r>
-              <a:rPr lang="en-US" dirty="0" smtClean="0"/>
-              <a:t> </a:t>
-            </a:r>
-            <a:r>
-              <a:rPr lang="ru-RU" dirty="0" smtClean="0"/>
-              <a:t>Многострочное редактирование</a:t>
-            </a:r>
-            <a:r>
-              <a:rPr lang="en-US" dirty="0" smtClean="0"/>
-              <a:t> </a:t>
-            </a:r>
-            <a:r>
-              <a:rPr lang="en-US" dirty="0" smtClean="0">
-                <a:solidFill>
-                  <a:srgbClr val="F6AE1E"/>
-                </a:solidFill>
-              </a:rPr>
-              <a:t>(</a:t>
-            </a:r>
-            <a:r>
-              <a:rPr lang="en-US" dirty="0" err="1">
-                <a:solidFill>
-                  <a:srgbClr val="F6AE1E"/>
-                </a:solidFill>
-              </a:rPr>
-              <a:t>Alt+Shift</a:t>
-            </a:r>
-            <a:r>
-              <a:rPr lang="en-US" dirty="0">
-                <a:solidFill>
-                  <a:srgbClr val="F6AE1E"/>
-                </a:solidFill>
-              </a:rPr>
-              <a:t> + Up/Down</a:t>
-            </a:r>
-            <a:r>
-              <a:rPr lang="en-US" dirty="0"/>
-              <a:t> </a:t>
-            </a:r>
-            <a:r>
-              <a:rPr lang="ru-RU" dirty="0" smtClean="0"/>
-              <a:t>или</a:t>
-            </a:r>
-            <a:r>
-              <a:rPr lang="en-US" dirty="0" smtClean="0"/>
-              <a:t> </a:t>
-            </a:r>
-            <a:r>
-              <a:rPr lang="en-US" dirty="0">
-                <a:solidFill>
-                  <a:srgbClr val="F6AE1E"/>
-                </a:solidFill>
-              </a:rPr>
-              <a:t>Alt + Mouse Up/Down</a:t>
-            </a:r>
-            <a:r>
-              <a:rPr lang="en-US" dirty="0" smtClean="0">
-                <a:solidFill>
-                  <a:srgbClr val="F6AE1E"/>
-                </a:solidFill>
-              </a:rPr>
-              <a:t>)</a:t>
-            </a:r>
-            <a:endParaRPr lang="ru-RU" dirty="0" smtClean="0">
-              <a:solidFill>
-                <a:srgbClr val="F6AE1E"/>
-              </a:solidFill>
-            </a:endParaRPr>
-          </a:p>
-          <a:p>
-            <a:pPr>
-              <a:buClr>
-                <a:schemeClr val="bg1"/>
-              </a:buClr>
-            </a:pPr>
-            <a:r>
-              <a:rPr lang="en-US" dirty="0" smtClean="0">
-                <a:solidFill>
-                  <a:srgbClr val="92D050"/>
-                </a:solidFill>
-              </a:rPr>
-              <a:t>[0</a:t>
-            </a:r>
-            <a:r>
-              <a:rPr lang="ru-RU" dirty="0" smtClean="0">
-                <a:solidFill>
-                  <a:srgbClr val="92D050"/>
-                </a:solidFill>
-              </a:rPr>
-              <a:t>5</a:t>
-            </a:r>
-            <a:r>
-              <a:rPr lang="en-US" dirty="0" smtClean="0">
-                <a:solidFill>
-                  <a:srgbClr val="92D050"/>
-                </a:solidFill>
-              </a:rPr>
-              <a:t>]</a:t>
-            </a:r>
-            <a:r>
-              <a:rPr lang="en-US" dirty="0" smtClean="0"/>
-              <a:t> </a:t>
-            </a:r>
-            <a:r>
-              <a:rPr lang="ru-RU" dirty="0" smtClean="0"/>
-              <a:t>Вставка текста из ц</a:t>
-            </a:r>
-            <a:r>
-              <a:rPr lang="ru-RU" dirty="0" smtClean="0">
-                <a:solidFill>
-                  <a:schemeClr val="bg1"/>
-                </a:solidFill>
-              </a:rPr>
-              <a:t>иклического буфера обмена </a:t>
-            </a:r>
-            <a:r>
-              <a:rPr lang="en-US" dirty="0">
-                <a:solidFill>
-                  <a:srgbClr val="F6AE1E"/>
-                </a:solidFill>
-              </a:rPr>
-              <a:t>(</a:t>
-            </a:r>
-            <a:r>
-              <a:rPr lang="en-US" dirty="0" err="1">
-                <a:solidFill>
-                  <a:srgbClr val="F6AE1E"/>
-                </a:solidFill>
-              </a:rPr>
-              <a:t>Ctrl+Shift</a:t>
-            </a:r>
-            <a:r>
-              <a:rPr lang="en-US" dirty="0">
-                <a:solidFill>
-                  <a:srgbClr val="F6AE1E"/>
-                </a:solidFill>
-              </a:rPr>
-              <a:t> + V</a:t>
-            </a:r>
-            <a:r>
-              <a:rPr lang="en-US" dirty="0" smtClean="0">
-                <a:solidFill>
-                  <a:srgbClr val="F6AE1E"/>
-                </a:solidFill>
-              </a:rPr>
-              <a:t>)</a:t>
-            </a:r>
-            <a:endParaRPr lang="ru-RU" dirty="0" smtClean="0">
-              <a:solidFill>
-                <a:srgbClr val="F6AE1E"/>
-              </a:solidFill>
-            </a:endParaRPr>
-          </a:p>
-          <a:p>
-            <a:pPr>
-              <a:buClr>
-                <a:schemeClr val="bg1"/>
-              </a:buClr>
-            </a:pPr>
-            <a:r>
-              <a:rPr lang="ru-RU" smtClean="0">
-                <a:solidFill>
-                  <a:schemeClr val="bg1"/>
-                </a:solidFill>
-              </a:rPr>
-              <a:t>Прокрутка текста без изменения положения курсора</a:t>
-            </a:r>
-            <a:r>
-              <a:rPr lang="en-US" dirty="0" smtClean="0">
-                <a:solidFill>
-                  <a:schemeClr val="bg1"/>
-                </a:solidFill>
-              </a:rPr>
-              <a:t> </a:t>
-            </a:r>
-            <a:r>
-              <a:rPr lang="en-US" dirty="0">
-                <a:solidFill>
-                  <a:srgbClr val="F6AE1E"/>
-                </a:solidFill>
-              </a:rPr>
-              <a:t>(Ctrl + Up/Down Arrow)</a:t>
-            </a:r>
+            <a:endParaRPr lang="ru-RU" dirty="0"/>
           </a:p>
         </p:txBody>
       </p:sp>
     </p:spTree>
     <p:extLst>
       <p:ext uri="{BB962C8B-B14F-4D97-AF65-F5344CB8AC3E}">
-        <p14:creationId xmlns:p14="http://schemas.microsoft.com/office/powerpoint/2010/main" val="468185828"/>
+        <p14:creationId xmlns:p14="http://schemas.microsoft.com/office/powerpoint/2010/main" val="3519851483"/>
       </p:ext>
     </p:extLst>
   </p:cSld>
   <p:clrMapOvr>
     <a:masterClrMapping/>
   </p:clrMapOvr>
-  <p:timing>
-    <p:tnLst>
-      <p:par>
-        <p:cTn id="1" dur="indefinite" restart="never" nodeType="tmRoot"/>
-      </p:par>
-    </p:tnLst>
-  </p:timing>
 </p:sld>
 </file>
 

</xml_diff>

<commit_message>
Updated Visual Studio presentations
</commit_message>
<xml_diff>
--- a/Presentation/tools-visual-studio.pptx
+++ b/Presentation/tools-visual-studio.pptx
@@ -6,7 +6,7 @@
     <p:sldMasterId id="2147483663" r:id="rId2"/>
   </p:sldMasterIdLst>
   <p:notesMasterIdLst>
-    <p:notesMasterId r:id="rId30"/>
+    <p:notesMasterId r:id="rId38"/>
   </p:notesMasterIdLst>
   <p:sldIdLst>
     <p:sldId id="257" r:id="rId3"/>
@@ -17,25 +17,33 @@
     <p:sldId id="281" r:id="rId8"/>
     <p:sldId id="272" r:id="rId9"/>
     <p:sldId id="275" r:id="rId10"/>
-    <p:sldId id="284" r:id="rId11"/>
-    <p:sldId id="282" r:id="rId12"/>
-    <p:sldId id="262" r:id="rId13"/>
-    <p:sldId id="283" r:id="rId14"/>
-    <p:sldId id="285" r:id="rId15"/>
-    <p:sldId id="265" r:id="rId16"/>
-    <p:sldId id="280" r:id="rId17"/>
-    <p:sldId id="277" r:id="rId18"/>
-    <p:sldId id="271" r:id="rId19"/>
-    <p:sldId id="266" r:id="rId20"/>
-    <p:sldId id="279" r:id="rId21"/>
-    <p:sldId id="269" r:id="rId22"/>
-    <p:sldId id="273" r:id="rId23"/>
-    <p:sldId id="274" r:id="rId24"/>
-    <p:sldId id="267" r:id="rId25"/>
-    <p:sldId id="268" r:id="rId26"/>
-    <p:sldId id="260" r:id="rId27"/>
-    <p:sldId id="261" r:id="rId28"/>
-    <p:sldId id="276" r:id="rId29"/>
+    <p:sldId id="288" r:id="rId11"/>
+    <p:sldId id="289" r:id="rId12"/>
+    <p:sldId id="291" r:id="rId13"/>
+    <p:sldId id="290" r:id="rId14"/>
+    <p:sldId id="284" r:id="rId15"/>
+    <p:sldId id="282" r:id="rId16"/>
+    <p:sldId id="262" r:id="rId17"/>
+    <p:sldId id="283" r:id="rId18"/>
+    <p:sldId id="285" r:id="rId19"/>
+    <p:sldId id="265" r:id="rId20"/>
+    <p:sldId id="280" r:id="rId21"/>
+    <p:sldId id="277" r:id="rId22"/>
+    <p:sldId id="271" r:id="rId23"/>
+    <p:sldId id="286" r:id="rId24"/>
+    <p:sldId id="266" r:id="rId25"/>
+    <p:sldId id="279" r:id="rId26"/>
+    <p:sldId id="292" r:id="rId27"/>
+    <p:sldId id="269" r:id="rId28"/>
+    <p:sldId id="273" r:id="rId29"/>
+    <p:sldId id="274" r:id="rId30"/>
+    <p:sldId id="267" r:id="rId31"/>
+    <p:sldId id="268" r:id="rId32"/>
+    <p:sldId id="260" r:id="rId33"/>
+    <p:sldId id="293" r:id="rId34"/>
+    <p:sldId id="287" r:id="rId35"/>
+    <p:sldId id="261" r:id="rId36"/>
+    <p:sldId id="276" r:id="rId37"/>
   </p:sldIdLst>
   <p:sldSz cx="9144000" cy="6858000" type="screen4x3"/>
   <p:notesSz cx="6858000" cy="9144000"/>
@@ -235,7 +243,7 @@
           <a:p>
             <a:fld id="{B24A7054-7FFB-49F4-A126-5DF6E687FF53}" type="datetimeFigureOut">
               <a:rPr lang="ru-RU" smtClean="0"/>
-              <a:t>12.09.2014</a:t>
+              <a:t>20.09.2014</a:t>
             </a:fld>
             <a:endParaRPr lang="ru-RU"/>
           </a:p>
@@ -1517,7 +1525,7 @@
           <a:p>
             <a:fld id="{8E6E6A2A-E9D3-4A0D-B04A-ABDD367A1E08}" type="datetimeFigureOut">
               <a:rPr lang="ru-RU" smtClean="0"/>
-              <a:t>12.09.2014</a:t>
+              <a:t>20.09.2014</a:t>
             </a:fld>
             <a:endParaRPr lang="ru-RU"/>
           </a:p>
@@ -4030,7 +4038,7 @@
                 </a:solidFill>
               </a:rPr>
               <a:pPr/>
-              <a:t>12.09.2014</a:t>
+              <a:t>20.09.2014</a:t>
             </a:fld>
             <a:endParaRPr lang="ru-RU">
               <a:solidFill>
@@ -5291,7 +5299,7 @@
           <a:p>
             <a:fld id="{AC3D3127-B7C4-45E3-9797-C527EC9FDD78}" type="datetimeFigureOut">
               <a:rPr lang="ru-RU" smtClean="0"/>
-              <a:t>12.09.2014</a:t>
+              <a:t>20.09.2014</a:t>
             </a:fld>
             <a:endParaRPr lang="ru-RU"/>
           </a:p>
@@ -5827,7 +5835,7 @@
                 </a:solidFill>
               </a:rPr>
               <a:pPr/>
-              <a:t>12.09.2014</a:t>
+              <a:t>20.09.2014</a:t>
             </a:fld>
             <a:endParaRPr lang="ru-RU">
               <a:solidFill>
@@ -6450,8 +6458,16 @@
           <a:lstStyle/>
           <a:p>
             <a:r>
-              <a:rPr lang="ru-RU" dirty="0" smtClean="0"/>
-              <a:t>Редактор: Настройки</a:t>
+              <a:rPr lang="en-US" dirty="0" smtClean="0">
+                <a:solidFill>
+                  <a:srgbClr val="92D050"/>
+                </a:solidFill>
+              </a:rPr>
+              <a:t>[12]</a:t>
+            </a:r>
+            <a:r>
+              <a:rPr lang="en-US" dirty="0" smtClean="0"/>
+              <a:t> Quick Launch</a:t>
             </a:r>
             <a:endParaRPr lang="ru-RU" dirty="0"/>
           </a:p>
@@ -6472,42 +6488,41 @@
           <a:bodyPr/>
           <a:lstStyle/>
           <a:p>
-            <a:pPr marL="0" indent="0">
-              <a:buNone/>
-            </a:pPr>
+            <a:r>
+              <a:rPr lang="en-US" dirty="0" err="1" smtClean="0">
+                <a:solidFill>
+                  <a:srgbClr val="F6AE1E"/>
+                </a:solidFill>
+              </a:rPr>
+              <a:t>Ctrl+Q</a:t>
+            </a:r>
+            <a:r>
+              <a:rPr lang="en-US" dirty="0" smtClean="0"/>
+              <a:t> </a:t>
+            </a:r>
             <a:r>
               <a:rPr lang="ru-RU" dirty="0" smtClean="0"/>
-              <a:t>Редактор </a:t>
+              <a:t>передаст фокус полю </a:t>
+            </a:r>
+            <a:r>
+              <a:rPr lang="en-US" dirty="0"/>
+              <a:t>Quick </a:t>
             </a:r>
             <a:r>
               <a:rPr lang="en-US" dirty="0" smtClean="0"/>
-              <a:t>VS </a:t>
+              <a:t>Launch</a:t>
+            </a:r>
+            <a:endParaRPr lang="ru-RU" dirty="0" smtClean="0"/>
+          </a:p>
+          <a:p>
+            <a:r>
+              <a:rPr lang="en-US" dirty="0" smtClean="0"/>
+              <a:t>@ </a:t>
             </a:r>
             <a:r>
               <a:rPr lang="ru-RU" dirty="0" smtClean="0"/>
-              <a:t>поддерживает множество языков. Настройки можно менять для всех языков сразу или по отдельности в диалоге «</a:t>
-            </a:r>
-            <a:r>
-              <a:rPr lang="en-US" dirty="0" smtClean="0"/>
-              <a:t>Tools -&gt; Options ...</a:t>
-            </a:r>
-            <a:r>
-              <a:rPr lang="ru-RU" dirty="0" smtClean="0"/>
-              <a:t>»</a:t>
-            </a:r>
-            <a:r>
-              <a:rPr lang="en-US" dirty="0" smtClean="0"/>
-              <a:t>.</a:t>
-            </a:r>
-            <a:endParaRPr lang="ru-RU" dirty="0" smtClean="0"/>
-          </a:p>
-          <a:p>
-            <a:pPr marL="0" indent="0">
-              <a:buNone/>
-            </a:pPr>
-            <a:endParaRPr lang="ru-RU" dirty="0" smtClean="0"/>
-          </a:p>
-          <a:p>
+              <a:t>в начале дает возможность фильтрации</a:t>
+            </a:r>
             <a:endParaRPr lang="ru-RU" dirty="0"/>
           </a:p>
         </p:txBody>
@@ -6515,7 +6530,7 @@
     </p:spTree>
     <p:extLst>
       <p:ext uri="{BB962C8B-B14F-4D97-AF65-F5344CB8AC3E}">
-        <p14:creationId xmlns:p14="http://schemas.microsoft.com/office/powerpoint/2010/main" val="2394860654"/>
+        <p14:creationId xmlns:p14="http://schemas.microsoft.com/office/powerpoint/2010/main" val="2737929373"/>
       </p:ext>
     </p:extLst>
   </p:cSld>
@@ -6554,14 +6569,39 @@
         </p:nvSpPr>
         <p:spPr/>
         <p:txBody>
-          <a:bodyPr/>
+          <a:bodyPr>
+            <a:normAutofit fontScale="90000"/>
+          </a:bodyPr>
           <a:lstStyle/>
           <a:p>
             <a:r>
               <a:rPr lang="ru-RU" dirty="0" smtClean="0"/>
-              <a:t>Редактор</a:t>
-            </a:r>
-            <a:endParaRPr lang="en-US" dirty="0"/>
+              <a:t>Окна со списками</a:t>
+            </a:r>
+            <a:r>
+              <a:rPr lang="en-US" dirty="0" smtClean="0"/>
+              <a:t/>
+            </a:r>
+            <a:br>
+              <a:rPr lang="en-US" dirty="0" smtClean="0"/>
+            </a:br>
+            <a:r>
+              <a:rPr lang="ru-RU" dirty="0" smtClean="0"/>
+              <a:t>(</a:t>
+            </a:r>
+            <a:r>
+              <a:rPr lang="en-US" dirty="0" smtClean="0"/>
+              <a:t>find results, find symbol results, </a:t>
+            </a:r>
+            <a:r>
+              <a:rPr lang="en-US" dirty="0" err="1" smtClean="0"/>
+              <a:t>etc</a:t>
+            </a:r>
+            <a:r>
+              <a:rPr lang="en-US" dirty="0" smtClean="0"/>
+              <a:t>)</a:t>
+            </a:r>
+            <a:endParaRPr lang="ru-RU" dirty="0"/>
           </a:p>
         </p:txBody>
       </p:sp>
@@ -6577,23 +6617,16 @@
         </p:nvSpPr>
         <p:spPr/>
         <p:txBody>
-          <a:bodyPr>
-            <a:normAutofit lnSpcReduction="10000"/>
-          </a:bodyPr>
+          <a:bodyPr/>
           <a:lstStyle/>
           <a:p>
-            <a:pPr>
-              <a:buClr>
-                <a:schemeClr val="bg1"/>
-              </a:buClr>
-            </a:pPr>
             <a:r>
               <a:rPr lang="en-US" dirty="0" smtClean="0">
                 <a:solidFill>
-                  <a:srgbClr val="92D050"/>
-                </a:solidFill>
-              </a:rPr>
-              <a:t>[10]</a:t>
+                  <a:srgbClr val="F6AE1E"/>
+                </a:solidFill>
+              </a:rPr>
+              <a:t>F8</a:t>
             </a:r>
             <a:r>
               <a:rPr lang="en-US" dirty="0" smtClean="0"/>
@@ -6601,83 +6634,17 @@
             </a:r>
             <a:r>
               <a:rPr lang="ru-RU" dirty="0" smtClean="0"/>
-              <a:t>Изменение размера шрифта </a:t>
-            </a:r>
-            <a:r>
-              <a:rPr lang="en-US" dirty="0">
+              <a:t>вперед</a:t>
+            </a:r>
+          </a:p>
+          <a:p>
+            <a:r>
+              <a:rPr lang="en-US" dirty="0" smtClean="0">
                 <a:solidFill>
                   <a:srgbClr val="F6AE1E"/>
                 </a:solidFill>
               </a:rPr>
-              <a:t>(</a:t>
-            </a:r>
-            <a:r>
-              <a:rPr lang="en-US" dirty="0" err="1">
-                <a:solidFill>
-                  <a:srgbClr val="F6AE1E"/>
-                </a:solidFill>
-              </a:rPr>
-              <a:t>Ctrl+Shift</a:t>
-            </a:r>
-            <a:r>
-              <a:rPr lang="en-US" dirty="0">
-                <a:solidFill>
-                  <a:srgbClr val="F6AE1E"/>
-                </a:solidFill>
-              </a:rPr>
-              <a:t> + &lt;/&gt; </a:t>
-            </a:r>
-            <a:r>
-              <a:rPr lang="ru-RU" dirty="0" smtClean="0">
-                <a:solidFill>
-                  <a:schemeClr val="bg1"/>
-                </a:solidFill>
-              </a:rPr>
-              <a:t>или</a:t>
-            </a:r>
-            <a:r>
-              <a:rPr lang="en-US" dirty="0" smtClean="0">
-                <a:solidFill>
-                  <a:srgbClr val="F6AE1E"/>
-                </a:solidFill>
-              </a:rPr>
-              <a:t> </a:t>
-            </a:r>
-            <a:r>
-              <a:rPr lang="en-US" dirty="0">
-                <a:solidFill>
-                  <a:srgbClr val="F6AE1E"/>
-                </a:solidFill>
-              </a:rPr>
-              <a:t>Ctrl + Mouse Scroll</a:t>
-            </a:r>
-            <a:r>
-              <a:rPr lang="en-US" dirty="0" smtClean="0">
-                <a:solidFill>
-                  <a:srgbClr val="F6AE1E"/>
-                </a:solidFill>
-              </a:rPr>
-              <a:t>)</a:t>
-            </a:r>
-            <a:endParaRPr lang="ru-RU" dirty="0" smtClean="0">
-              <a:solidFill>
-                <a:srgbClr val="F6AE1E"/>
-              </a:solidFill>
-            </a:endParaRPr>
-          </a:p>
-          <a:p>
-            <a:pPr>
-              <a:buClr>
-                <a:schemeClr val="bg1"/>
-              </a:buClr>
-            </a:pPr>
-            <a:r>
-              <a:rPr lang="en-US" dirty="0">
-                <a:solidFill>
-                  <a:srgbClr val="92D050"/>
-                </a:solidFill>
-              </a:rPr>
-              <a:t>[10]</a:t>
+              <a:t>Shift+F8</a:t>
             </a:r>
             <a:r>
               <a:rPr lang="en-US" dirty="0" smtClean="0"/>
@@ -6685,204 +6652,24 @@
             </a:r>
             <a:r>
               <a:rPr lang="ru-RU" dirty="0" smtClean="0"/>
-              <a:t>Многострочное редактирование</a:t>
-            </a:r>
-            <a:r>
-              <a:rPr lang="en-US" dirty="0" smtClean="0"/>
-              <a:t> </a:t>
-            </a:r>
-            <a:r>
-              <a:rPr lang="en-US" dirty="0" smtClean="0">
-                <a:solidFill>
-                  <a:srgbClr val="F6AE1E"/>
-                </a:solidFill>
-              </a:rPr>
-              <a:t>(</a:t>
-            </a:r>
-            <a:r>
-              <a:rPr lang="en-US" dirty="0" err="1">
-                <a:solidFill>
-                  <a:srgbClr val="F6AE1E"/>
-                </a:solidFill>
-              </a:rPr>
-              <a:t>Alt+Shift</a:t>
-            </a:r>
-            <a:r>
-              <a:rPr lang="en-US" dirty="0">
-                <a:solidFill>
-                  <a:srgbClr val="F6AE1E"/>
-                </a:solidFill>
-              </a:rPr>
-              <a:t> + Up/Down</a:t>
-            </a:r>
-            <a:r>
-              <a:rPr lang="en-US" dirty="0"/>
-              <a:t> </a:t>
-            </a:r>
-            <a:r>
-              <a:rPr lang="ru-RU" dirty="0" smtClean="0"/>
-              <a:t>или</a:t>
-            </a:r>
-            <a:r>
-              <a:rPr lang="en-US" dirty="0" smtClean="0"/>
-              <a:t> </a:t>
-            </a:r>
-            <a:r>
-              <a:rPr lang="en-US" dirty="0">
-                <a:solidFill>
-                  <a:srgbClr val="F6AE1E"/>
-                </a:solidFill>
-              </a:rPr>
-              <a:t>Alt + Mouse Up/Down</a:t>
-            </a:r>
-            <a:r>
-              <a:rPr lang="en-US" dirty="0" smtClean="0">
-                <a:solidFill>
-                  <a:srgbClr val="F6AE1E"/>
-                </a:solidFill>
-              </a:rPr>
-              <a:t>)</a:t>
-            </a:r>
-            <a:endParaRPr lang="ru-RU" dirty="0" smtClean="0">
-              <a:solidFill>
-                <a:srgbClr val="F6AE1E"/>
-              </a:solidFill>
-            </a:endParaRPr>
-          </a:p>
-          <a:p>
-            <a:pPr>
-              <a:buClr>
-                <a:schemeClr val="bg1"/>
-              </a:buClr>
-            </a:pPr>
-            <a:r>
-              <a:rPr lang="en-US" dirty="0" smtClean="0">
-                <a:solidFill>
-                  <a:srgbClr val="92D050"/>
-                </a:solidFill>
-              </a:rPr>
-              <a:t>[0</a:t>
-            </a:r>
-            <a:r>
-              <a:rPr lang="ru-RU" dirty="0" smtClean="0">
-                <a:solidFill>
-                  <a:srgbClr val="92D050"/>
-                </a:solidFill>
-              </a:rPr>
-              <a:t>5</a:t>
-            </a:r>
-            <a:r>
-              <a:rPr lang="en-US" dirty="0" smtClean="0">
-                <a:solidFill>
-                  <a:srgbClr val="92D050"/>
-                </a:solidFill>
-              </a:rPr>
-              <a:t>]</a:t>
-            </a:r>
-            <a:r>
-              <a:rPr lang="en-US" dirty="0" smtClean="0"/>
-              <a:t> </a:t>
-            </a:r>
-            <a:r>
-              <a:rPr lang="ru-RU" dirty="0" smtClean="0"/>
-              <a:t>Вставка текста из ц</a:t>
-            </a:r>
-            <a:r>
-              <a:rPr lang="ru-RU" dirty="0" smtClean="0">
-                <a:solidFill>
-                  <a:schemeClr val="bg1"/>
-                </a:solidFill>
-              </a:rPr>
-              <a:t>иклического буфера обмена </a:t>
-            </a:r>
-            <a:r>
-              <a:rPr lang="en-US" dirty="0">
-                <a:solidFill>
-                  <a:srgbClr val="F6AE1E"/>
-                </a:solidFill>
-              </a:rPr>
-              <a:t>(</a:t>
-            </a:r>
-            <a:r>
-              <a:rPr lang="en-US" dirty="0" err="1">
-                <a:solidFill>
-                  <a:srgbClr val="F6AE1E"/>
-                </a:solidFill>
-              </a:rPr>
-              <a:t>Ctrl+Shift</a:t>
-            </a:r>
-            <a:r>
-              <a:rPr lang="en-US" dirty="0">
-                <a:solidFill>
-                  <a:srgbClr val="F6AE1E"/>
-                </a:solidFill>
-              </a:rPr>
-              <a:t> + V</a:t>
-            </a:r>
-            <a:r>
-              <a:rPr lang="en-US" dirty="0" smtClean="0">
-                <a:solidFill>
-                  <a:srgbClr val="F6AE1E"/>
-                </a:solidFill>
-              </a:rPr>
-              <a:t>)</a:t>
-            </a:r>
-            <a:endParaRPr lang="ru-RU" dirty="0" smtClean="0">
-              <a:solidFill>
-                <a:srgbClr val="F6AE1E"/>
-              </a:solidFill>
-            </a:endParaRPr>
-          </a:p>
-          <a:p>
-            <a:pPr>
-              <a:buClr>
-                <a:schemeClr val="bg1"/>
-              </a:buClr>
-            </a:pPr>
-            <a:r>
-              <a:rPr lang="ru-RU" dirty="0" smtClean="0">
-                <a:solidFill>
-                  <a:schemeClr val="bg1"/>
-                </a:solidFill>
-              </a:rPr>
-              <a:t>Прокрутка текста без изменения положения курсора</a:t>
-            </a:r>
-            <a:r>
-              <a:rPr lang="en-US" dirty="0" smtClean="0">
-                <a:solidFill>
-                  <a:schemeClr val="bg1"/>
-                </a:solidFill>
-              </a:rPr>
-              <a:t> </a:t>
-            </a:r>
-            <a:r>
-              <a:rPr lang="en-US" dirty="0">
-                <a:solidFill>
-                  <a:srgbClr val="F6AE1E"/>
-                </a:solidFill>
-              </a:rPr>
-              <a:t>(Ctrl + Up/Down Arrow)</a:t>
-            </a:r>
+              <a:t>назад</a:t>
+            </a:r>
+          </a:p>
+          <a:p>
+            <a:endParaRPr lang="ru-RU" dirty="0"/>
           </a:p>
         </p:txBody>
       </p:sp>
     </p:spTree>
     <p:extLst>
       <p:ext uri="{BB962C8B-B14F-4D97-AF65-F5344CB8AC3E}">
-        <p14:creationId xmlns:p14="http://schemas.microsoft.com/office/powerpoint/2010/main" val="468185828"/>
+        <p14:creationId xmlns:p14="http://schemas.microsoft.com/office/powerpoint/2010/main" val="489127722"/>
       </p:ext>
     </p:extLst>
   </p:cSld>
   <p:clrMapOvr>
     <a:masterClrMapping/>
   </p:clrMapOvr>
-  <p:timing>
-    <p:tnLst>
-      <p:par>
-        <p:cTn id="1" dur="indefinite" restart="never" nodeType="tmRoot"/>
-      </p:par>
-    </p:tnLst>
-  </p:timing>
 </p:sld>
 </file>
 
@@ -6920,11 +6707,7 @@
           <a:p>
             <a:r>
               <a:rPr lang="ru-RU" dirty="0" smtClean="0"/>
-              <a:t>Редактор</a:t>
-            </a:r>
-            <a:r>
-              <a:rPr lang="en-US" dirty="0" smtClean="0"/>
-              <a:t>: Virtual Space</a:t>
+              <a:t>«Плавающие» окна</a:t>
             </a:r>
             <a:endParaRPr lang="ru-RU" dirty="0"/>
           </a:p>
@@ -6945,40 +6728,39 @@
           <a:bodyPr/>
           <a:lstStyle/>
           <a:p>
-            <a:pPr marL="0" indent="0">
-              <a:buNone/>
-            </a:pPr>
+            <a:r>
+              <a:rPr lang="en-US" dirty="0" err="1" smtClean="0">
+                <a:solidFill>
+                  <a:srgbClr val="F6AE1E"/>
+                </a:solidFill>
+              </a:rPr>
+              <a:t>Ctrl+click</a:t>
+            </a:r>
+            <a:r>
+              <a:rPr lang="en-US" dirty="0" smtClean="0"/>
+              <a:t> </a:t>
+            </a:r>
             <a:r>
               <a:rPr lang="ru-RU" dirty="0" smtClean="0"/>
-              <a:t>Если </a:t>
-            </a:r>
-            <a:r>
-              <a:rPr lang="ru-RU" dirty="0"/>
-              <a:t>включить </a:t>
-            </a:r>
+              <a:t>возвращает окно на место если вы его случайно вытащили не туда</a:t>
+            </a:r>
+          </a:p>
+          <a:p>
             <a:r>
               <a:rPr lang="ru-RU" dirty="0" smtClean="0"/>
-              <a:t>переключатель «</a:t>
-            </a:r>
-            <a:r>
-              <a:rPr lang="en-US" dirty="0" smtClean="0"/>
-              <a:t>Enable virtual space</a:t>
+              <a:t>Удерживайте </a:t>
+            </a:r>
+            <a:r>
+              <a:rPr lang="en-US" dirty="0" smtClean="0">
+                <a:solidFill>
+                  <a:srgbClr val="F6AE1E"/>
+                </a:solidFill>
+              </a:rPr>
+              <a:t>Ctrl</a:t>
             </a:r>
             <a:r>
               <a:rPr lang="ru-RU" dirty="0" smtClean="0"/>
-              <a:t>»</a:t>
-            </a:r>
-            <a:r>
-              <a:rPr lang="en-US" dirty="0" smtClean="0"/>
-              <a:t>, </a:t>
-            </a:r>
-            <a:r>
-              <a:rPr lang="ru-RU" dirty="0" smtClean="0"/>
-              <a:t>то курсор можно будет ставить в любой место в документе, а не только туда где введен </a:t>
-            </a:r>
-            <a:r>
-              <a:rPr lang="ru-RU" smtClean="0"/>
-              <a:t>текст. </a:t>
+              <a:t> во время перетаскивания окна чтобы убрать направляющие</a:t>
             </a:r>
             <a:endParaRPr lang="ru-RU" dirty="0"/>
           </a:p>
@@ -6987,7 +6769,7 @@
     </p:spTree>
     <p:extLst>
       <p:ext uri="{BB962C8B-B14F-4D97-AF65-F5344CB8AC3E}">
-        <p14:creationId xmlns:p14="http://schemas.microsoft.com/office/powerpoint/2010/main" val="2950142326"/>
+        <p14:creationId xmlns:p14="http://schemas.microsoft.com/office/powerpoint/2010/main" val="911313706"/>
       </p:ext>
     </p:extLst>
   </p:cSld>
@@ -7026,42 +6808,25 @@
         </p:nvSpPr>
         <p:spPr/>
         <p:txBody>
-          <a:bodyPr>
-            <a:normAutofit fontScale="90000"/>
-          </a:bodyPr>
+          <a:bodyPr/>
           <a:lstStyle/>
           <a:p>
             <a:r>
               <a:rPr lang="ru-RU" dirty="0" smtClean="0"/>
               <a:t>Редактор</a:t>
             </a:r>
-            <a:r>
-              <a:rPr lang="en-US" dirty="0" smtClean="0"/>
-              <a:t>: </a:t>
-            </a:r>
-            <a:r>
-              <a:rPr lang="en-US" dirty="0" smtClean="0"/>
-              <a:t>Outlining</a:t>
-            </a:r>
-            <a:br>
-              <a:rPr lang="en-US" dirty="0" smtClean="0"/>
-            </a:br>
-            <a:r>
-              <a:rPr lang="ru-RU" dirty="0" smtClean="0"/>
-              <a:t>Свернуть выделенный блок текста</a:t>
-            </a:r>
             <a:endParaRPr lang="ru-RU" dirty="0"/>
           </a:p>
         </p:txBody>
       </p:sp>
       <p:sp>
         <p:nvSpPr>
-          <p:cNvPr id="3" name="Content Placeholder 2"/>
+          <p:cNvPr id="3" name="Text Placeholder 2"/>
           <p:cNvSpPr>
             <a:spLocks noGrp="1"/>
           </p:cNvSpPr>
           <p:nvPr>
-            <p:ph idx="1"/>
+            <p:ph type="body" idx="1"/>
           </p:nvPr>
         </p:nvSpPr>
         <p:spPr/>
@@ -7069,53 +6834,6 @@
           <a:bodyPr/>
           <a:lstStyle/>
           <a:p>
-            <a:pPr marL="0" indent="0">
-              <a:buNone/>
-            </a:pPr>
-            <a:r>
-              <a:rPr lang="ru-RU" dirty="0" smtClean="0"/>
-              <a:t>Выделяем текст, нажимаем </a:t>
-            </a:r>
-            <a:r>
-              <a:rPr lang="en-US" dirty="0" smtClean="0">
-                <a:solidFill>
-                  <a:srgbClr val="FFC000"/>
-                </a:solidFill>
-              </a:rPr>
-              <a:t>Ctrl + M, H</a:t>
-            </a:r>
-            <a:r>
-              <a:rPr lang="ru-RU" dirty="0" smtClean="0"/>
-              <a:t> и выделенный блок текста «свернется».</a:t>
-            </a:r>
-            <a:r>
-              <a:rPr lang="en-US" dirty="0" smtClean="0"/>
-              <a:t> </a:t>
-            </a:r>
-            <a:r>
-              <a:rPr lang="ru-RU" dirty="0" smtClean="0"/>
-              <a:t>Та же команда доступна в меню </a:t>
-            </a:r>
-            <a:r>
-              <a:rPr lang="en-US" dirty="0" smtClean="0"/>
-              <a:t>Edit -&gt;</a:t>
-            </a:r>
-            <a:r>
-              <a:rPr lang="ru-RU" dirty="0" smtClean="0"/>
-              <a:t> </a:t>
-            </a:r>
-            <a:r>
-              <a:rPr lang="en-US" dirty="0" smtClean="0"/>
-              <a:t>Outlining</a:t>
-            </a:r>
-            <a:r>
-              <a:rPr lang="ru-RU" dirty="0" smtClean="0"/>
-              <a:t> -</a:t>
-            </a:r>
-            <a:r>
-              <a:rPr lang="en-US" dirty="0" smtClean="0"/>
-              <a:t>&gt; Hide Selection.</a:t>
-            </a:r>
             <a:endParaRPr lang="ru-RU" dirty="0"/>
           </a:p>
         </p:txBody>
@@ -7123,7 +6841,7 @@
     </p:spTree>
     <p:extLst>
       <p:ext uri="{BB962C8B-B14F-4D97-AF65-F5344CB8AC3E}">
-        <p14:creationId xmlns:p14="http://schemas.microsoft.com/office/powerpoint/2010/main" val="2080747852"/>
+        <p14:creationId xmlns:p14="http://schemas.microsoft.com/office/powerpoint/2010/main" val="3519851483"/>
       </p:ext>
     </p:extLst>
   </p:cSld>
@@ -7167,17 +6885,9 @@
           <a:p>
             <a:r>
               <a:rPr lang="ru-RU" dirty="0" smtClean="0"/>
-              <a:t>Редактор</a:t>
-            </a:r>
-            <a:r>
-              <a:rPr lang="en-US" dirty="0" smtClean="0"/>
-              <a:t>: </a:t>
-            </a:r>
-            <a:r>
-              <a:rPr lang="ru-RU" dirty="0" smtClean="0"/>
-              <a:t>Поиск текста</a:t>
-            </a:r>
-            <a:endParaRPr lang="en-US" dirty="0"/>
+              <a:t>Редактор: Настройки</a:t>
+            </a:r>
+            <a:endParaRPr lang="ru-RU" dirty="0"/>
           </a:p>
         </p:txBody>
       </p:sp>
@@ -7193,222 +6903,59 @@
         </p:nvSpPr>
         <p:spPr/>
         <p:txBody>
-          <a:bodyPr>
-            <a:normAutofit fontScale="85000" lnSpcReduction="10000"/>
-          </a:bodyPr>
+          <a:bodyPr/>
           <a:lstStyle/>
           <a:p>
-            <a:pPr>
-              <a:buClr>
-                <a:schemeClr val="bg1"/>
-              </a:buClr>
+            <a:pPr marL="0" indent="0">
+              <a:buNone/>
             </a:pPr>
             <a:r>
-              <a:rPr lang="en-US" dirty="0" err="1" smtClean="0">
-                <a:solidFill>
-                  <a:srgbClr val="F6AE1E"/>
-                </a:solidFill>
-              </a:rPr>
-              <a:t>Ctrl+I</a:t>
-            </a:r>
-            <a:r>
-              <a:rPr lang="ru-RU" dirty="0" smtClean="0">
-                <a:solidFill>
-                  <a:schemeClr val="bg1"/>
-                </a:solidFill>
-              </a:rPr>
-              <a:t> поиск</a:t>
-            </a:r>
-          </a:p>
-          <a:p>
-            <a:pPr>
-              <a:buClr>
-                <a:schemeClr val="bg1"/>
-              </a:buClr>
+              <a:rPr lang="ru-RU" dirty="0" smtClean="0"/>
+              <a:t>Редактор </a:t>
+            </a:r>
+            <a:r>
+              <a:rPr lang="en-US" dirty="0" smtClean="0"/>
+              <a:t>VS </a:t>
+            </a:r>
+            <a:r>
+              <a:rPr lang="ru-RU" dirty="0" smtClean="0"/>
+              <a:t>поддерживает множество языков. Настройки можно менять для всех языков сразу или по отдельности в диалоге «</a:t>
+            </a:r>
+            <a:r>
+              <a:rPr lang="en-US" dirty="0" smtClean="0"/>
+              <a:t>Tools -&gt; Options ...</a:t>
+            </a:r>
+            <a:r>
+              <a:rPr lang="ru-RU" dirty="0" smtClean="0"/>
+              <a:t>»</a:t>
+            </a:r>
+            <a:r>
+              <a:rPr lang="en-US" dirty="0" smtClean="0"/>
+              <a:t>.</a:t>
+            </a:r>
+            <a:endParaRPr lang="ru-RU" dirty="0" smtClean="0"/>
+          </a:p>
+          <a:p>
+            <a:pPr marL="0" indent="0">
+              <a:buNone/>
             </a:pPr>
-            <a:r>
-              <a:rPr lang="en-US" dirty="0">
-                <a:solidFill>
-                  <a:srgbClr val="F6AE1E"/>
-                </a:solidFill>
-              </a:rPr>
-              <a:t>F3/Shift+F3</a:t>
-            </a:r>
-            <a:r>
-              <a:rPr lang="en-US" dirty="0" smtClean="0">
-                <a:solidFill>
-                  <a:schemeClr val="bg1"/>
-                </a:solidFill>
-              </a:rPr>
-              <a:t> </a:t>
-            </a:r>
-            <a:r>
-              <a:rPr lang="ru-RU" dirty="0" smtClean="0">
-                <a:solidFill>
-                  <a:schemeClr val="bg1"/>
-                </a:solidFill>
-              </a:rPr>
-              <a:t>найти следующее/предыдущее вхождение строки</a:t>
-            </a:r>
-          </a:p>
-          <a:p>
-            <a:pPr>
-              <a:buClr>
-                <a:schemeClr val="bg1"/>
-              </a:buClr>
-            </a:pPr>
-            <a:r>
-              <a:rPr lang="en-US" dirty="0">
-                <a:solidFill>
-                  <a:srgbClr val="F6AE1E"/>
-                </a:solidFill>
-              </a:rPr>
-              <a:t>Ctrl+F3</a:t>
-            </a:r>
-            <a:r>
-              <a:rPr lang="en-US" dirty="0" smtClean="0">
-                <a:solidFill>
-                  <a:schemeClr val="bg1"/>
-                </a:solidFill>
-              </a:rPr>
-              <a:t> </a:t>
-            </a:r>
-            <a:r>
-              <a:rPr lang="ru-RU" dirty="0" smtClean="0">
-                <a:solidFill>
-                  <a:schemeClr val="bg1"/>
-                </a:solidFill>
-              </a:rPr>
-              <a:t>найти следующее вхождение выделенного текста</a:t>
-            </a:r>
-          </a:p>
-          <a:p>
-            <a:pPr>
-              <a:buClr>
-                <a:schemeClr val="bg1"/>
-              </a:buClr>
-            </a:pPr>
-            <a:r>
-              <a:rPr lang="en-US" dirty="0" err="1">
-                <a:solidFill>
-                  <a:srgbClr val="F6AE1E"/>
-                </a:solidFill>
-              </a:rPr>
-              <a:t>Ctrl+Shift+F</a:t>
-            </a:r>
-            <a:r>
-              <a:rPr lang="en-US" dirty="0" smtClean="0">
-                <a:solidFill>
-                  <a:schemeClr val="bg1"/>
-                </a:solidFill>
-              </a:rPr>
-              <a:t> </a:t>
-            </a:r>
-            <a:r>
-              <a:rPr lang="ru-RU" dirty="0" smtClean="0">
-                <a:solidFill>
-                  <a:schemeClr val="bg1"/>
-                </a:solidFill>
-              </a:rPr>
-              <a:t>найти в </a:t>
-            </a:r>
-            <a:r>
-              <a:rPr lang="en-US" dirty="0" smtClean="0">
-                <a:solidFill>
-                  <a:schemeClr val="bg1"/>
-                </a:solidFill>
-              </a:rPr>
-              <a:t>solution</a:t>
-            </a:r>
-          </a:p>
-          <a:p>
-            <a:pPr marL="0" indent="0">
-              <a:buClr>
-                <a:schemeClr val="bg1"/>
-              </a:buClr>
-              <a:buNone/>
-            </a:pPr>
-            <a:endParaRPr lang="ru-RU" dirty="0" smtClean="0">
-              <a:solidFill>
-                <a:schemeClr val="bg1"/>
-              </a:solidFill>
-            </a:endParaRPr>
-          </a:p>
-          <a:p>
-            <a:pPr>
-              <a:buClr>
-                <a:schemeClr val="bg1"/>
-              </a:buClr>
-            </a:pPr>
-            <a:endParaRPr lang="ru-RU" dirty="0">
-              <a:solidFill>
-                <a:schemeClr val="bg1"/>
-              </a:solidFill>
-            </a:endParaRPr>
-          </a:p>
-          <a:p>
-            <a:pPr marL="0" indent="0">
-              <a:buClr>
-                <a:schemeClr val="bg1"/>
-              </a:buClr>
-              <a:buNone/>
-            </a:pPr>
-            <a:r>
-              <a:rPr lang="en-US" dirty="0">
-                <a:solidFill>
-                  <a:schemeClr val="bg1"/>
-                </a:solidFill>
-                <a:hlinkClick r:id="rId2"/>
-              </a:rPr>
-              <a:t>http://</a:t>
-            </a:r>
-            <a:r>
-              <a:rPr lang="en-US" dirty="0" smtClean="0">
-                <a:solidFill>
-                  <a:schemeClr val="bg1"/>
-                </a:solidFill>
-                <a:hlinkClick r:id="rId2"/>
-              </a:rPr>
-              <a:t>weblogs.asp.net/scottgu/archive/2010/08/24/search-and-navigation-tips-tricks-with-visual-studio.aspx</a:t>
-            </a:r>
-            <a:endParaRPr lang="ru-RU" dirty="0" smtClean="0">
-              <a:solidFill>
-                <a:schemeClr val="bg1"/>
-              </a:solidFill>
-            </a:endParaRPr>
-          </a:p>
-          <a:p>
-            <a:pPr marL="0" indent="0">
-              <a:buClr>
-                <a:schemeClr val="bg1"/>
-              </a:buClr>
-              <a:buNone/>
-            </a:pPr>
-            <a:endParaRPr lang="en-US" dirty="0">
-              <a:solidFill>
-                <a:schemeClr val="bg1"/>
-              </a:solidFill>
-            </a:endParaRPr>
+            <a:endParaRPr lang="ru-RU" dirty="0" smtClean="0"/>
+          </a:p>
+          <a:p>
+            <a:endParaRPr lang="ru-RU" dirty="0"/>
           </a:p>
         </p:txBody>
       </p:sp>
     </p:spTree>
     <p:extLst>
       <p:ext uri="{BB962C8B-B14F-4D97-AF65-F5344CB8AC3E}">
-        <p14:creationId xmlns:p14="http://schemas.microsoft.com/office/powerpoint/2010/main" val="1967395690"/>
+        <p14:creationId xmlns:p14="http://schemas.microsoft.com/office/powerpoint/2010/main" val="2394860654"/>
       </p:ext>
     </p:extLst>
   </p:cSld>
   <p:clrMapOvr>
     <a:masterClrMapping/>
   </p:clrMapOvr>
-  <p:timing>
-    <p:tnLst>
-      <p:par>
-        <p:cTn id="1" dur="indefinite" restart="never" nodeType="tmRoot"/>
-      </p:par>
-    </p:tnLst>
-  </p:timing>
 </p:sld>
 </file>
 
@@ -7448,14 +6995,6 @@
               <a:rPr lang="ru-RU" dirty="0" smtClean="0"/>
               <a:t>Редактор</a:t>
             </a:r>
-            <a:r>
-              <a:rPr lang="en-US" dirty="0" smtClean="0"/>
-              <a:t>: </a:t>
-            </a:r>
-            <a:r>
-              <a:rPr lang="ru-RU" dirty="0" smtClean="0"/>
-              <a:t>Выделение текста</a:t>
-            </a:r>
             <a:endParaRPr lang="en-US" dirty="0"/>
           </a:p>
         </p:txBody>
@@ -7473,7 +7012,7 @@
         <p:spPr/>
         <p:txBody>
           <a:bodyPr>
-            <a:normAutofit/>
+            <a:normAutofit lnSpcReduction="10000"/>
           </a:bodyPr>
           <a:lstStyle/>
           <a:p>
@@ -7483,94 +7022,288 @@
               </a:buClr>
             </a:pPr>
             <a:r>
-              <a:rPr lang="en-US" dirty="0" err="1" smtClean="0">
+              <a:rPr lang="en-US" dirty="0" smtClean="0">
+                <a:solidFill>
+                  <a:srgbClr val="92D050"/>
+                </a:solidFill>
+              </a:rPr>
+              <a:t>[10]</a:t>
+            </a:r>
+            <a:r>
+              <a:rPr lang="en-US" dirty="0" smtClean="0"/>
+              <a:t> </a:t>
+            </a:r>
+            <a:r>
+              <a:rPr lang="ru-RU" dirty="0" smtClean="0"/>
+              <a:t>Изменение размера шрифта </a:t>
+            </a:r>
+            <a:r>
+              <a:rPr lang="en-US" dirty="0">
                 <a:solidFill>
                   <a:srgbClr val="F6AE1E"/>
                 </a:solidFill>
               </a:rPr>
+              <a:t>(</a:t>
+            </a:r>
+            <a:r>
+              <a:rPr lang="en-US" dirty="0" err="1">
+                <a:solidFill>
+                  <a:srgbClr val="F6AE1E"/>
+                </a:solidFill>
+              </a:rPr>
               <a:t>Ctrl+Shift</a:t>
             </a:r>
             <a:r>
+              <a:rPr lang="en-US" dirty="0">
+                <a:solidFill>
+                  <a:srgbClr val="F6AE1E"/>
+                </a:solidFill>
+              </a:rPr>
+              <a:t> + &lt;/&gt; </a:t>
+            </a:r>
+            <a:r>
+              <a:rPr lang="ru-RU" dirty="0" smtClean="0">
+                <a:solidFill>
+                  <a:schemeClr val="bg1"/>
+                </a:solidFill>
+              </a:rPr>
+              <a:t>или</a:t>
+            </a:r>
+            <a:r>
               <a:rPr lang="en-US" dirty="0" smtClean="0">
                 <a:solidFill>
                   <a:srgbClr val="F6AE1E"/>
                 </a:solidFill>
               </a:rPr>
-              <a:t>+]</a:t>
-            </a:r>
-            <a:r>
-              <a:rPr lang="ru-RU" dirty="0" smtClean="0">
-                <a:solidFill>
-                  <a:schemeClr val="bg1"/>
-                </a:solidFill>
-              </a:rPr>
-              <a:t> выделение блока внутри</a:t>
+              <a:t> </a:t>
+            </a:r>
+            <a:r>
+              <a:rPr lang="en-US" dirty="0">
+                <a:solidFill>
+                  <a:srgbClr val="F6AE1E"/>
+                </a:solidFill>
+              </a:rPr>
+              <a:t>Ctrl + Mouse Scroll</a:t>
             </a:r>
             <a:r>
               <a:rPr lang="en-US" dirty="0" smtClean="0">
                 <a:solidFill>
-                  <a:schemeClr val="bg1"/>
-                </a:solidFill>
-              </a:rPr>
-              <a:t> { }. </a:t>
-            </a:r>
-            <a:r>
-              <a:rPr lang="ru-RU" dirty="0" smtClean="0">
-                <a:solidFill>
-                  <a:schemeClr val="bg1"/>
-                </a:solidFill>
-              </a:rPr>
-              <a:t>Курсор должен стоять на </a:t>
-            </a:r>
-            <a:r>
-              <a:rPr lang="en-US" dirty="0" smtClean="0">
-                <a:solidFill>
-                  <a:schemeClr val="bg1"/>
-                </a:solidFill>
-              </a:rPr>
-              <a:t>{ </a:t>
-            </a:r>
-            <a:r>
-              <a:rPr lang="ru-RU" dirty="0" smtClean="0">
-                <a:solidFill>
-                  <a:schemeClr val="bg1"/>
-                </a:solidFill>
-              </a:rPr>
-              <a:t>или </a:t>
-            </a:r>
-            <a:r>
-              <a:rPr lang="en-US" dirty="0" smtClean="0">
-                <a:solidFill>
-                  <a:schemeClr val="bg1"/>
-                </a:solidFill>
-              </a:rPr>
-              <a:t>}</a:t>
+                  <a:srgbClr val="F6AE1E"/>
+                </a:solidFill>
+              </a:rPr>
+              <a:t>)</a:t>
             </a:r>
             <a:endParaRPr lang="ru-RU" dirty="0" smtClean="0">
               <a:solidFill>
-                <a:schemeClr val="bg1"/>
+                <a:srgbClr val="F6AE1E"/>
               </a:solidFill>
             </a:endParaRPr>
           </a:p>
           <a:p>
-            <a:pPr marL="0" indent="0">
+            <a:pPr>
               <a:buClr>
                 <a:schemeClr val="bg1"/>
               </a:buClr>
-              <a:buNone/>
             </a:pPr>
-            <a:endParaRPr lang="en-US" dirty="0">
+            <a:r>
+              <a:rPr lang="en-US" dirty="0">
+                <a:solidFill>
+                  <a:srgbClr val="92D050"/>
+                </a:solidFill>
+              </a:rPr>
+              <a:t>[10]</a:t>
+            </a:r>
+            <a:r>
+              <a:rPr lang="en-US" dirty="0" smtClean="0"/>
+              <a:t> </a:t>
+            </a:r>
+            <a:r>
+              <a:rPr lang="ru-RU" dirty="0" smtClean="0"/>
+              <a:t>Многострочное редактирование</a:t>
+            </a:r>
+            <a:r>
+              <a:rPr lang="en-US" dirty="0" smtClean="0"/>
+              <a:t> </a:t>
+            </a:r>
+            <a:r>
+              <a:rPr lang="en-US" dirty="0" smtClean="0">
+                <a:solidFill>
+                  <a:srgbClr val="F6AE1E"/>
+                </a:solidFill>
+              </a:rPr>
+              <a:t>(</a:t>
+            </a:r>
+            <a:r>
+              <a:rPr lang="en-US" dirty="0" err="1">
+                <a:solidFill>
+                  <a:srgbClr val="F6AE1E"/>
+                </a:solidFill>
+              </a:rPr>
+              <a:t>Alt+Shift</a:t>
+            </a:r>
+            <a:r>
+              <a:rPr lang="en-US" dirty="0">
+                <a:solidFill>
+                  <a:srgbClr val="F6AE1E"/>
+                </a:solidFill>
+              </a:rPr>
+              <a:t> + Up/Down</a:t>
+            </a:r>
+            <a:r>
+              <a:rPr lang="en-US" dirty="0"/>
+              <a:t> </a:t>
+            </a:r>
+            <a:r>
+              <a:rPr lang="ru-RU" dirty="0" smtClean="0"/>
+              <a:t>или</a:t>
+            </a:r>
+            <a:r>
+              <a:rPr lang="en-US" dirty="0" smtClean="0"/>
+              <a:t> </a:t>
+            </a:r>
+            <a:r>
+              <a:rPr lang="en-US" dirty="0">
+                <a:solidFill>
+                  <a:srgbClr val="F6AE1E"/>
+                </a:solidFill>
+              </a:rPr>
+              <a:t>Alt + Mouse Up/Down</a:t>
+            </a:r>
+            <a:r>
+              <a:rPr lang="en-US" dirty="0" smtClean="0">
+                <a:solidFill>
+                  <a:srgbClr val="F6AE1E"/>
+                </a:solidFill>
+              </a:rPr>
+              <a:t>)</a:t>
+            </a:r>
+            <a:endParaRPr lang="ru-RU" dirty="0" smtClean="0">
               <a:solidFill>
-                <a:schemeClr val="bg1"/>
+                <a:srgbClr val="F6AE1E"/>
               </a:solidFill>
             </a:endParaRPr>
+          </a:p>
+          <a:p>
+            <a:pPr>
+              <a:buClr>
+                <a:schemeClr val="bg1"/>
+              </a:buClr>
+            </a:pPr>
+            <a:r>
+              <a:rPr lang="en-US" dirty="0" smtClean="0">
+                <a:solidFill>
+                  <a:srgbClr val="92D050"/>
+                </a:solidFill>
+              </a:rPr>
+              <a:t>[0</a:t>
+            </a:r>
+            <a:r>
+              <a:rPr lang="ru-RU" dirty="0" smtClean="0">
+                <a:solidFill>
+                  <a:srgbClr val="92D050"/>
+                </a:solidFill>
+              </a:rPr>
+              <a:t>5</a:t>
+            </a:r>
+            <a:r>
+              <a:rPr lang="en-US" dirty="0" smtClean="0">
+                <a:solidFill>
+                  <a:srgbClr val="92D050"/>
+                </a:solidFill>
+              </a:rPr>
+              <a:t>]</a:t>
+            </a:r>
+            <a:r>
+              <a:rPr lang="en-US" dirty="0" smtClean="0"/>
+              <a:t> </a:t>
+            </a:r>
+            <a:r>
+              <a:rPr lang="ru-RU" dirty="0" smtClean="0"/>
+              <a:t>Вставка текста из ц</a:t>
+            </a:r>
+            <a:r>
+              <a:rPr lang="ru-RU" dirty="0" smtClean="0">
+                <a:solidFill>
+                  <a:schemeClr val="bg1"/>
+                </a:solidFill>
+              </a:rPr>
+              <a:t>иклического буфера обмена </a:t>
+            </a:r>
+            <a:r>
+              <a:rPr lang="en-US" dirty="0">
+                <a:solidFill>
+                  <a:srgbClr val="F6AE1E"/>
+                </a:solidFill>
+              </a:rPr>
+              <a:t>(</a:t>
+            </a:r>
+            <a:r>
+              <a:rPr lang="en-US" dirty="0" err="1">
+                <a:solidFill>
+                  <a:srgbClr val="F6AE1E"/>
+                </a:solidFill>
+              </a:rPr>
+              <a:t>Ctrl+Shift</a:t>
+            </a:r>
+            <a:r>
+              <a:rPr lang="en-US" dirty="0">
+                <a:solidFill>
+                  <a:srgbClr val="F6AE1E"/>
+                </a:solidFill>
+              </a:rPr>
+              <a:t> + V</a:t>
+            </a:r>
+            <a:r>
+              <a:rPr lang="en-US" dirty="0" smtClean="0">
+                <a:solidFill>
+                  <a:srgbClr val="F6AE1E"/>
+                </a:solidFill>
+              </a:rPr>
+              <a:t>)</a:t>
+            </a:r>
+            <a:endParaRPr lang="ru-RU" dirty="0" smtClean="0">
+              <a:solidFill>
+                <a:srgbClr val="F6AE1E"/>
+              </a:solidFill>
+            </a:endParaRPr>
+          </a:p>
+          <a:p>
+            <a:pPr>
+              <a:buClr>
+                <a:schemeClr val="bg1"/>
+              </a:buClr>
+            </a:pPr>
+            <a:r>
+              <a:rPr lang="ru-RU" dirty="0" smtClean="0">
+                <a:solidFill>
+                  <a:schemeClr val="bg1"/>
+                </a:solidFill>
+              </a:rPr>
+              <a:t>Прокрутка текста без изменения положения курсора</a:t>
+            </a:r>
+            <a:r>
+              <a:rPr lang="en-US" dirty="0" smtClean="0">
+                <a:solidFill>
+                  <a:schemeClr val="bg1"/>
+                </a:solidFill>
+              </a:rPr>
+              <a:t> </a:t>
+            </a:r>
+            <a:r>
+              <a:rPr lang="en-US" dirty="0">
+                <a:solidFill>
+                  <a:srgbClr val="F6AE1E"/>
+                </a:solidFill>
+              </a:rPr>
+              <a:t>(Ctrl + Up/Down Arrow)</a:t>
+            </a:r>
           </a:p>
         </p:txBody>
       </p:sp>
     </p:spTree>
     <p:extLst>
       <p:ext uri="{BB962C8B-B14F-4D97-AF65-F5344CB8AC3E}">
-        <p14:creationId xmlns:p14="http://schemas.microsoft.com/office/powerpoint/2010/main" val="4175683496"/>
+        <p14:creationId xmlns:p14="http://schemas.microsoft.com/office/powerpoint/2010/main" val="468185828"/>
       </p:ext>
     </p:extLst>
   </p:cSld>
@@ -7621,7 +7354,11 @@
           <a:p>
             <a:r>
               <a:rPr lang="ru-RU" dirty="0" smtClean="0"/>
-              <a:t>Редактор: комментарии</a:t>
+              <a:t>Редактор</a:t>
+            </a:r>
+            <a:r>
+              <a:rPr lang="en-US" dirty="0" smtClean="0"/>
+              <a:t>: Virtual Space</a:t>
             </a:r>
             <a:endParaRPr lang="ru-RU" dirty="0"/>
           </a:p>
@@ -7639,113 +7376,58 @@
         </p:nvSpPr>
         <p:spPr/>
         <p:txBody>
-          <a:bodyPr>
-            <a:normAutofit/>
-          </a:bodyPr>
+          <a:bodyPr/>
           <a:lstStyle/>
           <a:p>
-            <a:r>
-              <a:rPr lang="en-US" sz="2800" dirty="0" err="1">
-                <a:solidFill>
-                  <a:srgbClr val="F6AE1E"/>
-                </a:solidFill>
-              </a:rPr>
-              <a:t>Ctrl+K</a:t>
-            </a:r>
-            <a:r>
-              <a:rPr lang="en-US" sz="2800" dirty="0">
-                <a:solidFill>
-                  <a:srgbClr val="F6AE1E"/>
-                </a:solidFill>
-              </a:rPr>
+            <a:pPr marL="0" indent="0">
+              <a:buNone/>
+            </a:pPr>
+            <a:r>
+              <a:rPr lang="ru-RU" dirty="0" smtClean="0"/>
+              <a:t>Если </a:t>
+            </a:r>
+            <a:r>
+              <a:rPr lang="ru-RU" dirty="0"/>
+              <a:t>включить </a:t>
+            </a:r>
+            <a:r>
+              <a:rPr lang="ru-RU" dirty="0" smtClean="0"/>
+              <a:t>переключатель «</a:t>
+            </a:r>
+            <a:r>
+              <a:rPr lang="en-US" dirty="0" smtClean="0"/>
+              <a:t>Enable virtual space</a:t>
+            </a:r>
+            <a:r>
+              <a:rPr lang="ru-RU" dirty="0" smtClean="0"/>
+              <a:t>»</a:t>
+            </a:r>
+            <a:r>
+              <a:rPr lang="en-US" dirty="0" smtClean="0"/>
               <a:t>, </a:t>
             </a:r>
             <a:r>
-              <a:rPr lang="en-US" sz="2800" dirty="0" err="1">
-                <a:solidFill>
-                  <a:srgbClr val="F6AE1E"/>
-                </a:solidFill>
-              </a:rPr>
-              <a:t>Ctrl+C</a:t>
-            </a:r>
-            <a:r>
-              <a:rPr lang="en-US" sz="2800" dirty="0">
-                <a:solidFill>
-                  <a:schemeClr val="bg1"/>
-                </a:solidFill>
-              </a:rPr>
-              <a:t> </a:t>
-            </a:r>
-            <a:r>
-              <a:rPr lang="ru-RU" sz="2800" dirty="0">
-                <a:solidFill>
-                  <a:schemeClr val="bg1"/>
-                </a:solidFill>
-              </a:rPr>
-              <a:t>закоментировать выбранные </a:t>
-            </a:r>
-            <a:r>
-              <a:rPr lang="ru-RU" sz="2800" dirty="0" smtClean="0">
-                <a:solidFill>
-                  <a:schemeClr val="bg1"/>
-                </a:solidFill>
-              </a:rPr>
-              <a:t>строки</a:t>
-            </a:r>
-          </a:p>
-          <a:p>
-            <a:r>
-              <a:rPr lang="en-US" sz="2800" dirty="0" err="1">
-                <a:solidFill>
-                  <a:srgbClr val="F6AE1E"/>
-                </a:solidFill>
-              </a:rPr>
-              <a:t>Ctrl+K</a:t>
-            </a:r>
-            <a:r>
-              <a:rPr lang="en-US" sz="2800" dirty="0">
-                <a:solidFill>
-                  <a:srgbClr val="F6AE1E"/>
-                </a:solidFill>
-              </a:rPr>
-              <a:t>, </a:t>
-            </a:r>
-            <a:r>
-              <a:rPr lang="en-US" sz="2800" dirty="0" err="1">
-                <a:solidFill>
-                  <a:srgbClr val="F6AE1E"/>
-                </a:solidFill>
-              </a:rPr>
-              <a:t>Ctrl+U</a:t>
-            </a:r>
-            <a:r>
-              <a:rPr lang="en-US" sz="2800" dirty="0"/>
-              <a:t> </a:t>
-            </a:r>
-            <a:r>
-              <a:rPr lang="ru-RU" sz="2800" dirty="0"/>
-              <a:t>снять коментарий с выбранных строк</a:t>
-            </a:r>
+              <a:rPr lang="ru-RU" dirty="0" smtClean="0"/>
+              <a:t>то курсор можно будет ставить в любой место в документе, а не только туда где введен </a:t>
+            </a:r>
+            <a:r>
+              <a:rPr lang="ru-RU" smtClean="0"/>
+              <a:t>текст. </a:t>
+            </a:r>
+            <a:endParaRPr lang="ru-RU" dirty="0"/>
           </a:p>
         </p:txBody>
       </p:sp>
     </p:spTree>
     <p:extLst>
       <p:ext uri="{BB962C8B-B14F-4D97-AF65-F5344CB8AC3E}">
-        <p14:creationId xmlns:p14="http://schemas.microsoft.com/office/powerpoint/2010/main" val="4274730761"/>
+        <p14:creationId xmlns:p14="http://schemas.microsoft.com/office/powerpoint/2010/main" val="2950142326"/>
       </p:ext>
     </p:extLst>
   </p:cSld>
   <p:clrMapOvr>
     <a:masterClrMapping/>
   </p:clrMapOvr>
-  <p:timing>
-    <p:tnLst>
-      <p:par>
-        <p:cTn id="1" dur="indefinite" restart="never" nodeType="tmRoot"/>
-      </p:par>
-    </p:tnLst>
-  </p:timing>
 </p:sld>
 </file>
 
@@ -7778,7 +7460,9 @@
         </p:nvSpPr>
         <p:spPr/>
         <p:txBody>
-          <a:bodyPr/>
+          <a:bodyPr>
+            <a:normAutofit fontScale="90000"/>
+          </a:bodyPr>
           <a:lstStyle/>
           <a:p>
             <a:r>
@@ -7787,13 +7471,16 @@
             </a:r>
             <a:r>
               <a:rPr lang="en-US" dirty="0" smtClean="0"/>
-              <a:t>: </a:t>
-            </a:r>
+              <a:t>: Outlining</a:t>
+            </a:r>
+            <a:br>
+              <a:rPr lang="en-US" dirty="0" smtClean="0"/>
+            </a:br>
             <a:r>
               <a:rPr lang="ru-RU" dirty="0" smtClean="0"/>
-              <a:t>Колоночный режим</a:t>
-            </a:r>
-            <a:endParaRPr lang="en-US" dirty="0"/>
+              <a:t>Свернуть выделенный блок текста</a:t>
+            </a:r>
+            <a:endParaRPr lang="ru-RU" dirty="0"/>
           </a:p>
         </p:txBody>
       </p:sp>
@@ -7809,169 +7496,76 @@
         </p:nvSpPr>
         <p:spPr/>
         <p:txBody>
-          <a:bodyPr>
-            <a:normAutofit/>
-          </a:bodyPr>
+          <a:bodyPr/>
           <a:lstStyle/>
           <a:p>
-            <a:pPr>
-              <a:buClr>
-                <a:schemeClr val="bg1"/>
-              </a:buClr>
+            <a:pPr marL="0" indent="0">
+              <a:buNone/>
             </a:pPr>
             <a:r>
-              <a:rPr lang="en-US" dirty="0" err="1" smtClean="0">
-                <a:solidFill>
-                  <a:srgbClr val="F6AE1E"/>
-                </a:solidFill>
-              </a:rPr>
-              <a:t>Shift+Alt+Arrow</a:t>
-            </a:r>
-            <a:r>
-              <a:rPr lang="ru-RU" dirty="0" smtClean="0">
-                <a:solidFill>
-                  <a:schemeClr val="bg1"/>
-                </a:solidFill>
-              </a:rPr>
-              <a:t> позволяет выделить прямоугольный блок текста</a:t>
-            </a:r>
-          </a:p>
-          <a:p>
-            <a:pPr>
-              <a:buClr>
-                <a:schemeClr val="bg1"/>
-              </a:buClr>
-            </a:pPr>
-            <a:r>
-              <a:rPr lang="en-US" dirty="0">
-                <a:solidFill>
-                  <a:srgbClr val="F6AE1E"/>
-                </a:solidFill>
-              </a:rPr>
-              <a:t>Alt + Left Mouse</a:t>
+              <a:rPr lang="ru-RU" dirty="0" smtClean="0"/>
+              <a:t>Выделяем текст, нажимаем </a:t>
             </a:r>
             <a:r>
               <a:rPr lang="en-US" dirty="0" smtClean="0">
                 <a:solidFill>
-                  <a:schemeClr val="bg1"/>
-                </a:solidFill>
-              </a:rPr>
-              <a:t> Button </a:t>
-            </a:r>
-            <a:r>
-              <a:rPr lang="ru-RU" dirty="0" smtClean="0">
-                <a:solidFill>
-                  <a:schemeClr val="bg1"/>
-                </a:solidFill>
-              </a:rPr>
-              <a:t>позиционирует курсор за концом строки даже если опция «</a:t>
-            </a:r>
-            <a:r>
-              <a:rPr lang="en-US" dirty="0" smtClean="0">
-                <a:solidFill>
-                  <a:schemeClr val="bg1"/>
-                </a:solidFill>
-              </a:rPr>
-              <a:t>enable virtual space</a:t>
-            </a:r>
-            <a:r>
-              <a:rPr lang="ru-RU" dirty="0" smtClean="0">
-                <a:solidFill>
-                  <a:schemeClr val="bg1"/>
-                </a:solidFill>
-              </a:rPr>
-              <a:t>» выключена</a:t>
-            </a:r>
-          </a:p>
-          <a:p>
-            <a:pPr>
-              <a:buClr>
-                <a:schemeClr val="bg1"/>
-              </a:buClr>
-            </a:pPr>
-            <a:endParaRPr lang="en-US" dirty="0" smtClean="0">
-              <a:solidFill>
-                <a:schemeClr val="bg1"/>
-              </a:solidFill>
-            </a:endParaRPr>
-          </a:p>
-          <a:p>
-            <a:pPr marL="0" indent="0">
-              <a:buClr>
-                <a:schemeClr val="bg1"/>
-              </a:buClr>
-              <a:buNone/>
-            </a:pPr>
-            <a:endParaRPr lang="ru-RU" dirty="0" smtClean="0">
-              <a:solidFill>
-                <a:schemeClr val="bg1"/>
-              </a:solidFill>
-            </a:endParaRPr>
-          </a:p>
-          <a:p>
-            <a:pPr>
-              <a:buClr>
-                <a:schemeClr val="bg1"/>
-              </a:buClr>
-            </a:pPr>
-            <a:endParaRPr lang="ru-RU" dirty="0">
-              <a:solidFill>
-                <a:schemeClr val="bg1"/>
-              </a:solidFill>
-            </a:endParaRPr>
-          </a:p>
-          <a:p>
-            <a:pPr marL="0" indent="0">
-              <a:buClr>
-                <a:schemeClr val="bg1"/>
-              </a:buClr>
-              <a:buNone/>
-            </a:pPr>
-            <a:endParaRPr lang="en-US" dirty="0">
-              <a:solidFill>
-                <a:schemeClr val="bg1"/>
-              </a:solidFill>
-            </a:endParaRPr>
+                  <a:srgbClr val="FFC000"/>
+                </a:solidFill>
+              </a:rPr>
+              <a:t>Ctrl + M, H</a:t>
+            </a:r>
+            <a:r>
+              <a:rPr lang="ru-RU" dirty="0" smtClean="0"/>
+              <a:t> и выделенный блок текста «свернется».</a:t>
+            </a:r>
+            <a:r>
+              <a:rPr lang="en-US" dirty="0" smtClean="0"/>
+              <a:t> </a:t>
+            </a:r>
+            <a:r>
+              <a:rPr lang="ru-RU" dirty="0" smtClean="0"/>
+              <a:t>Та же команда доступна в меню </a:t>
+            </a:r>
+            <a:r>
+              <a:rPr lang="en-US" dirty="0" smtClean="0"/>
+              <a:t>Edit -&gt;</a:t>
+            </a:r>
+            <a:r>
+              <a:rPr lang="ru-RU" dirty="0" smtClean="0"/>
+              <a:t> </a:t>
+            </a:r>
+            <a:r>
+              <a:rPr lang="en-US" dirty="0" smtClean="0"/>
+              <a:t>Outlining</a:t>
+            </a:r>
+            <a:r>
+              <a:rPr lang="ru-RU" dirty="0" smtClean="0"/>
+              <a:t> -</a:t>
+            </a:r>
+            <a:r>
+              <a:rPr lang="en-US" dirty="0" smtClean="0"/>
+              <a:t>&gt; Hide Selection.</a:t>
+            </a:r>
+            <a:endParaRPr lang="ru-RU" dirty="0"/>
           </a:p>
         </p:txBody>
       </p:sp>
     </p:spTree>
     <p:extLst>
       <p:ext uri="{BB962C8B-B14F-4D97-AF65-F5344CB8AC3E}">
-        <p14:creationId xmlns:p14="http://schemas.microsoft.com/office/powerpoint/2010/main" val="1998512366"/>
+        <p14:creationId xmlns:p14="http://schemas.microsoft.com/office/powerpoint/2010/main" val="2080747852"/>
       </p:ext>
     </p:extLst>
   </p:cSld>
   <p:clrMapOvr>
     <a:masterClrMapping/>
   </p:clrMapOvr>
-  <p:timing>
-    <p:tnLst>
-      <p:par>
-        <p:cTn id="1" dur="indefinite" restart="never" nodeType="tmRoot"/>
-      </p:par>
-    </p:tnLst>
-  </p:timing>
 </p:sld>
 </file>
 
 <file path=ppt/slides/slide18.xml><?xml version="1.0" encoding="utf-8"?>
 <p:sld xmlns:a="http://schemas.openxmlformats.org/drawingml/2006/main" xmlns:r="http://schemas.openxmlformats.org/officeDocument/2006/relationships" xmlns:p="http://schemas.openxmlformats.org/presentationml/2006/main">
   <p:cSld>
-    <p:bg>
-      <p:bgPr>
-        <a:blipFill dpi="0" rotWithShape="1">
-          <a:blip r:embed="rId3">
-            <a:lum/>
-          </a:blip>
-          <a:srcRect/>
-          <a:stretch>
-            <a:fillRect/>
-          </a:stretch>
-        </a:blipFill>
-        <a:effectLst/>
-      </p:bgPr>
-    </p:bg>
     <p:spTree>
       <p:nvGrpSpPr>
         <p:cNvPr id="1" name=""/>
@@ -8011,7 +7605,7 @@
             </a:r>
             <a:r>
               <a:rPr lang="ru-RU" dirty="0" smtClean="0"/>
-              <a:t>Навигация по коду</a:t>
+              <a:t>Поиск текста</a:t>
             </a:r>
             <a:endParaRPr lang="en-US" dirty="0"/>
           </a:p>
@@ -8030,7 +7624,7 @@
         <p:spPr/>
         <p:txBody>
           <a:bodyPr>
-            <a:normAutofit fontScale="77500" lnSpcReduction="20000"/>
+            <a:normAutofit fontScale="85000" lnSpcReduction="10000"/>
           </a:bodyPr>
           <a:lstStyle/>
           <a:p>
@@ -8040,20 +7634,28 @@
               </a:buClr>
             </a:pPr>
             <a:r>
+              <a:rPr lang="en-US" dirty="0" err="1" smtClean="0">
+                <a:solidFill>
+                  <a:srgbClr val="F6AE1E"/>
+                </a:solidFill>
+              </a:rPr>
+              <a:t>Ctrl+I</a:t>
+            </a:r>
+            <a:r>
+              <a:rPr lang="ru-RU" dirty="0" smtClean="0">
+                <a:solidFill>
+                  <a:schemeClr val="bg1"/>
+                </a:solidFill>
+              </a:rPr>
+              <a:t> </a:t>
+            </a:r>
+            <a:r>
               <a:rPr lang="en-US" dirty="0" smtClean="0">
                 <a:solidFill>
-                  <a:srgbClr val="F6AE1E"/>
-                </a:solidFill>
-              </a:rPr>
-              <a:t>F12</a:t>
-            </a:r>
-            <a:r>
-              <a:rPr lang="en-US" dirty="0" smtClean="0">
-                <a:solidFill>
                   <a:schemeClr val="bg1"/>
                 </a:solidFill>
               </a:rPr>
-              <a:t> </a:t>
+              <a:t>incremental </a:t>
             </a:r>
             <a:r>
               <a:rPr lang="ru-RU" dirty="0" smtClean="0">
@@ -8061,8 +7663,13 @@
                   <a:schemeClr val="bg1"/>
                 </a:solidFill>
               </a:rPr>
-              <a:t>перейти к объявлению</a:t>
-            </a:r>
+              <a:t>поиск</a:t>
+            </a:r>
+            <a:endParaRPr lang="ru-RU" dirty="0" smtClean="0">
+              <a:solidFill>
+                <a:schemeClr val="bg1"/>
+              </a:solidFill>
+            </a:endParaRPr>
           </a:p>
           <a:p>
             <a:pPr>
@@ -8076,7 +7683,7 @@
                   <a:srgbClr val="F6AE1E"/>
                 </a:solidFill>
               </a:rPr>
-              <a:t>Shift+F12</a:t>
+              <a:t>F3/Shift+F3</a:t>
             </a:r>
             <a:r>
               <a:rPr lang="en-US" dirty="0" smtClean="0">
@@ -8092,7 +7699,7 @@
                   <a:schemeClr val="bg1"/>
                 </a:solidFill>
               </a:rPr>
-              <a:t>найти все места где используется имя</a:t>
+              <a:t>найти следующее/предыдущее вхождение строки</a:t>
             </a:r>
           </a:p>
           <a:p>
@@ -8107,15 +7714,7 @@
                   <a:srgbClr val="F6AE1E"/>
                 </a:solidFill>
               </a:rPr>
-              <a:t>Ctrl+</a:t>
-            </a:r>
-            <a:r>
-              <a:rPr lang="ru-RU" dirty="0">
-                <a:solidFill>
-                  <a:srgbClr val="F6AE1E"/>
-                </a:solidFill>
-              </a:rPr>
-              <a:t>Минус</a:t>
+              <a:t>Ctrl+F3</a:t>
             </a:r>
             <a:r>
               <a:rPr lang="en-US" dirty="0" smtClean="0">
@@ -8131,47 +7730,7 @@
                   <a:schemeClr val="bg1"/>
                 </a:solidFill>
               </a:rPr>
-              <a:t>и </a:t>
-            </a:r>
-            <a:r>
-              <a:rPr lang="en-US" dirty="0" err="1" smtClean="0">
-                <a:solidFill>
-                  <a:srgbClr val="F6AE1E"/>
-                </a:solidFill>
-              </a:rPr>
-              <a:t>Shift+Ctrl</a:t>
-            </a:r>
-            <a:r>
-              <a:rPr lang="en-US" dirty="0" smtClean="0">
-                <a:solidFill>
-                  <a:srgbClr val="F6AE1E"/>
-                </a:solidFill>
-              </a:rPr>
-              <a:t>+</a:t>
-            </a:r>
-            <a:r>
-              <a:rPr lang="ru-RU" dirty="0" smtClean="0">
-                <a:solidFill>
-                  <a:srgbClr val="F6AE1E"/>
-                </a:solidFill>
-              </a:rPr>
-              <a:t>Минус</a:t>
-            </a:r>
-            <a:r>
-              <a:rPr lang="en-US" dirty="0" smtClean="0">
-                <a:solidFill>
-                  <a:schemeClr val="bg1"/>
-                </a:solidFill>
-              </a:rPr>
-              <a:t> </a:t>
-            </a:r>
-            <a:r>
-              <a:rPr lang="ru-RU" dirty="0" smtClean="0">
-                <a:solidFill>
-                  <a:schemeClr val="bg1"/>
-                </a:solidFill>
-              </a:rPr>
-              <a:t>навигация «вперед»/«назад»</a:t>
+              <a:t>найти следующее вхождение выделенного текста</a:t>
             </a:r>
           </a:p>
           <a:p>
@@ -8186,23 +7745,15 @@
                   <a:srgbClr val="F6AE1E"/>
                 </a:solidFill>
               </a:rPr>
-              <a:t>Ctrl+Alt</a:t>
-            </a:r>
-            <a:r>
-              <a:rPr lang="en-US" dirty="0">
-                <a:solidFill>
-                  <a:srgbClr val="F6AE1E"/>
-                </a:solidFill>
-              </a:rPr>
-              <a:t>+</a:t>
-            </a:r>
-            <a:r>
-              <a:rPr lang="ru-RU" dirty="0">
-                <a:solidFill>
-                  <a:srgbClr val="F6AE1E"/>
-                </a:solidFill>
-              </a:rPr>
-              <a:t>Стрелка вниз</a:t>
+              <a:t>Ctrl+Shift+F</a:t>
+            </a:r>
+            <a:r>
+              <a:rPr lang="en-US" dirty="0" smtClean="0">
+                <a:solidFill>
+                  <a:schemeClr val="bg1"/>
+                </a:solidFill>
+              </a:rPr>
+              <a:t> </a:t>
             </a:r>
             <a:r>
               <a:rPr lang="ru-RU" dirty="0" smtClean="0">
@@ -8210,76 +7761,25 @@
                   <a:schemeClr val="bg1"/>
                 </a:solidFill>
               </a:rPr>
-              <a:t> показать список открытых файлов</a:t>
-            </a:r>
-            <a:endParaRPr lang="en-US" dirty="0" smtClean="0">
-              <a:solidFill>
-                <a:schemeClr val="bg1"/>
-              </a:solidFill>
-            </a:endParaRPr>
-          </a:p>
-          <a:p>
-            <a:pPr>
+              <a:t>найти в </a:t>
+            </a:r>
+            <a:r>
+              <a:rPr lang="en-US" dirty="0" smtClean="0">
+                <a:solidFill>
+                  <a:schemeClr val="bg1"/>
+                </a:solidFill>
+              </a:rPr>
+              <a:t>solution</a:t>
+            </a:r>
+          </a:p>
+          <a:p>
+            <a:pPr marL="0" indent="0">
               <a:buClr>
                 <a:schemeClr val="bg1"/>
               </a:buClr>
+              <a:buNone/>
             </a:pPr>
-            <a:r>
-              <a:rPr lang="en-US" dirty="0" err="1">
-                <a:solidFill>
-                  <a:srgbClr val="F6AE1E"/>
-                </a:solidFill>
-              </a:rPr>
-              <a:t>Ctrl+G</a:t>
-            </a:r>
-            <a:r>
-              <a:rPr lang="en-US" dirty="0">
-                <a:solidFill>
-                  <a:schemeClr val="bg1"/>
-                </a:solidFill>
-              </a:rPr>
-              <a:t> </a:t>
-            </a:r>
-            <a:r>
-              <a:rPr lang="ru-RU" dirty="0">
-                <a:solidFill>
-                  <a:schemeClr val="bg1"/>
-                </a:solidFill>
-              </a:rPr>
-              <a:t>перейти на строку </a:t>
-            </a:r>
-            <a:r>
-              <a:rPr lang="ru-RU" dirty="0" smtClean="0">
-                <a:solidFill>
-                  <a:schemeClr val="bg1"/>
-                </a:solidFill>
-              </a:rPr>
-              <a:t>№</a:t>
-            </a:r>
-          </a:p>
-          <a:p>
-            <a:pPr>
-              <a:buClr>
-                <a:schemeClr val="bg1"/>
-              </a:buClr>
-            </a:pPr>
-            <a:r>
-              <a:rPr lang="en-US" dirty="0">
-                <a:solidFill>
-                  <a:srgbClr val="F6AE1E"/>
-                </a:solidFill>
-              </a:rPr>
-              <a:t>Ctrl+] </a:t>
-            </a:r>
-            <a:r>
-              <a:rPr lang="ru-RU" dirty="0" smtClean="0">
-                <a:solidFill>
-                  <a:schemeClr val="bg1"/>
-                </a:solidFill>
-              </a:rPr>
-              <a:t>перейти к парной скобке открывающей или закрывающей скобке</a:t>
-            </a:r>
-            <a:endParaRPr lang="en-US" dirty="0" smtClean="0">
+            <a:endParaRPr lang="ru-RU" dirty="0" smtClean="0">
               <a:solidFill>
                 <a:schemeClr val="bg1"/>
               </a:solidFill>
@@ -8309,7 +7809,7 @@
                 <a:solidFill>
                   <a:schemeClr val="bg1"/>
                 </a:solidFill>
-                <a:hlinkClick r:id="rId4"/>
+                <a:hlinkClick r:id="rId2"/>
               </a:rPr>
               <a:t>http://</a:t>
             </a:r>
@@ -8318,7 +7818,7 @@
                 <a:solidFill>
                   <a:schemeClr val="bg1"/>
                 </a:solidFill>
-                <a:hlinkClick r:id="rId4"/>
+                <a:hlinkClick r:id="rId2"/>
               </a:rPr>
               <a:t>weblogs.asp.net/scottgu/archive/2010/08/24/search-and-navigation-tips-tricks-with-visual-studio.aspx</a:t>
             </a:r>
@@ -8346,12 +7846,12 @@
     </p:spTree>
     <p:extLst>
       <p:ext uri="{BB962C8B-B14F-4D97-AF65-F5344CB8AC3E}">
-        <p14:creationId xmlns:p14="http://schemas.microsoft.com/office/powerpoint/2010/main" val="1465218823"/>
+        <p14:creationId xmlns:p14="http://schemas.microsoft.com/office/powerpoint/2010/main" val="1967395690"/>
       </p:ext>
     </p:extLst>
   </p:cSld>
   <p:clrMapOvr>
-    <a:overrideClrMapping bg1="lt1" tx1="dk1" bg2="lt2" tx2="dk2" accent1="accent1" accent2="accent2" accent3="accent3" accent4="accent4" accent5="accent5" accent6="accent6" hlink="hlink" folHlink="folHlink"/>
+    <a:masterClrMapping/>
   </p:clrMapOvr>
   <p:timing>
     <p:tnLst>
@@ -8392,14 +7892,31 @@
         </p:nvSpPr>
         <p:spPr/>
         <p:txBody>
-          <a:bodyPr/>
+          <a:bodyPr>
+            <a:normAutofit fontScale="90000"/>
+          </a:bodyPr>
           <a:lstStyle/>
           <a:p>
             <a:r>
               <a:rPr lang="ru-RU" dirty="0" smtClean="0"/>
-              <a:t>Редактор: Смарт-тег</a:t>
-            </a:r>
-            <a:endParaRPr lang="ru-RU" dirty="0"/>
+              <a:t>Редактор</a:t>
+            </a:r>
+            <a:r>
+              <a:rPr lang="en-US" dirty="0" smtClean="0"/>
+              <a:t>: </a:t>
+            </a:r>
+            <a:r>
+              <a:rPr lang="ru-RU" dirty="0" smtClean="0"/>
+              <a:t>работа с блоками</a:t>
+            </a:r>
+            <a:br>
+              <a:rPr lang="ru-RU" dirty="0" smtClean="0"/>
+            </a:br>
+            <a:r>
+              <a:rPr lang="ru-RU" dirty="0" smtClean="0"/>
+              <a:t>внутри скобок</a:t>
+            </a:r>
+            <a:endParaRPr lang="en-US" dirty="0"/>
           </a:p>
         </p:txBody>
       </p:sp>
@@ -8415,49 +7932,128 @@
         </p:nvSpPr>
         <p:spPr/>
         <p:txBody>
-          <a:bodyPr/>
+          <a:bodyPr>
+            <a:normAutofit/>
+          </a:bodyPr>
           <a:lstStyle/>
           <a:p>
+            <a:pPr>
+              <a:buClr>
+                <a:schemeClr val="bg1"/>
+              </a:buClr>
+            </a:pPr>
+            <a:r>
+              <a:rPr lang="en-US" dirty="0" err="1" smtClean="0">
+                <a:solidFill>
+                  <a:srgbClr val="F6AE1E"/>
+                </a:solidFill>
+              </a:rPr>
+              <a:t>Ctrl+Shift</a:t>
+            </a:r>
             <a:r>
               <a:rPr lang="en-US" dirty="0" smtClean="0">
                 <a:solidFill>
                   <a:srgbClr val="F6AE1E"/>
                 </a:solidFill>
               </a:rPr>
-              <a:t>Alt + Shift + F10</a:t>
-            </a:r>
-            <a:r>
-              <a:rPr lang="en-US" dirty="0" smtClean="0"/>
-              <a:t> </a:t>
-            </a:r>
-            <a:r>
-              <a:rPr lang="ru-RU" dirty="0" smtClean="0"/>
+              <a:t>+]</a:t>
+            </a:r>
+            <a:r>
+              <a:rPr lang="ru-RU" dirty="0" smtClean="0">
+                <a:solidFill>
+                  <a:schemeClr val="bg1"/>
+                </a:solidFill>
+              </a:rPr>
+              <a:t> выделение блока внутри</a:t>
+            </a:r>
+            <a:r>
+              <a:rPr lang="en-US" dirty="0" smtClean="0">
+                <a:solidFill>
+                  <a:schemeClr val="bg1"/>
+                </a:solidFill>
+              </a:rPr>
+              <a:t> { }. </a:t>
+            </a:r>
+            <a:r>
+              <a:rPr lang="ru-RU" dirty="0" smtClean="0">
+                <a:solidFill>
+                  <a:schemeClr val="bg1"/>
+                </a:solidFill>
+              </a:rPr>
+              <a:t>Курсор должен стоять на </a:t>
+            </a:r>
+            <a:r>
+              <a:rPr lang="en-US" dirty="0" smtClean="0">
+                <a:solidFill>
+                  <a:schemeClr val="bg1"/>
+                </a:solidFill>
+              </a:rPr>
+              <a:t>{ </a:t>
+            </a:r>
+            <a:r>
+              <a:rPr lang="ru-RU" dirty="0" smtClean="0">
+                <a:solidFill>
+                  <a:schemeClr val="bg1"/>
+                </a:solidFill>
+              </a:rPr>
               <a:t>или </a:t>
             </a:r>
             <a:r>
               <a:rPr lang="en-US" dirty="0" smtClean="0">
                 <a:solidFill>
+                  <a:schemeClr val="bg1"/>
+                </a:solidFill>
+              </a:rPr>
+              <a:t>}</a:t>
+            </a:r>
+          </a:p>
+          <a:p>
+            <a:pPr>
+              <a:buClr>
+                <a:schemeClr val="bg1"/>
+              </a:buClr>
+            </a:pPr>
+            <a:r>
+              <a:rPr lang="en-US" dirty="0">
+                <a:solidFill>
                   <a:srgbClr val="F6AE1E"/>
                 </a:solidFill>
               </a:rPr>
-              <a:t>Ctrl + .</a:t>
-            </a:r>
-            <a:r>
-              <a:rPr lang="en-US" dirty="0" smtClean="0"/>
-              <a:t> – </a:t>
-            </a:r>
-            <a:r>
-              <a:rPr lang="ru-RU" dirty="0" smtClean="0"/>
-              <a:t>открыть меню смарт-тега</a:t>
-            </a:r>
-            <a:endParaRPr lang="ru-RU" dirty="0"/>
+              <a:t>Ctrl+] </a:t>
+            </a:r>
+            <a:r>
+              <a:rPr lang="ru-RU" dirty="0">
+                <a:solidFill>
+                  <a:schemeClr val="bg1"/>
+                </a:solidFill>
+              </a:rPr>
+              <a:t>перейти к парной скобке открывающей или закрывающей скобке</a:t>
+            </a:r>
+            <a:endParaRPr lang="ru-RU" dirty="0" smtClean="0">
+              <a:solidFill>
+                <a:schemeClr val="bg1"/>
+              </a:solidFill>
+            </a:endParaRPr>
+          </a:p>
+          <a:p>
+            <a:pPr marL="0" indent="0">
+              <a:buClr>
+                <a:schemeClr val="bg1"/>
+              </a:buClr>
+              <a:buNone/>
+            </a:pPr>
+            <a:endParaRPr lang="en-US" dirty="0">
+              <a:solidFill>
+                <a:schemeClr val="bg1"/>
+              </a:solidFill>
+            </a:endParaRPr>
           </a:p>
         </p:txBody>
       </p:sp>
     </p:spTree>
     <p:extLst>
       <p:ext uri="{BB962C8B-B14F-4D97-AF65-F5344CB8AC3E}">
-        <p14:creationId xmlns:p14="http://schemas.microsoft.com/office/powerpoint/2010/main" val="3059698048"/>
+        <p14:creationId xmlns:p14="http://schemas.microsoft.com/office/powerpoint/2010/main" val="4175683496"/>
       </p:ext>
     </p:extLst>
   </p:cSld>
@@ -8568,6 +8164,508 @@
 <file path=ppt/slides/slide20.xml><?xml version="1.0" encoding="utf-8"?>
 <p:sld xmlns:a="http://schemas.openxmlformats.org/drawingml/2006/main" xmlns:r="http://schemas.openxmlformats.org/officeDocument/2006/relationships" xmlns:p="http://schemas.openxmlformats.org/presentationml/2006/main">
   <p:cSld>
+    <p:spTree>
+      <p:nvGrpSpPr>
+        <p:cNvPr id="1" name=""/>
+        <p:cNvGrpSpPr/>
+        <p:nvPr/>
+      </p:nvGrpSpPr>
+      <p:grpSpPr>
+        <a:xfrm>
+          <a:off x="0" y="0"/>
+          <a:ext cx="0" cy="0"/>
+          <a:chOff x="0" y="0"/>
+          <a:chExt cx="0" cy="0"/>
+        </a:xfrm>
+      </p:grpSpPr>
+      <p:sp>
+        <p:nvSpPr>
+          <p:cNvPr id="2" name="Title 1"/>
+          <p:cNvSpPr>
+            <a:spLocks noGrp="1"/>
+          </p:cNvSpPr>
+          <p:nvPr>
+            <p:ph type="title"/>
+          </p:nvPr>
+        </p:nvSpPr>
+        <p:spPr/>
+        <p:txBody>
+          <a:bodyPr/>
+          <a:lstStyle/>
+          <a:p>
+            <a:r>
+              <a:rPr lang="ru-RU" dirty="0" smtClean="0"/>
+              <a:t>Редактор: комментарии</a:t>
+            </a:r>
+            <a:endParaRPr lang="ru-RU" dirty="0"/>
+          </a:p>
+        </p:txBody>
+      </p:sp>
+      <p:sp>
+        <p:nvSpPr>
+          <p:cNvPr id="3" name="Content Placeholder 2"/>
+          <p:cNvSpPr>
+            <a:spLocks noGrp="1"/>
+          </p:cNvSpPr>
+          <p:nvPr>
+            <p:ph idx="1"/>
+          </p:nvPr>
+        </p:nvSpPr>
+        <p:spPr/>
+        <p:txBody>
+          <a:bodyPr>
+            <a:normAutofit/>
+          </a:bodyPr>
+          <a:lstStyle/>
+          <a:p>
+            <a:r>
+              <a:rPr lang="en-US" sz="2800" dirty="0" err="1">
+                <a:solidFill>
+                  <a:srgbClr val="F6AE1E"/>
+                </a:solidFill>
+              </a:rPr>
+              <a:t>Ctrl+K</a:t>
+            </a:r>
+            <a:r>
+              <a:rPr lang="en-US" sz="2800" dirty="0">
+                <a:solidFill>
+                  <a:srgbClr val="F6AE1E"/>
+                </a:solidFill>
+              </a:rPr>
+              <a:t>, </a:t>
+            </a:r>
+            <a:r>
+              <a:rPr lang="en-US" sz="2800" dirty="0" err="1">
+                <a:solidFill>
+                  <a:srgbClr val="F6AE1E"/>
+                </a:solidFill>
+              </a:rPr>
+              <a:t>Ctrl+C</a:t>
+            </a:r>
+            <a:r>
+              <a:rPr lang="en-US" sz="2800" dirty="0">
+                <a:solidFill>
+                  <a:schemeClr val="bg1"/>
+                </a:solidFill>
+              </a:rPr>
+              <a:t> </a:t>
+            </a:r>
+            <a:r>
+              <a:rPr lang="ru-RU" sz="2800" dirty="0">
+                <a:solidFill>
+                  <a:schemeClr val="bg1"/>
+                </a:solidFill>
+              </a:rPr>
+              <a:t>закоментировать выбранные </a:t>
+            </a:r>
+            <a:r>
+              <a:rPr lang="ru-RU" sz="2800" dirty="0" smtClean="0">
+                <a:solidFill>
+                  <a:schemeClr val="bg1"/>
+                </a:solidFill>
+              </a:rPr>
+              <a:t>строки</a:t>
+            </a:r>
+          </a:p>
+          <a:p>
+            <a:r>
+              <a:rPr lang="en-US" sz="2800" dirty="0" err="1">
+                <a:solidFill>
+                  <a:srgbClr val="F6AE1E"/>
+                </a:solidFill>
+              </a:rPr>
+              <a:t>Ctrl+K</a:t>
+            </a:r>
+            <a:r>
+              <a:rPr lang="en-US" sz="2800" dirty="0">
+                <a:solidFill>
+                  <a:srgbClr val="F6AE1E"/>
+                </a:solidFill>
+              </a:rPr>
+              <a:t>, </a:t>
+            </a:r>
+            <a:r>
+              <a:rPr lang="en-US" sz="2800" dirty="0" err="1">
+                <a:solidFill>
+                  <a:srgbClr val="F6AE1E"/>
+                </a:solidFill>
+              </a:rPr>
+              <a:t>Ctrl+U</a:t>
+            </a:r>
+            <a:r>
+              <a:rPr lang="en-US" sz="2800" dirty="0"/>
+              <a:t> </a:t>
+            </a:r>
+            <a:r>
+              <a:rPr lang="ru-RU" sz="2800" dirty="0"/>
+              <a:t>снять коментарий с выбранных строк</a:t>
+            </a:r>
+          </a:p>
+        </p:txBody>
+      </p:sp>
+    </p:spTree>
+    <p:extLst>
+      <p:ext uri="{BB962C8B-B14F-4D97-AF65-F5344CB8AC3E}">
+        <p14:creationId xmlns:p14="http://schemas.microsoft.com/office/powerpoint/2010/main" val="4274730761"/>
+      </p:ext>
+    </p:extLst>
+  </p:cSld>
+  <p:clrMapOvr>
+    <a:masterClrMapping/>
+  </p:clrMapOvr>
+  <p:timing>
+    <p:tnLst>
+      <p:par>
+        <p:cTn id="1" dur="indefinite" restart="never" nodeType="tmRoot"/>
+      </p:par>
+    </p:tnLst>
+  </p:timing>
+</p:sld>
+</file>
+
+<file path=ppt/slides/slide21.xml><?xml version="1.0" encoding="utf-8"?>
+<p:sld xmlns:a="http://schemas.openxmlformats.org/drawingml/2006/main" xmlns:r="http://schemas.openxmlformats.org/officeDocument/2006/relationships" xmlns:p="http://schemas.openxmlformats.org/presentationml/2006/main">
+  <p:cSld>
+    <p:spTree>
+      <p:nvGrpSpPr>
+        <p:cNvPr id="1" name=""/>
+        <p:cNvGrpSpPr/>
+        <p:nvPr/>
+      </p:nvGrpSpPr>
+      <p:grpSpPr>
+        <a:xfrm>
+          <a:off x="0" y="0"/>
+          <a:ext cx="0" cy="0"/>
+          <a:chOff x="0" y="0"/>
+          <a:chExt cx="0" cy="0"/>
+        </a:xfrm>
+      </p:grpSpPr>
+      <p:sp>
+        <p:nvSpPr>
+          <p:cNvPr id="2" name="Title 1"/>
+          <p:cNvSpPr>
+            <a:spLocks noGrp="1"/>
+          </p:cNvSpPr>
+          <p:nvPr>
+            <p:ph type="title"/>
+          </p:nvPr>
+        </p:nvSpPr>
+        <p:spPr/>
+        <p:txBody>
+          <a:bodyPr/>
+          <a:lstStyle/>
+          <a:p>
+            <a:r>
+              <a:rPr lang="ru-RU" dirty="0" smtClean="0"/>
+              <a:t>Редактор</a:t>
+            </a:r>
+            <a:r>
+              <a:rPr lang="en-US" dirty="0" smtClean="0"/>
+              <a:t>: </a:t>
+            </a:r>
+            <a:r>
+              <a:rPr lang="ru-RU" dirty="0" smtClean="0"/>
+              <a:t>Колоночный режим</a:t>
+            </a:r>
+            <a:endParaRPr lang="en-US" dirty="0"/>
+          </a:p>
+        </p:txBody>
+      </p:sp>
+      <p:sp>
+        <p:nvSpPr>
+          <p:cNvPr id="3" name="Content Placeholder 2"/>
+          <p:cNvSpPr>
+            <a:spLocks noGrp="1"/>
+          </p:cNvSpPr>
+          <p:nvPr>
+            <p:ph idx="1"/>
+          </p:nvPr>
+        </p:nvSpPr>
+        <p:spPr/>
+        <p:txBody>
+          <a:bodyPr>
+            <a:normAutofit/>
+          </a:bodyPr>
+          <a:lstStyle/>
+          <a:p>
+            <a:pPr>
+              <a:buClr>
+                <a:schemeClr val="bg1"/>
+              </a:buClr>
+            </a:pPr>
+            <a:r>
+              <a:rPr lang="en-US" dirty="0" err="1" smtClean="0">
+                <a:solidFill>
+                  <a:srgbClr val="F6AE1E"/>
+                </a:solidFill>
+              </a:rPr>
+              <a:t>Shift+Alt+Arrow</a:t>
+            </a:r>
+            <a:r>
+              <a:rPr lang="ru-RU" dirty="0" smtClean="0">
+                <a:solidFill>
+                  <a:schemeClr val="bg1"/>
+                </a:solidFill>
+              </a:rPr>
+              <a:t> позволяет выделить прямоугольный блок текста</a:t>
+            </a:r>
+          </a:p>
+          <a:p>
+            <a:pPr>
+              <a:buClr>
+                <a:schemeClr val="bg1"/>
+              </a:buClr>
+            </a:pPr>
+            <a:r>
+              <a:rPr lang="en-US" dirty="0">
+                <a:solidFill>
+                  <a:srgbClr val="F6AE1E"/>
+                </a:solidFill>
+              </a:rPr>
+              <a:t>Alt + Left Mouse</a:t>
+            </a:r>
+            <a:r>
+              <a:rPr lang="en-US" dirty="0" smtClean="0">
+                <a:solidFill>
+                  <a:schemeClr val="bg1"/>
+                </a:solidFill>
+              </a:rPr>
+              <a:t> Button </a:t>
+            </a:r>
+            <a:r>
+              <a:rPr lang="ru-RU" dirty="0" smtClean="0">
+                <a:solidFill>
+                  <a:schemeClr val="bg1"/>
+                </a:solidFill>
+              </a:rPr>
+              <a:t>позиционирует курсор за концом строки даже если опция «</a:t>
+            </a:r>
+            <a:r>
+              <a:rPr lang="en-US" dirty="0" smtClean="0">
+                <a:solidFill>
+                  <a:schemeClr val="bg1"/>
+                </a:solidFill>
+              </a:rPr>
+              <a:t>enable virtual space</a:t>
+            </a:r>
+            <a:r>
+              <a:rPr lang="ru-RU" dirty="0" smtClean="0">
+                <a:solidFill>
+                  <a:schemeClr val="bg1"/>
+                </a:solidFill>
+              </a:rPr>
+              <a:t>» выключена</a:t>
+            </a:r>
+          </a:p>
+          <a:p>
+            <a:pPr>
+              <a:buClr>
+                <a:schemeClr val="bg1"/>
+              </a:buClr>
+            </a:pPr>
+            <a:endParaRPr lang="en-US" dirty="0" smtClean="0">
+              <a:solidFill>
+                <a:schemeClr val="bg1"/>
+              </a:solidFill>
+            </a:endParaRPr>
+          </a:p>
+          <a:p>
+            <a:pPr marL="0" indent="0">
+              <a:buClr>
+                <a:schemeClr val="bg1"/>
+              </a:buClr>
+              <a:buNone/>
+            </a:pPr>
+            <a:endParaRPr lang="ru-RU" dirty="0" smtClean="0">
+              <a:solidFill>
+                <a:schemeClr val="bg1"/>
+              </a:solidFill>
+            </a:endParaRPr>
+          </a:p>
+          <a:p>
+            <a:pPr>
+              <a:buClr>
+                <a:schemeClr val="bg1"/>
+              </a:buClr>
+            </a:pPr>
+            <a:endParaRPr lang="ru-RU" dirty="0">
+              <a:solidFill>
+                <a:schemeClr val="bg1"/>
+              </a:solidFill>
+            </a:endParaRPr>
+          </a:p>
+          <a:p>
+            <a:pPr marL="0" indent="0">
+              <a:buClr>
+                <a:schemeClr val="bg1"/>
+              </a:buClr>
+              <a:buNone/>
+            </a:pPr>
+            <a:endParaRPr lang="en-US" dirty="0">
+              <a:solidFill>
+                <a:schemeClr val="bg1"/>
+              </a:solidFill>
+            </a:endParaRPr>
+          </a:p>
+        </p:txBody>
+      </p:sp>
+    </p:spTree>
+    <p:extLst>
+      <p:ext uri="{BB962C8B-B14F-4D97-AF65-F5344CB8AC3E}">
+        <p14:creationId xmlns:p14="http://schemas.microsoft.com/office/powerpoint/2010/main" val="1998512366"/>
+      </p:ext>
+    </p:extLst>
+  </p:cSld>
+  <p:clrMapOvr>
+    <a:masterClrMapping/>
+  </p:clrMapOvr>
+  <p:timing>
+    <p:tnLst>
+      <p:par>
+        <p:cTn id="1" dur="indefinite" restart="never" nodeType="tmRoot"/>
+      </p:par>
+    </p:tnLst>
+  </p:timing>
+</p:sld>
+</file>
+
+<file path=ppt/slides/slide22.xml><?xml version="1.0" encoding="utf-8"?>
+<p:sld xmlns:a="http://schemas.openxmlformats.org/drawingml/2006/main" xmlns:r="http://schemas.openxmlformats.org/officeDocument/2006/relationships" xmlns:p="http://schemas.openxmlformats.org/presentationml/2006/main">
+  <p:cSld>
+    <p:spTree>
+      <p:nvGrpSpPr>
+        <p:cNvPr id="1" name=""/>
+        <p:cNvGrpSpPr/>
+        <p:nvPr/>
+      </p:nvGrpSpPr>
+      <p:grpSpPr>
+        <a:xfrm>
+          <a:off x="0" y="0"/>
+          <a:ext cx="0" cy="0"/>
+          <a:chOff x="0" y="0"/>
+          <a:chExt cx="0" cy="0"/>
+        </a:xfrm>
+      </p:grpSpPr>
+      <p:sp>
+        <p:nvSpPr>
+          <p:cNvPr id="2" name="Title 1"/>
+          <p:cNvSpPr>
+            <a:spLocks noGrp="1"/>
+          </p:cNvSpPr>
+          <p:nvPr>
+            <p:ph type="title"/>
+          </p:nvPr>
+        </p:nvSpPr>
+        <p:spPr/>
+        <p:txBody>
+          <a:bodyPr/>
+          <a:lstStyle/>
+          <a:p>
+            <a:r>
+              <a:rPr lang="ru-RU" dirty="0" smtClean="0"/>
+              <a:t>Редактор: Работа со строками</a:t>
+            </a:r>
+            <a:endParaRPr lang="ru-RU" dirty="0"/>
+          </a:p>
+        </p:txBody>
+      </p:sp>
+      <p:sp>
+        <p:nvSpPr>
+          <p:cNvPr id="3" name="Content Placeholder 2"/>
+          <p:cNvSpPr>
+            <a:spLocks noGrp="1"/>
+          </p:cNvSpPr>
+          <p:nvPr>
+            <p:ph idx="1"/>
+          </p:nvPr>
+        </p:nvSpPr>
+        <p:spPr/>
+        <p:txBody>
+          <a:bodyPr/>
+          <a:lstStyle/>
+          <a:p>
+            <a:r>
+              <a:rPr lang="en-US" dirty="0" err="1" smtClean="0">
+                <a:solidFill>
+                  <a:srgbClr val="F6AE1E"/>
+                </a:solidFill>
+              </a:rPr>
+              <a:t>Ctrl+L</a:t>
+            </a:r>
+            <a:r>
+              <a:rPr lang="en-US" dirty="0" smtClean="0"/>
+              <a:t> </a:t>
+            </a:r>
+            <a:r>
+              <a:rPr lang="ru-RU" dirty="0" smtClean="0"/>
+              <a:t>удалить текущую строку и вставить её в буфер обмена.</a:t>
+            </a:r>
+          </a:p>
+          <a:p>
+            <a:r>
+              <a:rPr lang="en-US" dirty="0" smtClean="0">
+                <a:solidFill>
+                  <a:srgbClr val="92D050"/>
+                </a:solidFill>
+              </a:rPr>
+              <a:t>[13]</a:t>
+            </a:r>
+            <a:r>
+              <a:rPr lang="en-US" dirty="0" smtClean="0">
+                <a:solidFill>
+                  <a:srgbClr val="F6AE1E"/>
+                </a:solidFill>
+              </a:rPr>
+              <a:t> </a:t>
+            </a:r>
+            <a:r>
+              <a:rPr lang="en-US" dirty="0" err="1" smtClean="0">
+                <a:solidFill>
+                  <a:srgbClr val="F6AE1E"/>
+                </a:solidFill>
+              </a:rPr>
+              <a:t>Alt+Up</a:t>
+            </a:r>
+            <a:r>
+              <a:rPr lang="en-US" dirty="0" smtClean="0"/>
+              <a:t>, </a:t>
+            </a:r>
+            <a:r>
+              <a:rPr lang="en-US" dirty="0" err="1" smtClean="0">
+                <a:solidFill>
+                  <a:srgbClr val="F6AE1E"/>
+                </a:solidFill>
+              </a:rPr>
+              <a:t>Alt+Down</a:t>
+            </a:r>
+            <a:r>
+              <a:rPr lang="en-US" dirty="0" smtClean="0"/>
+              <a:t> </a:t>
+            </a:r>
+            <a:r>
+              <a:rPr lang="ru-RU" dirty="0" smtClean="0"/>
+              <a:t>сдвинуть текущую строку вверх или вниз</a:t>
+            </a:r>
+            <a:endParaRPr lang="ru-RU" dirty="0"/>
+          </a:p>
+        </p:txBody>
+      </p:sp>
+    </p:spTree>
+    <p:extLst>
+      <p:ext uri="{BB962C8B-B14F-4D97-AF65-F5344CB8AC3E}">
+        <p14:creationId xmlns:p14="http://schemas.microsoft.com/office/powerpoint/2010/main" val="2334297427"/>
+      </p:ext>
+    </p:extLst>
+  </p:cSld>
+  <p:clrMapOvr>
+    <a:masterClrMapping/>
+  </p:clrMapOvr>
+</p:sld>
+</file>
+
+<file path=ppt/slides/slide23.xml><?xml version="1.0" encoding="utf-8"?>
+<p:sld xmlns:a="http://schemas.openxmlformats.org/drawingml/2006/main" xmlns:r="http://schemas.openxmlformats.org/officeDocument/2006/relationships" xmlns:p="http://schemas.openxmlformats.org/presentationml/2006/main">
+  <p:cSld>
     <p:bg>
       <p:bgPr>
         <a:blipFill dpi="0" rotWithShape="1">
@@ -8640,6 +8738,694 @@
         <p:spPr/>
         <p:txBody>
           <a:bodyPr>
+            <a:normAutofit fontScale="85000" lnSpcReduction="20000"/>
+          </a:bodyPr>
+          <a:lstStyle/>
+          <a:p>
+            <a:pPr>
+              <a:buClr>
+                <a:schemeClr val="bg1"/>
+              </a:buClr>
+            </a:pPr>
+            <a:r>
+              <a:rPr lang="en-US" dirty="0" smtClean="0">
+                <a:solidFill>
+                  <a:srgbClr val="F6AE1E"/>
+                </a:solidFill>
+              </a:rPr>
+              <a:t>F12</a:t>
+            </a:r>
+            <a:r>
+              <a:rPr lang="en-US" dirty="0" smtClean="0">
+                <a:solidFill>
+                  <a:schemeClr val="bg1"/>
+                </a:solidFill>
+              </a:rPr>
+              <a:t> </a:t>
+            </a:r>
+            <a:r>
+              <a:rPr lang="ru-RU" dirty="0" smtClean="0">
+                <a:solidFill>
+                  <a:schemeClr val="bg1"/>
+                </a:solidFill>
+              </a:rPr>
+              <a:t>перейти к </a:t>
+            </a:r>
+            <a:r>
+              <a:rPr lang="ru-RU" dirty="0" smtClean="0">
+                <a:solidFill>
+                  <a:schemeClr val="bg1"/>
+                </a:solidFill>
+              </a:rPr>
+              <a:t>объявлению</a:t>
+            </a:r>
+          </a:p>
+          <a:p>
+            <a:pPr>
+              <a:buClr>
+                <a:schemeClr val="bg1"/>
+              </a:buClr>
+            </a:pPr>
+            <a:r>
+              <a:rPr lang="en-US" dirty="0" smtClean="0">
+                <a:solidFill>
+                  <a:srgbClr val="F6AE1E"/>
+                </a:solidFill>
+              </a:rPr>
+              <a:t>Ctrl+Shift+7</a:t>
+            </a:r>
+            <a:r>
+              <a:rPr lang="en-US" dirty="0" smtClean="0">
+                <a:solidFill>
+                  <a:schemeClr val="bg1"/>
+                </a:solidFill>
+              </a:rPr>
+              <a:t> </a:t>
+            </a:r>
+            <a:r>
+              <a:rPr lang="ru-RU" dirty="0" smtClean="0">
+                <a:solidFill>
+                  <a:schemeClr val="bg1"/>
+                </a:solidFill>
+              </a:rPr>
+              <a:t>и </a:t>
+            </a:r>
+            <a:r>
+              <a:rPr lang="en-US" dirty="0" smtClean="0">
+                <a:solidFill>
+                  <a:srgbClr val="F6AE1E"/>
+                </a:solidFill>
+              </a:rPr>
+              <a:t>Ctrl+Shift+8</a:t>
+            </a:r>
+            <a:r>
+              <a:rPr lang="ru-RU" dirty="0" smtClean="0">
+                <a:solidFill>
+                  <a:schemeClr val="bg1"/>
+                </a:solidFill>
+              </a:rPr>
+              <a:t> переход по типам для которых ранее делали </a:t>
+            </a:r>
+            <a:r>
+              <a:rPr lang="en-US" dirty="0" smtClean="0">
+                <a:solidFill>
+                  <a:schemeClr val="bg1"/>
+                </a:solidFill>
+              </a:rPr>
+              <a:t>F12</a:t>
+            </a:r>
+            <a:endParaRPr lang="en-US" dirty="0" smtClean="0">
+              <a:solidFill>
+                <a:schemeClr val="bg1"/>
+              </a:solidFill>
+            </a:endParaRPr>
+          </a:p>
+          <a:p>
+            <a:pPr>
+              <a:buClr>
+                <a:schemeClr val="bg1"/>
+              </a:buClr>
+            </a:pPr>
+            <a:r>
+              <a:rPr lang="en-US" sz="3100" dirty="0">
+                <a:solidFill>
+                  <a:srgbClr val="92D050"/>
+                </a:solidFill>
+              </a:rPr>
+              <a:t>[</a:t>
+            </a:r>
+            <a:r>
+              <a:rPr lang="en-US" sz="3100" dirty="0" smtClean="0">
+                <a:solidFill>
+                  <a:srgbClr val="92D050"/>
+                </a:solidFill>
+              </a:rPr>
+              <a:t>1</a:t>
+            </a:r>
+            <a:r>
+              <a:rPr lang="ru-RU" sz="3100" dirty="0" smtClean="0">
+                <a:solidFill>
+                  <a:srgbClr val="92D050"/>
+                </a:solidFill>
+              </a:rPr>
+              <a:t>3</a:t>
+            </a:r>
+            <a:r>
+              <a:rPr lang="en-US" sz="3100" dirty="0" smtClean="0">
+                <a:solidFill>
+                  <a:srgbClr val="92D050"/>
+                </a:solidFill>
+              </a:rPr>
+              <a:t>]</a:t>
+            </a:r>
+            <a:r>
+              <a:rPr lang="ru-RU" sz="3100" dirty="0" smtClean="0">
+                <a:solidFill>
+                  <a:srgbClr val="F6AE1E"/>
+                </a:solidFill>
+              </a:rPr>
+              <a:t> </a:t>
+            </a:r>
+            <a:r>
+              <a:rPr lang="en-US" sz="3100" dirty="0" smtClean="0">
+                <a:solidFill>
+                  <a:srgbClr val="F6AE1E"/>
+                </a:solidFill>
+              </a:rPr>
+              <a:t>Alt+F12</a:t>
+            </a:r>
+            <a:r>
+              <a:rPr lang="en-US" dirty="0" smtClean="0">
+                <a:solidFill>
+                  <a:schemeClr val="bg1"/>
+                </a:solidFill>
+              </a:rPr>
+              <a:t> </a:t>
+            </a:r>
+            <a:r>
+              <a:rPr lang="ru-RU" dirty="0" smtClean="0">
+                <a:solidFill>
+                  <a:schemeClr val="bg1"/>
+                </a:solidFill>
+              </a:rPr>
+              <a:t>Просмотр объявления в окне редактора </a:t>
+            </a:r>
+            <a:r>
+              <a:rPr lang="en-US" dirty="0" smtClean="0">
+                <a:solidFill>
+                  <a:schemeClr val="bg1"/>
+                </a:solidFill>
+              </a:rPr>
+              <a:t>(peek definition)</a:t>
+            </a:r>
+            <a:endParaRPr lang="ru-RU" dirty="0" smtClean="0">
+              <a:solidFill>
+                <a:schemeClr val="bg1"/>
+              </a:solidFill>
+            </a:endParaRPr>
+          </a:p>
+          <a:p>
+            <a:pPr>
+              <a:buClr>
+                <a:schemeClr val="bg1"/>
+              </a:buClr>
+            </a:pPr>
+            <a:r>
+              <a:rPr lang="en-US" dirty="0">
+                <a:solidFill>
+                  <a:srgbClr val="F6AE1E"/>
+                </a:solidFill>
+              </a:rPr>
+              <a:t>Shift+F12</a:t>
+            </a:r>
+            <a:r>
+              <a:rPr lang="en-US" dirty="0" smtClean="0">
+                <a:solidFill>
+                  <a:schemeClr val="bg1"/>
+                </a:solidFill>
+              </a:rPr>
+              <a:t> </a:t>
+            </a:r>
+            <a:r>
+              <a:rPr lang="ru-RU" dirty="0" smtClean="0">
+                <a:solidFill>
+                  <a:schemeClr val="bg1"/>
+                </a:solidFill>
+              </a:rPr>
+              <a:t>найти все места где используется имя</a:t>
+            </a:r>
+          </a:p>
+          <a:p>
+            <a:pPr>
+              <a:buClr>
+                <a:schemeClr val="bg1"/>
+              </a:buClr>
+            </a:pPr>
+            <a:r>
+              <a:rPr lang="en-US" dirty="0">
+                <a:solidFill>
+                  <a:srgbClr val="F6AE1E"/>
+                </a:solidFill>
+              </a:rPr>
+              <a:t>Ctrl+</a:t>
+            </a:r>
+            <a:r>
+              <a:rPr lang="ru-RU" dirty="0">
+                <a:solidFill>
+                  <a:srgbClr val="F6AE1E"/>
+                </a:solidFill>
+              </a:rPr>
+              <a:t>Минус</a:t>
+            </a:r>
+            <a:r>
+              <a:rPr lang="en-US" dirty="0" smtClean="0">
+                <a:solidFill>
+                  <a:schemeClr val="bg1"/>
+                </a:solidFill>
+              </a:rPr>
+              <a:t> </a:t>
+            </a:r>
+            <a:r>
+              <a:rPr lang="ru-RU" dirty="0" smtClean="0">
+                <a:solidFill>
+                  <a:schemeClr val="bg1"/>
+                </a:solidFill>
+              </a:rPr>
+              <a:t>и </a:t>
+            </a:r>
+            <a:r>
+              <a:rPr lang="en-US" dirty="0" err="1" smtClean="0">
+                <a:solidFill>
+                  <a:srgbClr val="F6AE1E"/>
+                </a:solidFill>
+              </a:rPr>
+              <a:t>Shift+Ctrl</a:t>
+            </a:r>
+            <a:r>
+              <a:rPr lang="en-US" dirty="0" smtClean="0">
+                <a:solidFill>
+                  <a:srgbClr val="F6AE1E"/>
+                </a:solidFill>
+              </a:rPr>
+              <a:t>+</a:t>
+            </a:r>
+            <a:r>
+              <a:rPr lang="ru-RU" dirty="0" smtClean="0">
+                <a:solidFill>
+                  <a:srgbClr val="F6AE1E"/>
+                </a:solidFill>
+              </a:rPr>
+              <a:t>Минус</a:t>
+            </a:r>
+            <a:r>
+              <a:rPr lang="en-US" dirty="0" smtClean="0">
+                <a:solidFill>
+                  <a:schemeClr val="bg1"/>
+                </a:solidFill>
+              </a:rPr>
+              <a:t> </a:t>
+            </a:r>
+            <a:r>
+              <a:rPr lang="ru-RU" dirty="0" smtClean="0">
+                <a:solidFill>
+                  <a:schemeClr val="bg1"/>
+                </a:solidFill>
+              </a:rPr>
+              <a:t>навигация «вперед»/«назад»</a:t>
+            </a:r>
+          </a:p>
+          <a:p>
+            <a:pPr>
+              <a:buClr>
+                <a:schemeClr val="bg1"/>
+              </a:buClr>
+            </a:pPr>
+            <a:r>
+              <a:rPr lang="en-US" dirty="0" err="1">
+                <a:solidFill>
+                  <a:srgbClr val="F6AE1E"/>
+                </a:solidFill>
+              </a:rPr>
+              <a:t>Ctrl+Alt</a:t>
+            </a:r>
+            <a:r>
+              <a:rPr lang="en-US" dirty="0">
+                <a:solidFill>
+                  <a:srgbClr val="F6AE1E"/>
+                </a:solidFill>
+              </a:rPr>
+              <a:t>+</a:t>
+            </a:r>
+            <a:r>
+              <a:rPr lang="ru-RU" dirty="0">
+                <a:solidFill>
+                  <a:srgbClr val="F6AE1E"/>
+                </a:solidFill>
+              </a:rPr>
+              <a:t>Стрелка вниз</a:t>
+            </a:r>
+            <a:r>
+              <a:rPr lang="ru-RU" dirty="0" smtClean="0">
+                <a:solidFill>
+                  <a:schemeClr val="bg1"/>
+                </a:solidFill>
+              </a:rPr>
+              <a:t> показать список открытых файлов</a:t>
+            </a:r>
+            <a:endParaRPr lang="en-US" dirty="0" smtClean="0">
+              <a:solidFill>
+                <a:schemeClr val="bg1"/>
+              </a:solidFill>
+            </a:endParaRPr>
+          </a:p>
+          <a:p>
+            <a:pPr>
+              <a:buClr>
+                <a:schemeClr val="bg1"/>
+              </a:buClr>
+            </a:pPr>
+            <a:r>
+              <a:rPr lang="en-US" dirty="0" err="1">
+                <a:solidFill>
+                  <a:srgbClr val="F6AE1E"/>
+                </a:solidFill>
+              </a:rPr>
+              <a:t>Ctrl+G</a:t>
+            </a:r>
+            <a:r>
+              <a:rPr lang="en-US" dirty="0">
+                <a:solidFill>
+                  <a:schemeClr val="bg1"/>
+                </a:solidFill>
+              </a:rPr>
+              <a:t> </a:t>
+            </a:r>
+            <a:r>
+              <a:rPr lang="ru-RU" dirty="0">
+                <a:solidFill>
+                  <a:schemeClr val="bg1"/>
+                </a:solidFill>
+              </a:rPr>
+              <a:t>перейти на строку </a:t>
+            </a:r>
+            <a:r>
+              <a:rPr lang="ru-RU" dirty="0" smtClean="0">
+                <a:solidFill>
+                  <a:schemeClr val="bg1"/>
+                </a:solidFill>
+              </a:rPr>
+              <a:t>№</a:t>
+            </a:r>
+            <a:endParaRPr lang="en-US" dirty="0">
+              <a:solidFill>
+                <a:schemeClr val="bg1"/>
+              </a:solidFill>
+            </a:endParaRPr>
+          </a:p>
+        </p:txBody>
+      </p:sp>
+    </p:spTree>
+    <p:extLst>
+      <p:ext uri="{BB962C8B-B14F-4D97-AF65-F5344CB8AC3E}">
+        <p14:creationId xmlns:p14="http://schemas.microsoft.com/office/powerpoint/2010/main" val="1465218823"/>
+      </p:ext>
+    </p:extLst>
+  </p:cSld>
+  <p:clrMapOvr>
+    <a:overrideClrMapping bg1="lt1" tx1="dk1" bg2="lt2" tx2="dk2" accent1="accent1" accent2="accent2" accent3="accent3" accent4="accent4" accent5="accent5" accent6="accent6" hlink="hlink" folHlink="folHlink"/>
+  </p:clrMapOvr>
+  <p:timing>
+    <p:tnLst>
+      <p:par>
+        <p:cTn id="1" dur="indefinite" restart="never" nodeType="tmRoot"/>
+      </p:par>
+    </p:tnLst>
+  </p:timing>
+</p:sld>
+</file>
+
+<file path=ppt/slides/slide24.xml><?xml version="1.0" encoding="utf-8"?>
+<p:sld xmlns:a="http://schemas.openxmlformats.org/drawingml/2006/main" xmlns:r="http://schemas.openxmlformats.org/officeDocument/2006/relationships" xmlns:p="http://schemas.openxmlformats.org/presentationml/2006/main">
+  <p:cSld>
+    <p:spTree>
+      <p:nvGrpSpPr>
+        <p:cNvPr id="1" name=""/>
+        <p:cNvGrpSpPr/>
+        <p:nvPr/>
+      </p:nvGrpSpPr>
+      <p:grpSpPr>
+        <a:xfrm>
+          <a:off x="0" y="0"/>
+          <a:ext cx="0" cy="0"/>
+          <a:chOff x="0" y="0"/>
+          <a:chExt cx="0" cy="0"/>
+        </a:xfrm>
+      </p:grpSpPr>
+      <p:sp>
+        <p:nvSpPr>
+          <p:cNvPr id="2" name="Title 1"/>
+          <p:cNvSpPr>
+            <a:spLocks noGrp="1"/>
+          </p:cNvSpPr>
+          <p:nvPr>
+            <p:ph type="title"/>
+          </p:nvPr>
+        </p:nvSpPr>
+        <p:spPr/>
+        <p:txBody>
+          <a:bodyPr/>
+          <a:lstStyle/>
+          <a:p>
+            <a:r>
+              <a:rPr lang="ru-RU" dirty="0" smtClean="0"/>
+              <a:t>Редактор: Смарт-тег</a:t>
+            </a:r>
+            <a:endParaRPr lang="ru-RU" dirty="0"/>
+          </a:p>
+        </p:txBody>
+      </p:sp>
+      <p:sp>
+        <p:nvSpPr>
+          <p:cNvPr id="3" name="Content Placeholder 2"/>
+          <p:cNvSpPr>
+            <a:spLocks noGrp="1"/>
+          </p:cNvSpPr>
+          <p:nvPr>
+            <p:ph idx="1"/>
+          </p:nvPr>
+        </p:nvSpPr>
+        <p:spPr/>
+        <p:txBody>
+          <a:bodyPr/>
+          <a:lstStyle/>
+          <a:p>
+            <a:r>
+              <a:rPr lang="en-US" dirty="0" smtClean="0">
+                <a:solidFill>
+                  <a:srgbClr val="F6AE1E"/>
+                </a:solidFill>
+              </a:rPr>
+              <a:t>Alt + Shift + F10</a:t>
+            </a:r>
+            <a:r>
+              <a:rPr lang="en-US" dirty="0" smtClean="0"/>
+              <a:t> </a:t>
+            </a:r>
+            <a:r>
+              <a:rPr lang="ru-RU" dirty="0" smtClean="0"/>
+              <a:t>или </a:t>
+            </a:r>
+            <a:r>
+              <a:rPr lang="en-US" dirty="0" smtClean="0">
+                <a:solidFill>
+                  <a:srgbClr val="F6AE1E"/>
+                </a:solidFill>
+              </a:rPr>
+              <a:t>Ctrl + .</a:t>
+            </a:r>
+            <a:r>
+              <a:rPr lang="en-US" dirty="0" smtClean="0"/>
+              <a:t> – </a:t>
+            </a:r>
+            <a:r>
+              <a:rPr lang="ru-RU" dirty="0" smtClean="0"/>
+              <a:t>открыть меню смарт-тега</a:t>
+            </a:r>
+            <a:endParaRPr lang="ru-RU" dirty="0"/>
+          </a:p>
+        </p:txBody>
+      </p:sp>
+    </p:spTree>
+    <p:extLst>
+      <p:ext uri="{BB962C8B-B14F-4D97-AF65-F5344CB8AC3E}">
+        <p14:creationId xmlns:p14="http://schemas.microsoft.com/office/powerpoint/2010/main" val="3059698048"/>
+      </p:ext>
+    </p:extLst>
+  </p:cSld>
+  <p:clrMapOvr>
+    <a:masterClrMapping/>
+  </p:clrMapOvr>
+  <p:timing>
+    <p:tnLst>
+      <p:par>
+        <p:cTn id="1" dur="indefinite" restart="never" nodeType="tmRoot"/>
+      </p:par>
+    </p:tnLst>
+  </p:timing>
+</p:sld>
+</file>
+
+<file path=ppt/slides/slide25.xml><?xml version="1.0" encoding="utf-8"?>
+<p:sld xmlns:a="http://schemas.openxmlformats.org/drawingml/2006/main" xmlns:r="http://schemas.openxmlformats.org/officeDocument/2006/relationships" xmlns:p="http://schemas.openxmlformats.org/presentationml/2006/main">
+  <p:cSld>
+    <p:spTree>
+      <p:nvGrpSpPr>
+        <p:cNvPr id="1" name=""/>
+        <p:cNvGrpSpPr/>
+        <p:nvPr/>
+      </p:nvGrpSpPr>
+      <p:grpSpPr>
+        <a:xfrm>
+          <a:off x="0" y="0"/>
+          <a:ext cx="0" cy="0"/>
+          <a:chOff x="0" y="0"/>
+          <a:chExt cx="0" cy="0"/>
+        </a:xfrm>
+      </p:grpSpPr>
+      <p:sp>
+        <p:nvSpPr>
+          <p:cNvPr id="2" name="Title 1"/>
+          <p:cNvSpPr>
+            <a:spLocks noGrp="1"/>
+          </p:cNvSpPr>
+          <p:nvPr>
+            <p:ph type="title"/>
+          </p:nvPr>
+        </p:nvSpPr>
+        <p:spPr/>
+        <p:txBody>
+          <a:bodyPr/>
+          <a:lstStyle/>
+          <a:p>
+            <a:r>
+              <a:rPr lang="ru-RU" dirty="0" smtClean="0"/>
+              <a:t>Редактор: </a:t>
+            </a:r>
+            <a:r>
+              <a:rPr lang="en-US" dirty="0" smtClean="0"/>
+              <a:t>IntelliSense</a:t>
+            </a:r>
+            <a:endParaRPr lang="ru-RU" dirty="0"/>
+          </a:p>
+        </p:txBody>
+      </p:sp>
+      <p:sp>
+        <p:nvSpPr>
+          <p:cNvPr id="3" name="Content Placeholder 2"/>
+          <p:cNvSpPr>
+            <a:spLocks noGrp="1"/>
+          </p:cNvSpPr>
+          <p:nvPr>
+            <p:ph idx="1"/>
+          </p:nvPr>
+        </p:nvSpPr>
+        <p:spPr/>
+        <p:txBody>
+          <a:bodyPr/>
+          <a:lstStyle/>
+          <a:p>
+            <a:r>
+              <a:rPr lang="en-US" dirty="0" err="1" smtClean="0"/>
+              <a:t>Ctrl+Alt+Space</a:t>
+            </a:r>
+            <a:r>
+              <a:rPr lang="en-US" dirty="0" smtClean="0"/>
+              <a:t> – </a:t>
+            </a:r>
+            <a:r>
+              <a:rPr lang="ru-RU" dirty="0" smtClean="0"/>
+              <a:t>«режим советов». В этом режиме только </a:t>
+            </a:r>
+            <a:r>
+              <a:rPr lang="en-US" dirty="0" smtClean="0"/>
+              <a:t>Tab </a:t>
+            </a:r>
+            <a:r>
+              <a:rPr lang="ru-RU" dirty="0" smtClean="0"/>
+              <a:t>выбирает строку из списка предложений</a:t>
+            </a:r>
+            <a:endParaRPr lang="ru-RU" dirty="0"/>
+          </a:p>
+        </p:txBody>
+      </p:sp>
+    </p:spTree>
+    <p:extLst>
+      <p:ext uri="{BB962C8B-B14F-4D97-AF65-F5344CB8AC3E}">
+        <p14:creationId xmlns:p14="http://schemas.microsoft.com/office/powerpoint/2010/main" val="3953030913"/>
+      </p:ext>
+    </p:extLst>
+  </p:cSld>
+  <p:clrMapOvr>
+    <a:masterClrMapping/>
+  </p:clrMapOvr>
+</p:sld>
+</file>
+
+<file path=ppt/slides/slide26.xml><?xml version="1.0" encoding="utf-8"?>
+<p:sld xmlns:a="http://schemas.openxmlformats.org/drawingml/2006/main" xmlns:r="http://schemas.openxmlformats.org/officeDocument/2006/relationships" xmlns:p="http://schemas.openxmlformats.org/presentationml/2006/main">
+  <p:cSld>
+    <p:bg>
+      <p:bgPr>
+        <a:blipFill dpi="0" rotWithShape="1">
+          <a:blip r:embed="rId3">
+            <a:lum/>
+          </a:blip>
+          <a:srcRect/>
+          <a:stretch>
+            <a:fillRect/>
+          </a:stretch>
+        </a:blipFill>
+        <a:effectLst/>
+      </p:bgPr>
+    </p:bg>
+    <p:spTree>
+      <p:nvGrpSpPr>
+        <p:cNvPr id="1" name=""/>
+        <p:cNvGrpSpPr/>
+        <p:nvPr/>
+      </p:nvGrpSpPr>
+      <p:grpSpPr>
+        <a:xfrm>
+          <a:off x="0" y="0"/>
+          <a:ext cx="0" cy="0"/>
+          <a:chOff x="0" y="0"/>
+          <a:chExt cx="0" cy="0"/>
+        </a:xfrm>
+      </p:grpSpPr>
+      <p:sp>
+        <p:nvSpPr>
+          <p:cNvPr id="2" name="Title 1"/>
+          <p:cNvSpPr>
+            <a:spLocks noGrp="1"/>
+          </p:cNvSpPr>
+          <p:nvPr>
+            <p:ph type="title"/>
+          </p:nvPr>
+        </p:nvSpPr>
+        <p:spPr/>
+        <p:txBody>
+          <a:bodyPr/>
+          <a:lstStyle/>
+          <a:p>
+            <a:r>
+              <a:rPr lang="ru-RU" dirty="0" smtClean="0"/>
+              <a:t>Редактор</a:t>
+            </a:r>
+            <a:r>
+              <a:rPr lang="en-US" dirty="0" smtClean="0"/>
+              <a:t>: </a:t>
+            </a:r>
+            <a:r>
+              <a:rPr lang="ru-RU" dirty="0" smtClean="0"/>
+              <a:t>Навигация по коду</a:t>
+            </a:r>
+            <a:endParaRPr lang="en-US" dirty="0"/>
+          </a:p>
+        </p:txBody>
+      </p:sp>
+      <p:sp>
+        <p:nvSpPr>
+          <p:cNvPr id="3" name="Content Placeholder 2"/>
+          <p:cNvSpPr>
+            <a:spLocks noGrp="1"/>
+          </p:cNvSpPr>
+          <p:nvPr>
+            <p:ph idx="1"/>
+          </p:nvPr>
+        </p:nvSpPr>
+        <p:spPr/>
+        <p:txBody>
+          <a:bodyPr>
             <a:normAutofit/>
           </a:bodyPr>
           <a:lstStyle/>
@@ -8792,7 +9578,7 @@
 </p:sld>
 </file>
 
-<file path=ppt/slides/slide21.xml><?xml version="1.0" encoding="utf-8"?>
+<file path=ppt/slides/slide27.xml><?xml version="1.0" encoding="utf-8"?>
 <p:sld xmlns:a="http://schemas.openxmlformats.org/drawingml/2006/main" xmlns:r="http://schemas.openxmlformats.org/officeDocument/2006/relationships" xmlns:p="http://schemas.openxmlformats.org/presentationml/2006/main">
   <p:cSld>
     <p:spTree>
@@ -8849,7 +9635,7 @@
         <p:spPr/>
         <p:txBody>
           <a:bodyPr>
-            <a:normAutofit/>
+            <a:normAutofit fontScale="85000" lnSpcReduction="20000"/>
           </a:bodyPr>
           <a:lstStyle/>
           <a:p>
@@ -9007,7 +9793,71 @@
                   <a:schemeClr val="bg1"/>
                 </a:solidFill>
               </a:rPr>
-              <a:t>Tools -&gt; Code Snippets Manager.</a:t>
+              <a:t>Tools -&gt; Code Snippets Manager</a:t>
+            </a:r>
+            <a:r>
+              <a:rPr lang="en-US" dirty="0" smtClean="0">
+                <a:solidFill>
+                  <a:schemeClr val="bg1"/>
+                </a:solidFill>
+              </a:rPr>
+              <a:t>.</a:t>
+            </a:r>
+            <a:endParaRPr lang="ru-RU" dirty="0" smtClean="0">
+              <a:solidFill>
+                <a:schemeClr val="bg1"/>
+              </a:solidFill>
+            </a:endParaRPr>
+          </a:p>
+          <a:p>
+            <a:pPr marL="0" indent="0">
+              <a:spcAft>
+                <a:spcPts val="600"/>
+              </a:spcAft>
+              <a:buClr>
+                <a:schemeClr val="bg1"/>
+              </a:buClr>
+              <a:buNone/>
+            </a:pPr>
+            <a:endParaRPr lang="ru-RU" dirty="0" smtClean="0">
+              <a:solidFill>
+                <a:schemeClr val="bg1"/>
+              </a:solidFill>
+            </a:endParaRPr>
+          </a:p>
+          <a:p>
+            <a:pPr marL="0" indent="0">
+              <a:spcAft>
+                <a:spcPts val="600"/>
+              </a:spcAft>
+              <a:buClr>
+                <a:schemeClr val="bg1"/>
+              </a:buClr>
+              <a:buNone/>
+            </a:pPr>
+            <a:r>
+              <a:rPr lang="en-US" dirty="0" err="1" smtClean="0">
+                <a:solidFill>
+                  <a:srgbClr val="F6AE1E"/>
+                </a:solidFill>
+              </a:rPr>
+              <a:t>Ctrl+K+X</a:t>
+            </a:r>
+            <a:r>
+              <a:rPr lang="en-US" dirty="0" smtClean="0">
+                <a:solidFill>
+                  <a:schemeClr val="bg1"/>
+                </a:solidFill>
+              </a:rPr>
+              <a:t> </a:t>
+            </a:r>
+            <a:r>
+              <a:rPr lang="ru-RU" dirty="0" smtClean="0">
+                <a:solidFill>
+                  <a:schemeClr val="bg1"/>
+                </a:solidFill>
+              </a:rPr>
+              <a:t>показывает список сниппетов прямо в редакторе.</a:t>
             </a:r>
             <a:endParaRPr lang="ru-RU" dirty="0" smtClean="0">
               <a:solidFill>
@@ -9050,7 +9900,7 @@
 </p:sld>
 </file>
 
-<file path=ppt/slides/slide22.xml><?xml version="1.0" encoding="utf-8"?>
+<file path=ppt/slides/slide28.xml><?xml version="1.0" encoding="utf-8"?>
 <p:sld xmlns:a="http://schemas.openxmlformats.org/drawingml/2006/main" xmlns:r="http://schemas.openxmlformats.org/officeDocument/2006/relationships" xmlns:p="http://schemas.openxmlformats.org/presentationml/2006/main">
   <p:cSld>
     <p:spTree>
@@ -10307,7 +11157,7 @@
 </p:sld>
 </file>
 
-<file path=ppt/slides/slide23.xml><?xml version="1.0" encoding="utf-8"?>
+<file path=ppt/slides/slide29.xml><?xml version="1.0" encoding="utf-8"?>
 <p:sld xmlns:a="http://schemas.openxmlformats.org/drawingml/2006/main" xmlns:r="http://schemas.openxmlformats.org/officeDocument/2006/relationships" xmlns:p="http://schemas.openxmlformats.org/presentationml/2006/main">
   <p:cSld>
     <p:bg>
@@ -10504,7 +11354,137 @@
 </p:sld>
 </file>
 
-<file path=ppt/slides/slide24.xml><?xml version="1.0" encoding="utf-8"?>
+<file path=ppt/slides/slide3.xml><?xml version="1.0" encoding="utf-8"?>
+<p:sld xmlns:a="http://schemas.openxmlformats.org/drawingml/2006/main" xmlns:r="http://schemas.openxmlformats.org/officeDocument/2006/relationships" xmlns:p="http://schemas.openxmlformats.org/presentationml/2006/main">
+  <p:cSld>
+    <p:spTree>
+      <p:nvGrpSpPr>
+        <p:cNvPr id="1" name=""/>
+        <p:cNvGrpSpPr/>
+        <p:nvPr/>
+      </p:nvGrpSpPr>
+      <p:grpSpPr>
+        <a:xfrm>
+          <a:off x="0" y="0"/>
+          <a:ext cx="0" cy="0"/>
+          <a:chOff x="0" y="0"/>
+          <a:chExt cx="0" cy="0"/>
+        </a:xfrm>
+      </p:grpSpPr>
+      <p:sp>
+        <p:nvSpPr>
+          <p:cNvPr id="2" name="Title 1"/>
+          <p:cNvSpPr>
+            <a:spLocks noGrp="1"/>
+          </p:cNvSpPr>
+          <p:nvPr>
+            <p:ph type="title"/>
+          </p:nvPr>
+        </p:nvSpPr>
+        <p:spPr/>
+        <p:txBody>
+          <a:bodyPr/>
+          <a:lstStyle/>
+          <a:p>
+            <a:r>
+              <a:rPr lang="ru-RU" dirty="0" smtClean="0"/>
+              <a:t>Ссылки</a:t>
+            </a:r>
+            <a:endParaRPr lang="ru-RU" dirty="0"/>
+          </a:p>
+        </p:txBody>
+      </p:sp>
+      <p:sp>
+        <p:nvSpPr>
+          <p:cNvPr id="3" name="Content Placeholder 2"/>
+          <p:cNvSpPr>
+            <a:spLocks noGrp="1"/>
+          </p:cNvSpPr>
+          <p:nvPr>
+            <p:ph idx="1"/>
+          </p:nvPr>
+        </p:nvSpPr>
+        <p:spPr/>
+        <p:txBody>
+          <a:bodyPr/>
+          <a:lstStyle/>
+          <a:p>
+            <a:r>
+              <a:rPr lang="ru-RU" dirty="0" smtClean="0"/>
+              <a:t>Официальная страница</a:t>
+            </a:r>
+            <a:br>
+              <a:rPr lang="ru-RU" dirty="0" smtClean="0"/>
+            </a:br>
+            <a:r>
+              <a:rPr lang="en-US" dirty="0" smtClean="0">
+                <a:hlinkClick r:id="rId2"/>
+              </a:rPr>
+              <a:t>http://msdn.microsoft.com/visualstudio</a:t>
+            </a:r>
+            <a:endParaRPr lang="ru-RU" dirty="0" smtClean="0"/>
+          </a:p>
+          <a:p>
+            <a:r>
+              <a:rPr lang="ru-RU" dirty="0" smtClean="0"/>
+              <a:t>Расширения</a:t>
+            </a:r>
+            <a:br>
+              <a:rPr lang="ru-RU" dirty="0" smtClean="0"/>
+            </a:br>
+            <a:r>
+              <a:rPr lang="en-US" dirty="0" smtClean="0">
+                <a:hlinkClick r:id="rId3"/>
+              </a:rPr>
+              <a:t>http://visualstudiogallery.msdn.microsoft.com</a:t>
+            </a:r>
+            <a:endParaRPr lang="ru-RU" dirty="0" smtClean="0"/>
+          </a:p>
+          <a:p>
+            <a:r>
+              <a:rPr lang="ru-RU" dirty="0" smtClean="0"/>
+              <a:t>Предложения по улучшению</a:t>
+            </a:r>
+            <a:br>
+              <a:rPr lang="ru-RU" dirty="0" smtClean="0"/>
+            </a:br>
+            <a:r>
+              <a:rPr lang="en-US" dirty="0" smtClean="0">
+                <a:hlinkClick r:id="rId4"/>
+              </a:rPr>
+              <a:t>http://visualstudio.uservoice.com</a:t>
+            </a:r>
+            <a:endParaRPr lang="ru-RU" dirty="0" smtClean="0"/>
+          </a:p>
+          <a:p>
+            <a:endParaRPr lang="ru-RU" dirty="0" smtClean="0"/>
+          </a:p>
+          <a:p>
+            <a:endParaRPr lang="ru-RU" dirty="0"/>
+          </a:p>
+        </p:txBody>
+      </p:sp>
+    </p:spTree>
+    <p:extLst>
+      <p:ext uri="{BB962C8B-B14F-4D97-AF65-F5344CB8AC3E}">
+        <p14:creationId xmlns:p14="http://schemas.microsoft.com/office/powerpoint/2010/main" val="1256543289"/>
+      </p:ext>
+    </p:extLst>
+  </p:cSld>
+  <p:clrMapOvr>
+    <a:masterClrMapping/>
+  </p:clrMapOvr>
+  <p:timing>
+    <p:tnLst>
+      <p:par>
+        <p:cTn id="1" dur="indefinite" restart="never" nodeType="tmRoot"/>
+      </p:par>
+    </p:tnLst>
+  </p:timing>
+</p:sld>
+</file>
+
+<file path=ppt/slides/slide30.xml><?xml version="1.0" encoding="utf-8"?>
 <p:sld xmlns:a="http://schemas.openxmlformats.org/drawingml/2006/main" xmlns:r="http://schemas.openxmlformats.org/officeDocument/2006/relationships" xmlns:p="http://schemas.openxmlformats.org/presentationml/2006/main">
   <p:cSld>
     <p:bg>
@@ -10709,10 +11689,17 @@
   <p:clrMapOvr>
     <a:overrideClrMapping bg1="lt1" tx1="dk1" bg2="lt2" tx2="dk2" accent1="accent1" accent2="accent2" accent3="accent3" accent4="accent4" accent5="accent5" accent6="accent6" hlink="hlink" folHlink="folHlink"/>
   </p:clrMapOvr>
+  <p:timing>
+    <p:tnLst>
+      <p:par>
+        <p:cTn id="1" dur="indefinite" restart="never" nodeType="tmRoot"/>
+      </p:par>
+    </p:tnLst>
+  </p:timing>
 </p:sld>
 </file>
 
-<file path=ppt/slides/slide25.xml><?xml version="1.0" encoding="utf-8"?>
+<file path=ppt/slides/slide31.xml><?xml version="1.0" encoding="utf-8"?>
 <p:sld xmlns:a="http://schemas.openxmlformats.org/drawingml/2006/main" xmlns:r="http://schemas.openxmlformats.org/officeDocument/2006/relationships" xmlns:p="http://schemas.openxmlformats.org/presentationml/2006/main">
   <p:cSld>
     <p:spTree>
@@ -10764,8 +11751,52 @@
         </p:nvSpPr>
         <p:spPr/>
         <p:txBody>
-          <a:bodyPr/>
+          <a:bodyPr>
+            <a:normAutofit/>
+          </a:bodyPr>
           <a:lstStyle/>
+          <a:p>
+            <a:r>
+              <a:rPr lang="en-US" dirty="0" smtClean="0">
+                <a:solidFill>
+                  <a:srgbClr val="92D050"/>
+                </a:solidFill>
+              </a:rPr>
+              <a:t>[12]</a:t>
+            </a:r>
+            <a:r>
+              <a:rPr lang="en-US" dirty="0" smtClean="0"/>
+              <a:t> Shift + Alt + f11 </a:t>
+            </a:r>
+            <a:r>
+              <a:rPr lang="en-US" dirty="0" smtClean="0"/>
+              <a:t>step into specific</a:t>
+            </a:r>
+          </a:p>
+          <a:p>
+            <a:r>
+              <a:rPr lang="en-US" dirty="0" smtClean="0"/>
+              <a:t>Shift + </a:t>
+            </a:r>
+            <a:r>
+              <a:rPr lang="en-US" dirty="0"/>
+              <a:t>F11 </a:t>
+            </a:r>
+            <a:r>
+              <a:rPr lang="en-US" dirty="0" smtClean="0"/>
+              <a:t>step out</a:t>
+            </a:r>
+          </a:p>
+          <a:p>
+            <a:r>
+              <a:rPr lang="en-US" dirty="0"/>
+              <a:t>Ctrl+F10 run </a:t>
+            </a:r>
+            <a:r>
+              <a:rPr lang="en-US" dirty="0" smtClean="0"/>
+              <a:t>to cursor</a:t>
+            </a:r>
+          </a:p>
           <a:p>
             <a:endParaRPr lang="en-US" dirty="0"/>
           </a:p>
@@ -10781,10 +11812,299 @@
   <p:clrMapOvr>
     <a:masterClrMapping/>
   </p:clrMapOvr>
+  <p:timing>
+    <p:tnLst>
+      <p:par>
+        <p:cTn id="1" dur="indefinite" restart="never" nodeType="tmRoot"/>
+      </p:par>
+    </p:tnLst>
+  </p:timing>
 </p:sld>
 </file>
 
-<file path=ppt/slides/slide26.xml><?xml version="1.0" encoding="utf-8"?>
+<file path=ppt/slides/slide32.xml><?xml version="1.0" encoding="utf-8"?>
+<p:sld xmlns:a="http://schemas.openxmlformats.org/drawingml/2006/main" xmlns:r="http://schemas.openxmlformats.org/officeDocument/2006/relationships" xmlns:p="http://schemas.openxmlformats.org/presentationml/2006/main">
+  <p:cSld>
+    <p:spTree>
+      <p:nvGrpSpPr>
+        <p:cNvPr id="1" name=""/>
+        <p:cNvGrpSpPr/>
+        <p:nvPr/>
+      </p:nvGrpSpPr>
+      <p:grpSpPr>
+        <a:xfrm>
+          <a:off x="0" y="0"/>
+          <a:ext cx="0" cy="0"/>
+          <a:chOff x="0" y="0"/>
+          <a:chExt cx="0" cy="0"/>
+        </a:xfrm>
+      </p:grpSpPr>
+      <p:sp>
+        <p:nvSpPr>
+          <p:cNvPr id="2" name="Title 1"/>
+          <p:cNvSpPr>
+            <a:spLocks noGrp="1"/>
+          </p:cNvSpPr>
+          <p:nvPr>
+            <p:ph type="title"/>
+          </p:nvPr>
+        </p:nvSpPr>
+        <p:spPr/>
+        <p:txBody>
+          <a:bodyPr/>
+          <a:lstStyle/>
+          <a:p>
+            <a:r>
+              <a:rPr lang="ru-RU" dirty="0" smtClean="0"/>
+              <a:t>Отладчик</a:t>
+            </a:r>
+            <a:r>
+              <a:rPr lang="en-US" dirty="0" smtClean="0"/>
+              <a:t>: data tips</a:t>
+            </a:r>
+            <a:endParaRPr lang="en-US" dirty="0"/>
+          </a:p>
+        </p:txBody>
+      </p:sp>
+      <p:sp>
+        <p:nvSpPr>
+          <p:cNvPr id="3" name="Content Placeholder 2"/>
+          <p:cNvSpPr>
+            <a:spLocks noGrp="1"/>
+          </p:cNvSpPr>
+          <p:nvPr>
+            <p:ph idx="1"/>
+          </p:nvPr>
+        </p:nvSpPr>
+        <p:spPr/>
+        <p:txBody>
+          <a:bodyPr>
+            <a:normAutofit lnSpcReduction="10000"/>
+          </a:bodyPr>
+          <a:lstStyle/>
+          <a:p>
+            <a:r>
+              <a:rPr lang="ru-RU" dirty="0" smtClean="0"/>
+              <a:t>Нажмите и удерживайте </a:t>
+            </a:r>
+            <a:r>
+              <a:rPr lang="en-US" dirty="0" smtClean="0">
+                <a:solidFill>
+                  <a:srgbClr val="F6AE1E"/>
+                </a:solidFill>
+              </a:rPr>
+              <a:t>Ctrl</a:t>
+            </a:r>
+            <a:r>
+              <a:rPr lang="en-US" dirty="0" smtClean="0"/>
+              <a:t> </a:t>
+            </a:r>
+            <a:r>
+              <a:rPr lang="ru-RU" dirty="0" smtClean="0"/>
+              <a:t>чтобы сделать </a:t>
+            </a:r>
+            <a:r>
+              <a:rPr lang="en-US" dirty="0" smtClean="0"/>
+              <a:t>data tip </a:t>
+            </a:r>
+            <a:r>
+              <a:rPr lang="ru-RU" dirty="0" smtClean="0"/>
+              <a:t>прозрачным</a:t>
+            </a:r>
+          </a:p>
+          <a:p>
+            <a:r>
+              <a:rPr lang="en-US" dirty="0" smtClean="0"/>
+              <a:t>Data tip </a:t>
+            </a:r>
+            <a:r>
+              <a:rPr lang="ru-RU" dirty="0" smtClean="0"/>
+              <a:t>работают для комментариев</a:t>
+            </a:r>
+          </a:p>
+          <a:p>
+            <a:r>
+              <a:rPr lang="ru-RU" dirty="0" smtClean="0"/>
+              <a:t>Если прикрепить (</a:t>
+            </a:r>
+            <a:r>
+              <a:rPr lang="en-US" dirty="0" smtClean="0"/>
+              <a:t>pin) data tip, </a:t>
+            </a:r>
+            <a:r>
+              <a:rPr lang="ru-RU" dirty="0" smtClean="0"/>
+              <a:t>то её последнее значение можно будет просматривать и после завершения отладки</a:t>
+            </a:r>
+          </a:p>
+          <a:p>
+            <a:r>
+              <a:rPr lang="ru-RU" dirty="0"/>
+              <a:t>К </a:t>
+            </a:r>
+            <a:r>
+              <a:rPr lang="en-US" dirty="0"/>
+              <a:t>data tip </a:t>
+            </a:r>
+            <a:r>
+              <a:rPr lang="ru-RU" dirty="0"/>
+              <a:t>можно </a:t>
+            </a:r>
+            <a:r>
+              <a:rPr lang="ru-RU" dirty="0" smtClean="0"/>
+              <a:t>написать комментарий. Для этого нажмите символ </a:t>
+            </a:r>
+            <a:r>
+              <a:rPr lang="ru-RU" b="1" dirty="0" smtClean="0"/>
+              <a:t>︾</a:t>
+            </a:r>
+            <a:r>
+              <a:rPr lang="ru-RU" dirty="0" smtClean="0"/>
+              <a:t> справа.</a:t>
+            </a:r>
+          </a:p>
+          <a:p>
+            <a:r>
+              <a:rPr lang="en-US" dirty="0" smtClean="0"/>
+              <a:t>Export/Import Data tips</a:t>
+            </a:r>
+            <a:endParaRPr lang="en-US" dirty="0"/>
+          </a:p>
+        </p:txBody>
+      </p:sp>
+    </p:spTree>
+    <p:extLst>
+      <p:ext uri="{BB962C8B-B14F-4D97-AF65-F5344CB8AC3E}">
+        <p14:creationId xmlns:p14="http://schemas.microsoft.com/office/powerpoint/2010/main" val="2649018507"/>
+      </p:ext>
+    </p:extLst>
+  </p:cSld>
+  <p:clrMapOvr>
+    <a:masterClrMapping/>
+  </p:clrMapOvr>
+  <p:timing>
+    <p:tnLst>
+      <p:par>
+        <p:cTn id="1" dur="indefinite" restart="never" nodeType="tmRoot"/>
+      </p:par>
+    </p:tnLst>
+  </p:timing>
+</p:sld>
+</file>
+
+<file path=ppt/slides/slide33.xml><?xml version="1.0" encoding="utf-8"?>
+<p:sld xmlns:a="http://schemas.openxmlformats.org/drawingml/2006/main" xmlns:r="http://schemas.openxmlformats.org/officeDocument/2006/relationships" xmlns:p="http://schemas.openxmlformats.org/presentationml/2006/main">
+  <p:cSld>
+    <p:spTree>
+      <p:nvGrpSpPr>
+        <p:cNvPr id="1" name=""/>
+        <p:cNvGrpSpPr/>
+        <p:nvPr/>
+      </p:nvGrpSpPr>
+      <p:grpSpPr>
+        <a:xfrm>
+          <a:off x="0" y="0"/>
+          <a:ext cx="0" cy="0"/>
+          <a:chOff x="0" y="0"/>
+          <a:chExt cx="0" cy="0"/>
+        </a:xfrm>
+      </p:grpSpPr>
+      <p:sp>
+        <p:nvSpPr>
+          <p:cNvPr id="2" name="Title 1"/>
+          <p:cNvSpPr>
+            <a:spLocks noGrp="1"/>
+          </p:cNvSpPr>
+          <p:nvPr>
+            <p:ph type="title"/>
+          </p:nvPr>
+        </p:nvSpPr>
+        <p:spPr/>
+        <p:txBody>
+          <a:bodyPr>
+            <a:normAutofit fontScale="90000"/>
+          </a:bodyPr>
+          <a:lstStyle/>
+          <a:p>
+            <a:r>
+              <a:rPr lang="en-US" dirty="0" smtClean="0">
+                <a:solidFill>
+                  <a:srgbClr val="92D050"/>
+                </a:solidFill>
+              </a:rPr>
+              <a:t>[12]</a:t>
+            </a:r>
+            <a:r>
+              <a:rPr lang="en-US" dirty="0" smtClean="0"/>
+              <a:t> </a:t>
+            </a:r>
+            <a:r>
+              <a:rPr lang="ru-RU" dirty="0" smtClean="0"/>
+              <a:t>Отладчик</a:t>
+            </a:r>
+            <a:r>
+              <a:rPr lang="en-US" dirty="0" smtClean="0"/>
+              <a:t>: </a:t>
+            </a:r>
+            <a:r>
+              <a:rPr lang="ru-RU" dirty="0" smtClean="0"/>
+              <a:t>окно </a:t>
+            </a:r>
+            <a:r>
+              <a:rPr lang="en-US" dirty="0" smtClean="0"/>
+              <a:t>Parallel Watch</a:t>
+            </a:r>
+            <a:endParaRPr lang="en-US" dirty="0"/>
+          </a:p>
+        </p:txBody>
+      </p:sp>
+      <p:sp>
+        <p:nvSpPr>
+          <p:cNvPr id="3" name="Content Placeholder 2"/>
+          <p:cNvSpPr>
+            <a:spLocks noGrp="1"/>
+          </p:cNvSpPr>
+          <p:nvPr>
+            <p:ph idx="1"/>
+          </p:nvPr>
+        </p:nvSpPr>
+        <p:spPr/>
+        <p:txBody>
+          <a:bodyPr>
+            <a:normAutofit/>
+          </a:bodyPr>
+          <a:lstStyle/>
+          <a:p>
+            <a:r>
+              <a:rPr lang="ru-RU" dirty="0" smtClean="0"/>
+              <a:t>Можно использовать для просмотра переменных при рекурсивных вызовах</a:t>
+            </a:r>
+          </a:p>
+          <a:p>
+            <a:endParaRPr lang="en-US" dirty="0"/>
+          </a:p>
+        </p:txBody>
+      </p:sp>
+    </p:spTree>
+    <p:extLst>
+      <p:ext uri="{BB962C8B-B14F-4D97-AF65-F5344CB8AC3E}">
+        <p14:creationId xmlns:p14="http://schemas.microsoft.com/office/powerpoint/2010/main" val="600624019"/>
+      </p:ext>
+    </p:extLst>
+  </p:cSld>
+  <p:clrMapOvr>
+    <a:masterClrMapping/>
+  </p:clrMapOvr>
+  <p:timing>
+    <p:tnLst>
+      <p:par>
+        <p:cTn id="1" dur="indefinite" restart="never" nodeType="tmRoot"/>
+      </p:par>
+    </p:tnLst>
+  </p:timing>
+</p:sld>
+</file>
+
+<file path=ppt/slides/slide34.xml><?xml version="1.0" encoding="utf-8"?>
 <p:sld xmlns:a="http://schemas.openxmlformats.org/drawingml/2006/main" xmlns:r="http://schemas.openxmlformats.org/officeDocument/2006/relationships" xmlns:p="http://schemas.openxmlformats.org/presentationml/2006/main">
   <p:cSld>
     <p:spTree>
@@ -11058,7 +12378,7 @@
 </p:sld>
 </file>
 
-<file path=ppt/slides/slide27.xml><?xml version="1.0" encoding="utf-8"?>
+<file path=ppt/slides/slide35.xml><?xml version="1.0" encoding="utf-8"?>
 <p:sld xmlns:a="http://schemas.openxmlformats.org/drawingml/2006/main" xmlns:r="http://schemas.openxmlformats.org/officeDocument/2006/relationships" xmlns:p="http://schemas.openxmlformats.org/presentationml/2006/main">
   <p:cSld>
     <p:spTree>
@@ -11181,136 +12501,6 @@
     <p:extLst>
       <p:ext uri="{BB962C8B-B14F-4D97-AF65-F5344CB8AC3E}">
         <p14:creationId xmlns:p14="http://schemas.microsoft.com/office/powerpoint/2010/main" val="2755780728"/>
-      </p:ext>
-    </p:extLst>
-  </p:cSld>
-  <p:clrMapOvr>
-    <a:masterClrMapping/>
-  </p:clrMapOvr>
-  <p:timing>
-    <p:tnLst>
-      <p:par>
-        <p:cTn id="1" dur="indefinite" restart="never" nodeType="tmRoot"/>
-      </p:par>
-    </p:tnLst>
-  </p:timing>
-</p:sld>
-</file>
-
-<file path=ppt/slides/slide3.xml><?xml version="1.0" encoding="utf-8"?>
-<p:sld xmlns:a="http://schemas.openxmlformats.org/drawingml/2006/main" xmlns:r="http://schemas.openxmlformats.org/officeDocument/2006/relationships" xmlns:p="http://schemas.openxmlformats.org/presentationml/2006/main">
-  <p:cSld>
-    <p:spTree>
-      <p:nvGrpSpPr>
-        <p:cNvPr id="1" name=""/>
-        <p:cNvGrpSpPr/>
-        <p:nvPr/>
-      </p:nvGrpSpPr>
-      <p:grpSpPr>
-        <a:xfrm>
-          <a:off x="0" y="0"/>
-          <a:ext cx="0" cy="0"/>
-          <a:chOff x="0" y="0"/>
-          <a:chExt cx="0" cy="0"/>
-        </a:xfrm>
-      </p:grpSpPr>
-      <p:sp>
-        <p:nvSpPr>
-          <p:cNvPr id="2" name="Title 1"/>
-          <p:cNvSpPr>
-            <a:spLocks noGrp="1"/>
-          </p:cNvSpPr>
-          <p:nvPr>
-            <p:ph type="title"/>
-          </p:nvPr>
-        </p:nvSpPr>
-        <p:spPr/>
-        <p:txBody>
-          <a:bodyPr/>
-          <a:lstStyle/>
-          <a:p>
-            <a:r>
-              <a:rPr lang="ru-RU" dirty="0" smtClean="0"/>
-              <a:t>Ссылки</a:t>
-            </a:r>
-            <a:endParaRPr lang="ru-RU" dirty="0"/>
-          </a:p>
-        </p:txBody>
-      </p:sp>
-      <p:sp>
-        <p:nvSpPr>
-          <p:cNvPr id="3" name="Content Placeholder 2"/>
-          <p:cNvSpPr>
-            <a:spLocks noGrp="1"/>
-          </p:cNvSpPr>
-          <p:nvPr>
-            <p:ph idx="1"/>
-          </p:nvPr>
-        </p:nvSpPr>
-        <p:spPr/>
-        <p:txBody>
-          <a:bodyPr/>
-          <a:lstStyle/>
-          <a:p>
-            <a:r>
-              <a:rPr lang="ru-RU" dirty="0" smtClean="0"/>
-              <a:t>Официальная страница</a:t>
-            </a:r>
-            <a:br>
-              <a:rPr lang="ru-RU" dirty="0" smtClean="0"/>
-            </a:br>
-            <a:r>
-              <a:rPr lang="en-US" dirty="0" smtClean="0">
-                <a:hlinkClick r:id="rId2"/>
-              </a:rPr>
-              <a:t>http://msdn.microsoft.com/visualstudio</a:t>
-            </a:r>
-            <a:endParaRPr lang="ru-RU" dirty="0" smtClean="0"/>
-          </a:p>
-          <a:p>
-            <a:r>
-              <a:rPr lang="ru-RU" dirty="0" smtClean="0"/>
-              <a:t>Расширения</a:t>
-            </a:r>
-            <a:br>
-              <a:rPr lang="ru-RU" dirty="0" smtClean="0"/>
-            </a:br>
-            <a:r>
-              <a:rPr lang="en-US" dirty="0" smtClean="0">
-                <a:hlinkClick r:id="rId3"/>
-              </a:rPr>
-              <a:t>http://visualstudiogallery.msdn.microsoft.com</a:t>
-            </a:r>
-            <a:endParaRPr lang="ru-RU" dirty="0" smtClean="0"/>
-          </a:p>
-          <a:p>
-            <a:r>
-              <a:rPr lang="ru-RU" dirty="0" smtClean="0"/>
-              <a:t>Предложения по улучшению</a:t>
-            </a:r>
-            <a:br>
-              <a:rPr lang="ru-RU" dirty="0" smtClean="0"/>
-            </a:br>
-            <a:r>
-              <a:rPr lang="en-US" dirty="0" smtClean="0">
-                <a:hlinkClick r:id="rId4"/>
-              </a:rPr>
-              <a:t>http://visualstudio.uservoice.com</a:t>
-            </a:r>
-            <a:endParaRPr lang="ru-RU" dirty="0" smtClean="0"/>
-          </a:p>
-          <a:p>
-            <a:endParaRPr lang="ru-RU" dirty="0" smtClean="0"/>
-          </a:p>
-          <a:p>
-            <a:endParaRPr lang="ru-RU" dirty="0"/>
-          </a:p>
-        </p:txBody>
-      </p:sp>
-    </p:spTree>
-    <p:extLst>
-      <p:ext uri="{BB962C8B-B14F-4D97-AF65-F5344CB8AC3E}">
-        <p14:creationId xmlns:p14="http://schemas.microsoft.com/office/powerpoint/2010/main" val="1256543289"/>
       </p:ext>
     </p:extLst>
   </p:cSld>
@@ -11380,7 +12570,7 @@
         <p:spPr/>
         <p:txBody>
           <a:bodyPr>
-            <a:normAutofit lnSpcReduction="10000"/>
+            <a:normAutofit/>
           </a:bodyPr>
           <a:lstStyle/>
           <a:p>
@@ -11446,6 +12636,14 @@
               <a:rPr lang="ru-RU" dirty="0" smtClean="0"/>
               <a:t>5</a:t>
             </a:r>
+            <a:r>
+              <a:rPr lang="en-US" dirty="0" smtClean="0"/>
+              <a:t> </a:t>
+            </a:r>
+            <a:r>
+              <a:rPr lang="ru-RU" dirty="0" smtClean="0"/>
+              <a:t>и выше</a:t>
+            </a:r>
             <a:endParaRPr lang="ru-RU" dirty="0" smtClean="0">
               <a:solidFill>
                 <a:srgbClr val="92D050"/>
@@ -11480,7 +12678,15 @@
             </a:r>
             <a:r>
               <a:rPr lang="en-US" dirty="0" smtClean="0"/>
-              <a:t>Visual Studio 2010</a:t>
+              <a:t>Visual Studio </a:t>
+            </a:r>
+            <a:r>
+              <a:rPr lang="en-US" dirty="0" smtClean="0"/>
+              <a:t>2010</a:t>
+            </a:r>
+            <a:r>
+              <a:rPr lang="ru-RU" dirty="0" smtClean="0"/>
+              <a:t> и выше</a:t>
             </a:r>
           </a:p>
           <a:p>
@@ -11513,31 +12719,64 @@
               <a:rPr lang="en-US" dirty="0" smtClean="0"/>
               <a:t>2012</a:t>
             </a:r>
-            <a:endParaRPr lang="ru-RU" dirty="0" smtClean="0"/>
-          </a:p>
-          <a:p>
-            <a:pPr marL="0" indent="0">
+            <a:r>
+              <a:rPr lang="ru-RU" dirty="0" smtClean="0"/>
+              <a:t> и выше</a:t>
+            </a:r>
+          </a:p>
+          <a:p>
+            <a:pPr lvl="1">
               <a:buClr>
                 <a:schemeClr val="bg1"/>
               </a:buClr>
-              <a:buNone/>
             </a:pPr>
-            <a:endParaRPr lang="en-US" dirty="0" smtClean="0"/>
-          </a:p>
-          <a:p>
-            <a:pPr marL="0" indent="0">
-              <a:buClr>
-                <a:schemeClr val="bg1"/>
-              </a:buClr>
-              <a:buNone/>
-            </a:pPr>
+            <a:r>
+              <a:rPr lang="en-US" dirty="0">
+                <a:solidFill>
+                  <a:srgbClr val="92D050"/>
+                </a:solidFill>
+              </a:rPr>
+              <a:t>[</a:t>
+            </a:r>
+            <a:r>
+              <a:rPr lang="en-US" dirty="0" smtClean="0">
+                <a:solidFill>
+                  <a:srgbClr val="92D050"/>
+                </a:solidFill>
+              </a:rPr>
+              <a:t>1</a:t>
+            </a:r>
+            <a:r>
+              <a:rPr lang="ru-RU" dirty="0" smtClean="0">
+                <a:solidFill>
+                  <a:srgbClr val="92D050"/>
+                </a:solidFill>
+              </a:rPr>
+              <a:t>3</a:t>
+            </a:r>
+            <a:r>
+              <a:rPr lang="en-US" dirty="0" smtClean="0">
+                <a:solidFill>
+                  <a:srgbClr val="92D050"/>
+                </a:solidFill>
+              </a:rPr>
+              <a:t>]</a:t>
+            </a:r>
+            <a:r>
+              <a:rPr lang="en-US" dirty="0" smtClean="0"/>
+              <a:t> </a:t>
+            </a:r>
+            <a:r>
+              <a:rPr lang="en-US" dirty="0"/>
+              <a:t>Visual Studio </a:t>
+            </a:r>
+            <a:r>
+              <a:rPr lang="en-US" dirty="0" smtClean="0"/>
+              <a:t>201</a:t>
+            </a:r>
             <a:r>
               <a:rPr lang="ru-RU" dirty="0" smtClean="0"/>
-              <a:t>Аналогично обозначаются версии ОС </a:t>
-            </a:r>
-            <a:r>
-              <a:rPr lang="en-US" dirty="0" smtClean="0"/>
-              <a:t>Windows</a:t>
+              <a:t>3 и выше</a:t>
             </a:r>
             <a:endParaRPr lang="en-US" dirty="0"/>
           </a:p>
@@ -12376,8 +13615,20 @@
           <a:lstStyle/>
           <a:p>
             <a:r>
+              <a:rPr lang="en-US" dirty="0" smtClean="0">
+                <a:solidFill>
+                  <a:srgbClr val="92D050"/>
+                </a:solidFill>
+              </a:rPr>
+              <a:t>[12]</a:t>
+            </a:r>
+            <a:r>
+              <a:rPr lang="en-US" dirty="0" smtClean="0"/>
+              <a:t> </a:t>
+            </a:r>
+            <a:r>
               <a:rPr lang="ru-RU" dirty="0" smtClean="0"/>
-              <a:t>Редактор</a:t>
+              <a:t>Цветная строка статуса</a:t>
             </a:r>
             <a:endParaRPr lang="ru-RU" dirty="0"/>
           </a:p>
@@ -12385,12 +13636,12 @@
       </p:sp>
       <p:sp>
         <p:nvSpPr>
-          <p:cNvPr id="3" name="Text Placeholder 2"/>
+          <p:cNvPr id="3" name="Content Placeholder 2"/>
           <p:cNvSpPr>
             <a:spLocks noGrp="1"/>
           </p:cNvSpPr>
           <p:nvPr>
-            <p:ph type="body" idx="1"/>
+            <p:ph idx="1"/>
           </p:nvPr>
         </p:nvSpPr>
         <p:spPr/>
@@ -12398,6 +13649,21 @@
           <a:bodyPr/>
           <a:lstStyle/>
           <a:p>
+            <a:pPr marL="0" indent="0">
+              <a:buNone/>
+            </a:pPr>
+            <a:r>
+              <a:rPr lang="ru-RU" dirty="0" smtClean="0"/>
+              <a:t>Строка статуса в </a:t>
+            </a:r>
+            <a:r>
+              <a:rPr lang="en-US" dirty="0" smtClean="0"/>
+              <a:t>Visual Studio </a:t>
+            </a:r>
+            <a:r>
+              <a:rPr lang="ru-RU" dirty="0" smtClean="0"/>
+              <a:t>меняет цвет в заивисимости от режима: по умолчанию, разработка и отладка.</a:t>
+            </a:r>
             <a:endParaRPr lang="ru-RU" dirty="0"/>
           </a:p>
         </p:txBody>
@@ -12405,7 +13671,7 @@
     </p:spTree>
     <p:extLst>
       <p:ext uri="{BB962C8B-B14F-4D97-AF65-F5344CB8AC3E}">
-        <p14:creationId xmlns:p14="http://schemas.microsoft.com/office/powerpoint/2010/main" val="3519851483"/>
+        <p14:creationId xmlns:p14="http://schemas.microsoft.com/office/powerpoint/2010/main" val="1784779431"/>
       </p:ext>
     </p:extLst>
   </p:cSld>

</xml_diff>